<commit_message>
Study creating a repository in disk
</commit_message>
<xml_diff>
--- a/GitStudy/GitStudy.pptx
+++ b/GitStudy/GitStudy.pptx
@@ -6,6 +6,7 @@
   </p:sldMasterIdLst>
   <p:sldIdLst>
     <p:sldId id="256" r:id="rId2"/>
+    <p:sldId id="257" r:id="rId3"/>
   </p:sldIdLst>
   <p:sldSz cx="12192000" cy="6858000"/>
   <p:notesSz cx="6858000" cy="9144000"/>
@@ -104,6 +105,11 @@
       </a:defRPr>
     </a:lvl9pPr>
   </p:defaultTextStyle>
+  <p:extLst>
+    <p:ext uri="{EFAFB233-063F-42B5-8137-9DF3F51BA10A}">
+      <p15:sldGuideLst xmlns:p15="http://schemas.microsoft.com/office/powerpoint/2012/main"/>
+    </p:ext>
+  </p:extLst>
 </p:presentation>
 </file>
 
@@ -3363,6 +3369,148 @@
 </p:sld>
 </file>
 
+<file path=ppt/slides/slide2.xml><?xml version="1.0" encoding="utf-8"?>
+<p:sld xmlns:a="http://schemas.openxmlformats.org/drawingml/2006/main" xmlns:r="http://schemas.openxmlformats.org/officeDocument/2006/relationships" xmlns:p="http://schemas.openxmlformats.org/presentationml/2006/main">
+  <p:cSld>
+    <p:spTree>
+      <p:nvGrpSpPr>
+        <p:cNvPr id="1" name=""/>
+        <p:cNvGrpSpPr/>
+        <p:nvPr/>
+      </p:nvGrpSpPr>
+      <p:grpSpPr>
+        <a:xfrm>
+          <a:off x="0" y="0"/>
+          <a:ext cx="0" cy="0"/>
+          <a:chOff x="0" y="0"/>
+          <a:chExt cx="0" cy="0"/>
+        </a:xfrm>
+      </p:grpSpPr>
+      <p:sp>
+        <p:nvSpPr>
+          <p:cNvPr id="4" name="文字方塊 3">
+            <a:extLst>
+              <a:ext uri="{FF2B5EF4-FFF2-40B4-BE49-F238E27FC236}">
+                <a16:creationId xmlns:a16="http://schemas.microsoft.com/office/drawing/2014/main" id="{094FFABB-BB23-4EF3-902E-DFBBF7927157}"/>
+              </a:ext>
+            </a:extLst>
+          </p:cNvPr>
+          <p:cNvSpPr txBox="1"/>
+          <p:nvPr/>
+        </p:nvSpPr>
+        <p:spPr>
+          <a:xfrm>
+            <a:off x="294640" y="406400"/>
+            <a:ext cx="10596880" cy="1200329"/>
+          </a:xfrm>
+          <a:prstGeom prst="rect">
+            <a:avLst/>
+          </a:prstGeom>
+          <a:noFill/>
+        </p:spPr>
+        <p:txBody>
+          <a:bodyPr wrap="square" rtlCol="0">
+            <a:spAutoFit/>
+          </a:bodyPr>
+          <a:lstStyle/>
+          <a:p>
+            <a:pPr marL="342900" indent="-342900">
+              <a:buAutoNum type="arabicPeriod"/>
+            </a:pPr>
+            <a:r>
+              <a:rPr lang="en-US" altLang="zh-CN" dirty="0"/>
+              <a:t>Git</a:t>
+            </a:r>
+            <a:r>
+              <a:rPr lang="zh-CN" altLang="en-US" dirty="0"/>
+              <a:t>將</a:t>
+            </a:r>
+            <a:r>
+              <a:rPr lang="en-US" altLang="zh-CN" dirty="0"/>
+              <a:t>U</a:t>
+            </a:r>
+            <a:r>
+              <a:rPr lang="zh-CN" altLang="en-US" dirty="0"/>
+              <a:t>盤做成一個倉庫</a:t>
+            </a:r>
+            <a:endParaRPr lang="en-US" altLang="zh-CN" dirty="0"/>
+          </a:p>
+          <a:p>
+            <a:r>
+              <a:rPr lang="en-US" altLang="zh-TW" dirty="0"/>
+              <a:t>	(1)  </a:t>
+            </a:r>
+            <a:r>
+              <a:rPr lang="zh-CN" altLang="en-US" dirty="0"/>
+              <a:t>在</a:t>
+            </a:r>
+            <a:r>
+              <a:rPr lang="en-US" altLang="zh-CN" dirty="0"/>
+              <a:t>U</a:t>
+            </a:r>
+            <a:r>
+              <a:rPr lang="zh-CN" altLang="en-US" dirty="0"/>
+              <a:t>盤下建立一個文件夾</a:t>
+            </a:r>
+            <a:endParaRPr lang="en-US" altLang="zh-CN" dirty="0"/>
+          </a:p>
+          <a:p>
+            <a:r>
+              <a:rPr lang="en-US" altLang="zh-TW" dirty="0"/>
+              <a:t>	(2)   git </a:t>
+            </a:r>
+            <a:r>
+              <a:rPr lang="en-US" altLang="zh-TW" dirty="0" err="1"/>
+              <a:t>init</a:t>
+            </a:r>
+            <a:r>
+              <a:rPr lang="en-US" altLang="zh-TW" dirty="0"/>
+              <a:t> --bare </a:t>
+            </a:r>
+            <a:r>
+              <a:rPr lang="zh-CN" altLang="en-US" dirty="0"/>
+              <a:t>倉庫名</a:t>
+            </a:r>
+            <a:endParaRPr lang="en-US" altLang="zh-CN" dirty="0"/>
+          </a:p>
+          <a:p>
+            <a:r>
+              <a:rPr lang="en-US" altLang="zh-TW" dirty="0"/>
+              <a:t>	(3)   </a:t>
+            </a:r>
+            <a:r>
+              <a:rPr lang="zh-CN" altLang="en-US" dirty="0"/>
+              <a:t>在電腦上使用指令 </a:t>
+            </a:r>
+            <a:r>
+              <a:rPr lang="en-US" altLang="zh-CN" dirty="0"/>
+              <a:t>git clone + U</a:t>
+            </a:r>
+            <a:r>
+              <a:rPr lang="zh-CN" altLang="en-US" dirty="0"/>
+              <a:t>盤倉庫的路徑</a:t>
+            </a:r>
+            <a:r>
+              <a:rPr lang="en-US" altLang="zh-TW" dirty="0"/>
+              <a:t> </a:t>
+            </a:r>
+            <a:endParaRPr lang="zh-TW" altLang="en-US" dirty="0"/>
+          </a:p>
+        </p:txBody>
+      </p:sp>
+    </p:spTree>
+    <p:extLst>
+      <p:ext uri="{BB962C8B-B14F-4D97-AF65-F5344CB8AC3E}">
+        <p14:creationId xmlns:p14="http://schemas.microsoft.com/office/powerpoint/2010/main" val="2604005234"/>
+      </p:ext>
+    </p:extLst>
+  </p:cSld>
+  <p:clrMapOvr>
+    <a:masterClrMapping/>
+  </p:clrMapOvr>
+</p:sld>
+</file>
+
 <file path=ppt/theme/theme1.xml><?xml version="1.0" encoding="utf-8"?>
 <a:theme xmlns:a="http://schemas.openxmlformats.org/drawingml/2006/main" name="Office 佈景主題">
   <a:themeElements>

</xml_diff>

<commit_message>
Git Study-add git full name
</commit_message>
<xml_diff>
--- a/GitStudy/GitStudy.pptx
+++ b/GitStudy/GitStudy.pptx
@@ -6,7 +6,8 @@
   </p:sldMasterIdLst>
   <p:sldIdLst>
     <p:sldId id="256" r:id="rId2"/>
-    <p:sldId id="257" r:id="rId3"/>
+    <p:sldId id="258" r:id="rId3"/>
+    <p:sldId id="257" r:id="rId4"/>
   </p:sldIdLst>
   <p:sldSz cx="12192000" cy="6858000"/>
   <p:notesSz cx="6858000" cy="9144000"/>
@@ -3391,6 +3392,90 @@
           <p:cNvPr id="4" name="文字方塊 3">
             <a:extLst>
               <a:ext uri="{FF2B5EF4-FFF2-40B4-BE49-F238E27FC236}">
+                <a16:creationId xmlns:a16="http://schemas.microsoft.com/office/drawing/2014/main" id="{BC71AE0C-3F8B-488D-B2E4-3481BD33F881}"/>
+              </a:ext>
+            </a:extLst>
+          </p:cNvPr>
+          <p:cNvSpPr txBox="1"/>
+          <p:nvPr/>
+        </p:nvSpPr>
+        <p:spPr>
+          <a:xfrm>
+            <a:off x="487680" y="375920"/>
+            <a:ext cx="3671518" cy="646331"/>
+          </a:xfrm>
+          <a:prstGeom prst="rect">
+            <a:avLst/>
+          </a:prstGeom>
+          <a:noFill/>
+        </p:spPr>
+        <p:txBody>
+          <a:bodyPr wrap="none" rtlCol="0">
+            <a:spAutoFit/>
+          </a:bodyPr>
+          <a:lstStyle/>
+          <a:p>
+            <a:pPr marL="342900" indent="-342900">
+              <a:buAutoNum type="arabicPeriod"/>
+            </a:pPr>
+            <a:r>
+              <a:rPr lang="en-US" altLang="zh-CN" dirty="0"/>
+              <a:t>Git</a:t>
+            </a:r>
+            <a:r>
+              <a:rPr lang="zh-CN" altLang="en-US" dirty="0"/>
+              <a:t>的全稱</a:t>
+            </a:r>
+            <a:endParaRPr lang="en-US" altLang="zh-CN" dirty="0"/>
+          </a:p>
+          <a:p>
+            <a:r>
+              <a:rPr lang="en-US" altLang="zh-TW" dirty="0"/>
+              <a:t>        </a:t>
+            </a:r>
+            <a:r>
+              <a:rPr lang="en-US" altLang="zh-CN" dirty="0"/>
+              <a:t>Git  -- global information tracker</a:t>
+            </a:r>
+            <a:endParaRPr lang="zh-TW" altLang="en-US" dirty="0"/>
+          </a:p>
+        </p:txBody>
+      </p:sp>
+    </p:spTree>
+    <p:extLst>
+      <p:ext uri="{BB962C8B-B14F-4D97-AF65-F5344CB8AC3E}">
+        <p14:creationId xmlns:p14="http://schemas.microsoft.com/office/powerpoint/2010/main" val="1981488840"/>
+      </p:ext>
+    </p:extLst>
+  </p:cSld>
+  <p:clrMapOvr>
+    <a:masterClrMapping/>
+  </p:clrMapOvr>
+</p:sld>
+</file>
+
+<file path=ppt/slides/slide3.xml><?xml version="1.0" encoding="utf-8"?>
+<p:sld xmlns:a="http://schemas.openxmlformats.org/drawingml/2006/main" xmlns:r="http://schemas.openxmlformats.org/officeDocument/2006/relationships" xmlns:p="http://schemas.openxmlformats.org/presentationml/2006/main">
+  <p:cSld>
+    <p:spTree>
+      <p:nvGrpSpPr>
+        <p:cNvPr id="1" name=""/>
+        <p:cNvGrpSpPr/>
+        <p:nvPr/>
+      </p:nvGrpSpPr>
+      <p:grpSpPr>
+        <a:xfrm>
+          <a:off x="0" y="0"/>
+          <a:ext cx="0" cy="0"/>
+          <a:chOff x="0" y="0"/>
+          <a:chExt cx="0" cy="0"/>
+        </a:xfrm>
+      </p:grpSpPr>
+      <p:sp>
+        <p:nvSpPr>
+          <p:cNvPr id="4" name="文字方塊 3">
+            <a:extLst>
+              <a:ext uri="{FF2B5EF4-FFF2-40B4-BE49-F238E27FC236}">
                 <a16:creationId xmlns:a16="http://schemas.microsoft.com/office/drawing/2014/main" id="{094FFABB-BB23-4EF3-902E-DFBBF7927157}"/>
               </a:ext>
             </a:extLst>

</xml_diff>

<commit_message>
Add the git.editor config Add the git config file location
</commit_message>
<xml_diff>
--- a/GitStudy/GitStudy.pptx
+++ b/GitStudy/GitStudy.pptx
@@ -3486,7 +3486,7 @@
         <p:spPr>
           <a:xfrm>
             <a:off x="294640" y="406400"/>
-            <a:ext cx="10596880" cy="1200329"/>
+            <a:ext cx="10596880" cy="3416320"/>
           </a:xfrm>
           <a:prstGeom prst="rect">
             <a:avLst/>
@@ -3523,7 +3523,15 @@
           <a:p>
             <a:r>
               <a:rPr lang="en-US" altLang="zh-TW" dirty="0"/>
-              <a:t>	(1)  </a:t>
+              <a:t> </a:t>
+            </a:r>
+            <a:r>
+              <a:rPr lang="en-US" altLang="zh-TW" dirty="0" smtClean="0"/>
+              <a:t>             (</a:t>
+            </a:r>
+            <a:r>
+              <a:rPr lang="en-US" altLang="zh-TW" dirty="0"/>
+              <a:t>1)  </a:t>
             </a:r>
             <a:r>
               <a:rPr lang="zh-CN" altLang="en-US" dirty="0"/>
@@ -3542,7 +3550,19 @@
           <a:p>
             <a:r>
               <a:rPr lang="en-US" altLang="zh-TW" dirty="0"/>
-              <a:t>	(2)   git </a:t>
+              <a:t> </a:t>
+            </a:r>
+            <a:r>
+              <a:rPr lang="en-US" altLang="zh-TW" dirty="0" smtClean="0"/>
+              <a:t>             </a:t>
+            </a:r>
+            <a:r>
+              <a:rPr lang="en-US" altLang="zh-TW" dirty="0" smtClean="0"/>
+              <a:t>(</a:t>
+            </a:r>
+            <a:r>
+              <a:rPr lang="en-US" altLang="zh-TW" dirty="0"/>
+              <a:t>2)   git </a:t>
             </a:r>
             <a:r>
               <a:rPr lang="en-US" altLang="zh-TW" dirty="0" err="1"/>
@@ -3561,7 +3581,19 @@
           <a:p>
             <a:r>
               <a:rPr lang="en-US" altLang="zh-TW" dirty="0"/>
-              <a:t>	(3)   </a:t>
+              <a:t> </a:t>
+            </a:r>
+            <a:r>
+              <a:rPr lang="en-US" altLang="zh-TW" dirty="0" smtClean="0"/>
+              <a:t>             </a:t>
+            </a:r>
+            <a:r>
+              <a:rPr lang="en-US" altLang="zh-TW" dirty="0" smtClean="0"/>
+              <a:t>(</a:t>
+            </a:r>
+            <a:r>
+              <a:rPr lang="en-US" altLang="zh-TW" dirty="0"/>
+              <a:t>3)   </a:t>
             </a:r>
             <a:r>
               <a:rPr lang="zh-CN" altLang="en-US" dirty="0"/>
@@ -3573,13 +3605,239 @@
             </a:r>
             <a:r>
               <a:rPr lang="zh-CN" altLang="en-US" dirty="0"/>
-              <a:t>盤倉庫的路徑</a:t>
-            </a:r>
+              <a:t>盤倉庫的路</a:t>
+            </a:r>
+            <a:r>
+              <a:rPr lang="zh-CN" altLang="en-US" dirty="0" smtClean="0"/>
+              <a:t>徑</a:t>
+            </a:r>
+            <a:endParaRPr lang="en-US" altLang="zh-CN" dirty="0" smtClean="0"/>
+          </a:p>
+          <a:p>
+            <a:endParaRPr lang="en-US" altLang="zh-TW" dirty="0"/>
+          </a:p>
+          <a:p>
+            <a:r>
+              <a:rPr lang="en-US" altLang="zh-CN" dirty="0" smtClean="0"/>
+              <a:t>2.   </a:t>
+            </a:r>
+            <a:r>
+              <a:rPr lang="zh-CN" altLang="en-US" dirty="0" smtClean="0"/>
+              <a:t>配置</a:t>
+            </a:r>
+            <a:r>
+              <a:rPr lang="en-US" altLang="zh-CN" dirty="0" err="1" smtClean="0"/>
+              <a:t>git</a:t>
+            </a:r>
+            <a:r>
+              <a:rPr lang="zh-CN" altLang="en-US" dirty="0"/>
+              <a:t> </a:t>
+            </a:r>
+            <a:r>
+              <a:rPr lang="en-US" altLang="zh-CN" dirty="0" smtClean="0"/>
+              <a:t>commit</a:t>
+            </a:r>
+            <a:r>
+              <a:rPr lang="zh-CN" altLang="en-US" dirty="0" smtClean="0"/>
+              <a:t>的编辑器</a:t>
+            </a:r>
+            <a:endParaRPr lang="en-US" altLang="zh-CN" dirty="0" smtClean="0"/>
+          </a:p>
+          <a:p>
+            <a:pPr lvl="1"/>
+            <a:r>
+              <a:rPr lang="en-US" altLang="zh-CN" dirty="0"/>
+              <a:t> </a:t>
+            </a:r>
+            <a:r>
+              <a:rPr lang="en-US" altLang="zh-CN" dirty="0" err="1"/>
+              <a:t>git</a:t>
+            </a:r>
+            <a:r>
+              <a:rPr lang="en-US" altLang="zh-CN" dirty="0"/>
+              <a:t> </a:t>
+            </a:r>
+            <a:r>
+              <a:rPr lang="en-US" altLang="zh-CN" dirty="0" err="1"/>
+              <a:t>config</a:t>
+            </a:r>
+            <a:r>
+              <a:rPr lang="en-US" altLang="zh-CN" dirty="0"/>
+              <a:t> --global </a:t>
+            </a:r>
+            <a:r>
+              <a:rPr lang="en-US" altLang="zh-CN" dirty="0" err="1"/>
+              <a:t>core.editor</a:t>
+            </a:r>
+            <a:r>
+              <a:rPr lang="en-US" altLang="zh-CN" dirty="0"/>
+              <a:t> notepad++.</a:t>
+            </a:r>
+            <a:r>
+              <a:rPr lang="en-US" altLang="zh-CN" dirty="0" smtClean="0"/>
+              <a:t>exe</a:t>
+            </a:r>
+            <a:r>
+              <a:rPr lang="en-US" altLang="zh-TW" dirty="0" smtClean="0"/>
+              <a:t> </a:t>
+            </a:r>
+          </a:p>
+          <a:p>
+            <a:pPr marL="0" lvl="1"/>
+            <a:endParaRPr lang="en-US" altLang="zh-TW" dirty="0" smtClean="0"/>
+          </a:p>
+          <a:p>
+            <a:pPr marL="342900" lvl="1" indent="-342900">
+              <a:buAutoNum type="arabicPeriod" startAt="3"/>
+            </a:pPr>
+            <a:r>
+              <a:rPr lang="en-US" altLang="zh-CN" dirty="0" err="1" smtClean="0"/>
+              <a:t>git</a:t>
+            </a:r>
+            <a:r>
+              <a:rPr lang="en-US" altLang="zh-CN" dirty="0" smtClean="0"/>
+              <a:t> </a:t>
+            </a:r>
+            <a:r>
+              <a:rPr lang="en-US" altLang="zh-CN" dirty="0" err="1" smtClean="0"/>
+              <a:t>config</a:t>
+            </a:r>
+            <a:r>
+              <a:rPr lang="zh-CN" altLang="en-US" dirty="0"/>
+              <a:t> </a:t>
+            </a:r>
+            <a:r>
+              <a:rPr lang="zh-CN" altLang="en-US" dirty="0" smtClean="0"/>
+              <a:t>配置产生的位置</a:t>
+            </a:r>
+            <a:endParaRPr lang="en-US" altLang="zh-CN" dirty="0" smtClean="0"/>
+          </a:p>
+          <a:p>
+            <a:pPr marL="0" lvl="1"/>
+            <a:r>
+              <a:rPr lang="en-US" altLang="zh-TW" dirty="0" smtClean="0"/>
+              <a:t>          </a:t>
+            </a:r>
+            <a:r>
+              <a:rPr lang="en-US" altLang="zh-CN" dirty="0" err="1" smtClean="0"/>
+              <a:t>git</a:t>
+            </a:r>
+            <a:r>
+              <a:rPr lang="en-US" altLang="zh-CN" dirty="0" smtClean="0"/>
+              <a:t> </a:t>
+            </a:r>
+            <a:r>
+              <a:rPr lang="en-US" altLang="zh-CN" dirty="0" err="1" smtClean="0"/>
+              <a:t>config</a:t>
+            </a:r>
+            <a:r>
+              <a:rPr lang="en-US" altLang="zh-CN" dirty="0" smtClean="0"/>
+              <a:t> </a:t>
+            </a:r>
+            <a:r>
+              <a:rPr lang="en-US" altLang="zh-CN" dirty="0"/>
+              <a:t>--system         </a:t>
+            </a:r>
+            <a:r>
+              <a:rPr lang="zh-CN" altLang="en-US" dirty="0"/>
+              <a:t>位置</a:t>
+            </a:r>
+            <a:r>
+              <a:rPr lang="en-US" altLang="zh-CN" dirty="0" smtClean="0"/>
+              <a:t>D</a:t>
+            </a:r>
+            <a:r>
+              <a:rPr lang="en-US" altLang="zh-CN" dirty="0"/>
+              <a:t>:\</a:t>
+            </a:r>
+            <a:r>
+              <a:rPr lang="en-US" altLang="zh-CN" dirty="0" smtClean="0"/>
+              <a:t>git\Git\mingw64\etc\gitconfig</a:t>
+            </a:r>
+          </a:p>
+          <a:p>
+            <a:pPr marL="0" lvl="1"/>
             <a:r>
               <a:rPr lang="en-US" altLang="zh-TW" dirty="0"/>
               <a:t> </a:t>
             </a:r>
-            <a:endParaRPr lang="zh-TW" altLang="en-US" dirty="0"/>
+            <a:r>
+              <a:rPr lang="en-US" altLang="zh-TW" dirty="0" smtClean="0"/>
+              <a:t>         </a:t>
+            </a:r>
+            <a:r>
+              <a:rPr lang="en-US" altLang="zh-TW" dirty="0" err="1" smtClean="0"/>
+              <a:t>git</a:t>
+            </a:r>
+            <a:r>
+              <a:rPr lang="en-US" altLang="zh-TW" dirty="0" smtClean="0"/>
+              <a:t> </a:t>
+            </a:r>
+            <a:r>
+              <a:rPr lang="en-US" altLang="zh-TW" dirty="0" err="1" smtClean="0"/>
+              <a:t>config</a:t>
+            </a:r>
+            <a:r>
+              <a:rPr lang="en-US" altLang="zh-TW" dirty="0" smtClean="0"/>
+              <a:t> --global          </a:t>
+            </a:r>
+            <a:r>
+              <a:rPr lang="zh-CN" altLang="en-US" dirty="0" smtClean="0"/>
+              <a:t>位置</a:t>
+            </a:r>
+            <a:r>
+              <a:rPr lang="en-US" altLang="zh-CN" dirty="0"/>
+              <a:t>C:\</a:t>
+            </a:r>
+            <a:r>
+              <a:rPr lang="en-US" altLang="zh-CN" dirty="0" smtClean="0"/>
+              <a:t>Users\Administrator\.gitconfig</a:t>
+            </a:r>
+            <a:endParaRPr lang="en-US" altLang="zh-TW" dirty="0" smtClean="0"/>
+          </a:p>
+          <a:p>
+            <a:pPr marL="0" lvl="1"/>
+            <a:r>
+              <a:rPr lang="en-US" altLang="zh-TW" dirty="0" smtClean="0"/>
+              <a:t>          </a:t>
+            </a:r>
+            <a:r>
+              <a:rPr lang="en-US" altLang="zh-TW" dirty="0" err="1" smtClean="0"/>
+              <a:t>git</a:t>
+            </a:r>
+            <a:r>
+              <a:rPr lang="en-US" altLang="zh-TW" dirty="0" smtClean="0"/>
+              <a:t> </a:t>
+            </a:r>
+            <a:r>
+              <a:rPr lang="en-US" altLang="zh-TW" dirty="0" err="1" smtClean="0"/>
+              <a:t>config</a:t>
+            </a:r>
+            <a:r>
+              <a:rPr lang="en-US" altLang="zh-TW" dirty="0" smtClean="0"/>
+              <a:t> –local             </a:t>
+            </a:r>
+            <a:r>
+              <a:rPr lang="zh-CN" altLang="en-US" dirty="0" smtClean="0"/>
+              <a:t>位置 本地版本库 </a:t>
+            </a:r>
+            <a:r>
+              <a:rPr lang="en-US" altLang="zh-CN" dirty="0" smtClean="0"/>
+              <a:t>.</a:t>
+            </a:r>
+            <a:r>
+              <a:rPr lang="en-US" altLang="zh-CN" dirty="0" err="1" smtClean="0"/>
+              <a:t>git</a:t>
+            </a:r>
+            <a:r>
+              <a:rPr lang="en-US" altLang="zh-CN" dirty="0" smtClean="0"/>
+              <a:t>\</a:t>
+            </a:r>
+            <a:r>
+              <a:rPr lang="en-US" altLang="zh-CN" smtClean="0"/>
+              <a:t>config</a:t>
+            </a:r>
+            <a:endParaRPr lang="en-US" altLang="zh-TW" dirty="0" smtClean="0"/>
           </a:p>
         </p:txBody>
       </p:sp>

</xml_diff>

<commit_message>
Add git config list
</commit_message>
<xml_diff>
--- a/GitStudy/GitStudy.pptx
+++ b/GitStudy/GitStudy.pptx
@@ -261,7 +261,7 @@
           <a:p>
             <a:fld id="{B3DC4D43-2745-46E1-A871-6B61F7786A47}" type="datetimeFigureOut">
               <a:rPr lang="zh-TW" altLang="en-US" smtClean="0"/>
-              <a:t>2023/1/5</a:t>
+              <a:t>2023/1/6</a:t>
             </a:fld>
             <a:endParaRPr lang="zh-TW" altLang="en-US"/>
           </a:p>
@@ -459,7 +459,7 @@
           <a:p>
             <a:fld id="{B3DC4D43-2745-46E1-A871-6B61F7786A47}" type="datetimeFigureOut">
               <a:rPr lang="zh-TW" altLang="en-US" smtClean="0"/>
-              <a:t>2023/1/5</a:t>
+              <a:t>2023/1/6</a:t>
             </a:fld>
             <a:endParaRPr lang="zh-TW" altLang="en-US"/>
           </a:p>
@@ -667,7 +667,7 @@
           <a:p>
             <a:fld id="{B3DC4D43-2745-46E1-A871-6B61F7786A47}" type="datetimeFigureOut">
               <a:rPr lang="zh-TW" altLang="en-US" smtClean="0"/>
-              <a:t>2023/1/5</a:t>
+              <a:t>2023/1/6</a:t>
             </a:fld>
             <a:endParaRPr lang="zh-TW" altLang="en-US"/>
           </a:p>
@@ -865,7 +865,7 @@
           <a:p>
             <a:fld id="{B3DC4D43-2745-46E1-A871-6B61F7786A47}" type="datetimeFigureOut">
               <a:rPr lang="zh-TW" altLang="en-US" smtClean="0"/>
-              <a:t>2023/1/5</a:t>
+              <a:t>2023/1/6</a:t>
             </a:fld>
             <a:endParaRPr lang="zh-TW" altLang="en-US"/>
           </a:p>
@@ -1140,7 +1140,7 @@
           <a:p>
             <a:fld id="{B3DC4D43-2745-46E1-A871-6B61F7786A47}" type="datetimeFigureOut">
               <a:rPr lang="zh-TW" altLang="en-US" smtClean="0"/>
-              <a:t>2023/1/5</a:t>
+              <a:t>2023/1/6</a:t>
             </a:fld>
             <a:endParaRPr lang="zh-TW" altLang="en-US"/>
           </a:p>
@@ -1405,7 +1405,7 @@
           <a:p>
             <a:fld id="{B3DC4D43-2745-46E1-A871-6B61F7786A47}" type="datetimeFigureOut">
               <a:rPr lang="zh-TW" altLang="en-US" smtClean="0"/>
-              <a:t>2023/1/5</a:t>
+              <a:t>2023/1/6</a:t>
             </a:fld>
             <a:endParaRPr lang="zh-TW" altLang="en-US"/>
           </a:p>
@@ -1817,7 +1817,7 @@
           <a:p>
             <a:fld id="{B3DC4D43-2745-46E1-A871-6B61F7786A47}" type="datetimeFigureOut">
               <a:rPr lang="zh-TW" altLang="en-US" smtClean="0"/>
-              <a:t>2023/1/5</a:t>
+              <a:t>2023/1/6</a:t>
             </a:fld>
             <a:endParaRPr lang="zh-TW" altLang="en-US"/>
           </a:p>
@@ -1958,7 +1958,7 @@
           <a:p>
             <a:fld id="{B3DC4D43-2745-46E1-A871-6B61F7786A47}" type="datetimeFigureOut">
               <a:rPr lang="zh-TW" altLang="en-US" smtClean="0"/>
-              <a:t>2023/1/5</a:t>
+              <a:t>2023/1/6</a:t>
             </a:fld>
             <a:endParaRPr lang="zh-TW" altLang="en-US"/>
           </a:p>
@@ -2071,7 +2071,7 @@
           <a:p>
             <a:fld id="{B3DC4D43-2745-46E1-A871-6B61F7786A47}" type="datetimeFigureOut">
               <a:rPr lang="zh-TW" altLang="en-US" smtClean="0"/>
-              <a:t>2023/1/5</a:t>
+              <a:t>2023/1/6</a:t>
             </a:fld>
             <a:endParaRPr lang="zh-TW" altLang="en-US"/>
           </a:p>
@@ -2382,7 +2382,7 @@
           <a:p>
             <a:fld id="{B3DC4D43-2745-46E1-A871-6B61F7786A47}" type="datetimeFigureOut">
               <a:rPr lang="zh-TW" altLang="en-US" smtClean="0"/>
-              <a:t>2023/1/5</a:t>
+              <a:t>2023/1/6</a:t>
             </a:fld>
             <a:endParaRPr lang="zh-TW" altLang="en-US"/>
           </a:p>
@@ -2670,7 +2670,7 @@
           <a:p>
             <a:fld id="{B3DC4D43-2745-46E1-A871-6B61F7786A47}" type="datetimeFigureOut">
               <a:rPr lang="zh-TW" altLang="en-US" smtClean="0"/>
-              <a:t>2023/1/5</a:t>
+              <a:t>2023/1/6</a:t>
             </a:fld>
             <a:endParaRPr lang="zh-TW" altLang="en-US"/>
           </a:p>
@@ -2911,7 +2911,7 @@
           <a:p>
             <a:fld id="{B3DC4D43-2745-46E1-A871-6B61F7786A47}" type="datetimeFigureOut">
               <a:rPr lang="zh-TW" altLang="en-US" smtClean="0"/>
-              <a:t>2023/1/5</a:t>
+              <a:t>2023/1/6</a:t>
             </a:fld>
             <a:endParaRPr lang="zh-TW" altLang="en-US"/>
           </a:p>
@@ -3486,7 +3486,7 @@
         <p:spPr>
           <a:xfrm>
             <a:off x="294640" y="406400"/>
-            <a:ext cx="10596880" cy="3416320"/>
+            <a:ext cx="10596880" cy="4801314"/>
           </a:xfrm>
           <a:prstGeom prst="rect">
             <a:avLst/>
@@ -3523,15 +3523,7 @@
           <a:p>
             <a:r>
               <a:rPr lang="en-US" altLang="zh-TW" dirty="0"/>
-              <a:t> </a:t>
-            </a:r>
-            <a:r>
-              <a:rPr lang="en-US" altLang="zh-TW" dirty="0" smtClean="0"/>
-              <a:t>             (</a:t>
-            </a:r>
-            <a:r>
-              <a:rPr lang="en-US" altLang="zh-TW" dirty="0"/>
-              <a:t>1)  </a:t>
+              <a:t>              (1)  </a:t>
             </a:r>
             <a:r>
               <a:rPr lang="zh-CN" altLang="en-US" dirty="0"/>
@@ -3550,19 +3542,7 @@
           <a:p>
             <a:r>
               <a:rPr lang="en-US" altLang="zh-TW" dirty="0"/>
-              <a:t> </a:t>
-            </a:r>
-            <a:r>
-              <a:rPr lang="en-US" altLang="zh-TW" dirty="0" smtClean="0"/>
-              <a:t>             </a:t>
-            </a:r>
-            <a:r>
-              <a:rPr lang="en-US" altLang="zh-TW" dirty="0" smtClean="0"/>
-              <a:t>(</a:t>
-            </a:r>
-            <a:r>
-              <a:rPr lang="en-US" altLang="zh-TW" dirty="0"/>
-              <a:t>2)   git </a:t>
+              <a:t>              (2)   git </a:t>
             </a:r>
             <a:r>
               <a:rPr lang="en-US" altLang="zh-TW" dirty="0" err="1"/>
@@ -3581,19 +3561,7 @@
           <a:p>
             <a:r>
               <a:rPr lang="en-US" altLang="zh-TW" dirty="0"/>
-              <a:t> </a:t>
-            </a:r>
-            <a:r>
-              <a:rPr lang="en-US" altLang="zh-TW" dirty="0" smtClean="0"/>
-              <a:t>             </a:t>
-            </a:r>
-            <a:r>
-              <a:rPr lang="en-US" altLang="zh-TW" dirty="0" smtClean="0"/>
-              <a:t>(</a:t>
-            </a:r>
-            <a:r>
-              <a:rPr lang="en-US" altLang="zh-TW" dirty="0"/>
-              <a:t>3)   </a:t>
+              <a:t>              (3)   </a:t>
             </a:r>
             <a:r>
               <a:rPr lang="zh-CN" altLang="en-US" dirty="0"/>
@@ -3605,28 +3573,24 @@
             </a:r>
             <a:r>
               <a:rPr lang="zh-CN" altLang="en-US" dirty="0"/>
-              <a:t>盤倉庫的路</a:t>
-            </a:r>
-            <a:r>
-              <a:rPr lang="zh-CN" altLang="en-US" dirty="0" smtClean="0"/>
-              <a:t>徑</a:t>
-            </a:r>
-            <a:endParaRPr lang="en-US" altLang="zh-CN" dirty="0" smtClean="0"/>
+              <a:t>盤倉庫的路徑</a:t>
+            </a:r>
+            <a:endParaRPr lang="en-US" altLang="zh-CN" dirty="0"/>
           </a:p>
           <a:p>
             <a:endParaRPr lang="en-US" altLang="zh-TW" dirty="0"/>
           </a:p>
           <a:p>
             <a:r>
-              <a:rPr lang="en-US" altLang="zh-CN" dirty="0" smtClean="0"/>
+              <a:rPr lang="en-US" altLang="zh-CN" dirty="0"/>
               <a:t>2.   </a:t>
             </a:r>
             <a:r>
-              <a:rPr lang="zh-CN" altLang="en-US" dirty="0" smtClean="0"/>
+              <a:rPr lang="zh-CN" altLang="en-US" dirty="0"/>
               <a:t>配置</a:t>
             </a:r>
             <a:r>
-              <a:rPr lang="en-US" altLang="zh-CN" dirty="0" err="1" smtClean="0"/>
+              <a:rPr lang="en-US" altLang="zh-CN" dirty="0" err="1"/>
               <a:t>git</a:t>
             </a:r>
             <a:r>
@@ -3634,14 +3598,14 @@
               <a:t> </a:t>
             </a:r>
             <a:r>
-              <a:rPr lang="en-US" altLang="zh-CN" dirty="0" smtClean="0"/>
+              <a:rPr lang="en-US" altLang="zh-CN" dirty="0"/>
               <a:t>commit</a:t>
             </a:r>
             <a:r>
-              <a:rPr lang="zh-CN" altLang="en-US" dirty="0" smtClean="0"/>
+              <a:rPr lang="zh-CN" altLang="en-US" dirty="0"/>
               <a:t>的编辑器</a:t>
             </a:r>
-            <a:endParaRPr lang="en-US" altLang="zh-CN" dirty="0" smtClean="0"/>
+            <a:endParaRPr lang="en-US" altLang="zh-CN" dirty="0"/>
           </a:p>
           <a:p>
             <a:pPr lvl="1"/>
@@ -3671,173 +3635,210 @@
             </a:r>
             <a:r>
               <a:rPr lang="en-US" altLang="zh-CN" dirty="0"/>
-              <a:t> notepad++.</a:t>
-            </a:r>
-            <a:r>
-              <a:rPr lang="en-US" altLang="zh-CN" dirty="0" smtClean="0"/>
-              <a:t>exe</a:t>
-            </a:r>
-            <a:r>
-              <a:rPr lang="en-US" altLang="zh-TW" dirty="0" smtClean="0"/>
+              <a:t> notepad++.exe</a:t>
+            </a:r>
+            <a:r>
+              <a:rPr lang="en-US" altLang="zh-TW" dirty="0"/>
               <a:t> </a:t>
             </a:r>
           </a:p>
           <a:p>
             <a:pPr marL="0" lvl="1"/>
-            <a:endParaRPr lang="en-US" altLang="zh-TW" dirty="0" smtClean="0"/>
+            <a:endParaRPr lang="en-US" altLang="zh-TW" dirty="0"/>
           </a:p>
           <a:p>
             <a:pPr marL="342900" lvl="1" indent="-342900">
               <a:buAutoNum type="arabicPeriod" startAt="3"/>
             </a:pPr>
             <a:r>
-              <a:rPr lang="en-US" altLang="zh-CN" dirty="0" err="1" smtClean="0"/>
+              <a:rPr lang="en-US" altLang="zh-CN" dirty="0" err="1"/>
               <a:t>git</a:t>
             </a:r>
             <a:r>
-              <a:rPr lang="en-US" altLang="zh-CN" dirty="0" smtClean="0"/>
+              <a:rPr lang="en-US" altLang="zh-CN" dirty="0"/>
               <a:t> </a:t>
             </a:r>
             <a:r>
-              <a:rPr lang="en-US" altLang="zh-CN" dirty="0" err="1" smtClean="0"/>
+              <a:rPr lang="en-US" altLang="zh-CN" dirty="0" err="1"/>
               <a:t>config</a:t>
             </a:r>
             <a:r>
               <a:rPr lang="zh-CN" altLang="en-US" dirty="0"/>
+              <a:t> 配置产生的位置</a:t>
+            </a:r>
+            <a:endParaRPr lang="en-US" altLang="zh-CN" dirty="0"/>
+          </a:p>
+          <a:p>
+            <a:pPr marL="0" lvl="1"/>
+            <a:r>
+              <a:rPr lang="en-US" altLang="zh-TW" dirty="0"/>
+              <a:t>          </a:t>
+            </a:r>
+            <a:r>
+              <a:rPr lang="en-US" altLang="zh-CN" dirty="0" err="1"/>
+              <a:t>git</a:t>
+            </a:r>
+            <a:r>
+              <a:rPr lang="en-US" altLang="zh-CN" dirty="0"/>
               <a:t> </a:t>
             </a:r>
             <a:r>
-              <a:rPr lang="zh-CN" altLang="en-US" dirty="0" smtClean="0"/>
-              <a:t>配置产生的位置</a:t>
-            </a:r>
-            <a:endParaRPr lang="en-US" altLang="zh-CN" dirty="0" smtClean="0"/>
-          </a:p>
-          <a:p>
-            <a:pPr marL="0" lvl="1"/>
-            <a:r>
-              <a:rPr lang="en-US" altLang="zh-TW" dirty="0" smtClean="0"/>
-              <a:t>          </a:t>
-            </a:r>
-            <a:r>
-              <a:rPr lang="en-US" altLang="zh-CN" dirty="0" err="1" smtClean="0"/>
-              <a:t>git</a:t>
-            </a:r>
-            <a:r>
-              <a:rPr lang="en-US" altLang="zh-CN" dirty="0" smtClean="0"/>
-              <a:t> </a:t>
-            </a:r>
-            <a:r>
-              <a:rPr lang="en-US" altLang="zh-CN" dirty="0" err="1" smtClean="0"/>
+              <a:rPr lang="en-US" altLang="zh-CN" dirty="0" err="1"/>
               <a:t>config</a:t>
             </a:r>
             <a:r>
-              <a:rPr lang="en-US" altLang="zh-CN" dirty="0" smtClean="0"/>
-              <a:t> </a:t>
-            </a:r>
-            <a:r>
               <a:rPr lang="en-US" altLang="zh-CN" dirty="0"/>
-              <a:t>--system         </a:t>
+              <a:t> --system         </a:t>
             </a:r>
             <a:r>
               <a:rPr lang="zh-CN" altLang="en-US" dirty="0"/>
               <a:t>位置</a:t>
             </a:r>
             <a:r>
-              <a:rPr lang="en-US" altLang="zh-CN" dirty="0" smtClean="0"/>
-              <a:t>D</a:t>
-            </a:r>
-            <a:r>
               <a:rPr lang="en-US" altLang="zh-CN" dirty="0"/>
-              <a:t>:\</a:t>
-            </a:r>
-            <a:r>
-              <a:rPr lang="en-US" altLang="zh-CN" dirty="0" smtClean="0"/>
-              <a:t>git\Git\mingw64\etc\gitconfig</a:t>
+              <a:t>D:\git\Git\mingw64\etc\gitconfig</a:t>
             </a:r>
           </a:p>
           <a:p>
             <a:pPr marL="0" lvl="1"/>
+            <a:r>
+              <a:rPr lang="en-US" altLang="zh-TW" dirty="0"/>
+              <a:t>          </a:t>
+            </a:r>
+            <a:r>
+              <a:rPr lang="en-US" altLang="zh-TW" dirty="0" err="1"/>
+              <a:t>git</a:t>
+            </a:r>
             <a:r>
               <a:rPr lang="en-US" altLang="zh-TW" dirty="0"/>
               <a:t> </a:t>
             </a:r>
             <a:r>
-              <a:rPr lang="en-US" altLang="zh-TW" dirty="0" smtClean="0"/>
+              <a:rPr lang="en-US" altLang="zh-TW" dirty="0" err="1"/>
+              <a:t>config</a:t>
+            </a:r>
+            <a:r>
+              <a:rPr lang="en-US" altLang="zh-TW" dirty="0"/>
+              <a:t> --global          </a:t>
+            </a:r>
+            <a:r>
+              <a:rPr lang="zh-CN" altLang="en-US" dirty="0"/>
+              <a:t>位置</a:t>
+            </a:r>
+            <a:r>
+              <a:rPr lang="en-US" altLang="zh-CN" dirty="0"/>
+              <a:t>C:\Users\Administrator\.gitconfig</a:t>
+            </a:r>
+            <a:endParaRPr lang="en-US" altLang="zh-TW" dirty="0"/>
+          </a:p>
+          <a:p>
+            <a:pPr marL="0" lvl="1"/>
+            <a:r>
+              <a:rPr lang="en-US" altLang="zh-TW" dirty="0"/>
+              <a:t>          </a:t>
+            </a:r>
+            <a:r>
+              <a:rPr lang="en-US" altLang="zh-TW" dirty="0" err="1"/>
+              <a:t>git</a:t>
+            </a:r>
+            <a:r>
+              <a:rPr lang="en-US" altLang="zh-TW" dirty="0"/>
+              <a:t> </a:t>
+            </a:r>
+            <a:r>
+              <a:rPr lang="en-US" altLang="zh-TW" dirty="0" err="1"/>
+              <a:t>config</a:t>
+            </a:r>
+            <a:r>
+              <a:rPr lang="en-US" altLang="zh-TW" dirty="0"/>
+              <a:t> –local             </a:t>
+            </a:r>
+            <a:r>
+              <a:rPr lang="zh-CN" altLang="en-US" dirty="0"/>
+              <a:t>位置 本地版本库 </a:t>
+            </a:r>
+            <a:r>
+              <a:rPr lang="en-US" altLang="zh-CN" dirty="0"/>
+              <a:t>.git\config</a:t>
+            </a:r>
+          </a:p>
+          <a:p>
+            <a:pPr marL="0" lvl="1"/>
+            <a:endParaRPr lang="en-US" altLang="zh-TW" dirty="0"/>
+          </a:p>
+          <a:p>
+            <a:pPr marL="0" lvl="1"/>
+            <a:r>
+              <a:rPr lang="en-US" altLang="zh-CN" dirty="0"/>
+              <a:t>4. </a:t>
+            </a:r>
+            <a:r>
+              <a:rPr lang="zh-CN" altLang="en-US" dirty="0"/>
+              <a:t>顯示</a:t>
+            </a:r>
+            <a:r>
+              <a:rPr lang="en-US" altLang="zh-CN" dirty="0"/>
+              <a:t>config</a:t>
+            </a:r>
+            <a:r>
+              <a:rPr lang="zh-CN" altLang="en-US" dirty="0"/>
+              <a:t>當中的信息</a:t>
+            </a:r>
+            <a:endParaRPr lang="en-US" altLang="zh-CN" dirty="0"/>
+          </a:p>
+          <a:p>
+            <a:pPr marL="0" lvl="1"/>
+            <a:r>
+              <a:rPr lang="en-US" altLang="zh-TW" dirty="0"/>
               <a:t>         </a:t>
             </a:r>
             <a:r>
-              <a:rPr lang="en-US" altLang="zh-TW" dirty="0" err="1" smtClean="0"/>
-              <a:t>git</a:t>
-            </a:r>
-            <a:r>
-              <a:rPr lang="en-US" altLang="zh-TW" dirty="0" smtClean="0"/>
-              <a:t> </a:t>
-            </a:r>
-            <a:r>
-              <a:rPr lang="en-US" altLang="zh-TW" dirty="0" err="1" smtClean="0"/>
-              <a:t>config</a:t>
-            </a:r>
-            <a:r>
-              <a:rPr lang="en-US" altLang="zh-TW" dirty="0" smtClean="0"/>
-              <a:t> --global          </a:t>
-            </a:r>
-            <a:r>
-              <a:rPr lang="zh-CN" altLang="en-US" dirty="0" smtClean="0"/>
+              <a:rPr lang="en-US" altLang="zh-CN" dirty="0"/>
+              <a:t>git config --system –l      </a:t>
+            </a:r>
+            <a:r>
+              <a:rPr lang="zh-CN" altLang="en-US" dirty="0"/>
               <a:t>位置</a:t>
             </a:r>
             <a:r>
               <a:rPr lang="en-US" altLang="zh-CN" dirty="0"/>
-              <a:t>C:\</a:t>
-            </a:r>
-            <a:r>
-              <a:rPr lang="en-US" altLang="zh-CN" dirty="0" smtClean="0"/>
-              <a:t>Users\Administrator\.gitconfig</a:t>
-            </a:r>
-            <a:endParaRPr lang="en-US" altLang="zh-TW" dirty="0" smtClean="0"/>
+              <a:t>D:\git\Git\mingw64\etc\gitconfig</a:t>
+            </a:r>
           </a:p>
           <a:p>
             <a:pPr marL="0" lvl="1"/>
             <a:r>
-              <a:rPr lang="en-US" altLang="zh-TW" dirty="0" smtClean="0"/>
-              <a:t>          </a:t>
-            </a:r>
-            <a:r>
-              <a:rPr lang="en-US" altLang="zh-TW" dirty="0" err="1" smtClean="0"/>
-              <a:t>git</a:t>
-            </a:r>
-            <a:r>
-              <a:rPr lang="en-US" altLang="zh-TW" dirty="0" smtClean="0"/>
-              <a:t> </a:t>
-            </a:r>
-            <a:r>
-              <a:rPr lang="en-US" altLang="zh-TW" dirty="0" err="1" smtClean="0"/>
-              <a:t>config</a:t>
-            </a:r>
-            <a:r>
-              <a:rPr lang="en-US" altLang="zh-TW" dirty="0" smtClean="0"/>
-              <a:t> –local             </a:t>
-            </a:r>
-            <a:r>
-              <a:rPr lang="zh-CN" altLang="en-US" dirty="0" smtClean="0"/>
+              <a:rPr lang="en-US" altLang="zh-TW" dirty="0"/>
+              <a:t>         </a:t>
+            </a:r>
+            <a:r>
+              <a:rPr lang="en-US" altLang="zh-CN" dirty="0"/>
+              <a:t>git config --global –l        </a:t>
+            </a:r>
+            <a:r>
+              <a:rPr lang="zh-CN" altLang="en-US" dirty="0"/>
+              <a:t>位置</a:t>
+            </a:r>
+            <a:r>
+              <a:rPr lang="en-US" altLang="zh-CN" dirty="0"/>
+              <a:t>C:\Users\Administrator\.gitconfig</a:t>
+            </a:r>
+          </a:p>
+          <a:p>
+            <a:pPr marL="0" lvl="1"/>
+            <a:r>
+              <a:rPr lang="en-US" altLang="zh-CN" dirty="0"/>
+              <a:t>         git config --system –l       </a:t>
+            </a:r>
+            <a:r>
+              <a:rPr lang="zh-CN" altLang="en-US" dirty="0"/>
               <a:t>位置 本地版本库 </a:t>
             </a:r>
             <a:r>
-              <a:rPr lang="en-US" altLang="zh-CN" dirty="0" smtClean="0"/>
-              <a:t>.</a:t>
-            </a:r>
-            <a:r>
-              <a:rPr lang="en-US" altLang="zh-CN" dirty="0" err="1" smtClean="0"/>
-              <a:t>git</a:t>
-            </a:r>
-            <a:r>
-              <a:rPr lang="en-US" altLang="zh-CN" dirty="0" smtClean="0"/>
-              <a:t>\</a:t>
-            </a:r>
-            <a:r>
-              <a:rPr lang="en-US" altLang="zh-CN" smtClean="0"/>
-              <a:t>config</a:t>
-            </a:r>
-            <a:endParaRPr lang="en-US" altLang="zh-TW" dirty="0" smtClean="0"/>
+              <a:rPr lang="en-US" altLang="zh-CN" dirty="0"/>
+              <a:t>.git\config</a:t>
+            </a:r>
+            <a:endParaRPr lang="en-US" altLang="zh-TW" dirty="0"/>
           </a:p>
         </p:txBody>
       </p:sp>

</xml_diff>

<commit_message>
Add the git branch command and tidy the ppt content
</commit_message>
<xml_diff>
--- a/GitStudy/GitStudy.pptx
+++ b/GitStudy/GitStudy.pptx
@@ -8,6 +8,12 @@
     <p:sldId id="256" r:id="rId2"/>
     <p:sldId id="258" r:id="rId3"/>
     <p:sldId id="257" r:id="rId4"/>
+    <p:sldId id="263" r:id="rId5"/>
+    <p:sldId id="264" r:id="rId6"/>
+    <p:sldId id="259" r:id="rId7"/>
+    <p:sldId id="260" r:id="rId8"/>
+    <p:sldId id="261" r:id="rId9"/>
+    <p:sldId id="262" r:id="rId10"/>
   </p:sldIdLst>
   <p:sldSz cx="12192000" cy="6858000"/>
   <p:notesSz cx="6858000" cy="9144000"/>
@@ -261,7 +267,7 @@
           <a:p>
             <a:fld id="{B3DC4D43-2745-46E1-A871-6B61F7786A47}" type="datetimeFigureOut">
               <a:rPr lang="zh-TW" altLang="en-US" smtClean="0"/>
-              <a:t>2023/1/6</a:t>
+              <a:t>2023/1/13</a:t>
             </a:fld>
             <a:endParaRPr lang="zh-TW" altLang="en-US"/>
           </a:p>
@@ -459,7 +465,7 @@
           <a:p>
             <a:fld id="{B3DC4D43-2745-46E1-A871-6B61F7786A47}" type="datetimeFigureOut">
               <a:rPr lang="zh-TW" altLang="en-US" smtClean="0"/>
-              <a:t>2023/1/6</a:t>
+              <a:t>2023/1/13</a:t>
             </a:fld>
             <a:endParaRPr lang="zh-TW" altLang="en-US"/>
           </a:p>
@@ -667,7 +673,7 @@
           <a:p>
             <a:fld id="{B3DC4D43-2745-46E1-A871-6B61F7786A47}" type="datetimeFigureOut">
               <a:rPr lang="zh-TW" altLang="en-US" smtClean="0"/>
-              <a:t>2023/1/6</a:t>
+              <a:t>2023/1/13</a:t>
             </a:fld>
             <a:endParaRPr lang="zh-TW" altLang="en-US"/>
           </a:p>
@@ -865,7 +871,7 @@
           <a:p>
             <a:fld id="{B3DC4D43-2745-46E1-A871-6B61F7786A47}" type="datetimeFigureOut">
               <a:rPr lang="zh-TW" altLang="en-US" smtClean="0"/>
-              <a:t>2023/1/6</a:t>
+              <a:t>2023/1/13</a:t>
             </a:fld>
             <a:endParaRPr lang="zh-TW" altLang="en-US"/>
           </a:p>
@@ -1140,7 +1146,7 @@
           <a:p>
             <a:fld id="{B3DC4D43-2745-46E1-A871-6B61F7786A47}" type="datetimeFigureOut">
               <a:rPr lang="zh-TW" altLang="en-US" smtClean="0"/>
-              <a:t>2023/1/6</a:t>
+              <a:t>2023/1/13</a:t>
             </a:fld>
             <a:endParaRPr lang="zh-TW" altLang="en-US"/>
           </a:p>
@@ -1405,7 +1411,7 @@
           <a:p>
             <a:fld id="{B3DC4D43-2745-46E1-A871-6B61F7786A47}" type="datetimeFigureOut">
               <a:rPr lang="zh-TW" altLang="en-US" smtClean="0"/>
-              <a:t>2023/1/6</a:t>
+              <a:t>2023/1/13</a:t>
             </a:fld>
             <a:endParaRPr lang="zh-TW" altLang="en-US"/>
           </a:p>
@@ -1817,7 +1823,7 @@
           <a:p>
             <a:fld id="{B3DC4D43-2745-46E1-A871-6B61F7786A47}" type="datetimeFigureOut">
               <a:rPr lang="zh-TW" altLang="en-US" smtClean="0"/>
-              <a:t>2023/1/6</a:t>
+              <a:t>2023/1/13</a:t>
             </a:fld>
             <a:endParaRPr lang="zh-TW" altLang="en-US"/>
           </a:p>
@@ -1958,7 +1964,7 @@
           <a:p>
             <a:fld id="{B3DC4D43-2745-46E1-A871-6B61F7786A47}" type="datetimeFigureOut">
               <a:rPr lang="zh-TW" altLang="en-US" smtClean="0"/>
-              <a:t>2023/1/6</a:t>
+              <a:t>2023/1/13</a:t>
             </a:fld>
             <a:endParaRPr lang="zh-TW" altLang="en-US"/>
           </a:p>
@@ -2071,7 +2077,7 @@
           <a:p>
             <a:fld id="{B3DC4D43-2745-46E1-A871-6B61F7786A47}" type="datetimeFigureOut">
               <a:rPr lang="zh-TW" altLang="en-US" smtClean="0"/>
-              <a:t>2023/1/6</a:t>
+              <a:t>2023/1/13</a:t>
             </a:fld>
             <a:endParaRPr lang="zh-TW" altLang="en-US"/>
           </a:p>
@@ -2382,7 +2388,7 @@
           <a:p>
             <a:fld id="{B3DC4D43-2745-46E1-A871-6B61F7786A47}" type="datetimeFigureOut">
               <a:rPr lang="zh-TW" altLang="en-US" smtClean="0"/>
-              <a:t>2023/1/6</a:t>
+              <a:t>2023/1/13</a:t>
             </a:fld>
             <a:endParaRPr lang="zh-TW" altLang="en-US"/>
           </a:p>
@@ -2670,7 +2676,7 @@
           <a:p>
             <a:fld id="{B3DC4D43-2745-46E1-A871-6B61F7786A47}" type="datetimeFigureOut">
               <a:rPr lang="zh-TW" altLang="en-US" smtClean="0"/>
-              <a:t>2023/1/6</a:t>
+              <a:t>2023/1/13</a:t>
             </a:fld>
             <a:endParaRPr lang="zh-TW" altLang="en-US"/>
           </a:p>
@@ -2911,7 +2917,7 @@
           <a:p>
             <a:fld id="{B3DC4D43-2745-46E1-A871-6B61F7786A47}" type="datetimeFigureOut">
               <a:rPr lang="zh-TW" altLang="en-US" smtClean="0"/>
-              <a:t>2023/1/6</a:t>
+              <a:t>2023/1/13</a:t>
             </a:fld>
             <a:endParaRPr lang="zh-TW" altLang="en-US"/>
           </a:p>
@@ -3486,7 +3492,7 @@
         <p:spPr>
           <a:xfrm>
             <a:off x="294640" y="406400"/>
-            <a:ext cx="10596880" cy="4801314"/>
+            <a:ext cx="10596880" cy="2308324"/>
           </a:xfrm>
           <a:prstGeom prst="rect">
             <a:avLst/>
@@ -3581,208 +3587,18 @@
             <a:endParaRPr lang="en-US" altLang="zh-TW" dirty="0"/>
           </a:p>
           <a:p>
-            <a:r>
-              <a:rPr lang="en-US" altLang="zh-CN" dirty="0"/>
-              <a:t>2.   </a:t>
-            </a:r>
-            <a:r>
-              <a:rPr lang="zh-CN" altLang="en-US" dirty="0"/>
-              <a:t>配置</a:t>
-            </a:r>
-            <a:r>
-              <a:rPr lang="en-US" altLang="zh-CN" dirty="0" err="1"/>
-              <a:t>git</a:t>
-            </a:r>
-            <a:r>
-              <a:rPr lang="zh-CN" altLang="en-US" dirty="0"/>
-              <a:t> </a:t>
-            </a:r>
-            <a:r>
-              <a:rPr lang="en-US" altLang="zh-CN" dirty="0"/>
-              <a:t>commit</a:t>
-            </a:r>
-            <a:r>
-              <a:rPr lang="zh-CN" altLang="en-US" dirty="0"/>
-              <a:t>的编辑器</a:t>
-            </a:r>
-            <a:endParaRPr lang="en-US" altLang="zh-CN" dirty="0"/>
-          </a:p>
-          <a:p>
-            <a:pPr lvl="1"/>
-            <a:r>
-              <a:rPr lang="en-US" altLang="zh-CN" dirty="0"/>
-              <a:t> </a:t>
-            </a:r>
-            <a:r>
-              <a:rPr lang="en-US" altLang="zh-CN" dirty="0" err="1"/>
-              <a:t>git</a:t>
-            </a:r>
-            <a:r>
-              <a:rPr lang="en-US" altLang="zh-CN" dirty="0"/>
-              <a:t> </a:t>
-            </a:r>
-            <a:r>
-              <a:rPr lang="en-US" altLang="zh-CN" dirty="0" err="1"/>
-              <a:t>config</a:t>
-            </a:r>
-            <a:r>
-              <a:rPr lang="en-US" altLang="zh-CN" dirty="0"/>
-              <a:t> --global </a:t>
-            </a:r>
-            <a:r>
-              <a:rPr lang="en-US" altLang="zh-CN" dirty="0" err="1"/>
-              <a:t>core.editor</a:t>
-            </a:r>
-            <a:r>
-              <a:rPr lang="en-US" altLang="zh-CN" dirty="0"/>
-              <a:t> notepad++.exe</a:t>
-            </a:r>
-            <a:r>
-              <a:rPr lang="en-US" altLang="zh-TW" dirty="0"/>
-              <a:t> </a:t>
-            </a:r>
-          </a:p>
-          <a:p>
             <a:pPr marL="0" lvl="1"/>
             <a:endParaRPr lang="en-US" altLang="zh-TW" dirty="0"/>
           </a:p>
           <a:p>
-            <a:pPr marL="342900" lvl="1" indent="-342900">
-              <a:buAutoNum type="arabicPeriod" startAt="3"/>
-            </a:pPr>
-            <a:r>
-              <a:rPr lang="en-US" altLang="zh-CN" dirty="0" err="1"/>
-              <a:t>git</a:t>
-            </a:r>
+            <a:pPr marL="0" lvl="1"/>
             <a:r>
               <a:rPr lang="en-US" altLang="zh-CN" dirty="0"/>
-              <a:t> </a:t>
-            </a:r>
-            <a:r>
-              <a:rPr lang="en-US" altLang="zh-CN" dirty="0" err="1"/>
-              <a:t>config</a:t>
+              <a:t>5. </a:t>
             </a:r>
             <a:r>
               <a:rPr lang="zh-CN" altLang="en-US" dirty="0"/>
-              <a:t> 配置产生的位置</a:t>
-            </a:r>
-            <a:endParaRPr lang="en-US" altLang="zh-CN" dirty="0"/>
-          </a:p>
-          <a:p>
-            <a:pPr marL="0" lvl="1"/>
-            <a:r>
-              <a:rPr lang="en-US" altLang="zh-TW" dirty="0"/>
-              <a:t>          </a:t>
-            </a:r>
-            <a:r>
-              <a:rPr lang="en-US" altLang="zh-CN" dirty="0" err="1"/>
-              <a:t>git</a:t>
-            </a:r>
-            <a:r>
-              <a:rPr lang="en-US" altLang="zh-CN" dirty="0"/>
-              <a:t> </a:t>
-            </a:r>
-            <a:r>
-              <a:rPr lang="en-US" altLang="zh-CN" dirty="0" err="1"/>
-              <a:t>config</a:t>
-            </a:r>
-            <a:r>
-              <a:rPr lang="en-US" altLang="zh-CN" dirty="0"/>
-              <a:t> --system         </a:t>
-            </a:r>
-            <a:r>
-              <a:rPr lang="zh-CN" altLang="en-US" dirty="0"/>
-              <a:t>位置</a:t>
-            </a:r>
-            <a:r>
-              <a:rPr lang="en-US" altLang="zh-CN" dirty="0"/>
-              <a:t>D:\git\Git\mingw64\etc\gitconfig</a:t>
-            </a:r>
-          </a:p>
-          <a:p>
-            <a:pPr marL="0" lvl="1"/>
-            <a:r>
-              <a:rPr lang="en-US" altLang="zh-TW" dirty="0"/>
-              <a:t>          </a:t>
-            </a:r>
-            <a:r>
-              <a:rPr lang="en-US" altLang="zh-TW" dirty="0" err="1"/>
-              <a:t>git</a:t>
-            </a:r>
-            <a:r>
-              <a:rPr lang="en-US" altLang="zh-TW" dirty="0"/>
-              <a:t> </a:t>
-            </a:r>
-            <a:r>
-              <a:rPr lang="en-US" altLang="zh-TW" dirty="0" err="1"/>
-              <a:t>config</a:t>
-            </a:r>
-            <a:r>
-              <a:rPr lang="en-US" altLang="zh-TW" dirty="0"/>
-              <a:t> --global          </a:t>
-            </a:r>
-            <a:r>
-              <a:rPr lang="zh-CN" altLang="en-US" dirty="0"/>
-              <a:t>位置</a:t>
-            </a:r>
-            <a:r>
-              <a:rPr lang="en-US" altLang="zh-CN" dirty="0"/>
-              <a:t>C:\Users\Administrator\.gitconfig</a:t>
-            </a:r>
-            <a:endParaRPr lang="en-US" altLang="zh-TW" dirty="0"/>
-          </a:p>
-          <a:p>
-            <a:pPr marL="0" lvl="1"/>
-            <a:r>
-              <a:rPr lang="en-US" altLang="zh-TW" dirty="0"/>
-              <a:t>          </a:t>
-            </a:r>
-            <a:r>
-              <a:rPr lang="en-US" altLang="zh-TW" dirty="0" err="1"/>
-              <a:t>git</a:t>
-            </a:r>
-            <a:r>
-              <a:rPr lang="en-US" altLang="zh-TW" dirty="0"/>
-              <a:t> </a:t>
-            </a:r>
-            <a:r>
-              <a:rPr lang="en-US" altLang="zh-TW" dirty="0" err="1"/>
-              <a:t>config</a:t>
-            </a:r>
-            <a:r>
-              <a:rPr lang="en-US" altLang="zh-TW" dirty="0"/>
-              <a:t> –local             </a:t>
-            </a:r>
-            <a:r>
-              <a:rPr lang="zh-CN" altLang="en-US" dirty="0"/>
-              <a:t>位置 本地版本库 </a:t>
-            </a:r>
-            <a:r>
-              <a:rPr lang="en-US" altLang="zh-CN" dirty="0"/>
-              <a:t>.git\config</a:t>
-            </a:r>
-          </a:p>
-          <a:p>
-            <a:pPr marL="0" lvl="1"/>
-            <a:endParaRPr lang="en-US" altLang="zh-TW" dirty="0"/>
-          </a:p>
-          <a:p>
-            <a:pPr marL="0" lvl="1"/>
-            <a:r>
-              <a:rPr lang="en-US" altLang="zh-CN" dirty="0"/>
-              <a:t>4. </a:t>
-            </a:r>
-            <a:r>
-              <a:rPr lang="zh-CN" altLang="en-US" dirty="0"/>
-              <a:t>顯示</a:t>
-            </a:r>
-            <a:r>
-              <a:rPr lang="en-US" altLang="zh-CN" dirty="0"/>
-              <a:t>config</a:t>
-            </a:r>
-            <a:r>
-              <a:rPr lang="zh-CN" altLang="en-US" dirty="0"/>
-              <a:t>當中的信息</a:t>
+              <a:t>查看某個文件的歷史修改記錄</a:t>
             </a:r>
             <a:endParaRPr lang="en-US" altLang="zh-CN" dirty="0"/>
           </a:p>
@@ -3794,49 +3610,11 @@
             </a:r>
             <a:r>
               <a:rPr lang="en-US" altLang="zh-CN" dirty="0"/>
-              <a:t>git config --system –l      </a:t>
+              <a:t>git log   --follow </a:t>
             </a:r>
             <a:r>
               <a:rPr lang="zh-CN" altLang="en-US" dirty="0"/>
-              <a:t>位置</a:t>
-            </a:r>
-            <a:r>
-              <a:rPr lang="en-US" altLang="zh-CN" dirty="0"/>
-              <a:t>D:\git\Git\mingw64\etc\gitconfig</a:t>
-            </a:r>
-          </a:p>
-          <a:p>
-            <a:pPr marL="0" lvl="1"/>
-            <a:r>
-              <a:rPr lang="en-US" altLang="zh-TW" dirty="0"/>
-              <a:t>         </a:t>
-            </a:r>
-            <a:r>
-              <a:rPr lang="en-US" altLang="zh-CN" dirty="0"/>
-              <a:t>git config --global –l        </a:t>
-            </a:r>
-            <a:r>
-              <a:rPr lang="zh-CN" altLang="en-US" dirty="0"/>
-              <a:t>位置</a:t>
-            </a:r>
-            <a:r>
-              <a:rPr lang="en-US" altLang="zh-CN" dirty="0"/>
-              <a:t>C:\Users\Administrator\.gitconfig</a:t>
-            </a:r>
-          </a:p>
-          <a:p>
-            <a:pPr marL="0" lvl="1"/>
-            <a:r>
-              <a:rPr lang="en-US" altLang="zh-CN" dirty="0"/>
-              <a:t>         git config --system –l       </a:t>
-            </a:r>
-            <a:r>
-              <a:rPr lang="zh-CN" altLang="en-US" dirty="0"/>
-              <a:t>位置 本地版本库 </a:t>
-            </a:r>
-            <a:r>
-              <a:rPr lang="en-US" altLang="zh-CN" dirty="0"/>
-              <a:t>.git\config</a:t>
+              <a:t>文件名</a:t>
             </a:r>
             <a:endParaRPr lang="en-US" altLang="zh-TW" dirty="0"/>
           </a:p>
@@ -3846,6 +3624,1248 @@
     <p:extLst>
       <p:ext uri="{BB962C8B-B14F-4D97-AF65-F5344CB8AC3E}">
         <p14:creationId xmlns:p14="http://schemas.microsoft.com/office/powerpoint/2010/main" val="2604005234"/>
+      </p:ext>
+    </p:extLst>
+  </p:cSld>
+  <p:clrMapOvr>
+    <a:masterClrMapping/>
+  </p:clrMapOvr>
+</p:sld>
+</file>
+
+<file path=ppt/slides/slide4.xml><?xml version="1.0" encoding="utf-8"?>
+<p:sld xmlns:a="http://schemas.openxmlformats.org/drawingml/2006/main" xmlns:r="http://schemas.openxmlformats.org/officeDocument/2006/relationships" xmlns:p="http://schemas.openxmlformats.org/presentationml/2006/main">
+  <p:cSld>
+    <p:spTree>
+      <p:nvGrpSpPr>
+        <p:cNvPr id="1" name=""/>
+        <p:cNvGrpSpPr/>
+        <p:nvPr/>
+      </p:nvGrpSpPr>
+      <p:grpSpPr>
+        <a:xfrm>
+          <a:off x="0" y="0"/>
+          <a:ext cx="0" cy="0"/>
+          <a:chOff x="0" y="0"/>
+          <a:chExt cx="0" cy="0"/>
+        </a:xfrm>
+      </p:grpSpPr>
+      <p:sp>
+        <p:nvSpPr>
+          <p:cNvPr id="4" name="文字方塊 3">
+            <a:extLst>
+              <a:ext uri="{FF2B5EF4-FFF2-40B4-BE49-F238E27FC236}">
+                <a16:creationId xmlns:a16="http://schemas.microsoft.com/office/drawing/2014/main" id="{EE42E484-788D-46B8-84C5-818D073B92AE}"/>
+              </a:ext>
+            </a:extLst>
+          </p:cNvPr>
+          <p:cNvSpPr txBox="1"/>
+          <p:nvPr/>
+        </p:nvSpPr>
+        <p:spPr>
+          <a:xfrm>
+            <a:off x="365503" y="355600"/>
+            <a:ext cx="4130874" cy="400110"/>
+          </a:xfrm>
+          <a:prstGeom prst="rect">
+            <a:avLst/>
+          </a:prstGeom>
+          <a:noFill/>
+        </p:spPr>
+        <p:txBody>
+          <a:bodyPr wrap="none" rtlCol="0">
+            <a:spAutoFit/>
+          </a:bodyPr>
+          <a:lstStyle/>
+          <a:p>
+            <a:r>
+              <a:rPr lang="en-US" altLang="zh-CN" sz="2000" b="1" dirty="0"/>
+              <a:t>git config</a:t>
+            </a:r>
+            <a:r>
+              <a:rPr lang="zh-CN" altLang="en-US" sz="2000" b="1" dirty="0"/>
+              <a:t>的命令</a:t>
+            </a:r>
+            <a:r>
+              <a:rPr lang="en-US" altLang="zh-CN" sz="2000" b="1" dirty="0"/>
+              <a:t>-</a:t>
+            </a:r>
+            <a:r>
+              <a:rPr lang="zh-CN" altLang="en-US" sz="2000" b="1" dirty="0"/>
+              <a:t>配置</a:t>
+            </a:r>
+            <a:r>
+              <a:rPr lang="en-US" altLang="zh-CN" sz="2000" b="1" dirty="0"/>
+              <a:t>.git/config</a:t>
+            </a:r>
+            <a:r>
+              <a:rPr lang="zh-CN" altLang="en-US" sz="2000" b="1" dirty="0"/>
+              <a:t>文件</a:t>
+            </a:r>
+            <a:endParaRPr lang="zh-TW" altLang="en-US" sz="2000" b="1" dirty="0"/>
+          </a:p>
+        </p:txBody>
+      </p:sp>
+      <p:sp>
+        <p:nvSpPr>
+          <p:cNvPr id="5" name="文字方塊 4">
+            <a:extLst>
+              <a:ext uri="{FF2B5EF4-FFF2-40B4-BE49-F238E27FC236}">
+                <a16:creationId xmlns:a16="http://schemas.microsoft.com/office/drawing/2014/main" id="{7335B79A-F03E-499E-A7C1-0FE623461237}"/>
+              </a:ext>
+            </a:extLst>
+          </p:cNvPr>
+          <p:cNvSpPr txBox="1"/>
+          <p:nvPr/>
+        </p:nvSpPr>
+        <p:spPr>
+          <a:xfrm>
+            <a:off x="1330959" y="873760"/>
+            <a:ext cx="9144000" cy="3693319"/>
+          </a:xfrm>
+          <a:prstGeom prst="rect">
+            <a:avLst/>
+          </a:prstGeom>
+          <a:noFill/>
+        </p:spPr>
+        <p:txBody>
+          <a:bodyPr wrap="square" rtlCol="0">
+            <a:spAutoFit/>
+          </a:bodyPr>
+          <a:lstStyle/>
+          <a:p>
+            <a:r>
+              <a:rPr lang="en-US" altLang="zh-CN" dirty="0"/>
+              <a:t>1.    </a:t>
+            </a:r>
+            <a:r>
+              <a:rPr lang="zh-CN" altLang="en-US" dirty="0"/>
+              <a:t>配置</a:t>
+            </a:r>
+            <a:r>
+              <a:rPr lang="en-US" altLang="zh-CN" dirty="0"/>
+              <a:t>git</a:t>
+            </a:r>
+            <a:r>
+              <a:rPr lang="zh-CN" altLang="en-US" dirty="0"/>
+              <a:t> </a:t>
+            </a:r>
+            <a:r>
+              <a:rPr lang="en-US" altLang="zh-CN" dirty="0"/>
+              <a:t>commit</a:t>
+            </a:r>
+            <a:r>
+              <a:rPr lang="zh-CN" altLang="en-US" dirty="0"/>
+              <a:t>的编辑器</a:t>
+            </a:r>
+            <a:endParaRPr lang="en-US" altLang="zh-CN" dirty="0"/>
+          </a:p>
+          <a:p>
+            <a:pPr lvl="1"/>
+            <a:r>
+              <a:rPr lang="en-US" altLang="zh-CN" dirty="0"/>
+              <a:t> git config --global </a:t>
+            </a:r>
+            <a:r>
+              <a:rPr lang="en-US" altLang="zh-CN" dirty="0" err="1"/>
+              <a:t>core.editor</a:t>
+            </a:r>
+            <a:r>
+              <a:rPr lang="en-US" altLang="zh-CN" dirty="0"/>
+              <a:t> notepad++.exe</a:t>
+            </a:r>
+            <a:r>
+              <a:rPr lang="en-US" altLang="zh-TW" dirty="0"/>
+              <a:t> </a:t>
+            </a:r>
+          </a:p>
+          <a:p>
+            <a:pPr marL="0" lvl="1"/>
+            <a:endParaRPr lang="en-US" altLang="zh-TW" dirty="0"/>
+          </a:p>
+          <a:p>
+            <a:pPr marL="0" lvl="1"/>
+            <a:r>
+              <a:rPr lang="en-US" altLang="zh-CN" dirty="0"/>
+              <a:t>2.    git config</a:t>
+            </a:r>
+            <a:r>
+              <a:rPr lang="zh-CN" altLang="en-US" dirty="0"/>
+              <a:t> 配置产生的位置</a:t>
+            </a:r>
+            <a:endParaRPr lang="en-US" altLang="zh-CN" dirty="0"/>
+          </a:p>
+          <a:p>
+            <a:pPr marL="0" lvl="1"/>
+            <a:r>
+              <a:rPr lang="en-US" altLang="zh-TW" dirty="0"/>
+              <a:t>          </a:t>
+            </a:r>
+            <a:r>
+              <a:rPr lang="en-US" altLang="zh-CN" dirty="0"/>
+              <a:t>git config --system         </a:t>
+            </a:r>
+            <a:r>
+              <a:rPr lang="zh-CN" altLang="en-US" dirty="0"/>
+              <a:t>位置</a:t>
+            </a:r>
+            <a:r>
+              <a:rPr lang="en-US" altLang="zh-CN" dirty="0"/>
+              <a:t>D:\git\Git\mingw64\etc\gitconfig</a:t>
+            </a:r>
+          </a:p>
+          <a:p>
+            <a:pPr marL="0" lvl="1"/>
+            <a:r>
+              <a:rPr lang="en-US" altLang="zh-TW" dirty="0"/>
+              <a:t>          git config --global          </a:t>
+            </a:r>
+            <a:r>
+              <a:rPr lang="zh-CN" altLang="en-US" dirty="0"/>
+              <a:t>位置</a:t>
+            </a:r>
+            <a:r>
+              <a:rPr lang="en-US" altLang="zh-CN" dirty="0"/>
+              <a:t>C:\Users\Administrator\.gitconfig</a:t>
+            </a:r>
+            <a:endParaRPr lang="en-US" altLang="zh-TW" dirty="0"/>
+          </a:p>
+          <a:p>
+            <a:pPr marL="0" lvl="1"/>
+            <a:r>
+              <a:rPr lang="en-US" altLang="zh-TW" dirty="0"/>
+              <a:t>          git config –local             </a:t>
+            </a:r>
+            <a:r>
+              <a:rPr lang="zh-CN" altLang="en-US" dirty="0"/>
+              <a:t>位置 本地版本库 </a:t>
+            </a:r>
+            <a:r>
+              <a:rPr lang="en-US" altLang="zh-CN" dirty="0"/>
+              <a:t>.git\config</a:t>
+            </a:r>
+          </a:p>
+          <a:p>
+            <a:pPr marL="0" lvl="1"/>
+            <a:endParaRPr lang="en-US" altLang="zh-TW" dirty="0"/>
+          </a:p>
+          <a:p>
+            <a:pPr marL="0" lvl="1"/>
+            <a:r>
+              <a:rPr lang="en-US" altLang="zh-CN" dirty="0"/>
+              <a:t>3.   </a:t>
+            </a:r>
+            <a:r>
+              <a:rPr lang="zh-CN" altLang="en-US" dirty="0"/>
+              <a:t>顯示</a:t>
+            </a:r>
+            <a:r>
+              <a:rPr lang="en-US" altLang="zh-CN" dirty="0"/>
+              <a:t>config</a:t>
+            </a:r>
+            <a:r>
+              <a:rPr lang="zh-CN" altLang="en-US" dirty="0"/>
+              <a:t>當中的信息</a:t>
+            </a:r>
+            <a:endParaRPr lang="en-US" altLang="zh-CN" dirty="0"/>
+          </a:p>
+          <a:p>
+            <a:pPr marL="0" lvl="1"/>
+            <a:r>
+              <a:rPr lang="en-US" altLang="zh-TW" dirty="0"/>
+              <a:t>         </a:t>
+            </a:r>
+            <a:r>
+              <a:rPr lang="en-US" altLang="zh-CN" dirty="0"/>
+              <a:t>git config --system –l      </a:t>
+            </a:r>
+            <a:r>
+              <a:rPr lang="zh-CN" altLang="en-US" dirty="0"/>
+              <a:t>位置</a:t>
+            </a:r>
+            <a:r>
+              <a:rPr lang="en-US" altLang="zh-CN" dirty="0"/>
+              <a:t>D:\git\Git\mingw64\etc\gitconfig</a:t>
+            </a:r>
+          </a:p>
+          <a:p>
+            <a:pPr marL="0" lvl="1"/>
+            <a:r>
+              <a:rPr lang="en-US" altLang="zh-TW" dirty="0"/>
+              <a:t>         </a:t>
+            </a:r>
+            <a:r>
+              <a:rPr lang="en-US" altLang="zh-CN" dirty="0"/>
+              <a:t>git config --global –l        </a:t>
+            </a:r>
+            <a:r>
+              <a:rPr lang="zh-CN" altLang="en-US" dirty="0"/>
+              <a:t>位置</a:t>
+            </a:r>
+            <a:r>
+              <a:rPr lang="en-US" altLang="zh-CN" dirty="0"/>
+              <a:t>C:\Users\Administrator\.gitconfig</a:t>
+            </a:r>
+          </a:p>
+          <a:p>
+            <a:pPr marL="0" lvl="1"/>
+            <a:r>
+              <a:rPr lang="en-US" altLang="zh-CN" dirty="0"/>
+              <a:t>         git config --system –l       </a:t>
+            </a:r>
+            <a:r>
+              <a:rPr lang="zh-CN" altLang="en-US" dirty="0"/>
+              <a:t>位置 本地版本库 </a:t>
+            </a:r>
+            <a:r>
+              <a:rPr lang="en-US" altLang="zh-CN" dirty="0"/>
+              <a:t>.git\config</a:t>
+            </a:r>
+          </a:p>
+          <a:p>
+            <a:endParaRPr lang="zh-TW" altLang="en-US" dirty="0"/>
+          </a:p>
+        </p:txBody>
+      </p:sp>
+    </p:spTree>
+    <p:extLst>
+      <p:ext uri="{BB962C8B-B14F-4D97-AF65-F5344CB8AC3E}">
+        <p14:creationId xmlns:p14="http://schemas.microsoft.com/office/powerpoint/2010/main" val="2887803966"/>
+      </p:ext>
+    </p:extLst>
+  </p:cSld>
+  <p:clrMapOvr>
+    <a:masterClrMapping/>
+  </p:clrMapOvr>
+</p:sld>
+</file>
+
+<file path=ppt/slides/slide5.xml><?xml version="1.0" encoding="utf-8"?>
+<p:sld xmlns:a="http://schemas.openxmlformats.org/drawingml/2006/main" xmlns:r="http://schemas.openxmlformats.org/officeDocument/2006/relationships" xmlns:p="http://schemas.openxmlformats.org/presentationml/2006/main">
+  <p:cSld>
+    <p:spTree>
+      <p:nvGrpSpPr>
+        <p:cNvPr id="1" name=""/>
+        <p:cNvGrpSpPr/>
+        <p:nvPr/>
+      </p:nvGrpSpPr>
+      <p:grpSpPr>
+        <a:xfrm>
+          <a:off x="0" y="0"/>
+          <a:ext cx="0" cy="0"/>
+          <a:chOff x="0" y="0"/>
+          <a:chExt cx="0" cy="0"/>
+        </a:xfrm>
+      </p:grpSpPr>
+      <p:sp>
+        <p:nvSpPr>
+          <p:cNvPr id="4" name="文字方塊 3">
+            <a:extLst>
+              <a:ext uri="{FF2B5EF4-FFF2-40B4-BE49-F238E27FC236}">
+                <a16:creationId xmlns:a16="http://schemas.microsoft.com/office/drawing/2014/main" id="{EE42E484-788D-46B8-84C5-818D073B92AE}"/>
+              </a:ext>
+            </a:extLst>
+          </p:cNvPr>
+          <p:cNvSpPr txBox="1"/>
+          <p:nvPr/>
+        </p:nvSpPr>
+        <p:spPr>
+          <a:xfrm>
+            <a:off x="365503" y="355600"/>
+            <a:ext cx="3043590" cy="400110"/>
+          </a:xfrm>
+          <a:prstGeom prst="rect">
+            <a:avLst/>
+          </a:prstGeom>
+          <a:noFill/>
+        </p:spPr>
+        <p:txBody>
+          <a:bodyPr wrap="none" rtlCol="0">
+            <a:spAutoFit/>
+          </a:bodyPr>
+          <a:lstStyle/>
+          <a:p>
+            <a:r>
+              <a:rPr lang="en-US" altLang="zh-CN" sz="2000" b="1" dirty="0"/>
+              <a:t>git branch</a:t>
+            </a:r>
+            <a:r>
+              <a:rPr lang="zh-CN" altLang="en-US" sz="2000" b="1" dirty="0"/>
+              <a:t>的命令操作分支</a:t>
+            </a:r>
+            <a:endParaRPr lang="zh-TW" altLang="en-US" sz="2000" b="1" dirty="0"/>
+          </a:p>
+        </p:txBody>
+      </p:sp>
+      <p:sp>
+        <p:nvSpPr>
+          <p:cNvPr id="5" name="文字方塊 4">
+            <a:extLst>
+              <a:ext uri="{FF2B5EF4-FFF2-40B4-BE49-F238E27FC236}">
+                <a16:creationId xmlns:a16="http://schemas.microsoft.com/office/drawing/2014/main" id="{7335B79A-F03E-499E-A7C1-0FE623461237}"/>
+              </a:ext>
+            </a:extLst>
+          </p:cNvPr>
+          <p:cNvSpPr txBox="1"/>
+          <p:nvPr/>
+        </p:nvSpPr>
+        <p:spPr>
+          <a:xfrm>
+            <a:off x="1198880" y="985520"/>
+            <a:ext cx="10383519" cy="2308324"/>
+          </a:xfrm>
+          <a:prstGeom prst="rect">
+            <a:avLst/>
+          </a:prstGeom>
+          <a:noFill/>
+        </p:spPr>
+        <p:txBody>
+          <a:bodyPr wrap="square" rtlCol="0">
+            <a:spAutoFit/>
+          </a:bodyPr>
+          <a:lstStyle/>
+          <a:p>
+            <a:r>
+              <a:rPr lang="en-US" altLang="zh-CN" b="1" dirty="0"/>
+              <a:t>1.</a:t>
+            </a:r>
+            <a:r>
+              <a:rPr lang="zh-CN" altLang="en-US" b="1" dirty="0"/>
+              <a:t>創建分支</a:t>
+            </a:r>
+            <a:endParaRPr lang="en-US" altLang="zh-CN" b="1" dirty="0"/>
+          </a:p>
+          <a:p>
+            <a:r>
+              <a:rPr lang="en-US" altLang="zh-TW" dirty="0"/>
+              <a:t>	</a:t>
+            </a:r>
+            <a:r>
+              <a:rPr lang="en-US" altLang="zh-CN" dirty="0"/>
+              <a:t>git branch </a:t>
+            </a:r>
+            <a:r>
+              <a:rPr lang="zh-CN" altLang="en-US" dirty="0"/>
+              <a:t>分支名</a:t>
+            </a:r>
+            <a:endParaRPr lang="en-US" altLang="zh-CN" dirty="0"/>
+          </a:p>
+          <a:p>
+            <a:endParaRPr lang="en-US" altLang="zh-TW" b="1" dirty="0"/>
+          </a:p>
+          <a:p>
+            <a:r>
+              <a:rPr lang="zh-CN" altLang="en-US" b="1" dirty="0"/>
+              <a:t> </a:t>
+            </a:r>
+            <a:r>
+              <a:rPr lang="en-US" altLang="zh-CN" b="1" dirty="0"/>
+              <a:t>2.</a:t>
+            </a:r>
+            <a:r>
+              <a:rPr lang="zh-CN" altLang="en-US" b="1" dirty="0"/>
+              <a:t>查詢有哪些分支</a:t>
+            </a:r>
+            <a:endParaRPr lang="en-US" altLang="zh-CN" b="1" dirty="0"/>
+          </a:p>
+          <a:p>
+            <a:r>
+              <a:rPr lang="en-US" altLang="zh-TW" dirty="0"/>
+              <a:t>	</a:t>
+            </a:r>
+            <a:r>
+              <a:rPr lang="en-US" altLang="zh-CN" dirty="0"/>
+              <a:t>git branch</a:t>
+            </a:r>
+          </a:p>
+          <a:p>
+            <a:endParaRPr lang="en-US" altLang="zh-CN" dirty="0"/>
+          </a:p>
+          <a:p>
+            <a:r>
+              <a:rPr lang="en-US" altLang="zh-CN" dirty="0"/>
+              <a:t> </a:t>
+            </a:r>
+            <a:r>
+              <a:rPr lang="en-US" altLang="zh-CN" b="1" dirty="0"/>
+              <a:t>3.</a:t>
+            </a:r>
+            <a:r>
+              <a:rPr lang="zh-CN" altLang="en-US" b="1" dirty="0"/>
+              <a:t>查看分支有貢獻的提交</a:t>
+            </a:r>
+            <a:endParaRPr lang="en-US" altLang="zh-CN" b="1" dirty="0"/>
+          </a:p>
+          <a:p>
+            <a:r>
+              <a:rPr lang="en-US" altLang="zh-CN" b="1" dirty="0"/>
+              <a:t>	</a:t>
+            </a:r>
+            <a:r>
+              <a:rPr lang="en-US" altLang="zh-CN" dirty="0"/>
+              <a:t>git show-branch</a:t>
+            </a:r>
+          </a:p>
+        </p:txBody>
+      </p:sp>
+    </p:spTree>
+    <p:extLst>
+      <p:ext uri="{BB962C8B-B14F-4D97-AF65-F5344CB8AC3E}">
+        <p14:creationId xmlns:p14="http://schemas.microsoft.com/office/powerpoint/2010/main" val="410421558"/>
+      </p:ext>
+    </p:extLst>
+  </p:cSld>
+  <p:clrMapOvr>
+    <a:masterClrMapping/>
+  </p:clrMapOvr>
+</p:sld>
+</file>
+
+<file path=ppt/slides/slide6.xml><?xml version="1.0" encoding="utf-8"?>
+<p:sld xmlns:a="http://schemas.openxmlformats.org/drawingml/2006/main" xmlns:r="http://schemas.openxmlformats.org/officeDocument/2006/relationships" xmlns:p="http://schemas.openxmlformats.org/presentationml/2006/main">
+  <p:cSld>
+    <p:spTree>
+      <p:nvGrpSpPr>
+        <p:cNvPr id="1" name=""/>
+        <p:cNvGrpSpPr/>
+        <p:nvPr/>
+      </p:nvGrpSpPr>
+      <p:grpSpPr>
+        <a:xfrm>
+          <a:off x="0" y="0"/>
+          <a:ext cx="0" cy="0"/>
+          <a:chOff x="0" y="0"/>
+          <a:chExt cx="0" cy="0"/>
+        </a:xfrm>
+      </p:grpSpPr>
+      <p:sp>
+        <p:nvSpPr>
+          <p:cNvPr id="5" name="文字方塊 4">
+            <a:extLst>
+              <a:ext uri="{FF2B5EF4-FFF2-40B4-BE49-F238E27FC236}">
+                <a16:creationId xmlns:a16="http://schemas.microsoft.com/office/drawing/2014/main" id="{0B1F6121-1C23-4A07-A66F-19BD3BFDA4C3}"/>
+              </a:ext>
+            </a:extLst>
+          </p:cNvPr>
+          <p:cNvSpPr txBox="1"/>
+          <p:nvPr/>
+        </p:nvSpPr>
+        <p:spPr>
+          <a:xfrm>
+            <a:off x="304800" y="284480"/>
+            <a:ext cx="4425699" cy="400110"/>
+          </a:xfrm>
+          <a:prstGeom prst="rect">
+            <a:avLst/>
+          </a:prstGeom>
+          <a:noFill/>
+        </p:spPr>
+        <p:txBody>
+          <a:bodyPr wrap="none" rtlCol="0">
+            <a:spAutoFit/>
+          </a:bodyPr>
+          <a:lstStyle/>
+          <a:p>
+            <a:r>
+              <a:rPr lang="en-US" altLang="zh-TW" sz="2000" b="1" dirty="0"/>
+              <a:t>Git </a:t>
+            </a:r>
+            <a:r>
+              <a:rPr lang="zh-CN" altLang="en-US" sz="2000" b="1" dirty="0"/>
+              <a:t>修改一次文件到</a:t>
+            </a:r>
+            <a:r>
+              <a:rPr lang="en-US" altLang="zh-CN" sz="2000" b="1" dirty="0"/>
+              <a:t>commit</a:t>
+            </a:r>
+            <a:r>
+              <a:rPr lang="zh-CN" altLang="en-US" sz="2000" b="1" dirty="0"/>
+              <a:t>的圖示過程</a:t>
+            </a:r>
+            <a:endParaRPr lang="zh-TW" altLang="en-US" sz="2000" b="1" dirty="0"/>
+          </a:p>
+        </p:txBody>
+      </p:sp>
+      <p:pic>
+        <p:nvPicPr>
+          <p:cNvPr id="7" name="圖片 6">
+            <a:extLst>
+              <a:ext uri="{FF2B5EF4-FFF2-40B4-BE49-F238E27FC236}">
+                <a16:creationId xmlns:a16="http://schemas.microsoft.com/office/drawing/2014/main" id="{21F441B3-C6D6-46FD-B8E7-6B83AE9E5AC7}"/>
+              </a:ext>
+            </a:extLst>
+          </p:cNvPr>
+          <p:cNvPicPr>
+            <a:picLocks noChangeAspect="1"/>
+          </p:cNvPicPr>
+          <p:nvPr/>
+        </p:nvPicPr>
+        <p:blipFill>
+          <a:blip r:embed="rId2">
+            <a:extLst>
+              <a:ext uri="{28A0092B-C50C-407E-A947-70E740481C1C}">
+                <a14:useLocalDpi xmlns:a14="http://schemas.microsoft.com/office/drawing/2010/main" val="0"/>
+              </a:ext>
+            </a:extLst>
+          </a:blip>
+          <a:stretch>
+            <a:fillRect/>
+          </a:stretch>
+        </p:blipFill>
+        <p:spPr>
+          <a:xfrm>
+            <a:off x="3746819" y="1475135"/>
+            <a:ext cx="4910908" cy="3907730"/>
+          </a:xfrm>
+          <a:prstGeom prst="rect">
+            <a:avLst/>
+          </a:prstGeom>
+        </p:spPr>
+      </p:pic>
+      <p:sp>
+        <p:nvSpPr>
+          <p:cNvPr id="8" name="文字方塊 7">
+            <a:extLst>
+              <a:ext uri="{FF2B5EF4-FFF2-40B4-BE49-F238E27FC236}">
+                <a16:creationId xmlns:a16="http://schemas.microsoft.com/office/drawing/2014/main" id="{49C93D34-C734-4A03-AE9A-C29244EFEBC3}"/>
+              </a:ext>
+            </a:extLst>
+          </p:cNvPr>
+          <p:cNvSpPr txBox="1"/>
+          <p:nvPr/>
+        </p:nvSpPr>
+        <p:spPr>
+          <a:xfrm flipH="1">
+            <a:off x="5094832" y="1105803"/>
+            <a:ext cx="3230882" cy="369332"/>
+          </a:xfrm>
+          <a:prstGeom prst="rect">
+            <a:avLst/>
+          </a:prstGeom>
+          <a:noFill/>
+        </p:spPr>
+        <p:txBody>
+          <a:bodyPr wrap="square" rtlCol="0">
+            <a:spAutoFit/>
+          </a:bodyPr>
+          <a:lstStyle/>
+          <a:p>
+            <a:r>
+              <a:rPr lang="zh-CN" altLang="en-US" dirty="0"/>
+              <a:t>一次</a:t>
+            </a:r>
+            <a:r>
+              <a:rPr lang="en-US" altLang="zh-CN" dirty="0"/>
+              <a:t>commit</a:t>
+            </a:r>
+            <a:r>
+              <a:rPr lang="zh-CN" altLang="en-US" dirty="0"/>
+              <a:t>后</a:t>
+            </a:r>
+            <a:endParaRPr lang="zh-TW" altLang="en-US" dirty="0"/>
+          </a:p>
+        </p:txBody>
+      </p:sp>
+      <p:sp>
+        <p:nvSpPr>
+          <p:cNvPr id="9" name="箭號: 向下 8">
+            <a:extLst>
+              <a:ext uri="{FF2B5EF4-FFF2-40B4-BE49-F238E27FC236}">
+                <a16:creationId xmlns:a16="http://schemas.microsoft.com/office/drawing/2014/main" id="{2FCCB5B6-35FA-41D1-9A57-23ACAE0006F5}"/>
+              </a:ext>
+            </a:extLst>
+          </p:cNvPr>
+          <p:cNvSpPr/>
+          <p:nvPr/>
+        </p:nvSpPr>
+        <p:spPr>
+          <a:xfrm>
+            <a:off x="5455920" y="5382864"/>
+            <a:ext cx="934720" cy="790545"/>
+          </a:xfrm>
+          <a:prstGeom prst="downArrow">
+            <a:avLst/>
+          </a:prstGeom>
+        </p:spPr>
+        <p:style>
+          <a:lnRef idx="2">
+            <a:schemeClr val="accent1">
+              <a:shade val="50000"/>
+            </a:schemeClr>
+          </a:lnRef>
+          <a:fillRef idx="1">
+            <a:schemeClr val="accent1"/>
+          </a:fillRef>
+          <a:effectRef idx="0">
+            <a:schemeClr val="accent1"/>
+          </a:effectRef>
+          <a:fontRef idx="minor">
+            <a:schemeClr val="lt1"/>
+          </a:fontRef>
+        </p:style>
+        <p:txBody>
+          <a:bodyPr rtlCol="0" anchor="ctr"/>
+          <a:lstStyle/>
+          <a:p>
+            <a:pPr algn="ctr"/>
+            <a:endParaRPr lang="zh-TW" altLang="en-US"/>
+          </a:p>
+        </p:txBody>
+      </p:sp>
+    </p:spTree>
+    <p:extLst>
+      <p:ext uri="{BB962C8B-B14F-4D97-AF65-F5344CB8AC3E}">
+        <p14:creationId xmlns:p14="http://schemas.microsoft.com/office/powerpoint/2010/main" val="3901155342"/>
+      </p:ext>
+    </p:extLst>
+  </p:cSld>
+  <p:clrMapOvr>
+    <a:masterClrMapping/>
+  </p:clrMapOvr>
+</p:sld>
+</file>
+
+<file path=ppt/slides/slide7.xml><?xml version="1.0" encoding="utf-8"?>
+<p:sld xmlns:a="http://schemas.openxmlformats.org/drawingml/2006/main" xmlns:r="http://schemas.openxmlformats.org/officeDocument/2006/relationships" xmlns:p="http://schemas.openxmlformats.org/presentationml/2006/main">
+  <p:cSld>
+    <p:spTree>
+      <p:nvGrpSpPr>
+        <p:cNvPr id="1" name=""/>
+        <p:cNvGrpSpPr/>
+        <p:nvPr/>
+      </p:nvGrpSpPr>
+      <p:grpSpPr>
+        <a:xfrm>
+          <a:off x="0" y="0"/>
+          <a:ext cx="0" cy="0"/>
+          <a:chOff x="0" y="0"/>
+          <a:chExt cx="0" cy="0"/>
+        </a:xfrm>
+      </p:grpSpPr>
+      <p:sp>
+        <p:nvSpPr>
+          <p:cNvPr id="5" name="文字方塊 4">
+            <a:extLst>
+              <a:ext uri="{FF2B5EF4-FFF2-40B4-BE49-F238E27FC236}">
+                <a16:creationId xmlns:a16="http://schemas.microsoft.com/office/drawing/2014/main" id="{0B1F6121-1C23-4A07-A66F-19BD3BFDA4C3}"/>
+              </a:ext>
+            </a:extLst>
+          </p:cNvPr>
+          <p:cNvSpPr txBox="1"/>
+          <p:nvPr/>
+        </p:nvSpPr>
+        <p:spPr>
+          <a:xfrm>
+            <a:off x="304800" y="284480"/>
+            <a:ext cx="4425699" cy="400110"/>
+          </a:xfrm>
+          <a:prstGeom prst="rect">
+            <a:avLst/>
+          </a:prstGeom>
+          <a:noFill/>
+        </p:spPr>
+        <p:txBody>
+          <a:bodyPr wrap="none" rtlCol="0">
+            <a:spAutoFit/>
+          </a:bodyPr>
+          <a:lstStyle/>
+          <a:p>
+            <a:r>
+              <a:rPr lang="en-US" altLang="zh-TW" sz="2000" b="1" dirty="0"/>
+              <a:t>Git </a:t>
+            </a:r>
+            <a:r>
+              <a:rPr lang="zh-CN" altLang="en-US" sz="2000" b="1" dirty="0"/>
+              <a:t>修改一次文件到</a:t>
+            </a:r>
+            <a:r>
+              <a:rPr lang="en-US" altLang="zh-CN" sz="2000" b="1" dirty="0"/>
+              <a:t>commit</a:t>
+            </a:r>
+            <a:r>
+              <a:rPr lang="zh-CN" altLang="en-US" sz="2000" b="1" dirty="0"/>
+              <a:t>的圖示過程</a:t>
+            </a:r>
+            <a:endParaRPr lang="zh-TW" altLang="en-US" sz="2000" b="1" dirty="0"/>
+          </a:p>
+        </p:txBody>
+      </p:sp>
+      <p:sp>
+        <p:nvSpPr>
+          <p:cNvPr id="8" name="文字方塊 7">
+            <a:extLst>
+              <a:ext uri="{FF2B5EF4-FFF2-40B4-BE49-F238E27FC236}">
+                <a16:creationId xmlns:a16="http://schemas.microsoft.com/office/drawing/2014/main" id="{49C93D34-C734-4A03-AE9A-C29244EFEBC3}"/>
+              </a:ext>
+            </a:extLst>
+          </p:cNvPr>
+          <p:cNvSpPr txBox="1"/>
+          <p:nvPr/>
+        </p:nvSpPr>
+        <p:spPr>
+          <a:xfrm flipH="1">
+            <a:off x="5003392" y="1105804"/>
+            <a:ext cx="3230882" cy="369332"/>
+          </a:xfrm>
+          <a:prstGeom prst="rect">
+            <a:avLst/>
+          </a:prstGeom>
+          <a:noFill/>
+        </p:spPr>
+        <p:txBody>
+          <a:bodyPr wrap="square" rtlCol="0">
+            <a:spAutoFit/>
+          </a:bodyPr>
+          <a:lstStyle/>
+          <a:p>
+            <a:r>
+              <a:rPr lang="zh-CN" altLang="en-US" dirty="0"/>
+              <a:t>修改某個文件内容</a:t>
+            </a:r>
+            <a:endParaRPr lang="zh-TW" altLang="en-US" dirty="0"/>
+          </a:p>
+        </p:txBody>
+      </p:sp>
+      <p:sp>
+        <p:nvSpPr>
+          <p:cNvPr id="9" name="箭號: 向下 8">
+            <a:extLst>
+              <a:ext uri="{FF2B5EF4-FFF2-40B4-BE49-F238E27FC236}">
+                <a16:creationId xmlns:a16="http://schemas.microsoft.com/office/drawing/2014/main" id="{2FCCB5B6-35FA-41D1-9A57-23ACAE0006F5}"/>
+              </a:ext>
+            </a:extLst>
+          </p:cNvPr>
+          <p:cNvSpPr/>
+          <p:nvPr/>
+        </p:nvSpPr>
+        <p:spPr>
+          <a:xfrm>
+            <a:off x="5455920" y="5382864"/>
+            <a:ext cx="934720" cy="790545"/>
+          </a:xfrm>
+          <a:prstGeom prst="downArrow">
+            <a:avLst/>
+          </a:prstGeom>
+        </p:spPr>
+        <p:style>
+          <a:lnRef idx="2">
+            <a:schemeClr val="accent1">
+              <a:shade val="50000"/>
+            </a:schemeClr>
+          </a:lnRef>
+          <a:fillRef idx="1">
+            <a:schemeClr val="accent1"/>
+          </a:fillRef>
+          <a:effectRef idx="0">
+            <a:schemeClr val="accent1"/>
+          </a:effectRef>
+          <a:fontRef idx="minor">
+            <a:schemeClr val="lt1"/>
+          </a:fontRef>
+        </p:style>
+        <p:txBody>
+          <a:bodyPr rtlCol="0" anchor="ctr"/>
+          <a:lstStyle/>
+          <a:p>
+            <a:pPr algn="ctr"/>
+            <a:endParaRPr lang="zh-TW" altLang="en-US"/>
+          </a:p>
+        </p:txBody>
+      </p:sp>
+      <p:pic>
+        <p:nvPicPr>
+          <p:cNvPr id="3" name="圖片 2">
+            <a:extLst>
+              <a:ext uri="{FF2B5EF4-FFF2-40B4-BE49-F238E27FC236}">
+                <a16:creationId xmlns:a16="http://schemas.microsoft.com/office/drawing/2014/main" id="{77378AED-F75E-4D86-B271-D01414623425}"/>
+              </a:ext>
+            </a:extLst>
+          </p:cNvPr>
+          <p:cNvPicPr>
+            <a:picLocks noChangeAspect="1"/>
+          </p:cNvPicPr>
+          <p:nvPr/>
+        </p:nvPicPr>
+        <p:blipFill>
+          <a:blip r:embed="rId2">
+            <a:extLst>
+              <a:ext uri="{28A0092B-C50C-407E-A947-70E740481C1C}">
+                <a14:useLocalDpi xmlns:a14="http://schemas.microsoft.com/office/drawing/2010/main" val="0"/>
+              </a:ext>
+            </a:extLst>
+          </a:blip>
+          <a:stretch>
+            <a:fillRect/>
+          </a:stretch>
+        </p:blipFill>
+        <p:spPr>
+          <a:xfrm>
+            <a:off x="3774440" y="1573389"/>
+            <a:ext cx="4643120" cy="3711222"/>
+          </a:xfrm>
+          <a:prstGeom prst="rect">
+            <a:avLst/>
+          </a:prstGeom>
+        </p:spPr>
+      </p:pic>
+    </p:spTree>
+    <p:extLst>
+      <p:ext uri="{BB962C8B-B14F-4D97-AF65-F5344CB8AC3E}">
+        <p14:creationId xmlns:p14="http://schemas.microsoft.com/office/powerpoint/2010/main" val="4280783543"/>
+      </p:ext>
+    </p:extLst>
+  </p:cSld>
+  <p:clrMapOvr>
+    <a:masterClrMapping/>
+  </p:clrMapOvr>
+</p:sld>
+</file>
+
+<file path=ppt/slides/slide8.xml><?xml version="1.0" encoding="utf-8"?>
+<p:sld xmlns:a="http://schemas.openxmlformats.org/drawingml/2006/main" xmlns:r="http://schemas.openxmlformats.org/officeDocument/2006/relationships" xmlns:p="http://schemas.openxmlformats.org/presentationml/2006/main">
+  <p:cSld>
+    <p:spTree>
+      <p:nvGrpSpPr>
+        <p:cNvPr id="1" name=""/>
+        <p:cNvGrpSpPr/>
+        <p:nvPr/>
+      </p:nvGrpSpPr>
+      <p:grpSpPr>
+        <a:xfrm>
+          <a:off x="0" y="0"/>
+          <a:ext cx="0" cy="0"/>
+          <a:chOff x="0" y="0"/>
+          <a:chExt cx="0" cy="0"/>
+        </a:xfrm>
+      </p:grpSpPr>
+      <p:sp>
+        <p:nvSpPr>
+          <p:cNvPr id="5" name="文字方塊 4">
+            <a:extLst>
+              <a:ext uri="{FF2B5EF4-FFF2-40B4-BE49-F238E27FC236}">
+                <a16:creationId xmlns:a16="http://schemas.microsoft.com/office/drawing/2014/main" id="{0B1F6121-1C23-4A07-A66F-19BD3BFDA4C3}"/>
+              </a:ext>
+            </a:extLst>
+          </p:cNvPr>
+          <p:cNvSpPr txBox="1"/>
+          <p:nvPr/>
+        </p:nvSpPr>
+        <p:spPr>
+          <a:xfrm>
+            <a:off x="304800" y="284480"/>
+            <a:ext cx="4425699" cy="400110"/>
+          </a:xfrm>
+          <a:prstGeom prst="rect">
+            <a:avLst/>
+          </a:prstGeom>
+          <a:noFill/>
+        </p:spPr>
+        <p:txBody>
+          <a:bodyPr wrap="none" rtlCol="0">
+            <a:spAutoFit/>
+          </a:bodyPr>
+          <a:lstStyle/>
+          <a:p>
+            <a:r>
+              <a:rPr lang="en-US" altLang="zh-TW" sz="2000" b="1" dirty="0"/>
+              <a:t>Git </a:t>
+            </a:r>
+            <a:r>
+              <a:rPr lang="zh-CN" altLang="en-US" sz="2000" b="1" dirty="0"/>
+              <a:t>修改一次文件到</a:t>
+            </a:r>
+            <a:r>
+              <a:rPr lang="en-US" altLang="zh-CN" sz="2000" b="1" dirty="0"/>
+              <a:t>commit</a:t>
+            </a:r>
+            <a:r>
+              <a:rPr lang="zh-CN" altLang="en-US" sz="2000" b="1" dirty="0"/>
+              <a:t>的圖示過程</a:t>
+            </a:r>
+            <a:endParaRPr lang="zh-TW" altLang="en-US" sz="2000" b="1" dirty="0"/>
+          </a:p>
+        </p:txBody>
+      </p:sp>
+      <p:sp>
+        <p:nvSpPr>
+          <p:cNvPr id="8" name="文字方塊 7">
+            <a:extLst>
+              <a:ext uri="{FF2B5EF4-FFF2-40B4-BE49-F238E27FC236}">
+                <a16:creationId xmlns:a16="http://schemas.microsoft.com/office/drawing/2014/main" id="{49C93D34-C734-4A03-AE9A-C29244EFEBC3}"/>
+              </a:ext>
+            </a:extLst>
+          </p:cNvPr>
+          <p:cNvSpPr txBox="1"/>
+          <p:nvPr/>
+        </p:nvSpPr>
+        <p:spPr>
+          <a:xfrm flipH="1">
+            <a:off x="4740659" y="1105803"/>
+            <a:ext cx="3230882" cy="369332"/>
+          </a:xfrm>
+          <a:prstGeom prst="rect">
+            <a:avLst/>
+          </a:prstGeom>
+          <a:noFill/>
+        </p:spPr>
+        <p:txBody>
+          <a:bodyPr wrap="square" rtlCol="0">
+            <a:spAutoFit/>
+          </a:bodyPr>
+          <a:lstStyle/>
+          <a:p>
+            <a:r>
+              <a:rPr lang="en-US" altLang="zh-CN" dirty="0"/>
+              <a:t>git add</a:t>
+            </a:r>
+            <a:r>
+              <a:rPr lang="zh-CN" altLang="en-US" dirty="0"/>
+              <a:t>修改的文件</a:t>
+            </a:r>
+            <a:endParaRPr lang="zh-TW" altLang="en-US" dirty="0"/>
+          </a:p>
+        </p:txBody>
+      </p:sp>
+      <p:sp>
+        <p:nvSpPr>
+          <p:cNvPr id="9" name="箭號: 向下 8">
+            <a:extLst>
+              <a:ext uri="{FF2B5EF4-FFF2-40B4-BE49-F238E27FC236}">
+                <a16:creationId xmlns:a16="http://schemas.microsoft.com/office/drawing/2014/main" id="{2FCCB5B6-35FA-41D1-9A57-23ACAE0006F5}"/>
+              </a:ext>
+            </a:extLst>
+          </p:cNvPr>
+          <p:cNvSpPr/>
+          <p:nvPr/>
+        </p:nvSpPr>
+        <p:spPr>
+          <a:xfrm>
+            <a:off x="5455920" y="5382864"/>
+            <a:ext cx="934720" cy="790545"/>
+          </a:xfrm>
+          <a:prstGeom prst="downArrow">
+            <a:avLst/>
+          </a:prstGeom>
+        </p:spPr>
+        <p:style>
+          <a:lnRef idx="2">
+            <a:schemeClr val="accent1">
+              <a:shade val="50000"/>
+            </a:schemeClr>
+          </a:lnRef>
+          <a:fillRef idx="1">
+            <a:schemeClr val="accent1"/>
+          </a:fillRef>
+          <a:effectRef idx="0">
+            <a:schemeClr val="accent1"/>
+          </a:effectRef>
+          <a:fontRef idx="minor">
+            <a:schemeClr val="lt1"/>
+          </a:fontRef>
+        </p:style>
+        <p:txBody>
+          <a:bodyPr rtlCol="0" anchor="ctr"/>
+          <a:lstStyle/>
+          <a:p>
+            <a:pPr algn="ctr"/>
+            <a:endParaRPr lang="zh-TW" altLang="en-US"/>
+          </a:p>
+        </p:txBody>
+      </p:sp>
+      <p:pic>
+        <p:nvPicPr>
+          <p:cNvPr id="4" name="圖片 3">
+            <a:extLst>
+              <a:ext uri="{FF2B5EF4-FFF2-40B4-BE49-F238E27FC236}">
+                <a16:creationId xmlns:a16="http://schemas.microsoft.com/office/drawing/2014/main" id="{805814F5-6CD6-4CC4-862D-C26DCF98525E}"/>
+              </a:ext>
+            </a:extLst>
+          </p:cNvPr>
+          <p:cNvPicPr>
+            <a:picLocks noChangeAspect="1"/>
+          </p:cNvPicPr>
+          <p:nvPr/>
+        </p:nvPicPr>
+        <p:blipFill>
+          <a:blip r:embed="rId2">
+            <a:extLst>
+              <a:ext uri="{28A0092B-C50C-407E-A947-70E740481C1C}">
+                <a14:useLocalDpi xmlns:a14="http://schemas.microsoft.com/office/drawing/2010/main" val="0"/>
+              </a:ext>
+            </a:extLst>
+          </a:blip>
+          <a:stretch>
+            <a:fillRect/>
+          </a:stretch>
+        </p:blipFill>
+        <p:spPr>
+          <a:xfrm>
+            <a:off x="3883150" y="1733106"/>
+            <a:ext cx="4425699" cy="3391787"/>
+          </a:xfrm>
+          <a:prstGeom prst="rect">
+            <a:avLst/>
+          </a:prstGeom>
+        </p:spPr>
+      </p:pic>
+    </p:spTree>
+    <p:extLst>
+      <p:ext uri="{BB962C8B-B14F-4D97-AF65-F5344CB8AC3E}">
+        <p14:creationId xmlns:p14="http://schemas.microsoft.com/office/powerpoint/2010/main" val="2493712124"/>
+      </p:ext>
+    </p:extLst>
+  </p:cSld>
+  <p:clrMapOvr>
+    <a:masterClrMapping/>
+  </p:clrMapOvr>
+</p:sld>
+</file>
+
+<file path=ppt/slides/slide9.xml><?xml version="1.0" encoding="utf-8"?>
+<p:sld xmlns:a="http://schemas.openxmlformats.org/drawingml/2006/main" xmlns:r="http://schemas.openxmlformats.org/officeDocument/2006/relationships" xmlns:p="http://schemas.openxmlformats.org/presentationml/2006/main">
+  <p:cSld>
+    <p:spTree>
+      <p:nvGrpSpPr>
+        <p:cNvPr id="1" name=""/>
+        <p:cNvGrpSpPr/>
+        <p:nvPr/>
+      </p:nvGrpSpPr>
+      <p:grpSpPr>
+        <a:xfrm>
+          <a:off x="0" y="0"/>
+          <a:ext cx="0" cy="0"/>
+          <a:chOff x="0" y="0"/>
+          <a:chExt cx="0" cy="0"/>
+        </a:xfrm>
+      </p:grpSpPr>
+      <p:sp>
+        <p:nvSpPr>
+          <p:cNvPr id="5" name="文字方塊 4">
+            <a:extLst>
+              <a:ext uri="{FF2B5EF4-FFF2-40B4-BE49-F238E27FC236}">
+                <a16:creationId xmlns:a16="http://schemas.microsoft.com/office/drawing/2014/main" id="{0B1F6121-1C23-4A07-A66F-19BD3BFDA4C3}"/>
+              </a:ext>
+            </a:extLst>
+          </p:cNvPr>
+          <p:cNvSpPr txBox="1"/>
+          <p:nvPr/>
+        </p:nvSpPr>
+        <p:spPr>
+          <a:xfrm>
+            <a:off x="304800" y="284480"/>
+            <a:ext cx="4425699" cy="400110"/>
+          </a:xfrm>
+          <a:prstGeom prst="rect">
+            <a:avLst/>
+          </a:prstGeom>
+          <a:noFill/>
+        </p:spPr>
+        <p:txBody>
+          <a:bodyPr wrap="none" rtlCol="0">
+            <a:spAutoFit/>
+          </a:bodyPr>
+          <a:lstStyle/>
+          <a:p>
+            <a:r>
+              <a:rPr lang="en-US" altLang="zh-TW" sz="2000" b="1" dirty="0"/>
+              <a:t>Git </a:t>
+            </a:r>
+            <a:r>
+              <a:rPr lang="zh-CN" altLang="en-US" sz="2000" b="1" dirty="0"/>
+              <a:t>修改一次文件到</a:t>
+            </a:r>
+            <a:r>
+              <a:rPr lang="en-US" altLang="zh-CN" sz="2000" b="1" dirty="0"/>
+              <a:t>commit</a:t>
+            </a:r>
+            <a:r>
+              <a:rPr lang="zh-CN" altLang="en-US" sz="2000" b="1" dirty="0"/>
+              <a:t>的圖示過程</a:t>
+            </a:r>
+            <a:endParaRPr lang="zh-TW" altLang="en-US" sz="2000" b="1" dirty="0"/>
+          </a:p>
+        </p:txBody>
+      </p:sp>
+      <p:sp>
+        <p:nvSpPr>
+          <p:cNvPr id="8" name="文字方塊 7">
+            <a:extLst>
+              <a:ext uri="{FF2B5EF4-FFF2-40B4-BE49-F238E27FC236}">
+                <a16:creationId xmlns:a16="http://schemas.microsoft.com/office/drawing/2014/main" id="{49C93D34-C734-4A03-AE9A-C29244EFEBC3}"/>
+              </a:ext>
+            </a:extLst>
+          </p:cNvPr>
+          <p:cNvSpPr txBox="1"/>
+          <p:nvPr/>
+        </p:nvSpPr>
+        <p:spPr>
+          <a:xfrm flipH="1">
+            <a:off x="5055619" y="1266299"/>
+            <a:ext cx="3230882" cy="369332"/>
+          </a:xfrm>
+          <a:prstGeom prst="rect">
+            <a:avLst/>
+          </a:prstGeom>
+          <a:noFill/>
+        </p:spPr>
+        <p:txBody>
+          <a:bodyPr wrap="square" rtlCol="0">
+            <a:spAutoFit/>
+          </a:bodyPr>
+          <a:lstStyle/>
+          <a:p>
+            <a:r>
+              <a:rPr lang="en-US" altLang="zh-CN" dirty="0"/>
+              <a:t>git commit</a:t>
+            </a:r>
+            <a:r>
+              <a:rPr lang="zh-CN" altLang="en-US" dirty="0"/>
+              <a:t>后</a:t>
+            </a:r>
+            <a:endParaRPr lang="zh-TW" altLang="en-US" dirty="0"/>
+          </a:p>
+        </p:txBody>
+      </p:sp>
+      <p:pic>
+        <p:nvPicPr>
+          <p:cNvPr id="3" name="圖片 2">
+            <a:extLst>
+              <a:ext uri="{FF2B5EF4-FFF2-40B4-BE49-F238E27FC236}">
+                <a16:creationId xmlns:a16="http://schemas.microsoft.com/office/drawing/2014/main" id="{CFA75E75-22E7-4864-9F85-98E75F7FF86D}"/>
+              </a:ext>
+            </a:extLst>
+          </p:cNvPr>
+          <p:cNvPicPr>
+            <a:picLocks noChangeAspect="1"/>
+          </p:cNvPicPr>
+          <p:nvPr/>
+        </p:nvPicPr>
+        <p:blipFill>
+          <a:blip r:embed="rId2">
+            <a:extLst>
+              <a:ext uri="{28A0092B-C50C-407E-A947-70E740481C1C}">
+                <a14:useLocalDpi xmlns:a14="http://schemas.microsoft.com/office/drawing/2010/main" val="0"/>
+              </a:ext>
+            </a:extLst>
+          </a:blip>
+          <a:stretch>
+            <a:fillRect/>
+          </a:stretch>
+        </p:blipFill>
+        <p:spPr>
+          <a:xfrm>
+            <a:off x="3332480" y="1798321"/>
+            <a:ext cx="5821680" cy="3424048"/>
+          </a:xfrm>
+          <a:prstGeom prst="rect">
+            <a:avLst/>
+          </a:prstGeom>
+        </p:spPr>
+      </p:pic>
+    </p:spTree>
+    <p:extLst>
+      <p:ext uri="{BB962C8B-B14F-4D97-AF65-F5344CB8AC3E}">
+        <p14:creationId xmlns:p14="http://schemas.microsoft.com/office/powerpoint/2010/main" val="1914980352"/>
       </p:ext>
     </p:extLst>
   </p:cSld>

</xml_diff>

<commit_message>
Add the git branch command study
</commit_message>
<xml_diff>
--- a/GitStudy/GitStudy.pptx
+++ b/GitStudy/GitStudy.pptx
@@ -10,10 +10,11 @@
     <p:sldId id="257" r:id="rId4"/>
     <p:sldId id="263" r:id="rId5"/>
     <p:sldId id="264" r:id="rId6"/>
-    <p:sldId id="259" r:id="rId7"/>
-    <p:sldId id="260" r:id="rId8"/>
-    <p:sldId id="261" r:id="rId9"/>
-    <p:sldId id="262" r:id="rId10"/>
+    <p:sldId id="265" r:id="rId7"/>
+    <p:sldId id="259" r:id="rId8"/>
+    <p:sldId id="260" r:id="rId9"/>
+    <p:sldId id="261" r:id="rId10"/>
+    <p:sldId id="262" r:id="rId11"/>
   </p:sldIdLst>
   <p:sldSz cx="12192000" cy="6858000"/>
   <p:notesSz cx="6858000" cy="9144000"/>
@@ -267,7 +268,7 @@
           <a:p>
             <a:fld id="{B3DC4D43-2745-46E1-A871-6B61F7786A47}" type="datetimeFigureOut">
               <a:rPr lang="zh-TW" altLang="en-US" smtClean="0"/>
-              <a:t>2023/1/13</a:t>
+              <a:t>2023/1/14</a:t>
             </a:fld>
             <a:endParaRPr lang="zh-TW" altLang="en-US"/>
           </a:p>
@@ -465,7 +466,7 @@
           <a:p>
             <a:fld id="{B3DC4D43-2745-46E1-A871-6B61F7786A47}" type="datetimeFigureOut">
               <a:rPr lang="zh-TW" altLang="en-US" smtClean="0"/>
-              <a:t>2023/1/13</a:t>
+              <a:t>2023/1/14</a:t>
             </a:fld>
             <a:endParaRPr lang="zh-TW" altLang="en-US"/>
           </a:p>
@@ -673,7 +674,7 @@
           <a:p>
             <a:fld id="{B3DC4D43-2745-46E1-A871-6B61F7786A47}" type="datetimeFigureOut">
               <a:rPr lang="zh-TW" altLang="en-US" smtClean="0"/>
-              <a:t>2023/1/13</a:t>
+              <a:t>2023/1/14</a:t>
             </a:fld>
             <a:endParaRPr lang="zh-TW" altLang="en-US"/>
           </a:p>
@@ -871,7 +872,7 @@
           <a:p>
             <a:fld id="{B3DC4D43-2745-46E1-A871-6B61F7786A47}" type="datetimeFigureOut">
               <a:rPr lang="zh-TW" altLang="en-US" smtClean="0"/>
-              <a:t>2023/1/13</a:t>
+              <a:t>2023/1/14</a:t>
             </a:fld>
             <a:endParaRPr lang="zh-TW" altLang="en-US"/>
           </a:p>
@@ -1146,7 +1147,7 @@
           <a:p>
             <a:fld id="{B3DC4D43-2745-46E1-A871-6B61F7786A47}" type="datetimeFigureOut">
               <a:rPr lang="zh-TW" altLang="en-US" smtClean="0"/>
-              <a:t>2023/1/13</a:t>
+              <a:t>2023/1/14</a:t>
             </a:fld>
             <a:endParaRPr lang="zh-TW" altLang="en-US"/>
           </a:p>
@@ -1411,7 +1412,7 @@
           <a:p>
             <a:fld id="{B3DC4D43-2745-46E1-A871-6B61F7786A47}" type="datetimeFigureOut">
               <a:rPr lang="zh-TW" altLang="en-US" smtClean="0"/>
-              <a:t>2023/1/13</a:t>
+              <a:t>2023/1/14</a:t>
             </a:fld>
             <a:endParaRPr lang="zh-TW" altLang="en-US"/>
           </a:p>
@@ -1823,7 +1824,7 @@
           <a:p>
             <a:fld id="{B3DC4D43-2745-46E1-A871-6B61F7786A47}" type="datetimeFigureOut">
               <a:rPr lang="zh-TW" altLang="en-US" smtClean="0"/>
-              <a:t>2023/1/13</a:t>
+              <a:t>2023/1/14</a:t>
             </a:fld>
             <a:endParaRPr lang="zh-TW" altLang="en-US"/>
           </a:p>
@@ -1964,7 +1965,7 @@
           <a:p>
             <a:fld id="{B3DC4D43-2745-46E1-A871-6B61F7786A47}" type="datetimeFigureOut">
               <a:rPr lang="zh-TW" altLang="en-US" smtClean="0"/>
-              <a:t>2023/1/13</a:t>
+              <a:t>2023/1/14</a:t>
             </a:fld>
             <a:endParaRPr lang="zh-TW" altLang="en-US"/>
           </a:p>
@@ -2077,7 +2078,7 @@
           <a:p>
             <a:fld id="{B3DC4D43-2745-46E1-A871-6B61F7786A47}" type="datetimeFigureOut">
               <a:rPr lang="zh-TW" altLang="en-US" smtClean="0"/>
-              <a:t>2023/1/13</a:t>
+              <a:t>2023/1/14</a:t>
             </a:fld>
             <a:endParaRPr lang="zh-TW" altLang="en-US"/>
           </a:p>
@@ -2388,7 +2389,7 @@
           <a:p>
             <a:fld id="{B3DC4D43-2745-46E1-A871-6B61F7786A47}" type="datetimeFigureOut">
               <a:rPr lang="zh-TW" altLang="en-US" smtClean="0"/>
-              <a:t>2023/1/13</a:t>
+              <a:t>2023/1/14</a:t>
             </a:fld>
             <a:endParaRPr lang="zh-TW" altLang="en-US"/>
           </a:p>
@@ -2676,7 +2677,7 @@
           <a:p>
             <a:fld id="{B3DC4D43-2745-46E1-A871-6B61F7786A47}" type="datetimeFigureOut">
               <a:rPr lang="zh-TW" altLang="en-US" smtClean="0"/>
-              <a:t>2023/1/13</a:t>
+              <a:t>2023/1/14</a:t>
             </a:fld>
             <a:endParaRPr lang="zh-TW" altLang="en-US"/>
           </a:p>
@@ -2917,7 +2918,7 @@
           <a:p>
             <a:fld id="{B3DC4D43-2745-46E1-A871-6B61F7786A47}" type="datetimeFigureOut">
               <a:rPr lang="zh-TW" altLang="en-US" smtClean="0"/>
-              <a:t>2023/1/13</a:t>
+              <a:t>2023/1/14</a:t>
             </a:fld>
             <a:endParaRPr lang="zh-TW" altLang="en-US"/>
           </a:p>
@@ -3376,6 +3377,160 @@
 </p:sld>
 </file>
 
+<file path=ppt/slides/slide10.xml><?xml version="1.0" encoding="utf-8"?>
+<p:sld xmlns:a="http://schemas.openxmlformats.org/drawingml/2006/main" xmlns:r="http://schemas.openxmlformats.org/officeDocument/2006/relationships" xmlns:p="http://schemas.openxmlformats.org/presentationml/2006/main">
+  <p:cSld>
+    <p:spTree>
+      <p:nvGrpSpPr>
+        <p:cNvPr id="1" name=""/>
+        <p:cNvGrpSpPr/>
+        <p:nvPr/>
+      </p:nvGrpSpPr>
+      <p:grpSpPr>
+        <a:xfrm>
+          <a:off x="0" y="0"/>
+          <a:ext cx="0" cy="0"/>
+          <a:chOff x="0" y="0"/>
+          <a:chExt cx="0" cy="0"/>
+        </a:xfrm>
+      </p:grpSpPr>
+      <p:sp>
+        <p:nvSpPr>
+          <p:cNvPr id="5" name="文字方塊 4">
+            <a:extLst>
+              <a:ext uri="{FF2B5EF4-FFF2-40B4-BE49-F238E27FC236}">
+                <a16:creationId xmlns:a16="http://schemas.microsoft.com/office/drawing/2014/main" id="{0B1F6121-1C23-4A07-A66F-19BD3BFDA4C3}"/>
+              </a:ext>
+            </a:extLst>
+          </p:cNvPr>
+          <p:cNvSpPr txBox="1"/>
+          <p:nvPr/>
+        </p:nvSpPr>
+        <p:spPr>
+          <a:xfrm>
+            <a:off x="304800" y="284480"/>
+            <a:ext cx="4425699" cy="400110"/>
+          </a:xfrm>
+          <a:prstGeom prst="rect">
+            <a:avLst/>
+          </a:prstGeom>
+          <a:noFill/>
+        </p:spPr>
+        <p:txBody>
+          <a:bodyPr wrap="none" rtlCol="0">
+            <a:spAutoFit/>
+          </a:bodyPr>
+          <a:lstStyle/>
+          <a:p>
+            <a:r>
+              <a:rPr lang="en-US" altLang="zh-TW" sz="2000" b="1" dirty="0"/>
+              <a:t>Git </a:t>
+            </a:r>
+            <a:r>
+              <a:rPr lang="zh-CN" altLang="en-US" sz="2000" b="1" dirty="0"/>
+              <a:t>修改一次文件到</a:t>
+            </a:r>
+            <a:r>
+              <a:rPr lang="en-US" altLang="zh-CN" sz="2000" b="1" dirty="0"/>
+              <a:t>commit</a:t>
+            </a:r>
+            <a:r>
+              <a:rPr lang="zh-CN" altLang="en-US" sz="2000" b="1" dirty="0"/>
+              <a:t>的圖示過程</a:t>
+            </a:r>
+            <a:endParaRPr lang="zh-TW" altLang="en-US" sz="2000" b="1" dirty="0"/>
+          </a:p>
+        </p:txBody>
+      </p:sp>
+      <p:sp>
+        <p:nvSpPr>
+          <p:cNvPr id="8" name="文字方塊 7">
+            <a:extLst>
+              <a:ext uri="{FF2B5EF4-FFF2-40B4-BE49-F238E27FC236}">
+                <a16:creationId xmlns:a16="http://schemas.microsoft.com/office/drawing/2014/main" id="{49C93D34-C734-4A03-AE9A-C29244EFEBC3}"/>
+              </a:ext>
+            </a:extLst>
+          </p:cNvPr>
+          <p:cNvSpPr txBox="1"/>
+          <p:nvPr/>
+        </p:nvSpPr>
+        <p:spPr>
+          <a:xfrm flipH="1">
+            <a:off x="5055619" y="1266299"/>
+            <a:ext cx="3230882" cy="369332"/>
+          </a:xfrm>
+          <a:prstGeom prst="rect">
+            <a:avLst/>
+          </a:prstGeom>
+          <a:noFill/>
+        </p:spPr>
+        <p:txBody>
+          <a:bodyPr wrap="square" rtlCol="0">
+            <a:spAutoFit/>
+          </a:bodyPr>
+          <a:lstStyle/>
+          <a:p>
+            <a:r>
+              <a:rPr lang="en-US" altLang="zh-CN" dirty="0"/>
+              <a:t>git commit</a:t>
+            </a:r>
+            <a:r>
+              <a:rPr lang="zh-CN" altLang="en-US" dirty="0"/>
+              <a:t>后</a:t>
+            </a:r>
+            <a:endParaRPr lang="zh-TW" altLang="en-US" dirty="0"/>
+          </a:p>
+        </p:txBody>
+      </p:sp>
+      <p:pic>
+        <p:nvPicPr>
+          <p:cNvPr id="3" name="圖片 2">
+            <a:extLst>
+              <a:ext uri="{FF2B5EF4-FFF2-40B4-BE49-F238E27FC236}">
+                <a16:creationId xmlns:a16="http://schemas.microsoft.com/office/drawing/2014/main" id="{CFA75E75-22E7-4864-9F85-98E75F7FF86D}"/>
+              </a:ext>
+            </a:extLst>
+          </p:cNvPr>
+          <p:cNvPicPr>
+            <a:picLocks noChangeAspect="1"/>
+          </p:cNvPicPr>
+          <p:nvPr/>
+        </p:nvPicPr>
+        <p:blipFill>
+          <a:blip r:embed="rId2">
+            <a:extLst>
+              <a:ext uri="{28A0092B-C50C-407E-A947-70E740481C1C}">
+                <a14:useLocalDpi xmlns:a14="http://schemas.microsoft.com/office/drawing/2010/main" val="0"/>
+              </a:ext>
+            </a:extLst>
+          </a:blip>
+          <a:stretch>
+            <a:fillRect/>
+          </a:stretch>
+        </p:blipFill>
+        <p:spPr>
+          <a:xfrm>
+            <a:off x="3332480" y="1798321"/>
+            <a:ext cx="5821680" cy="3424048"/>
+          </a:xfrm>
+          <a:prstGeom prst="rect">
+            <a:avLst/>
+          </a:prstGeom>
+        </p:spPr>
+      </p:pic>
+    </p:spTree>
+    <p:extLst>
+      <p:ext uri="{BB962C8B-B14F-4D97-AF65-F5344CB8AC3E}">
+        <p14:creationId xmlns:p14="http://schemas.microsoft.com/office/powerpoint/2010/main" val="1914980352"/>
+      </p:ext>
+    </p:extLst>
+  </p:cSld>
+  <p:clrMapOvr>
+    <a:masterClrMapping/>
+  </p:clrMapOvr>
+</p:sld>
+</file>
+
 <file path=ppt/slides/slide2.xml><?xml version="1.0" encoding="utf-8"?>
 <p:sld xmlns:a="http://schemas.openxmlformats.org/drawingml/2006/main" xmlns:r="http://schemas.openxmlformats.org/officeDocument/2006/relationships" xmlns:p="http://schemas.openxmlformats.org/presentationml/2006/main">
   <p:cSld>
@@ -4011,8 +4166,8 @@
         </p:nvSpPr>
         <p:spPr>
           <a:xfrm>
-            <a:off x="1198880" y="985520"/>
-            <a:ext cx="10383519" cy="2308324"/>
+            <a:off x="1097280" y="755710"/>
+            <a:ext cx="10383519" cy="5355312"/>
           </a:xfrm>
           <a:prstGeom prst="rect">
             <a:avLst/>
@@ -4104,6 +4259,106 @@
             <a:r>
               <a:rPr lang="en-US" altLang="zh-CN" dirty="0"/>
               <a:t>git show-branch</a:t>
+            </a:r>
+          </a:p>
+          <a:p>
+            <a:endParaRPr lang="en-US" altLang="zh-CN" dirty="0"/>
+          </a:p>
+          <a:p>
+            <a:r>
+              <a:rPr lang="en-US" altLang="zh-CN" b="1" dirty="0"/>
+              <a:t>4.</a:t>
+            </a:r>
+            <a:r>
+              <a:rPr lang="zh-CN" altLang="en-US" b="1" dirty="0"/>
+              <a:t>創建並切換到分支</a:t>
+            </a:r>
+            <a:endParaRPr lang="en-US" altLang="zh-CN" b="1" dirty="0"/>
+          </a:p>
+          <a:p>
+            <a:r>
+              <a:rPr lang="en-US" altLang="zh-CN" dirty="0"/>
+              <a:t>	git checkout –b </a:t>
+            </a:r>
+            <a:r>
+              <a:rPr lang="zh-CN" altLang="en-US" dirty="0"/>
+              <a:t>分支名</a:t>
+            </a:r>
+            <a:endParaRPr lang="en-US" altLang="zh-CN" dirty="0"/>
+          </a:p>
+          <a:p>
+            <a:endParaRPr lang="en-US" altLang="zh-CN" dirty="0"/>
+          </a:p>
+          <a:p>
+            <a:r>
+              <a:rPr lang="en-US" altLang="zh-CN" b="1" dirty="0"/>
+              <a:t>5. </a:t>
+            </a:r>
+            <a:r>
+              <a:rPr lang="zh-CN" altLang="en-US" b="1" dirty="0"/>
+              <a:t>切換分支</a:t>
+            </a:r>
+            <a:endParaRPr lang="en-US" altLang="zh-CN" b="1" dirty="0"/>
+          </a:p>
+          <a:p>
+            <a:r>
+              <a:rPr lang="en-US" altLang="zh-CN" dirty="0"/>
+              <a:t>	git checkout </a:t>
+            </a:r>
+            <a:r>
+              <a:rPr lang="zh-CN" altLang="en-US" dirty="0"/>
+              <a:t>分支名</a:t>
+            </a:r>
+            <a:r>
+              <a:rPr lang="en-US" altLang="zh-CN" dirty="0"/>
+              <a:t>, </a:t>
+            </a:r>
+            <a:r>
+              <a:rPr lang="zh-CN" altLang="en-US" dirty="0"/>
+              <a:t>如果内容不冲突會把修改也帶到切換分支</a:t>
+            </a:r>
+            <a:endParaRPr lang="en-US" altLang="zh-CN" dirty="0"/>
+          </a:p>
+          <a:p>
+            <a:endParaRPr lang="en-US" altLang="zh-CN" dirty="0"/>
+          </a:p>
+          <a:p>
+            <a:r>
+              <a:rPr lang="en-US" altLang="zh-CN" b="1" dirty="0"/>
+              <a:t>6. </a:t>
+            </a:r>
+            <a:r>
+              <a:rPr lang="zh-CN" altLang="en-US" b="1" dirty="0"/>
+              <a:t>查看另外一個分支文件的内容</a:t>
+            </a:r>
+            <a:endParaRPr lang="en-US" altLang="zh-CN" b="1" dirty="0"/>
+          </a:p>
+          <a:p>
+            <a:r>
+              <a:rPr lang="en-US" altLang="zh-CN" dirty="0"/>
+              <a:t>	git show </a:t>
+            </a:r>
+            <a:r>
+              <a:rPr lang="zh-CN" altLang="en-US" dirty="0"/>
+              <a:t>分支名</a:t>
+            </a:r>
+            <a:r>
+              <a:rPr lang="en-US" altLang="zh-CN" dirty="0"/>
+              <a:t>:</a:t>
+            </a:r>
+            <a:r>
+              <a:rPr lang="zh-CN" altLang="en-US" dirty="0"/>
+              <a:t>文件名</a:t>
+            </a:r>
+            <a:endParaRPr lang="en-US" altLang="zh-CN" dirty="0"/>
+          </a:p>
+          <a:p>
+            <a:endParaRPr lang="en-US" altLang="zh-CN" dirty="0"/>
+          </a:p>
+          <a:p>
+            <a:r>
+              <a:rPr lang="en-US" altLang="zh-CN" dirty="0"/>
+              <a:t>	</a:t>
             </a:r>
           </a:p>
         </p:txBody>
@@ -4140,6 +4395,348 @@
       </p:grpSpPr>
       <p:sp>
         <p:nvSpPr>
+          <p:cNvPr id="4" name="文字方塊 3">
+            <a:extLst>
+              <a:ext uri="{FF2B5EF4-FFF2-40B4-BE49-F238E27FC236}">
+                <a16:creationId xmlns:a16="http://schemas.microsoft.com/office/drawing/2014/main" id="{EE42E484-788D-46B8-84C5-818D073B92AE}"/>
+              </a:ext>
+            </a:extLst>
+          </p:cNvPr>
+          <p:cNvSpPr txBox="1"/>
+          <p:nvPr/>
+        </p:nvSpPr>
+        <p:spPr>
+          <a:xfrm>
+            <a:off x="365503" y="355600"/>
+            <a:ext cx="3043590" cy="400110"/>
+          </a:xfrm>
+          <a:prstGeom prst="rect">
+            <a:avLst/>
+          </a:prstGeom>
+          <a:noFill/>
+        </p:spPr>
+        <p:txBody>
+          <a:bodyPr wrap="none" rtlCol="0">
+            <a:spAutoFit/>
+          </a:bodyPr>
+          <a:lstStyle/>
+          <a:p>
+            <a:r>
+              <a:rPr lang="en-US" altLang="zh-CN" sz="2000" b="1" dirty="0"/>
+              <a:t>git branch</a:t>
+            </a:r>
+            <a:r>
+              <a:rPr lang="zh-CN" altLang="en-US" sz="2000" b="1" dirty="0"/>
+              <a:t>的命令操作分支</a:t>
+            </a:r>
+            <a:endParaRPr lang="zh-TW" altLang="en-US" sz="2000" b="1" dirty="0"/>
+          </a:p>
+        </p:txBody>
+      </p:sp>
+      <p:sp>
+        <p:nvSpPr>
+          <p:cNvPr id="5" name="文字方塊 4">
+            <a:extLst>
+              <a:ext uri="{FF2B5EF4-FFF2-40B4-BE49-F238E27FC236}">
+                <a16:creationId xmlns:a16="http://schemas.microsoft.com/office/drawing/2014/main" id="{7335B79A-F03E-499E-A7C1-0FE623461237}"/>
+              </a:ext>
+            </a:extLst>
+          </p:cNvPr>
+          <p:cNvSpPr txBox="1"/>
+          <p:nvPr/>
+        </p:nvSpPr>
+        <p:spPr>
+          <a:xfrm>
+            <a:off x="1097280" y="755710"/>
+            <a:ext cx="10383519" cy="369332"/>
+          </a:xfrm>
+          <a:prstGeom prst="rect">
+            <a:avLst/>
+          </a:prstGeom>
+          <a:noFill/>
+        </p:spPr>
+        <p:txBody>
+          <a:bodyPr wrap="square" rtlCol="0">
+            <a:spAutoFit/>
+          </a:bodyPr>
+          <a:lstStyle/>
+          <a:p>
+            <a:r>
+              <a:rPr lang="en-US" altLang="zh-CN" dirty="0"/>
+              <a:t>	</a:t>
+            </a:r>
+          </a:p>
+        </p:txBody>
+      </p:sp>
+      <p:sp>
+        <p:nvSpPr>
+          <p:cNvPr id="2" name="文字方塊 1">
+            <a:extLst>
+              <a:ext uri="{FF2B5EF4-FFF2-40B4-BE49-F238E27FC236}">
+                <a16:creationId xmlns:a16="http://schemas.microsoft.com/office/drawing/2014/main" id="{705A9098-1D08-426B-9670-C472F103B3ED}"/>
+              </a:ext>
+            </a:extLst>
+          </p:cNvPr>
+          <p:cNvSpPr txBox="1"/>
+          <p:nvPr/>
+        </p:nvSpPr>
+        <p:spPr>
+          <a:xfrm>
+            <a:off x="995680" y="1125042"/>
+            <a:ext cx="5618480" cy="2031325"/>
+          </a:xfrm>
+          <a:prstGeom prst="rect">
+            <a:avLst/>
+          </a:prstGeom>
+          <a:noFill/>
+        </p:spPr>
+        <p:txBody>
+          <a:bodyPr wrap="square" rtlCol="0">
+            <a:spAutoFit/>
+          </a:bodyPr>
+          <a:lstStyle/>
+          <a:p>
+            <a:r>
+              <a:rPr lang="en-US" altLang="zh-CN" dirty="0"/>
+              <a:t>7. </a:t>
+            </a:r>
+            <a:r>
+              <a:rPr lang="zh-CN" altLang="en-US" dirty="0"/>
+              <a:t>展示</a:t>
+            </a:r>
+            <a:r>
+              <a:rPr lang="en-US" altLang="zh-CN" dirty="0"/>
+              <a:t>Branch</a:t>
+            </a:r>
+          </a:p>
+          <a:p>
+            <a:r>
+              <a:rPr lang="en-US" altLang="zh-TW" dirty="0"/>
+              <a:t>	git show-branch</a:t>
+            </a:r>
+          </a:p>
+          <a:p>
+            <a:r>
+              <a:rPr lang="en-US" altLang="zh-TW" dirty="0"/>
+              <a:t>	--</a:t>
+            </a:r>
+            <a:r>
+              <a:rPr lang="zh-CN" altLang="en-US" dirty="0"/>
+              <a:t>符號以上代表</a:t>
+            </a:r>
+            <a:r>
+              <a:rPr lang="en-US" altLang="zh-CN" dirty="0"/>
+              <a:t>branch</a:t>
+            </a:r>
+          </a:p>
+          <a:p>
+            <a:r>
+              <a:rPr lang="en-US" altLang="zh-TW" dirty="0"/>
+              <a:t>	</a:t>
+            </a:r>
+            <a:r>
+              <a:rPr lang="en-US" altLang="zh-CN" dirty="0"/>
+              <a:t>--</a:t>
+            </a:r>
+            <a:r>
+              <a:rPr lang="zh-CN" altLang="en-US" dirty="0"/>
+              <a:t>符號以下代表提交的</a:t>
+            </a:r>
+            <a:r>
+              <a:rPr lang="en-US" altLang="zh-CN" dirty="0"/>
+              <a:t>log</a:t>
+            </a:r>
+            <a:r>
+              <a:rPr lang="zh-CN" altLang="en-US" dirty="0"/>
+              <a:t>信息</a:t>
+            </a:r>
+            <a:endParaRPr lang="en-US" altLang="zh-TW" dirty="0"/>
+          </a:p>
+          <a:p>
+            <a:r>
+              <a:rPr lang="en-US" altLang="zh-TW" dirty="0"/>
+              <a:t>	</a:t>
+            </a:r>
+            <a:r>
+              <a:rPr lang="en-US" altLang="zh-CN" dirty="0"/>
+              <a:t>+ </a:t>
+            </a:r>
+            <a:r>
+              <a:rPr lang="zh-CN" altLang="en-US" dirty="0"/>
+              <a:t>代表提交在哪一個分支當中</a:t>
+            </a:r>
+            <a:endParaRPr lang="en-US" altLang="zh-CN" dirty="0"/>
+          </a:p>
+          <a:p>
+            <a:r>
+              <a:rPr lang="en-US" altLang="zh-TW" dirty="0"/>
+              <a:t>                  </a:t>
+            </a:r>
+            <a:r>
+              <a:rPr lang="en-US" altLang="zh-CN" dirty="0"/>
+              <a:t>- </a:t>
+            </a:r>
+            <a:r>
+              <a:rPr lang="zh-CN" altLang="en-US" dirty="0"/>
+              <a:t>代表合并提交</a:t>
+            </a:r>
+            <a:endParaRPr lang="en-US" altLang="zh-CN" dirty="0"/>
+          </a:p>
+          <a:p>
+            <a:r>
+              <a:rPr lang="en-US" altLang="zh-TW" dirty="0"/>
+              <a:t>                 </a:t>
+            </a:r>
+            <a:r>
+              <a:rPr lang="zh-CN" altLang="en-US" dirty="0"/>
+              <a:t>* 代表存在于活動分支的提交</a:t>
+            </a:r>
+            <a:endParaRPr lang="zh-TW" altLang="en-US" dirty="0"/>
+          </a:p>
+        </p:txBody>
+      </p:sp>
+      <p:pic>
+        <p:nvPicPr>
+          <p:cNvPr id="8" name="圖片 7">
+            <a:extLst>
+              <a:ext uri="{FF2B5EF4-FFF2-40B4-BE49-F238E27FC236}">
+                <a16:creationId xmlns:a16="http://schemas.microsoft.com/office/drawing/2014/main" id="{E25375C7-CDC0-469F-B0A3-AB1EA038A7A6}"/>
+              </a:ext>
+            </a:extLst>
+          </p:cNvPr>
+          <p:cNvPicPr>
+            <a:picLocks noChangeAspect="1"/>
+          </p:cNvPicPr>
+          <p:nvPr/>
+        </p:nvPicPr>
+        <p:blipFill>
+          <a:blip r:embed="rId2">
+            <a:extLst>
+              <a:ext uri="{28A0092B-C50C-407E-A947-70E740481C1C}">
+                <a14:useLocalDpi xmlns:a14="http://schemas.microsoft.com/office/drawing/2010/main" val="0"/>
+              </a:ext>
+            </a:extLst>
+          </a:blip>
+          <a:stretch>
+            <a:fillRect/>
+          </a:stretch>
+        </p:blipFill>
+        <p:spPr>
+          <a:xfrm>
+            <a:off x="1562042" y="3259420"/>
+            <a:ext cx="5052117" cy="2247299"/>
+          </a:xfrm>
+          <a:prstGeom prst="rect">
+            <a:avLst/>
+          </a:prstGeom>
+        </p:spPr>
+      </p:pic>
+      <p:sp>
+        <p:nvSpPr>
+          <p:cNvPr id="9" name="文字方塊 8">
+            <a:extLst>
+              <a:ext uri="{FF2B5EF4-FFF2-40B4-BE49-F238E27FC236}">
+                <a16:creationId xmlns:a16="http://schemas.microsoft.com/office/drawing/2014/main" id="{5FAB5A54-BBE1-4721-A93D-ABA7C212CCBE}"/>
+              </a:ext>
+            </a:extLst>
+          </p:cNvPr>
+          <p:cNvSpPr txBox="1"/>
+          <p:nvPr/>
+        </p:nvSpPr>
+        <p:spPr>
+          <a:xfrm>
+            <a:off x="6868160" y="3244334"/>
+            <a:ext cx="4876800" cy="1200329"/>
+          </a:xfrm>
+          <a:prstGeom prst="rect">
+            <a:avLst/>
+          </a:prstGeom>
+          <a:noFill/>
+        </p:spPr>
+        <p:txBody>
+          <a:bodyPr wrap="square" rtlCol="0">
+            <a:spAutoFit/>
+          </a:bodyPr>
+          <a:lstStyle/>
+          <a:p>
+            <a:r>
+              <a:rPr lang="zh-CN" altLang="en-US" dirty="0"/>
+              <a:t>紅色對應紅色</a:t>
+            </a:r>
+            <a:r>
+              <a:rPr lang="en-US" altLang="zh-CN" dirty="0"/>
+              <a:t>, </a:t>
+            </a:r>
+            <a:r>
+              <a:rPr lang="zh-CN" altLang="en-US" dirty="0"/>
+              <a:t>綠色對應綠色</a:t>
+            </a:r>
+            <a:endParaRPr lang="en-US" altLang="zh-CN" dirty="0"/>
+          </a:p>
+          <a:p>
+            <a:endParaRPr lang="en-US" altLang="zh-TW" dirty="0"/>
+          </a:p>
+          <a:p>
+            <a:r>
+              <a:rPr lang="zh-CN" altLang="en-US" dirty="0"/>
+              <a:t>一般這條命令只有顯示到共同擁有的版本庫當中</a:t>
+            </a:r>
+            <a:r>
+              <a:rPr lang="en-US" altLang="zh-CN" dirty="0"/>
+              <a:t>, </a:t>
+            </a:r>
+            <a:r>
+              <a:rPr lang="zh-CN" altLang="en-US" dirty="0"/>
+              <a:t>如果顯示更多加上</a:t>
+            </a:r>
+            <a:r>
+              <a:rPr lang="en-US" altLang="zh-CN" dirty="0"/>
+              <a:t>”--more=</a:t>
+            </a:r>
+            <a:r>
+              <a:rPr lang="zh-CN" altLang="en-US"/>
+              <a:t>數量</a:t>
+            </a:r>
+            <a:r>
+              <a:rPr lang="en-US" altLang="zh-CN"/>
+              <a:t>“</a:t>
+            </a:r>
+            <a:endParaRPr lang="zh-TW" altLang="en-US" dirty="0"/>
+          </a:p>
+        </p:txBody>
+      </p:sp>
+    </p:spTree>
+    <p:extLst>
+      <p:ext uri="{BB962C8B-B14F-4D97-AF65-F5344CB8AC3E}">
+        <p14:creationId xmlns:p14="http://schemas.microsoft.com/office/powerpoint/2010/main" val="2151625063"/>
+      </p:ext>
+    </p:extLst>
+  </p:cSld>
+  <p:clrMapOvr>
+    <a:masterClrMapping/>
+  </p:clrMapOvr>
+</p:sld>
+</file>
+
+<file path=ppt/slides/slide7.xml><?xml version="1.0" encoding="utf-8"?>
+<p:sld xmlns:a="http://schemas.openxmlformats.org/drawingml/2006/main" xmlns:r="http://schemas.openxmlformats.org/officeDocument/2006/relationships" xmlns:p="http://schemas.openxmlformats.org/presentationml/2006/main">
+  <p:cSld>
+    <p:spTree>
+      <p:nvGrpSpPr>
+        <p:cNvPr id="1" name=""/>
+        <p:cNvGrpSpPr/>
+        <p:nvPr/>
+      </p:nvGrpSpPr>
+      <p:grpSpPr>
+        <a:xfrm>
+          <a:off x="0" y="0"/>
+          <a:ext cx="0" cy="0"/>
+          <a:chOff x="0" y="0"/>
+          <a:chExt cx="0" cy="0"/>
+        </a:xfrm>
+      </p:grpSpPr>
+      <p:sp>
+        <p:nvSpPr>
           <p:cNvPr id="5" name="文字方塊 4">
             <a:extLst>
               <a:ext uri="{FF2B5EF4-FFF2-40B4-BE49-F238E27FC236}">
@@ -4325,7 +4922,7 @@
 </p:sld>
 </file>
 
-<file path=ppt/slides/slide7.xml><?xml version="1.0" encoding="utf-8"?>
+<file path=ppt/slides/slide8.xml><?xml version="1.0" encoding="utf-8"?>
 <p:sld xmlns:a="http://schemas.openxmlformats.org/drawingml/2006/main" xmlns:r="http://schemas.openxmlformats.org/officeDocument/2006/relationships" xmlns:p="http://schemas.openxmlformats.org/presentationml/2006/main">
   <p:cSld>
     <p:spTree>
@@ -4521,7 +5118,7 @@
 </p:sld>
 </file>
 
-<file path=ppt/slides/slide8.xml><?xml version="1.0" encoding="utf-8"?>
+<file path=ppt/slides/slide9.xml><?xml version="1.0" encoding="utf-8"?>
 <p:sld xmlns:a="http://schemas.openxmlformats.org/drawingml/2006/main" xmlns:r="http://schemas.openxmlformats.org/officeDocument/2006/relationships" xmlns:p="http://schemas.openxmlformats.org/presentationml/2006/main">
   <p:cSld>
     <p:spTree>
@@ -4712,160 +5309,6 @@
     <p:extLst>
       <p:ext uri="{BB962C8B-B14F-4D97-AF65-F5344CB8AC3E}">
         <p14:creationId xmlns:p14="http://schemas.microsoft.com/office/powerpoint/2010/main" val="2493712124"/>
-      </p:ext>
-    </p:extLst>
-  </p:cSld>
-  <p:clrMapOvr>
-    <a:masterClrMapping/>
-  </p:clrMapOvr>
-</p:sld>
-</file>
-
-<file path=ppt/slides/slide9.xml><?xml version="1.0" encoding="utf-8"?>
-<p:sld xmlns:a="http://schemas.openxmlformats.org/drawingml/2006/main" xmlns:r="http://schemas.openxmlformats.org/officeDocument/2006/relationships" xmlns:p="http://schemas.openxmlformats.org/presentationml/2006/main">
-  <p:cSld>
-    <p:spTree>
-      <p:nvGrpSpPr>
-        <p:cNvPr id="1" name=""/>
-        <p:cNvGrpSpPr/>
-        <p:nvPr/>
-      </p:nvGrpSpPr>
-      <p:grpSpPr>
-        <a:xfrm>
-          <a:off x="0" y="0"/>
-          <a:ext cx="0" cy="0"/>
-          <a:chOff x="0" y="0"/>
-          <a:chExt cx="0" cy="0"/>
-        </a:xfrm>
-      </p:grpSpPr>
-      <p:sp>
-        <p:nvSpPr>
-          <p:cNvPr id="5" name="文字方塊 4">
-            <a:extLst>
-              <a:ext uri="{FF2B5EF4-FFF2-40B4-BE49-F238E27FC236}">
-                <a16:creationId xmlns:a16="http://schemas.microsoft.com/office/drawing/2014/main" id="{0B1F6121-1C23-4A07-A66F-19BD3BFDA4C3}"/>
-              </a:ext>
-            </a:extLst>
-          </p:cNvPr>
-          <p:cNvSpPr txBox="1"/>
-          <p:nvPr/>
-        </p:nvSpPr>
-        <p:spPr>
-          <a:xfrm>
-            <a:off x="304800" y="284480"/>
-            <a:ext cx="4425699" cy="400110"/>
-          </a:xfrm>
-          <a:prstGeom prst="rect">
-            <a:avLst/>
-          </a:prstGeom>
-          <a:noFill/>
-        </p:spPr>
-        <p:txBody>
-          <a:bodyPr wrap="none" rtlCol="0">
-            <a:spAutoFit/>
-          </a:bodyPr>
-          <a:lstStyle/>
-          <a:p>
-            <a:r>
-              <a:rPr lang="en-US" altLang="zh-TW" sz="2000" b="1" dirty="0"/>
-              <a:t>Git </a:t>
-            </a:r>
-            <a:r>
-              <a:rPr lang="zh-CN" altLang="en-US" sz="2000" b="1" dirty="0"/>
-              <a:t>修改一次文件到</a:t>
-            </a:r>
-            <a:r>
-              <a:rPr lang="en-US" altLang="zh-CN" sz="2000" b="1" dirty="0"/>
-              <a:t>commit</a:t>
-            </a:r>
-            <a:r>
-              <a:rPr lang="zh-CN" altLang="en-US" sz="2000" b="1" dirty="0"/>
-              <a:t>的圖示過程</a:t>
-            </a:r>
-            <a:endParaRPr lang="zh-TW" altLang="en-US" sz="2000" b="1" dirty="0"/>
-          </a:p>
-        </p:txBody>
-      </p:sp>
-      <p:sp>
-        <p:nvSpPr>
-          <p:cNvPr id="8" name="文字方塊 7">
-            <a:extLst>
-              <a:ext uri="{FF2B5EF4-FFF2-40B4-BE49-F238E27FC236}">
-                <a16:creationId xmlns:a16="http://schemas.microsoft.com/office/drawing/2014/main" id="{49C93D34-C734-4A03-AE9A-C29244EFEBC3}"/>
-              </a:ext>
-            </a:extLst>
-          </p:cNvPr>
-          <p:cNvSpPr txBox="1"/>
-          <p:nvPr/>
-        </p:nvSpPr>
-        <p:spPr>
-          <a:xfrm flipH="1">
-            <a:off x="5055619" y="1266299"/>
-            <a:ext cx="3230882" cy="369332"/>
-          </a:xfrm>
-          <a:prstGeom prst="rect">
-            <a:avLst/>
-          </a:prstGeom>
-          <a:noFill/>
-        </p:spPr>
-        <p:txBody>
-          <a:bodyPr wrap="square" rtlCol="0">
-            <a:spAutoFit/>
-          </a:bodyPr>
-          <a:lstStyle/>
-          <a:p>
-            <a:r>
-              <a:rPr lang="en-US" altLang="zh-CN" dirty="0"/>
-              <a:t>git commit</a:t>
-            </a:r>
-            <a:r>
-              <a:rPr lang="zh-CN" altLang="en-US" dirty="0"/>
-              <a:t>后</a:t>
-            </a:r>
-            <a:endParaRPr lang="zh-TW" altLang="en-US" dirty="0"/>
-          </a:p>
-        </p:txBody>
-      </p:sp>
-      <p:pic>
-        <p:nvPicPr>
-          <p:cNvPr id="3" name="圖片 2">
-            <a:extLst>
-              <a:ext uri="{FF2B5EF4-FFF2-40B4-BE49-F238E27FC236}">
-                <a16:creationId xmlns:a16="http://schemas.microsoft.com/office/drawing/2014/main" id="{CFA75E75-22E7-4864-9F85-98E75F7FF86D}"/>
-              </a:ext>
-            </a:extLst>
-          </p:cNvPr>
-          <p:cNvPicPr>
-            <a:picLocks noChangeAspect="1"/>
-          </p:cNvPicPr>
-          <p:nvPr/>
-        </p:nvPicPr>
-        <p:blipFill>
-          <a:blip r:embed="rId2">
-            <a:extLst>
-              <a:ext uri="{28A0092B-C50C-407E-A947-70E740481C1C}">
-                <a14:useLocalDpi xmlns:a14="http://schemas.microsoft.com/office/drawing/2010/main" val="0"/>
-              </a:ext>
-            </a:extLst>
-          </a:blip>
-          <a:stretch>
-            <a:fillRect/>
-          </a:stretch>
-        </p:blipFill>
-        <p:spPr>
-          <a:xfrm>
-            <a:off x="3332480" y="1798321"/>
-            <a:ext cx="5821680" cy="3424048"/>
-          </a:xfrm>
-          <a:prstGeom prst="rect">
-            <a:avLst/>
-          </a:prstGeom>
-        </p:spPr>
-      </p:pic>
-    </p:spTree>
-    <p:extLst>
-      <p:ext uri="{BB962C8B-B14F-4D97-AF65-F5344CB8AC3E}">
-        <p14:creationId xmlns:p14="http://schemas.microsoft.com/office/powerpoint/2010/main" val="1914980352"/>
       </p:ext>
     </p:extLst>
   </p:cSld>

</xml_diff>

<commit_message>
Add git blame command
</commit_message>
<xml_diff>
--- a/GitStudy/GitStudy.pptx
+++ b/GitStudy/GitStudy.pptx
@@ -9,12 +9,13 @@
     <p:sldId id="258" r:id="rId3"/>
     <p:sldId id="257" r:id="rId4"/>
     <p:sldId id="263" r:id="rId5"/>
-    <p:sldId id="264" r:id="rId6"/>
-    <p:sldId id="265" r:id="rId7"/>
-    <p:sldId id="259" r:id="rId8"/>
-    <p:sldId id="260" r:id="rId9"/>
-    <p:sldId id="261" r:id="rId10"/>
-    <p:sldId id="262" r:id="rId11"/>
+    <p:sldId id="266" r:id="rId6"/>
+    <p:sldId id="264" r:id="rId7"/>
+    <p:sldId id="265" r:id="rId8"/>
+    <p:sldId id="259" r:id="rId9"/>
+    <p:sldId id="260" r:id="rId10"/>
+    <p:sldId id="261" r:id="rId11"/>
+    <p:sldId id="262" r:id="rId12"/>
   </p:sldIdLst>
   <p:sldSz cx="12192000" cy="6858000"/>
   <p:notesSz cx="6858000" cy="9144000"/>
@@ -268,7 +269,7 @@
           <a:p>
             <a:fld id="{B3DC4D43-2745-46E1-A871-6B61F7786A47}" type="datetimeFigureOut">
               <a:rPr lang="zh-TW" altLang="en-US" smtClean="0"/>
-              <a:t>2023/1/14</a:t>
+              <a:t>2023/1/15</a:t>
             </a:fld>
             <a:endParaRPr lang="zh-TW" altLang="en-US"/>
           </a:p>
@@ -466,7 +467,7 @@
           <a:p>
             <a:fld id="{B3DC4D43-2745-46E1-A871-6B61F7786A47}" type="datetimeFigureOut">
               <a:rPr lang="zh-TW" altLang="en-US" smtClean="0"/>
-              <a:t>2023/1/14</a:t>
+              <a:t>2023/1/15</a:t>
             </a:fld>
             <a:endParaRPr lang="zh-TW" altLang="en-US"/>
           </a:p>
@@ -674,7 +675,7 @@
           <a:p>
             <a:fld id="{B3DC4D43-2745-46E1-A871-6B61F7786A47}" type="datetimeFigureOut">
               <a:rPr lang="zh-TW" altLang="en-US" smtClean="0"/>
-              <a:t>2023/1/14</a:t>
+              <a:t>2023/1/15</a:t>
             </a:fld>
             <a:endParaRPr lang="zh-TW" altLang="en-US"/>
           </a:p>
@@ -872,7 +873,7 @@
           <a:p>
             <a:fld id="{B3DC4D43-2745-46E1-A871-6B61F7786A47}" type="datetimeFigureOut">
               <a:rPr lang="zh-TW" altLang="en-US" smtClean="0"/>
-              <a:t>2023/1/14</a:t>
+              <a:t>2023/1/15</a:t>
             </a:fld>
             <a:endParaRPr lang="zh-TW" altLang="en-US"/>
           </a:p>
@@ -1147,7 +1148,7 @@
           <a:p>
             <a:fld id="{B3DC4D43-2745-46E1-A871-6B61F7786A47}" type="datetimeFigureOut">
               <a:rPr lang="zh-TW" altLang="en-US" smtClean="0"/>
-              <a:t>2023/1/14</a:t>
+              <a:t>2023/1/15</a:t>
             </a:fld>
             <a:endParaRPr lang="zh-TW" altLang="en-US"/>
           </a:p>
@@ -1412,7 +1413,7 @@
           <a:p>
             <a:fld id="{B3DC4D43-2745-46E1-A871-6B61F7786A47}" type="datetimeFigureOut">
               <a:rPr lang="zh-TW" altLang="en-US" smtClean="0"/>
-              <a:t>2023/1/14</a:t>
+              <a:t>2023/1/15</a:t>
             </a:fld>
             <a:endParaRPr lang="zh-TW" altLang="en-US"/>
           </a:p>
@@ -1824,7 +1825,7 @@
           <a:p>
             <a:fld id="{B3DC4D43-2745-46E1-A871-6B61F7786A47}" type="datetimeFigureOut">
               <a:rPr lang="zh-TW" altLang="en-US" smtClean="0"/>
-              <a:t>2023/1/14</a:t>
+              <a:t>2023/1/15</a:t>
             </a:fld>
             <a:endParaRPr lang="zh-TW" altLang="en-US"/>
           </a:p>
@@ -1965,7 +1966,7 @@
           <a:p>
             <a:fld id="{B3DC4D43-2745-46E1-A871-6B61F7786A47}" type="datetimeFigureOut">
               <a:rPr lang="zh-TW" altLang="en-US" smtClean="0"/>
-              <a:t>2023/1/14</a:t>
+              <a:t>2023/1/15</a:t>
             </a:fld>
             <a:endParaRPr lang="zh-TW" altLang="en-US"/>
           </a:p>
@@ -2078,7 +2079,7 @@
           <a:p>
             <a:fld id="{B3DC4D43-2745-46E1-A871-6B61F7786A47}" type="datetimeFigureOut">
               <a:rPr lang="zh-TW" altLang="en-US" smtClean="0"/>
-              <a:t>2023/1/14</a:t>
+              <a:t>2023/1/15</a:t>
             </a:fld>
             <a:endParaRPr lang="zh-TW" altLang="en-US"/>
           </a:p>
@@ -2389,7 +2390,7 @@
           <a:p>
             <a:fld id="{B3DC4D43-2745-46E1-A871-6B61F7786A47}" type="datetimeFigureOut">
               <a:rPr lang="zh-TW" altLang="en-US" smtClean="0"/>
-              <a:t>2023/1/14</a:t>
+              <a:t>2023/1/15</a:t>
             </a:fld>
             <a:endParaRPr lang="zh-TW" altLang="en-US"/>
           </a:p>
@@ -2677,7 +2678,7 @@
           <a:p>
             <a:fld id="{B3DC4D43-2745-46E1-A871-6B61F7786A47}" type="datetimeFigureOut">
               <a:rPr lang="zh-TW" altLang="en-US" smtClean="0"/>
-              <a:t>2023/1/14</a:t>
+              <a:t>2023/1/15</a:t>
             </a:fld>
             <a:endParaRPr lang="zh-TW" altLang="en-US"/>
           </a:p>
@@ -2918,7 +2919,7 @@
           <a:p>
             <a:fld id="{B3DC4D43-2745-46E1-A871-6B61F7786A47}" type="datetimeFigureOut">
               <a:rPr lang="zh-TW" altLang="en-US" smtClean="0"/>
-              <a:t>2023/1/14</a:t>
+              <a:t>2023/1/15</a:t>
             </a:fld>
             <a:endParaRPr lang="zh-TW" altLang="en-US"/>
           </a:p>
@@ -3456,6 +3457,206 @@
         </p:nvSpPr>
         <p:spPr>
           <a:xfrm flipH="1">
+            <a:off x="4740659" y="1105803"/>
+            <a:ext cx="3230882" cy="369332"/>
+          </a:xfrm>
+          <a:prstGeom prst="rect">
+            <a:avLst/>
+          </a:prstGeom>
+          <a:noFill/>
+        </p:spPr>
+        <p:txBody>
+          <a:bodyPr wrap="square" rtlCol="0">
+            <a:spAutoFit/>
+          </a:bodyPr>
+          <a:lstStyle/>
+          <a:p>
+            <a:r>
+              <a:rPr lang="en-US" altLang="zh-CN" dirty="0"/>
+              <a:t>git add</a:t>
+            </a:r>
+            <a:r>
+              <a:rPr lang="zh-CN" altLang="en-US" dirty="0"/>
+              <a:t>修改的文件</a:t>
+            </a:r>
+            <a:endParaRPr lang="zh-TW" altLang="en-US" dirty="0"/>
+          </a:p>
+        </p:txBody>
+      </p:sp>
+      <p:sp>
+        <p:nvSpPr>
+          <p:cNvPr id="9" name="箭號: 向下 8">
+            <a:extLst>
+              <a:ext uri="{FF2B5EF4-FFF2-40B4-BE49-F238E27FC236}">
+                <a16:creationId xmlns:a16="http://schemas.microsoft.com/office/drawing/2014/main" id="{2FCCB5B6-35FA-41D1-9A57-23ACAE0006F5}"/>
+              </a:ext>
+            </a:extLst>
+          </p:cNvPr>
+          <p:cNvSpPr/>
+          <p:nvPr/>
+        </p:nvSpPr>
+        <p:spPr>
+          <a:xfrm>
+            <a:off x="5455920" y="5382864"/>
+            <a:ext cx="934720" cy="790545"/>
+          </a:xfrm>
+          <a:prstGeom prst="downArrow">
+            <a:avLst/>
+          </a:prstGeom>
+        </p:spPr>
+        <p:style>
+          <a:lnRef idx="2">
+            <a:schemeClr val="accent1">
+              <a:shade val="50000"/>
+            </a:schemeClr>
+          </a:lnRef>
+          <a:fillRef idx="1">
+            <a:schemeClr val="accent1"/>
+          </a:fillRef>
+          <a:effectRef idx="0">
+            <a:schemeClr val="accent1"/>
+          </a:effectRef>
+          <a:fontRef idx="minor">
+            <a:schemeClr val="lt1"/>
+          </a:fontRef>
+        </p:style>
+        <p:txBody>
+          <a:bodyPr rtlCol="0" anchor="ctr"/>
+          <a:lstStyle/>
+          <a:p>
+            <a:pPr algn="ctr"/>
+            <a:endParaRPr lang="zh-TW" altLang="en-US"/>
+          </a:p>
+        </p:txBody>
+      </p:sp>
+      <p:pic>
+        <p:nvPicPr>
+          <p:cNvPr id="4" name="圖片 3">
+            <a:extLst>
+              <a:ext uri="{FF2B5EF4-FFF2-40B4-BE49-F238E27FC236}">
+                <a16:creationId xmlns:a16="http://schemas.microsoft.com/office/drawing/2014/main" id="{805814F5-6CD6-4CC4-862D-C26DCF98525E}"/>
+              </a:ext>
+            </a:extLst>
+          </p:cNvPr>
+          <p:cNvPicPr>
+            <a:picLocks noChangeAspect="1"/>
+          </p:cNvPicPr>
+          <p:nvPr/>
+        </p:nvPicPr>
+        <p:blipFill>
+          <a:blip r:embed="rId2">
+            <a:extLst>
+              <a:ext uri="{28A0092B-C50C-407E-A947-70E740481C1C}">
+                <a14:useLocalDpi xmlns:a14="http://schemas.microsoft.com/office/drawing/2010/main" val="0"/>
+              </a:ext>
+            </a:extLst>
+          </a:blip>
+          <a:stretch>
+            <a:fillRect/>
+          </a:stretch>
+        </p:blipFill>
+        <p:spPr>
+          <a:xfrm>
+            <a:off x="3883150" y="1733106"/>
+            <a:ext cx="4425699" cy="3391787"/>
+          </a:xfrm>
+          <a:prstGeom prst="rect">
+            <a:avLst/>
+          </a:prstGeom>
+        </p:spPr>
+      </p:pic>
+    </p:spTree>
+    <p:extLst>
+      <p:ext uri="{BB962C8B-B14F-4D97-AF65-F5344CB8AC3E}">
+        <p14:creationId xmlns:p14="http://schemas.microsoft.com/office/powerpoint/2010/main" val="2493712124"/>
+      </p:ext>
+    </p:extLst>
+  </p:cSld>
+  <p:clrMapOvr>
+    <a:masterClrMapping/>
+  </p:clrMapOvr>
+</p:sld>
+</file>
+
+<file path=ppt/slides/slide11.xml><?xml version="1.0" encoding="utf-8"?>
+<p:sld xmlns:a="http://schemas.openxmlformats.org/drawingml/2006/main" xmlns:r="http://schemas.openxmlformats.org/officeDocument/2006/relationships" xmlns:p="http://schemas.openxmlformats.org/presentationml/2006/main">
+  <p:cSld>
+    <p:spTree>
+      <p:nvGrpSpPr>
+        <p:cNvPr id="1" name=""/>
+        <p:cNvGrpSpPr/>
+        <p:nvPr/>
+      </p:nvGrpSpPr>
+      <p:grpSpPr>
+        <a:xfrm>
+          <a:off x="0" y="0"/>
+          <a:ext cx="0" cy="0"/>
+          <a:chOff x="0" y="0"/>
+          <a:chExt cx="0" cy="0"/>
+        </a:xfrm>
+      </p:grpSpPr>
+      <p:sp>
+        <p:nvSpPr>
+          <p:cNvPr id="5" name="文字方塊 4">
+            <a:extLst>
+              <a:ext uri="{FF2B5EF4-FFF2-40B4-BE49-F238E27FC236}">
+                <a16:creationId xmlns:a16="http://schemas.microsoft.com/office/drawing/2014/main" id="{0B1F6121-1C23-4A07-A66F-19BD3BFDA4C3}"/>
+              </a:ext>
+            </a:extLst>
+          </p:cNvPr>
+          <p:cNvSpPr txBox="1"/>
+          <p:nvPr/>
+        </p:nvSpPr>
+        <p:spPr>
+          <a:xfrm>
+            <a:off x="304800" y="284480"/>
+            <a:ext cx="4425699" cy="400110"/>
+          </a:xfrm>
+          <a:prstGeom prst="rect">
+            <a:avLst/>
+          </a:prstGeom>
+          <a:noFill/>
+        </p:spPr>
+        <p:txBody>
+          <a:bodyPr wrap="none" rtlCol="0">
+            <a:spAutoFit/>
+          </a:bodyPr>
+          <a:lstStyle/>
+          <a:p>
+            <a:r>
+              <a:rPr lang="en-US" altLang="zh-TW" sz="2000" b="1" dirty="0"/>
+              <a:t>Git </a:t>
+            </a:r>
+            <a:r>
+              <a:rPr lang="zh-CN" altLang="en-US" sz="2000" b="1" dirty="0"/>
+              <a:t>修改一次文件到</a:t>
+            </a:r>
+            <a:r>
+              <a:rPr lang="en-US" altLang="zh-CN" sz="2000" b="1" dirty="0"/>
+              <a:t>commit</a:t>
+            </a:r>
+            <a:r>
+              <a:rPr lang="zh-CN" altLang="en-US" sz="2000" b="1" dirty="0"/>
+              <a:t>的圖示過程</a:t>
+            </a:r>
+            <a:endParaRPr lang="zh-TW" altLang="en-US" sz="2000" b="1" dirty="0"/>
+          </a:p>
+        </p:txBody>
+      </p:sp>
+      <p:sp>
+        <p:nvSpPr>
+          <p:cNvPr id="8" name="文字方塊 7">
+            <a:extLst>
+              <a:ext uri="{FF2B5EF4-FFF2-40B4-BE49-F238E27FC236}">
+                <a16:creationId xmlns:a16="http://schemas.microsoft.com/office/drawing/2014/main" id="{49C93D34-C734-4A03-AE9A-C29244EFEBC3}"/>
+              </a:ext>
+            </a:extLst>
+          </p:cNvPr>
+          <p:cNvSpPr txBox="1"/>
+          <p:nvPr/>
+        </p:nvSpPr>
+        <p:spPr>
+          <a:xfrm flipH="1">
             <a:off x="5055619" y="1266299"/>
             <a:ext cx="3230882" cy="369332"/>
           </a:xfrm>
@@ -4114,20 +4315,14 @@
       </p:grpSpPr>
       <p:sp>
         <p:nvSpPr>
-          <p:cNvPr id="4" name="文字方塊 3">
-            <a:extLst>
-              <a:ext uri="{FF2B5EF4-FFF2-40B4-BE49-F238E27FC236}">
-                <a16:creationId xmlns:a16="http://schemas.microsoft.com/office/drawing/2014/main" id="{EE42E484-788D-46B8-84C5-818D073B92AE}"/>
-              </a:ext>
-            </a:extLst>
-          </p:cNvPr>
+          <p:cNvPr id="4" name="文本框 3"/>
           <p:cNvSpPr txBox="1"/>
           <p:nvPr/>
         </p:nvSpPr>
         <p:spPr>
           <a:xfrm>
-            <a:off x="365503" y="355600"/>
-            <a:ext cx="3043590" cy="400110"/>
+            <a:off x="290945" y="235527"/>
+            <a:ext cx="7994496" cy="1200329"/>
           </a:xfrm>
           <a:prstGeom prst="rect">
             <a:avLst/>
@@ -4141,115 +4336,23 @@
           <a:lstStyle/>
           <a:p>
             <a:r>
-              <a:rPr lang="en-US" altLang="zh-CN" sz="2000" b="1" dirty="0"/>
-              <a:t>git branch</a:t>
-            </a:r>
-            <a:r>
-              <a:rPr lang="zh-CN" altLang="en-US" sz="2000" b="1" dirty="0"/>
-              <a:t>的命令操作分支</a:t>
-            </a:r>
-            <a:endParaRPr lang="zh-TW" altLang="en-US" sz="2000" b="1" dirty="0"/>
-          </a:p>
-        </p:txBody>
-      </p:sp>
-      <p:sp>
-        <p:nvSpPr>
-          <p:cNvPr id="5" name="文字方塊 4">
-            <a:extLst>
-              <a:ext uri="{FF2B5EF4-FFF2-40B4-BE49-F238E27FC236}">
-                <a16:creationId xmlns:a16="http://schemas.microsoft.com/office/drawing/2014/main" id="{7335B79A-F03E-499E-A7C1-0FE623461237}"/>
-              </a:ext>
-            </a:extLst>
-          </p:cNvPr>
-          <p:cNvSpPr txBox="1"/>
-          <p:nvPr/>
-        </p:nvSpPr>
-        <p:spPr>
-          <a:xfrm>
-            <a:off x="1097280" y="755710"/>
-            <a:ext cx="10383519" cy="5355312"/>
-          </a:xfrm>
-          <a:prstGeom prst="rect">
-            <a:avLst/>
-          </a:prstGeom>
-          <a:noFill/>
-        </p:spPr>
-        <p:txBody>
-          <a:bodyPr wrap="square" rtlCol="0">
-            <a:spAutoFit/>
-          </a:bodyPr>
-          <a:lstStyle/>
-          <a:p>
-            <a:r>
-              <a:rPr lang="en-US" altLang="zh-CN" b="1" dirty="0"/>
-              <a:t>1.</a:t>
-            </a:r>
-            <a:r>
-              <a:rPr lang="zh-CN" altLang="en-US" b="1" dirty="0"/>
-              <a:t>創建分支</a:t>
-            </a:r>
-            <a:endParaRPr lang="en-US" altLang="zh-CN" b="1" dirty="0"/>
-          </a:p>
-          <a:p>
-            <a:r>
-              <a:rPr lang="en-US" altLang="zh-TW" dirty="0"/>
+              <a:rPr lang="en-US" altLang="zh-CN" b="1" dirty="0" err="1"/>
+              <a:t>g</a:t>
+            </a:r>
+            <a:r>
+              <a:rPr lang="en-US" altLang="zh-CN" b="1" dirty="0" err="1" smtClean="0"/>
+              <a:t>it</a:t>
+            </a:r>
+            <a:r>
+              <a:rPr lang="en-US" altLang="zh-CN" b="1" dirty="0" smtClean="0"/>
+              <a:t> commit</a:t>
+            </a:r>
+          </a:p>
+          <a:p>
+            <a:r>
+              <a:rPr lang="en-US" altLang="zh-CN" b="1" dirty="0" smtClean="0"/>
               <a:t>	</a:t>
             </a:r>
-            <a:r>
-              <a:rPr lang="en-US" altLang="zh-CN" dirty="0"/>
-              <a:t>git branch </a:t>
-            </a:r>
-            <a:r>
-              <a:rPr lang="zh-CN" altLang="en-US" dirty="0"/>
-              <a:t>分支名</a:t>
-            </a:r>
-            <a:endParaRPr lang="en-US" altLang="zh-CN" dirty="0"/>
-          </a:p>
-          <a:p>
-            <a:endParaRPr lang="en-US" altLang="zh-TW" b="1" dirty="0"/>
-          </a:p>
-          <a:p>
-            <a:r>
-              <a:rPr lang="zh-CN" altLang="en-US" b="1" dirty="0"/>
-              <a:t> </a:t>
-            </a:r>
-            <a:r>
-              <a:rPr lang="en-US" altLang="zh-CN" b="1" dirty="0"/>
-              <a:t>2.</a:t>
-            </a:r>
-            <a:r>
-              <a:rPr lang="zh-CN" altLang="en-US" b="1" dirty="0"/>
-              <a:t>查詢有哪些分支</a:t>
-            </a:r>
-            <a:endParaRPr lang="en-US" altLang="zh-CN" b="1" dirty="0"/>
-          </a:p>
-          <a:p>
-            <a:r>
-              <a:rPr lang="en-US" altLang="zh-TW" dirty="0"/>
-              <a:t>	</a:t>
-            </a:r>
-            <a:r>
-              <a:rPr lang="en-US" altLang="zh-CN" dirty="0"/>
-              <a:t>git branch</a:t>
-            </a:r>
-          </a:p>
-          <a:p>
-            <a:endParaRPr lang="en-US" altLang="zh-CN" dirty="0"/>
-          </a:p>
-          <a:p>
-            <a:r>
-              <a:rPr lang="en-US" altLang="zh-CN" dirty="0"/>
-              <a:t> </a:t>
-            </a:r>
-            <a:r>
-              <a:rPr lang="en-US" altLang="zh-CN" b="1" dirty="0"/>
-              <a:t>3.</a:t>
-            </a:r>
-            <a:r>
-              <a:rPr lang="zh-CN" altLang="en-US" b="1" dirty="0"/>
-              <a:t>查看分支有貢獻的提交</a:t>
-            </a:r>
-            <a:endParaRPr lang="en-US" altLang="zh-CN" b="1" dirty="0"/>
           </a:p>
           <a:p>
             <a:r>
@@ -4257,116 +4360,60 @@
               <a:t>	</a:t>
             </a:r>
             <a:r>
-              <a:rPr lang="en-US" altLang="zh-CN" dirty="0"/>
-              <a:t>git show-branch</a:t>
-            </a:r>
-          </a:p>
-          <a:p>
-            <a:endParaRPr lang="en-US" altLang="zh-CN" dirty="0"/>
+              <a:rPr lang="en-US" altLang="zh-CN" b="1" dirty="0" smtClean="0"/>
+              <a:t>1. </a:t>
+            </a:r>
+            <a:r>
+              <a:rPr lang="en-US" altLang="zh-CN" b="1" dirty="0" err="1" smtClean="0"/>
+              <a:t>git</a:t>
+            </a:r>
+            <a:r>
+              <a:rPr lang="en-US" altLang="zh-CN" b="1" dirty="0" smtClean="0"/>
+              <a:t> blame –L </a:t>
+            </a:r>
+            <a:r>
+              <a:rPr lang="en-US" altLang="zh-CN" b="1" dirty="0" err="1" smtClean="0"/>
+              <a:t>m,n</a:t>
+            </a:r>
+            <a:r>
+              <a:rPr lang="en-US" altLang="zh-CN" b="1" dirty="0" smtClean="0"/>
+              <a:t> </a:t>
+            </a:r>
+            <a:r>
+              <a:rPr lang="zh-CN" altLang="en-US" b="1" dirty="0" smtClean="0"/>
+              <a:t>文件名</a:t>
+            </a:r>
+            <a:endParaRPr lang="en-US" altLang="zh-CN" b="1" dirty="0" smtClean="0"/>
           </a:p>
           <a:p>
             <a:r>
               <a:rPr lang="en-US" altLang="zh-CN" b="1" dirty="0"/>
-              <a:t>4.</a:t>
-            </a:r>
-            <a:r>
-              <a:rPr lang="zh-CN" altLang="en-US" b="1" dirty="0"/>
-              <a:t>創建並切換到分支</a:t>
+              <a:t>	</a:t>
+            </a:r>
+            <a:r>
+              <a:rPr lang="en-US" altLang="zh-CN" b="1" dirty="0" smtClean="0"/>
+              <a:t>	</a:t>
+            </a:r>
+            <a:r>
+              <a:rPr lang="zh-CN" altLang="en-US" b="1" dirty="0" smtClean="0"/>
+              <a:t>可以看见代码修改的时间和人， </a:t>
+            </a:r>
+            <a:r>
+              <a:rPr lang="en-US" altLang="zh-CN" b="1" dirty="0" err="1" smtClean="0"/>
+              <a:t>m,n</a:t>
+            </a:r>
+            <a:r>
+              <a:rPr lang="zh-CN" altLang="en-US" b="1" smtClean="0"/>
+              <a:t>代表从第几行到第几行</a:t>
             </a:r>
             <a:endParaRPr lang="en-US" altLang="zh-CN" b="1" dirty="0"/>
-          </a:p>
-          <a:p>
-            <a:r>
-              <a:rPr lang="en-US" altLang="zh-CN" dirty="0"/>
-              <a:t>	git checkout –b </a:t>
-            </a:r>
-            <a:r>
-              <a:rPr lang="zh-CN" altLang="en-US" dirty="0"/>
-              <a:t>分支名</a:t>
-            </a:r>
-            <a:endParaRPr lang="en-US" altLang="zh-CN" dirty="0"/>
-          </a:p>
-          <a:p>
-            <a:endParaRPr lang="en-US" altLang="zh-CN" dirty="0"/>
-          </a:p>
-          <a:p>
-            <a:r>
-              <a:rPr lang="en-US" altLang="zh-CN" b="1" dirty="0"/>
-              <a:t>5. </a:t>
-            </a:r>
-            <a:r>
-              <a:rPr lang="zh-CN" altLang="en-US" b="1" dirty="0"/>
-              <a:t>切換分支</a:t>
-            </a:r>
-            <a:endParaRPr lang="en-US" altLang="zh-CN" b="1" dirty="0"/>
-          </a:p>
-          <a:p>
-            <a:r>
-              <a:rPr lang="en-US" altLang="zh-CN" dirty="0"/>
-              <a:t>	git checkout </a:t>
-            </a:r>
-            <a:r>
-              <a:rPr lang="zh-CN" altLang="en-US" dirty="0"/>
-              <a:t>分支名</a:t>
-            </a:r>
-            <a:r>
-              <a:rPr lang="en-US" altLang="zh-CN" dirty="0"/>
-              <a:t>, </a:t>
-            </a:r>
-            <a:r>
-              <a:rPr lang="zh-CN" altLang="en-US" dirty="0"/>
-              <a:t>如果内容不冲突會把修改也帶到切換分支</a:t>
-            </a:r>
-            <a:endParaRPr lang="en-US" altLang="zh-CN" dirty="0"/>
-          </a:p>
-          <a:p>
-            <a:endParaRPr lang="en-US" altLang="zh-CN" dirty="0"/>
-          </a:p>
-          <a:p>
-            <a:r>
-              <a:rPr lang="en-US" altLang="zh-CN" b="1" dirty="0"/>
-              <a:t>6. </a:t>
-            </a:r>
-            <a:r>
-              <a:rPr lang="zh-CN" altLang="en-US" b="1" dirty="0"/>
-              <a:t>查看另外一個分支文件的内容</a:t>
-            </a:r>
-            <a:endParaRPr lang="en-US" altLang="zh-CN" b="1" dirty="0"/>
-          </a:p>
-          <a:p>
-            <a:r>
-              <a:rPr lang="en-US" altLang="zh-CN" dirty="0"/>
-              <a:t>	git show </a:t>
-            </a:r>
-            <a:r>
-              <a:rPr lang="zh-CN" altLang="en-US" dirty="0"/>
-              <a:t>分支名</a:t>
-            </a:r>
-            <a:r>
-              <a:rPr lang="en-US" altLang="zh-CN" dirty="0"/>
-              <a:t>:</a:t>
-            </a:r>
-            <a:r>
-              <a:rPr lang="zh-CN" altLang="en-US" dirty="0"/>
-              <a:t>文件名</a:t>
-            </a:r>
-            <a:endParaRPr lang="en-US" altLang="zh-CN" dirty="0"/>
-          </a:p>
-          <a:p>
-            <a:endParaRPr lang="en-US" altLang="zh-CN" dirty="0"/>
-          </a:p>
-          <a:p>
-            <a:r>
-              <a:rPr lang="en-US" altLang="zh-CN" dirty="0"/>
-              <a:t>	</a:t>
-            </a:r>
           </a:p>
         </p:txBody>
       </p:sp>
     </p:spTree>
     <p:extLst>
       <p:ext uri="{BB962C8B-B14F-4D97-AF65-F5344CB8AC3E}">
-        <p14:creationId xmlns:p14="http://schemas.microsoft.com/office/powerpoint/2010/main" val="410421558"/>
+        <p14:creationId xmlns:p14="http://schemas.microsoft.com/office/powerpoint/2010/main" val="391565664"/>
       </p:ext>
     </p:extLst>
   </p:cSld>
@@ -4448,7 +4495,7 @@
         <p:spPr>
           <a:xfrm>
             <a:off x="1097280" y="755710"/>
-            <a:ext cx="10383519" cy="369332"/>
+            <a:ext cx="10383519" cy="5909310"/>
           </a:xfrm>
           <a:prstGeom prst="rect">
             <a:avLst/>
@@ -4462,253 +4509,229 @@
           <a:lstStyle/>
           <a:p>
             <a:r>
+              <a:rPr lang="en-US" altLang="zh-CN" b="1" dirty="0"/>
+              <a:t>1.</a:t>
+            </a:r>
+            <a:r>
+              <a:rPr lang="zh-CN" altLang="en-US" b="1" dirty="0"/>
+              <a:t>創建分支</a:t>
+            </a:r>
+            <a:endParaRPr lang="en-US" altLang="zh-CN" b="1" dirty="0"/>
+          </a:p>
+          <a:p>
+            <a:r>
+              <a:rPr lang="en-US" altLang="zh-TW" dirty="0"/>
+              <a:t>	</a:t>
+            </a:r>
+            <a:r>
+              <a:rPr lang="en-US" altLang="zh-CN" dirty="0"/>
+              <a:t>git branch </a:t>
+            </a:r>
+            <a:r>
+              <a:rPr lang="zh-CN" altLang="en-US" dirty="0"/>
+              <a:t>分支名</a:t>
+            </a:r>
+            <a:endParaRPr lang="en-US" altLang="zh-CN" dirty="0"/>
+          </a:p>
+          <a:p>
+            <a:endParaRPr lang="en-US" altLang="zh-TW" b="1" dirty="0"/>
+          </a:p>
+          <a:p>
+            <a:r>
+              <a:rPr lang="zh-CN" altLang="en-US" b="1" dirty="0"/>
+              <a:t> </a:t>
+            </a:r>
+            <a:r>
+              <a:rPr lang="en-US" altLang="zh-CN" b="1" dirty="0"/>
+              <a:t>2.</a:t>
+            </a:r>
+            <a:r>
+              <a:rPr lang="zh-CN" altLang="en-US" b="1" dirty="0"/>
+              <a:t>查詢有哪些分支</a:t>
+            </a:r>
+            <a:endParaRPr lang="en-US" altLang="zh-CN" b="1" dirty="0"/>
+          </a:p>
+          <a:p>
+            <a:r>
+              <a:rPr lang="en-US" altLang="zh-TW" dirty="0"/>
+              <a:t>	</a:t>
+            </a:r>
+            <a:r>
+              <a:rPr lang="en-US" altLang="zh-CN" dirty="0"/>
+              <a:t>git branch</a:t>
+            </a:r>
+          </a:p>
+          <a:p>
+            <a:endParaRPr lang="en-US" altLang="zh-CN" dirty="0"/>
+          </a:p>
+          <a:p>
+            <a:r>
+              <a:rPr lang="en-US" altLang="zh-CN" dirty="0"/>
+              <a:t> </a:t>
+            </a:r>
+            <a:r>
+              <a:rPr lang="en-US" altLang="zh-CN" b="1" dirty="0"/>
+              <a:t>3.</a:t>
+            </a:r>
+            <a:r>
+              <a:rPr lang="zh-CN" altLang="en-US" b="1" dirty="0"/>
+              <a:t>查看分支有貢獻的提交</a:t>
+            </a:r>
+            <a:endParaRPr lang="en-US" altLang="zh-CN" b="1" dirty="0"/>
+          </a:p>
+          <a:p>
+            <a:r>
+              <a:rPr lang="en-US" altLang="zh-CN" b="1" dirty="0"/>
+              <a:t>	</a:t>
+            </a:r>
+            <a:r>
+              <a:rPr lang="en-US" altLang="zh-CN" dirty="0"/>
+              <a:t>git show-branch</a:t>
+            </a:r>
+          </a:p>
+          <a:p>
+            <a:endParaRPr lang="en-US" altLang="zh-CN" dirty="0"/>
+          </a:p>
+          <a:p>
+            <a:r>
+              <a:rPr lang="en-US" altLang="zh-CN" b="1" dirty="0"/>
+              <a:t>4.</a:t>
+            </a:r>
+            <a:r>
+              <a:rPr lang="zh-CN" altLang="en-US" b="1" dirty="0"/>
+              <a:t>創建並切換到分支</a:t>
+            </a:r>
+            <a:endParaRPr lang="en-US" altLang="zh-CN" b="1" dirty="0"/>
+          </a:p>
+          <a:p>
+            <a:r>
+              <a:rPr lang="en-US" altLang="zh-CN" dirty="0"/>
+              <a:t>	git checkout –b </a:t>
+            </a:r>
+            <a:r>
+              <a:rPr lang="zh-CN" altLang="en-US" dirty="0"/>
+              <a:t>分支名</a:t>
+            </a:r>
+            <a:endParaRPr lang="en-US" altLang="zh-CN" dirty="0"/>
+          </a:p>
+          <a:p>
+            <a:endParaRPr lang="en-US" altLang="zh-CN" dirty="0"/>
+          </a:p>
+          <a:p>
+            <a:r>
+              <a:rPr lang="en-US" altLang="zh-CN" b="1" dirty="0"/>
+              <a:t>5. </a:t>
+            </a:r>
+            <a:r>
+              <a:rPr lang="zh-CN" altLang="en-US" b="1" dirty="0"/>
+              <a:t>切換分支</a:t>
+            </a:r>
+            <a:endParaRPr lang="en-US" altLang="zh-CN" b="1" dirty="0"/>
+          </a:p>
+          <a:p>
+            <a:r>
+              <a:rPr lang="en-US" altLang="zh-CN" dirty="0"/>
+              <a:t>	git checkout </a:t>
+            </a:r>
+            <a:r>
+              <a:rPr lang="zh-CN" altLang="en-US" dirty="0"/>
+              <a:t>分支名</a:t>
+            </a:r>
+            <a:r>
+              <a:rPr lang="en-US" altLang="zh-CN" dirty="0"/>
+              <a:t>, </a:t>
+            </a:r>
+            <a:r>
+              <a:rPr lang="zh-CN" altLang="en-US" dirty="0"/>
+              <a:t>如果内容不冲突會把修改也帶到切換分支</a:t>
+            </a:r>
+            <a:endParaRPr lang="en-US" altLang="zh-CN" dirty="0"/>
+          </a:p>
+          <a:p>
+            <a:endParaRPr lang="en-US" altLang="zh-CN" dirty="0"/>
+          </a:p>
+          <a:p>
+            <a:r>
+              <a:rPr lang="en-US" altLang="zh-CN" b="1" dirty="0"/>
+              <a:t>6. </a:t>
+            </a:r>
+            <a:r>
+              <a:rPr lang="zh-CN" altLang="en-US" b="1" dirty="0"/>
+              <a:t>查看另外一個分支文件的内容</a:t>
+            </a:r>
+            <a:endParaRPr lang="en-US" altLang="zh-CN" b="1" dirty="0"/>
+          </a:p>
+          <a:p>
+            <a:r>
+              <a:rPr lang="en-US" altLang="zh-CN" dirty="0"/>
+              <a:t>	git show </a:t>
+            </a:r>
+            <a:r>
+              <a:rPr lang="zh-CN" altLang="en-US" dirty="0"/>
+              <a:t>分支名</a:t>
+            </a:r>
+            <a:r>
+              <a:rPr lang="en-US" altLang="zh-CN" dirty="0"/>
+              <a:t>:</a:t>
+            </a:r>
+            <a:r>
+              <a:rPr lang="zh-CN" altLang="en-US" dirty="0"/>
+              <a:t>文件名</a:t>
+            </a:r>
+            <a:endParaRPr lang="en-US" altLang="zh-CN" dirty="0"/>
+          </a:p>
+          <a:p>
+            <a:endParaRPr lang="en-US" altLang="zh-CN" dirty="0"/>
+          </a:p>
+          <a:p>
+            <a:r>
+              <a:rPr lang="en-US" altLang="zh-CN" b="1" dirty="0" smtClean="0"/>
+              <a:t>7. </a:t>
+            </a:r>
+            <a:r>
+              <a:rPr lang="zh-CN" altLang="en-US" b="1" dirty="0" smtClean="0"/>
+              <a:t>查看远程分支和所有分支信息</a:t>
+            </a:r>
+            <a:endParaRPr lang="en-US" altLang="zh-CN" b="1" dirty="0" smtClean="0"/>
+          </a:p>
+          <a:p>
+            <a:r>
               <a:rPr lang="en-US" altLang="zh-CN" dirty="0"/>
               <a:t>	</a:t>
             </a:r>
-          </a:p>
-        </p:txBody>
-      </p:sp>
-      <p:sp>
-        <p:nvSpPr>
-          <p:cNvPr id="2" name="文字方塊 1">
-            <a:extLst>
-              <a:ext uri="{FF2B5EF4-FFF2-40B4-BE49-F238E27FC236}">
-                <a16:creationId xmlns:a16="http://schemas.microsoft.com/office/drawing/2014/main" id="{705A9098-1D08-426B-9670-C472F103B3ED}"/>
-              </a:ext>
-            </a:extLst>
-          </p:cNvPr>
-          <p:cNvSpPr txBox="1"/>
-          <p:nvPr/>
-        </p:nvSpPr>
-        <p:spPr>
-          <a:xfrm>
-            <a:off x="995680" y="1125042"/>
-            <a:ext cx="5618480" cy="2031325"/>
-          </a:xfrm>
-          <a:prstGeom prst="rect">
-            <a:avLst/>
-          </a:prstGeom>
-          <a:noFill/>
-        </p:spPr>
-        <p:txBody>
-          <a:bodyPr wrap="square" rtlCol="0">
-            <a:spAutoFit/>
-          </a:bodyPr>
-          <a:lstStyle/>
+            <a:r>
+              <a:rPr lang="en-US" altLang="zh-CN" dirty="0" err="1" smtClean="0"/>
+              <a:t>git</a:t>
+            </a:r>
+            <a:r>
+              <a:rPr lang="en-US" altLang="zh-CN" dirty="0" smtClean="0"/>
+              <a:t> branch –r</a:t>
+            </a:r>
+          </a:p>
           <a:p>
             <a:r>
               <a:rPr lang="en-US" altLang="zh-CN" dirty="0"/>
-              <a:t>7. </a:t>
-            </a:r>
-            <a:r>
-              <a:rPr lang="zh-CN" altLang="en-US" dirty="0"/>
-              <a:t>展示</a:t>
+              <a:t>	</a:t>
+            </a:r>
+            <a:r>
+              <a:rPr lang="en-US" altLang="zh-CN" dirty="0" err="1" smtClean="0"/>
+              <a:t>git</a:t>
+            </a:r>
+            <a:r>
+              <a:rPr lang="en-US" altLang="zh-CN" dirty="0" smtClean="0"/>
+              <a:t> branch –r -a</a:t>
             </a:r>
             <a:r>
               <a:rPr lang="en-US" altLang="zh-CN" dirty="0"/>
-              <a:t>Branch</a:t>
-            </a:r>
-          </a:p>
-          <a:p>
-            <a:r>
-              <a:rPr lang="en-US" altLang="zh-TW" dirty="0"/>
-              <a:t>	git show-branch</a:t>
-            </a:r>
-          </a:p>
-          <a:p>
-            <a:r>
-              <a:rPr lang="en-US" altLang="zh-TW" dirty="0"/>
-              <a:t>	--</a:t>
-            </a:r>
-            <a:r>
-              <a:rPr lang="zh-CN" altLang="en-US" dirty="0"/>
-              <a:t>符號以上代表</a:t>
-            </a:r>
-            <a:r>
-              <a:rPr lang="en-US" altLang="zh-CN" dirty="0"/>
-              <a:t>branch</a:t>
-            </a:r>
-          </a:p>
-          <a:p>
-            <a:r>
-              <a:rPr lang="en-US" altLang="zh-TW" dirty="0"/>
               <a:t>	</a:t>
             </a:r>
-            <a:r>
-              <a:rPr lang="en-US" altLang="zh-CN" dirty="0"/>
-              <a:t>--</a:t>
-            </a:r>
-            <a:r>
-              <a:rPr lang="zh-CN" altLang="en-US" dirty="0"/>
-              <a:t>符號以下代表提交的</a:t>
-            </a:r>
-            <a:r>
-              <a:rPr lang="en-US" altLang="zh-CN" dirty="0"/>
-              <a:t>log</a:t>
-            </a:r>
-            <a:r>
-              <a:rPr lang="zh-CN" altLang="en-US" dirty="0"/>
-              <a:t>信息</a:t>
-            </a:r>
-            <a:endParaRPr lang="en-US" altLang="zh-TW" dirty="0"/>
-          </a:p>
-          <a:p>
-            <a:r>
-              <a:rPr lang="en-US" altLang="zh-TW" dirty="0"/>
-              <a:t>	</a:t>
-            </a:r>
-            <a:r>
-              <a:rPr lang="en-US" altLang="zh-CN" dirty="0"/>
-              <a:t>+ </a:t>
-            </a:r>
-            <a:r>
-              <a:rPr lang="zh-CN" altLang="en-US" dirty="0"/>
-              <a:t>代表提交在哪一個分支當中</a:t>
-            </a:r>
-            <a:endParaRPr lang="en-US" altLang="zh-CN" dirty="0"/>
-          </a:p>
-          <a:p>
-            <a:r>
-              <a:rPr lang="en-US" altLang="zh-TW" dirty="0"/>
-              <a:t>                  </a:t>
-            </a:r>
-            <a:r>
-              <a:rPr lang="en-US" altLang="zh-CN" dirty="0"/>
-              <a:t>- </a:t>
-            </a:r>
-            <a:r>
-              <a:rPr lang="zh-CN" altLang="en-US" dirty="0"/>
-              <a:t>代表合并提交</a:t>
-            </a:r>
-            <a:endParaRPr lang="en-US" altLang="zh-CN" dirty="0"/>
-          </a:p>
-          <a:p>
-            <a:r>
-              <a:rPr lang="en-US" altLang="zh-TW" dirty="0"/>
-              <a:t>                 </a:t>
-            </a:r>
-            <a:r>
-              <a:rPr lang="zh-CN" altLang="en-US" dirty="0"/>
-              <a:t>* 代表存在于活動分支的提交</a:t>
-            </a:r>
-            <a:endParaRPr lang="zh-TW" altLang="en-US" dirty="0"/>
-          </a:p>
-        </p:txBody>
-      </p:sp>
-      <p:pic>
-        <p:nvPicPr>
-          <p:cNvPr id="8" name="圖片 7">
-            <a:extLst>
-              <a:ext uri="{FF2B5EF4-FFF2-40B4-BE49-F238E27FC236}">
-                <a16:creationId xmlns:a16="http://schemas.microsoft.com/office/drawing/2014/main" id="{E25375C7-CDC0-469F-B0A3-AB1EA038A7A6}"/>
-              </a:ext>
-            </a:extLst>
-          </p:cNvPr>
-          <p:cNvPicPr>
-            <a:picLocks noChangeAspect="1"/>
-          </p:cNvPicPr>
-          <p:nvPr/>
-        </p:nvPicPr>
-        <p:blipFill>
-          <a:blip r:embed="rId2">
-            <a:extLst>
-              <a:ext uri="{28A0092B-C50C-407E-A947-70E740481C1C}">
-                <a14:useLocalDpi xmlns:a14="http://schemas.microsoft.com/office/drawing/2010/main" val="0"/>
-              </a:ext>
-            </a:extLst>
-          </a:blip>
-          <a:stretch>
-            <a:fillRect/>
-          </a:stretch>
-        </p:blipFill>
-        <p:spPr>
-          <a:xfrm>
-            <a:off x="1562042" y="3259420"/>
-            <a:ext cx="5052117" cy="2247299"/>
-          </a:xfrm>
-          <a:prstGeom prst="rect">
-            <a:avLst/>
-          </a:prstGeom>
-        </p:spPr>
-      </p:pic>
-      <p:sp>
-        <p:nvSpPr>
-          <p:cNvPr id="9" name="文字方塊 8">
-            <a:extLst>
-              <a:ext uri="{FF2B5EF4-FFF2-40B4-BE49-F238E27FC236}">
-                <a16:creationId xmlns:a16="http://schemas.microsoft.com/office/drawing/2014/main" id="{5FAB5A54-BBE1-4721-A93D-ABA7C212CCBE}"/>
-              </a:ext>
-            </a:extLst>
-          </p:cNvPr>
-          <p:cNvSpPr txBox="1"/>
-          <p:nvPr/>
-        </p:nvSpPr>
-        <p:spPr>
-          <a:xfrm>
-            <a:off x="6868160" y="3244334"/>
-            <a:ext cx="4876800" cy="1200329"/>
-          </a:xfrm>
-          <a:prstGeom prst="rect">
-            <a:avLst/>
-          </a:prstGeom>
-          <a:noFill/>
-        </p:spPr>
-        <p:txBody>
-          <a:bodyPr wrap="square" rtlCol="0">
-            <a:spAutoFit/>
-          </a:bodyPr>
-          <a:lstStyle/>
-          <a:p>
-            <a:r>
-              <a:rPr lang="zh-CN" altLang="en-US" dirty="0"/>
-              <a:t>紅色對應紅色</a:t>
-            </a:r>
-            <a:r>
-              <a:rPr lang="en-US" altLang="zh-CN" dirty="0"/>
-              <a:t>, </a:t>
-            </a:r>
-            <a:r>
-              <a:rPr lang="zh-CN" altLang="en-US" dirty="0"/>
-              <a:t>綠色對應綠色</a:t>
-            </a:r>
-            <a:endParaRPr lang="en-US" altLang="zh-CN" dirty="0"/>
-          </a:p>
-          <a:p>
-            <a:endParaRPr lang="en-US" altLang="zh-TW" dirty="0"/>
-          </a:p>
-          <a:p>
-            <a:r>
-              <a:rPr lang="zh-CN" altLang="en-US" dirty="0"/>
-              <a:t>一般這條命令只有顯示到共同擁有的版本庫當中</a:t>
-            </a:r>
-            <a:r>
-              <a:rPr lang="en-US" altLang="zh-CN" dirty="0"/>
-              <a:t>, </a:t>
-            </a:r>
-            <a:r>
-              <a:rPr lang="zh-CN" altLang="en-US" dirty="0"/>
-              <a:t>如果顯示更多加上</a:t>
-            </a:r>
-            <a:r>
-              <a:rPr lang="en-US" altLang="zh-CN" dirty="0"/>
-              <a:t>”--more=</a:t>
-            </a:r>
-            <a:r>
-              <a:rPr lang="zh-CN" altLang="en-US"/>
-              <a:t>數量</a:t>
-            </a:r>
-            <a:r>
-              <a:rPr lang="en-US" altLang="zh-CN"/>
-              <a:t>“</a:t>
-            </a:r>
-            <a:endParaRPr lang="zh-TW" altLang="en-US" dirty="0"/>
           </a:p>
         </p:txBody>
       </p:sp>
     </p:spTree>
     <p:extLst>
       <p:ext uri="{BB962C8B-B14F-4D97-AF65-F5344CB8AC3E}">
-        <p14:creationId xmlns:p14="http://schemas.microsoft.com/office/powerpoint/2010/main" val="2151625063"/>
+        <p14:creationId xmlns:p14="http://schemas.microsoft.com/office/powerpoint/2010/main" val="410421558"/>
       </p:ext>
     </p:extLst>
   </p:cSld>
@@ -4737,10 +4760,10 @@
       </p:grpSpPr>
       <p:sp>
         <p:nvSpPr>
-          <p:cNvPr id="5" name="文字方塊 4">
-            <a:extLst>
-              <a:ext uri="{FF2B5EF4-FFF2-40B4-BE49-F238E27FC236}">
-                <a16:creationId xmlns:a16="http://schemas.microsoft.com/office/drawing/2014/main" id="{0B1F6121-1C23-4A07-A66F-19BD3BFDA4C3}"/>
+          <p:cNvPr id="4" name="文字方塊 3">
+            <a:extLst>
+              <a:ext uri="{FF2B5EF4-FFF2-40B4-BE49-F238E27FC236}">
+                <a16:creationId xmlns:a16="http://schemas.microsoft.com/office/drawing/2014/main" id="{EE42E484-788D-46B8-84C5-818D073B92AE}"/>
               </a:ext>
             </a:extLst>
           </p:cNvPr>
@@ -4749,8 +4772,8 @@
         </p:nvSpPr>
         <p:spPr>
           <a:xfrm>
-            <a:off x="304800" y="284480"/>
-            <a:ext cx="4425699" cy="400110"/>
+            <a:off x="365503" y="355600"/>
+            <a:ext cx="3043590" cy="400110"/>
           </a:xfrm>
           <a:prstGeom prst="rect">
             <a:avLst/>
@@ -4764,31 +4787,220 @@
           <a:lstStyle/>
           <a:p>
             <a:r>
-              <a:rPr lang="en-US" altLang="zh-TW" sz="2000" b="1" dirty="0"/>
-              <a:t>Git </a:t>
+              <a:rPr lang="en-US" altLang="zh-CN" sz="2000" b="1" dirty="0"/>
+              <a:t>git branch</a:t>
             </a:r>
             <a:r>
               <a:rPr lang="zh-CN" altLang="en-US" sz="2000" b="1" dirty="0"/>
-              <a:t>修改一次文件到</a:t>
-            </a:r>
-            <a:r>
-              <a:rPr lang="en-US" altLang="zh-CN" sz="2000" b="1" dirty="0"/>
-              <a:t>commit</a:t>
-            </a:r>
-            <a:r>
-              <a:rPr lang="zh-CN" altLang="en-US" sz="2000" b="1" dirty="0"/>
-              <a:t>的圖示過程</a:t>
+              <a:t>的命令操作分支</a:t>
             </a:r>
             <a:endParaRPr lang="zh-TW" altLang="en-US" sz="2000" b="1" dirty="0"/>
+          </a:p>
+        </p:txBody>
+      </p:sp>
+      <p:sp>
+        <p:nvSpPr>
+          <p:cNvPr id="5" name="文字方塊 4">
+            <a:extLst>
+              <a:ext uri="{FF2B5EF4-FFF2-40B4-BE49-F238E27FC236}">
+                <a16:creationId xmlns:a16="http://schemas.microsoft.com/office/drawing/2014/main" id="{7335B79A-F03E-499E-A7C1-0FE623461237}"/>
+              </a:ext>
+            </a:extLst>
+          </p:cNvPr>
+          <p:cNvSpPr txBox="1"/>
+          <p:nvPr/>
+        </p:nvSpPr>
+        <p:spPr>
+          <a:xfrm>
+            <a:off x="1097280" y="755710"/>
+            <a:ext cx="10383519" cy="369332"/>
+          </a:xfrm>
+          <a:prstGeom prst="rect">
+            <a:avLst/>
+          </a:prstGeom>
+          <a:noFill/>
+        </p:spPr>
+        <p:txBody>
+          <a:bodyPr wrap="square" rtlCol="0">
+            <a:spAutoFit/>
+          </a:bodyPr>
+          <a:lstStyle/>
+          <a:p>
+            <a:r>
+              <a:rPr lang="en-US" altLang="zh-CN" dirty="0"/>
+              <a:t>	</a:t>
+            </a:r>
+          </a:p>
+        </p:txBody>
+      </p:sp>
+      <p:sp>
+        <p:nvSpPr>
+          <p:cNvPr id="2" name="文字方塊 1">
+            <a:extLst>
+              <a:ext uri="{FF2B5EF4-FFF2-40B4-BE49-F238E27FC236}">
+                <a16:creationId xmlns:a16="http://schemas.microsoft.com/office/drawing/2014/main" id="{705A9098-1D08-426B-9670-C472F103B3ED}"/>
+              </a:ext>
+            </a:extLst>
+          </p:cNvPr>
+          <p:cNvSpPr txBox="1"/>
+          <p:nvPr/>
+        </p:nvSpPr>
+        <p:spPr>
+          <a:xfrm>
+            <a:off x="995680" y="1125042"/>
+            <a:ext cx="5618480" cy="2308324"/>
+          </a:xfrm>
+          <a:prstGeom prst="rect">
+            <a:avLst/>
+          </a:prstGeom>
+          <a:noFill/>
+        </p:spPr>
+        <p:txBody>
+          <a:bodyPr wrap="square" rtlCol="0">
+            <a:spAutoFit/>
+          </a:bodyPr>
+          <a:lstStyle/>
+          <a:p>
+            <a:r>
+              <a:rPr lang="en-US" altLang="zh-CN" dirty="0"/>
+              <a:t>8</a:t>
+            </a:r>
+            <a:r>
+              <a:rPr lang="en-US" altLang="zh-CN" dirty="0" smtClean="0"/>
+              <a:t>. </a:t>
+            </a:r>
+            <a:r>
+              <a:rPr lang="zh-CN" altLang="en-US" dirty="0"/>
+              <a:t>展示</a:t>
+            </a:r>
+            <a:r>
+              <a:rPr lang="en-US" altLang="zh-CN" dirty="0"/>
+              <a:t>Branch</a:t>
+            </a:r>
+          </a:p>
+          <a:p>
+            <a:r>
+              <a:rPr lang="en-US" altLang="zh-TW" dirty="0"/>
+              <a:t>	</a:t>
+            </a:r>
+            <a:r>
+              <a:rPr lang="en-US" altLang="zh-TW" dirty="0" err="1"/>
+              <a:t>git</a:t>
+            </a:r>
+            <a:r>
+              <a:rPr lang="en-US" altLang="zh-TW" dirty="0"/>
+              <a:t> </a:t>
+            </a:r>
+            <a:r>
+              <a:rPr lang="en-US" altLang="zh-TW" dirty="0" smtClean="0"/>
+              <a:t>show-branch</a:t>
+            </a:r>
+          </a:p>
+          <a:p>
+            <a:r>
+              <a:rPr lang="en-US" altLang="zh-TW" dirty="0"/>
+              <a:t>	</a:t>
+            </a:r>
+            <a:r>
+              <a:rPr lang="en-US" altLang="zh-CN" dirty="0" err="1" smtClean="0"/>
+              <a:t>git</a:t>
+            </a:r>
+            <a:r>
+              <a:rPr lang="en-US" altLang="zh-CN" dirty="0" smtClean="0"/>
+              <a:t> show-branch –more=</a:t>
+            </a:r>
+            <a:r>
+              <a:rPr lang="zh-CN" altLang="en-US" dirty="0" smtClean="0"/>
+              <a:t>数量</a:t>
+            </a:r>
+            <a:endParaRPr lang="en-US" altLang="zh-TW" dirty="0"/>
+          </a:p>
+          <a:p>
+            <a:r>
+              <a:rPr lang="en-US" altLang="zh-TW" dirty="0"/>
+              <a:t>	--</a:t>
+            </a:r>
+            <a:r>
+              <a:rPr lang="zh-CN" altLang="en-US" dirty="0"/>
+              <a:t>符號以上代表</a:t>
+            </a:r>
+            <a:r>
+              <a:rPr lang="en-US" altLang="zh-CN" dirty="0"/>
+              <a:t>branch</a:t>
+            </a:r>
+          </a:p>
+          <a:p>
+            <a:r>
+              <a:rPr lang="en-US" altLang="zh-TW" dirty="0"/>
+              <a:t>	</a:t>
+            </a:r>
+            <a:r>
+              <a:rPr lang="en-US" altLang="zh-CN" dirty="0"/>
+              <a:t>--</a:t>
+            </a:r>
+            <a:r>
+              <a:rPr lang="zh-CN" altLang="en-US" dirty="0"/>
+              <a:t>符號以下代表提交的</a:t>
+            </a:r>
+            <a:r>
+              <a:rPr lang="en-US" altLang="zh-CN" dirty="0"/>
+              <a:t>log</a:t>
+            </a:r>
+            <a:r>
+              <a:rPr lang="zh-CN" altLang="en-US" dirty="0"/>
+              <a:t>信息</a:t>
+            </a:r>
+            <a:endParaRPr lang="en-US" altLang="zh-TW" dirty="0"/>
+          </a:p>
+          <a:p>
+            <a:r>
+              <a:rPr lang="en-US" altLang="zh-TW" dirty="0"/>
+              <a:t>	</a:t>
+            </a:r>
+            <a:r>
+              <a:rPr lang="en-US" altLang="zh-CN" dirty="0"/>
+              <a:t>+ </a:t>
+            </a:r>
+            <a:r>
+              <a:rPr lang="zh-CN" altLang="en-US" dirty="0"/>
+              <a:t>代表提交在哪一個分支當中</a:t>
+            </a:r>
+            <a:endParaRPr lang="en-US" altLang="zh-CN" dirty="0"/>
+          </a:p>
+          <a:p>
+            <a:r>
+              <a:rPr lang="en-US" altLang="zh-TW" dirty="0"/>
+              <a:t>                  </a:t>
+            </a:r>
+            <a:r>
+              <a:rPr lang="en-US" altLang="zh-CN" dirty="0"/>
+              <a:t>- </a:t>
+            </a:r>
+            <a:r>
+              <a:rPr lang="zh-CN" altLang="en-US" dirty="0"/>
+              <a:t>代表合并提交</a:t>
+            </a:r>
+            <a:endParaRPr lang="en-US" altLang="zh-CN" dirty="0"/>
+          </a:p>
+          <a:p>
+            <a:r>
+              <a:rPr lang="en-US" altLang="zh-TW" dirty="0"/>
+              <a:t>                 </a:t>
+            </a:r>
+            <a:r>
+              <a:rPr lang="zh-CN" altLang="en-US" dirty="0"/>
+              <a:t>* 代表存在于活動分支的提交</a:t>
+            </a:r>
+            <a:endParaRPr lang="zh-TW" altLang="en-US" dirty="0"/>
           </a:p>
         </p:txBody>
       </p:sp>
       <p:pic>
         <p:nvPicPr>
-          <p:cNvPr id="7" name="圖片 6">
-            <a:extLst>
-              <a:ext uri="{FF2B5EF4-FFF2-40B4-BE49-F238E27FC236}">
-                <a16:creationId xmlns:a16="http://schemas.microsoft.com/office/drawing/2014/main" id="{21F441B3-C6D6-46FD-B8E7-6B83AE9E5AC7}"/>
+          <p:cNvPr id="8" name="圖片 7">
+            <a:extLst>
+              <a:ext uri="{FF2B5EF4-FFF2-40B4-BE49-F238E27FC236}">
+                <a16:creationId xmlns:a16="http://schemas.microsoft.com/office/drawing/2014/main" id="{E25375C7-CDC0-469F-B0A3-AB1EA038A7A6}"/>
               </a:ext>
             </a:extLst>
           </p:cNvPr>
@@ -4811,8 +5023,8 @@
         </p:blipFill>
         <p:spPr>
           <a:xfrm>
-            <a:off x="3746819" y="1475135"/>
-            <a:ext cx="4910908" cy="3907730"/>
+            <a:off x="1469304" y="3433366"/>
+            <a:ext cx="5052117" cy="2247299"/>
           </a:xfrm>
           <a:prstGeom prst="rect">
             <a:avLst/>
@@ -4821,10 +5033,10 @@
       </p:pic>
       <p:sp>
         <p:nvSpPr>
-          <p:cNvPr id="8" name="文字方塊 7">
-            <a:extLst>
-              <a:ext uri="{FF2B5EF4-FFF2-40B4-BE49-F238E27FC236}">
-                <a16:creationId xmlns:a16="http://schemas.microsoft.com/office/drawing/2014/main" id="{49C93D34-C734-4A03-AE9A-C29244EFEBC3}"/>
+          <p:cNvPr id="9" name="文字方塊 8">
+            <a:extLst>
+              <a:ext uri="{FF2B5EF4-FFF2-40B4-BE49-F238E27FC236}">
+                <a16:creationId xmlns:a16="http://schemas.microsoft.com/office/drawing/2014/main" id="{5FAB5A54-BBE1-4721-A93D-ABA7C212CCBE}"/>
               </a:ext>
             </a:extLst>
           </p:cNvPr>
@@ -4832,9 +5044,9 @@
           <p:nvPr/>
         </p:nvSpPr>
         <p:spPr>
-          <a:xfrm flipH="1">
-            <a:off x="5094832" y="1105803"/>
-            <a:ext cx="3230882" cy="369332"/>
+          <a:xfrm>
+            <a:off x="6868160" y="3433366"/>
+            <a:ext cx="4876800" cy="1200329"/>
           </a:xfrm>
           <a:prstGeom prst="rect">
             <a:avLst/>
@@ -4849,70 +5061,54 @@
           <a:p>
             <a:r>
               <a:rPr lang="zh-CN" altLang="en-US" dirty="0"/>
-              <a:t>一次</a:t>
+              <a:t>紅色對應紅色</a:t>
             </a:r>
             <a:r>
               <a:rPr lang="en-US" altLang="zh-CN" dirty="0"/>
-              <a:t>commit</a:t>
+              <a:t>, </a:t>
             </a:r>
             <a:r>
               <a:rPr lang="zh-CN" altLang="en-US" dirty="0"/>
-              <a:t>后</a:t>
+              <a:t>綠色對應綠色</a:t>
+            </a:r>
+            <a:endParaRPr lang="en-US" altLang="zh-CN" dirty="0"/>
+          </a:p>
+          <a:p>
+            <a:endParaRPr lang="en-US" altLang="zh-TW" dirty="0"/>
+          </a:p>
+          <a:p>
+            <a:r>
+              <a:rPr lang="zh-CN" altLang="en-US" dirty="0"/>
+              <a:t>一般這條命令只有顯示到共同擁有的版本庫當中</a:t>
+            </a:r>
+            <a:r>
+              <a:rPr lang="en-US" altLang="zh-CN" dirty="0"/>
+              <a:t>, </a:t>
+            </a:r>
+            <a:r>
+              <a:rPr lang="zh-CN" altLang="en-US" dirty="0"/>
+              <a:t>如果顯示更多加上</a:t>
+            </a:r>
+            <a:r>
+              <a:rPr lang="en-US" altLang="zh-CN" dirty="0"/>
+              <a:t>”--more=</a:t>
+            </a:r>
+            <a:r>
+              <a:rPr lang="zh-CN" altLang="en-US" dirty="0"/>
+              <a:t>數量</a:t>
+            </a:r>
+            <a:r>
+              <a:rPr lang="en-US" altLang="zh-CN" dirty="0"/>
+              <a:t>“</a:t>
             </a:r>
             <a:endParaRPr lang="zh-TW" altLang="en-US" dirty="0"/>
-          </a:p>
-        </p:txBody>
-      </p:sp>
-      <p:sp>
-        <p:nvSpPr>
-          <p:cNvPr id="9" name="箭號: 向下 8">
-            <a:extLst>
-              <a:ext uri="{FF2B5EF4-FFF2-40B4-BE49-F238E27FC236}">
-                <a16:creationId xmlns:a16="http://schemas.microsoft.com/office/drawing/2014/main" id="{2FCCB5B6-35FA-41D1-9A57-23ACAE0006F5}"/>
-              </a:ext>
-            </a:extLst>
-          </p:cNvPr>
-          <p:cNvSpPr/>
-          <p:nvPr/>
-        </p:nvSpPr>
-        <p:spPr>
-          <a:xfrm>
-            <a:off x="5455920" y="5382864"/>
-            <a:ext cx="934720" cy="790545"/>
-          </a:xfrm>
-          <a:prstGeom prst="downArrow">
-            <a:avLst/>
-          </a:prstGeom>
-        </p:spPr>
-        <p:style>
-          <a:lnRef idx="2">
-            <a:schemeClr val="accent1">
-              <a:shade val="50000"/>
-            </a:schemeClr>
-          </a:lnRef>
-          <a:fillRef idx="1">
-            <a:schemeClr val="accent1"/>
-          </a:fillRef>
-          <a:effectRef idx="0">
-            <a:schemeClr val="accent1"/>
-          </a:effectRef>
-          <a:fontRef idx="minor">
-            <a:schemeClr val="lt1"/>
-          </a:fontRef>
-        </p:style>
-        <p:txBody>
-          <a:bodyPr rtlCol="0" anchor="ctr"/>
-          <a:lstStyle/>
-          <a:p>
-            <a:pPr algn="ctr"/>
-            <a:endParaRPr lang="zh-TW" altLang="en-US"/>
           </a:p>
         </p:txBody>
       </p:sp>
     </p:spTree>
     <p:extLst>
       <p:ext uri="{BB962C8B-B14F-4D97-AF65-F5344CB8AC3E}">
-        <p14:creationId xmlns:p14="http://schemas.microsoft.com/office/powerpoint/2010/main" val="3901155342"/>
+        <p14:creationId xmlns:p14="http://schemas.microsoft.com/office/powerpoint/2010/main" val="2151625063"/>
       </p:ext>
     </p:extLst>
   </p:cSld>
@@ -4987,6 +5183,42 @@
           </a:p>
         </p:txBody>
       </p:sp>
+      <p:pic>
+        <p:nvPicPr>
+          <p:cNvPr id="7" name="圖片 6">
+            <a:extLst>
+              <a:ext uri="{FF2B5EF4-FFF2-40B4-BE49-F238E27FC236}">
+                <a16:creationId xmlns:a16="http://schemas.microsoft.com/office/drawing/2014/main" id="{21F441B3-C6D6-46FD-B8E7-6B83AE9E5AC7}"/>
+              </a:ext>
+            </a:extLst>
+          </p:cNvPr>
+          <p:cNvPicPr>
+            <a:picLocks noChangeAspect="1"/>
+          </p:cNvPicPr>
+          <p:nvPr/>
+        </p:nvPicPr>
+        <p:blipFill>
+          <a:blip r:embed="rId2">
+            <a:extLst>
+              <a:ext uri="{28A0092B-C50C-407E-A947-70E740481C1C}">
+                <a14:useLocalDpi xmlns:a14="http://schemas.microsoft.com/office/drawing/2010/main" val="0"/>
+              </a:ext>
+            </a:extLst>
+          </a:blip>
+          <a:stretch>
+            <a:fillRect/>
+          </a:stretch>
+        </p:blipFill>
+        <p:spPr>
+          <a:xfrm>
+            <a:off x="3746819" y="1475135"/>
+            <a:ext cx="4910908" cy="3907730"/>
+          </a:xfrm>
+          <a:prstGeom prst="rect">
+            <a:avLst/>
+          </a:prstGeom>
+        </p:spPr>
+      </p:pic>
       <p:sp>
         <p:nvSpPr>
           <p:cNvPr id="8" name="文字方塊 7">
@@ -5001,7 +5233,7 @@
         </p:nvSpPr>
         <p:spPr>
           <a:xfrm flipH="1">
-            <a:off x="5003392" y="1105804"/>
+            <a:off x="5094832" y="1105803"/>
             <a:ext cx="3230882" cy="369332"/>
           </a:xfrm>
           <a:prstGeom prst="rect">
@@ -5017,7 +5249,15 @@
           <a:p>
             <a:r>
               <a:rPr lang="zh-CN" altLang="en-US" dirty="0"/>
-              <a:t>修改某個文件内容</a:t>
+              <a:t>一次</a:t>
+            </a:r>
+            <a:r>
+              <a:rPr lang="en-US" altLang="zh-CN" dirty="0"/>
+              <a:t>commit</a:t>
+            </a:r>
+            <a:r>
+              <a:rPr lang="zh-CN" altLang="en-US" dirty="0"/>
+              <a:t>后</a:t>
             </a:r>
             <a:endParaRPr lang="zh-TW" altLang="en-US" dirty="0"/>
           </a:p>
@@ -5069,46 +5309,10 @@
           </a:p>
         </p:txBody>
       </p:sp>
-      <p:pic>
-        <p:nvPicPr>
-          <p:cNvPr id="3" name="圖片 2">
-            <a:extLst>
-              <a:ext uri="{FF2B5EF4-FFF2-40B4-BE49-F238E27FC236}">
-                <a16:creationId xmlns:a16="http://schemas.microsoft.com/office/drawing/2014/main" id="{77378AED-F75E-4D86-B271-D01414623425}"/>
-              </a:ext>
-            </a:extLst>
-          </p:cNvPr>
-          <p:cNvPicPr>
-            <a:picLocks noChangeAspect="1"/>
-          </p:cNvPicPr>
-          <p:nvPr/>
-        </p:nvPicPr>
-        <p:blipFill>
-          <a:blip r:embed="rId2">
-            <a:extLst>
-              <a:ext uri="{28A0092B-C50C-407E-A947-70E740481C1C}">
-                <a14:useLocalDpi xmlns:a14="http://schemas.microsoft.com/office/drawing/2010/main" val="0"/>
-              </a:ext>
-            </a:extLst>
-          </a:blip>
-          <a:stretch>
-            <a:fillRect/>
-          </a:stretch>
-        </p:blipFill>
-        <p:spPr>
-          <a:xfrm>
-            <a:off x="3774440" y="1573389"/>
-            <a:ext cx="4643120" cy="3711222"/>
-          </a:xfrm>
-          <a:prstGeom prst="rect">
-            <a:avLst/>
-          </a:prstGeom>
-        </p:spPr>
-      </p:pic>
     </p:spTree>
     <p:extLst>
       <p:ext uri="{BB962C8B-B14F-4D97-AF65-F5344CB8AC3E}">
-        <p14:creationId xmlns:p14="http://schemas.microsoft.com/office/powerpoint/2010/main" val="4280783543"/>
+        <p14:creationId xmlns:p14="http://schemas.microsoft.com/office/powerpoint/2010/main" val="3901155342"/>
       </p:ext>
     </p:extLst>
   </p:cSld>
@@ -5197,7 +5401,7 @@
         </p:nvSpPr>
         <p:spPr>
           <a:xfrm flipH="1">
-            <a:off x="4740659" y="1105803"/>
+            <a:off x="5003392" y="1105804"/>
             <a:ext cx="3230882" cy="369332"/>
           </a:xfrm>
           <a:prstGeom prst="rect">
@@ -5212,12 +5416,8 @@
           <a:lstStyle/>
           <a:p>
             <a:r>
-              <a:rPr lang="en-US" altLang="zh-CN" dirty="0"/>
-              <a:t>git add</a:t>
-            </a:r>
-            <a:r>
               <a:rPr lang="zh-CN" altLang="en-US" dirty="0"/>
-              <a:t>修改的文件</a:t>
+              <a:t>修改某個文件内容</a:t>
             </a:r>
             <a:endParaRPr lang="zh-TW" altLang="en-US" dirty="0"/>
           </a:p>
@@ -5271,10 +5471,10 @@
       </p:sp>
       <p:pic>
         <p:nvPicPr>
-          <p:cNvPr id="4" name="圖片 3">
-            <a:extLst>
-              <a:ext uri="{FF2B5EF4-FFF2-40B4-BE49-F238E27FC236}">
-                <a16:creationId xmlns:a16="http://schemas.microsoft.com/office/drawing/2014/main" id="{805814F5-6CD6-4CC4-862D-C26DCF98525E}"/>
+          <p:cNvPr id="3" name="圖片 2">
+            <a:extLst>
+              <a:ext uri="{FF2B5EF4-FFF2-40B4-BE49-F238E27FC236}">
+                <a16:creationId xmlns:a16="http://schemas.microsoft.com/office/drawing/2014/main" id="{77378AED-F75E-4D86-B271-D01414623425}"/>
               </a:ext>
             </a:extLst>
           </p:cNvPr>
@@ -5297,8 +5497,8 @@
         </p:blipFill>
         <p:spPr>
           <a:xfrm>
-            <a:off x="3883150" y="1733106"/>
-            <a:ext cx="4425699" cy="3391787"/>
+            <a:off x="3774440" y="1573389"/>
+            <a:ext cx="4643120" cy="3711222"/>
           </a:xfrm>
           <a:prstGeom prst="rect">
             <a:avLst/>
@@ -5308,7 +5508,7 @@
     </p:spTree>
     <p:extLst>
       <p:ext uri="{BB962C8B-B14F-4D97-AF65-F5344CB8AC3E}">
-        <p14:creationId xmlns:p14="http://schemas.microsoft.com/office/powerpoint/2010/main" val="2493712124"/>
+        <p14:creationId xmlns:p14="http://schemas.microsoft.com/office/powerpoint/2010/main" val="4280783543"/>
       </p:ext>
     </p:extLst>
   </p:cSld>

</xml_diff>

<commit_message>
Add some git commit command
</commit_message>
<xml_diff>
--- a/GitStudy/GitStudy.pptx
+++ b/GitStudy/GitStudy.pptx
@@ -269,7 +269,7 @@
           <a:p>
             <a:fld id="{B3DC4D43-2745-46E1-A871-6B61F7786A47}" type="datetimeFigureOut">
               <a:rPr lang="zh-TW" altLang="en-US" smtClean="0"/>
-              <a:t>2023/1/15</a:t>
+              <a:t>2023/1/17</a:t>
             </a:fld>
             <a:endParaRPr lang="zh-TW" altLang="en-US"/>
           </a:p>
@@ -467,7 +467,7 @@
           <a:p>
             <a:fld id="{B3DC4D43-2745-46E1-A871-6B61F7786A47}" type="datetimeFigureOut">
               <a:rPr lang="zh-TW" altLang="en-US" smtClean="0"/>
-              <a:t>2023/1/15</a:t>
+              <a:t>2023/1/17</a:t>
             </a:fld>
             <a:endParaRPr lang="zh-TW" altLang="en-US"/>
           </a:p>
@@ -675,7 +675,7 @@
           <a:p>
             <a:fld id="{B3DC4D43-2745-46E1-A871-6B61F7786A47}" type="datetimeFigureOut">
               <a:rPr lang="zh-TW" altLang="en-US" smtClean="0"/>
-              <a:t>2023/1/15</a:t>
+              <a:t>2023/1/17</a:t>
             </a:fld>
             <a:endParaRPr lang="zh-TW" altLang="en-US"/>
           </a:p>
@@ -873,7 +873,7 @@
           <a:p>
             <a:fld id="{B3DC4D43-2745-46E1-A871-6B61F7786A47}" type="datetimeFigureOut">
               <a:rPr lang="zh-TW" altLang="en-US" smtClean="0"/>
-              <a:t>2023/1/15</a:t>
+              <a:t>2023/1/17</a:t>
             </a:fld>
             <a:endParaRPr lang="zh-TW" altLang="en-US"/>
           </a:p>
@@ -1148,7 +1148,7 @@
           <a:p>
             <a:fld id="{B3DC4D43-2745-46E1-A871-6B61F7786A47}" type="datetimeFigureOut">
               <a:rPr lang="zh-TW" altLang="en-US" smtClean="0"/>
-              <a:t>2023/1/15</a:t>
+              <a:t>2023/1/17</a:t>
             </a:fld>
             <a:endParaRPr lang="zh-TW" altLang="en-US"/>
           </a:p>
@@ -1413,7 +1413,7 @@
           <a:p>
             <a:fld id="{B3DC4D43-2745-46E1-A871-6B61F7786A47}" type="datetimeFigureOut">
               <a:rPr lang="zh-TW" altLang="en-US" smtClean="0"/>
-              <a:t>2023/1/15</a:t>
+              <a:t>2023/1/17</a:t>
             </a:fld>
             <a:endParaRPr lang="zh-TW" altLang="en-US"/>
           </a:p>
@@ -1825,7 +1825,7 @@
           <a:p>
             <a:fld id="{B3DC4D43-2745-46E1-A871-6B61F7786A47}" type="datetimeFigureOut">
               <a:rPr lang="zh-TW" altLang="en-US" smtClean="0"/>
-              <a:t>2023/1/15</a:t>
+              <a:t>2023/1/17</a:t>
             </a:fld>
             <a:endParaRPr lang="zh-TW" altLang="en-US"/>
           </a:p>
@@ -1966,7 +1966,7 @@
           <a:p>
             <a:fld id="{B3DC4D43-2745-46E1-A871-6B61F7786A47}" type="datetimeFigureOut">
               <a:rPr lang="zh-TW" altLang="en-US" smtClean="0"/>
-              <a:t>2023/1/15</a:t>
+              <a:t>2023/1/17</a:t>
             </a:fld>
             <a:endParaRPr lang="zh-TW" altLang="en-US"/>
           </a:p>
@@ -2079,7 +2079,7 @@
           <a:p>
             <a:fld id="{B3DC4D43-2745-46E1-A871-6B61F7786A47}" type="datetimeFigureOut">
               <a:rPr lang="zh-TW" altLang="en-US" smtClean="0"/>
-              <a:t>2023/1/15</a:t>
+              <a:t>2023/1/17</a:t>
             </a:fld>
             <a:endParaRPr lang="zh-TW" altLang="en-US"/>
           </a:p>
@@ -2390,7 +2390,7 @@
           <a:p>
             <a:fld id="{B3DC4D43-2745-46E1-A871-6B61F7786A47}" type="datetimeFigureOut">
               <a:rPr lang="zh-TW" altLang="en-US" smtClean="0"/>
-              <a:t>2023/1/15</a:t>
+              <a:t>2023/1/17</a:t>
             </a:fld>
             <a:endParaRPr lang="zh-TW" altLang="en-US"/>
           </a:p>
@@ -2678,7 +2678,7 @@
           <a:p>
             <a:fld id="{B3DC4D43-2745-46E1-A871-6B61F7786A47}" type="datetimeFigureOut">
               <a:rPr lang="zh-TW" altLang="en-US" smtClean="0"/>
-              <a:t>2023/1/15</a:t>
+              <a:t>2023/1/17</a:t>
             </a:fld>
             <a:endParaRPr lang="zh-TW" altLang="en-US"/>
           </a:p>
@@ -2919,7 +2919,7 @@
           <a:p>
             <a:fld id="{B3DC4D43-2745-46E1-A871-6B61F7786A47}" type="datetimeFigureOut">
               <a:rPr lang="zh-TW" altLang="en-US" smtClean="0"/>
-              <a:t>2023/1/15</a:t>
+              <a:t>2023/1/17</a:t>
             </a:fld>
             <a:endParaRPr lang="zh-TW" altLang="en-US"/>
           </a:p>
@@ -4321,8 +4321,8 @@
         </p:nvSpPr>
         <p:spPr>
           <a:xfrm>
-            <a:off x="290945" y="235527"/>
-            <a:ext cx="7994496" cy="1200329"/>
+            <a:off x="277552" y="225367"/>
+            <a:ext cx="11636895" cy="6463308"/>
           </a:xfrm>
           <a:prstGeom prst="rect">
             <a:avLst/>
@@ -4330,83 +4330,369 @@
           <a:noFill/>
         </p:spPr>
         <p:txBody>
-          <a:bodyPr wrap="none" rtlCol="0">
+          <a:bodyPr wrap="square" rtlCol="0">
             <a:spAutoFit/>
           </a:bodyPr>
           <a:lstStyle/>
           <a:p>
             <a:r>
-              <a:rPr lang="en-US" altLang="zh-CN" b="1" dirty="0" err="1"/>
-              <a:t>g</a:t>
-            </a:r>
-            <a:r>
-              <a:rPr lang="en-US" altLang="zh-CN" b="1" dirty="0" err="1" smtClean="0"/>
-              <a:t>it</a:t>
-            </a:r>
-            <a:r>
-              <a:rPr lang="en-US" altLang="zh-CN" b="1" dirty="0" smtClean="0"/>
-              <a:t> commit</a:t>
-            </a:r>
-          </a:p>
-          <a:p>
-            <a:r>
-              <a:rPr lang="en-US" altLang="zh-CN" b="1" dirty="0" smtClean="0"/>
-              <a:t>	</a:t>
-            </a:r>
+              <a:rPr lang="en-US" altLang="zh-CN" b="1" dirty="0"/>
+              <a:t>git commit</a:t>
+            </a:r>
+            <a:r>
+              <a:rPr lang="zh-CN" altLang="en-US" b="1" dirty="0"/>
+              <a:t>的相關命令</a:t>
+            </a:r>
+            <a:endParaRPr lang="en-US" altLang="zh-CN" b="1" dirty="0"/>
           </a:p>
           <a:p>
             <a:r>
               <a:rPr lang="en-US" altLang="zh-CN" b="1" dirty="0"/>
               <a:t>	</a:t>
             </a:r>
-            <a:r>
-              <a:rPr lang="en-US" altLang="zh-CN" b="1" dirty="0" smtClean="0"/>
-              <a:t>1. </a:t>
-            </a:r>
-            <a:r>
-              <a:rPr lang="en-US" altLang="zh-CN" b="1" dirty="0" err="1" smtClean="0"/>
+          </a:p>
+          <a:p>
+            <a:r>
+              <a:rPr lang="en-US" altLang="zh-CN" b="1" dirty="0"/>
+              <a:t>	1. </a:t>
+            </a:r>
+            <a:r>
+              <a:rPr lang="zh-CN" altLang="en-US" b="1" dirty="0"/>
+              <a:t>看见代码修改的时间和人</a:t>
+            </a:r>
+            <a:endParaRPr lang="en-US" altLang="zh-CN" b="1" dirty="0"/>
+          </a:p>
+          <a:p>
+            <a:r>
+              <a:rPr lang="en-US" altLang="zh-CN" b="1" dirty="0"/>
+              <a:t>	         git blame –L </a:t>
+            </a:r>
+            <a:r>
+              <a:rPr lang="en-US" altLang="zh-CN" b="1" dirty="0" err="1"/>
+              <a:t>m,n</a:t>
+            </a:r>
+            <a:r>
+              <a:rPr lang="en-US" altLang="zh-CN" b="1" dirty="0"/>
+              <a:t> </a:t>
+            </a:r>
+            <a:r>
+              <a:rPr lang="zh-CN" altLang="en-US" b="1" dirty="0"/>
+              <a:t>文件名可以， </a:t>
+            </a:r>
+            <a:r>
+              <a:rPr lang="en-US" altLang="zh-CN" b="1" dirty="0" err="1"/>
+              <a:t>m,n</a:t>
+            </a:r>
+            <a:r>
+              <a:rPr lang="zh-CN" altLang="en-US" b="1" dirty="0"/>
+              <a:t>代表从第几行到第几行</a:t>
+            </a:r>
+            <a:endParaRPr lang="en-US" altLang="zh-CN" b="1" dirty="0"/>
+          </a:p>
+          <a:p>
+            <a:endParaRPr lang="en-US" altLang="zh-CN" b="1" dirty="0"/>
+          </a:p>
+          <a:p>
+            <a:r>
+              <a:rPr lang="en-US" altLang="zh-CN" b="1" dirty="0"/>
+              <a:t>	2. </a:t>
+            </a:r>
+            <a:r>
+              <a:rPr lang="zh-CN" altLang="en-US" b="1" dirty="0"/>
+              <a:t>查找錯誤提交</a:t>
+            </a:r>
+            <a:endParaRPr lang="en-US" altLang="zh-CN" b="1" dirty="0"/>
+          </a:p>
+          <a:p>
+            <a:r>
+              <a:rPr lang="en-US" altLang="zh-CN" b="1" dirty="0"/>
+              <a:t>	         git bisect start </a:t>
+            </a:r>
+            <a:r>
+              <a:rPr lang="zh-CN" altLang="en-US" b="1" dirty="0"/>
+              <a:t>啓動二分法搜尋</a:t>
+            </a:r>
+            <a:endParaRPr lang="en-US" altLang="zh-CN" b="1" dirty="0"/>
+          </a:p>
+          <a:p>
+            <a:r>
+              <a:rPr lang="en-US" altLang="zh-CN" b="1" dirty="0"/>
+              <a:t>	         git bisect bad   </a:t>
+            </a:r>
+            <a:r>
+              <a:rPr lang="zh-CN" altLang="en-US" b="1" dirty="0"/>
+              <a:t>告訴</a:t>
+            </a:r>
+            <a:r>
+              <a:rPr lang="en-US" altLang="zh-CN" b="1" dirty="0"/>
               <a:t>git</a:t>
             </a:r>
             <a:r>
-              <a:rPr lang="en-US" altLang="zh-CN" b="1" dirty="0" smtClean="0"/>
-              <a:t> blame –L </a:t>
-            </a:r>
-            <a:r>
-              <a:rPr lang="en-US" altLang="zh-CN" b="1" dirty="0" err="1" smtClean="0"/>
-              <a:t>m,n</a:t>
-            </a:r>
-            <a:r>
-              <a:rPr lang="en-US" altLang="zh-CN" b="1" dirty="0" smtClean="0"/>
+              <a:rPr lang="zh-CN" altLang="en-US" b="1" dirty="0"/>
+              <a:t>目前</a:t>
+            </a:r>
+            <a:r>
+              <a:rPr lang="en-US" altLang="zh-CN" b="1" dirty="0"/>
+              <a:t>HEAD</a:t>
+            </a:r>
+            <a:r>
+              <a:rPr lang="zh-CN" altLang="en-US" b="1" dirty="0"/>
+              <a:t>指向的版本是壞的</a:t>
+            </a:r>
+            <a:endParaRPr lang="en-US" altLang="zh-CN" b="1" dirty="0"/>
+          </a:p>
+          <a:p>
+            <a:r>
+              <a:rPr lang="en-US" altLang="zh-CN" b="1" dirty="0"/>
+              <a:t>	         git bisect good sha1  </a:t>
+            </a:r>
+            <a:r>
+              <a:rPr lang="zh-CN" altLang="en-US" b="1" dirty="0"/>
+              <a:t>告訴</a:t>
+            </a:r>
+            <a:r>
+              <a:rPr lang="en-US" altLang="zh-CN" b="1" dirty="0"/>
+              <a:t>git</a:t>
+            </a:r>
+            <a:r>
+              <a:rPr lang="zh-CN" altLang="en-US" b="1" dirty="0"/>
+              <a:t>目前</a:t>
+            </a:r>
+            <a:r>
+              <a:rPr lang="en-US" altLang="zh-CN" b="1" dirty="0"/>
+              <a:t>HEAD</a:t>
+            </a:r>
+            <a:r>
+              <a:rPr lang="zh-CN" altLang="en-US" b="1" dirty="0"/>
+              <a:t>指向的版本是好的</a:t>
+            </a:r>
+            <a:endParaRPr lang="en-US" altLang="zh-CN" b="1" dirty="0"/>
+          </a:p>
+          <a:p>
+            <a:r>
+              <a:rPr lang="en-US" altLang="zh-CN" b="1" dirty="0"/>
+              <a:t>	         git bisect log   </a:t>
+            </a:r>
+            <a:r>
+              <a:rPr lang="zh-CN" altLang="en-US" b="1" dirty="0"/>
+              <a:t>查看二分法記錄你的回答</a:t>
+            </a:r>
+            <a:endParaRPr lang="en-US" altLang="zh-CN" b="1" dirty="0"/>
+          </a:p>
+          <a:p>
+            <a:r>
+              <a:rPr lang="en-US" altLang="zh-CN" b="1" dirty="0"/>
+              <a:t>	        git bisect reset  </a:t>
+            </a:r>
+            <a:r>
+              <a:rPr lang="zh-CN" altLang="en-US" b="1" dirty="0"/>
+              <a:t>回到原來的分支上面</a:t>
+            </a:r>
+            <a:endParaRPr lang="en-US" altLang="zh-CN" b="1" dirty="0"/>
+          </a:p>
+          <a:p>
+            <a:endParaRPr lang="en-US" altLang="zh-CN" b="1" dirty="0"/>
+          </a:p>
+          <a:p>
+            <a:r>
+              <a:rPr lang="en-US" altLang="zh-CN" b="1" dirty="0"/>
+              <a:t>	 3. </a:t>
+            </a:r>
+            <a:r>
+              <a:rPr lang="zh-CN" altLang="en-US" b="1" dirty="0"/>
+              <a:t>產看歷史提交</a:t>
+            </a:r>
+            <a:endParaRPr lang="en-US" altLang="zh-CN" b="1" dirty="0"/>
+          </a:p>
+          <a:p>
+            <a:r>
+              <a:rPr lang="en-US" altLang="zh-CN" b="1" dirty="0"/>
+              <a:t>		 git log --pretty=short --abbrev-commit HEAD~2..HEAD  </a:t>
+            </a:r>
+            <a:r>
+              <a:rPr lang="en-US" altLang="zh-CN" b="1" dirty="0">
+                <a:sym typeface="Wingdings" panose="05000000000000000000" pitchFamily="2" charset="2"/>
+              </a:rPr>
+              <a:t>  (1)</a:t>
+            </a:r>
+            <a:r>
+              <a:rPr lang="en-US" altLang="zh-CN" b="1" dirty="0"/>
+              <a:t>--pretty=short    </a:t>
+            </a:r>
+            <a:r>
+              <a:rPr lang="zh-CN" altLang="en-US" b="1" dirty="0"/>
+              <a:t>簡單的打印</a:t>
+            </a:r>
+            <a:endParaRPr lang="en-US" altLang="zh-CN" b="1" dirty="0"/>
+          </a:p>
+          <a:p>
+            <a:r>
+              <a:rPr lang="en-US" altLang="zh-CN" b="1" dirty="0">
+                <a:sym typeface="Wingdings" panose="05000000000000000000" pitchFamily="2" charset="2"/>
+              </a:rPr>
+              <a:t>								 (2)--abbrev-commit   SHA1</a:t>
+            </a:r>
+            <a:r>
+              <a:rPr lang="zh-CN" altLang="en-US" b="1" dirty="0">
+                <a:sym typeface="Wingdings" panose="05000000000000000000" pitchFamily="2" charset="2"/>
+              </a:rPr>
+              <a:t>的值進行縮寫</a:t>
+            </a:r>
+            <a:endParaRPr lang="en-US" altLang="zh-CN" b="1" dirty="0">
+              <a:sym typeface="Wingdings" panose="05000000000000000000" pitchFamily="2" charset="2"/>
+            </a:endParaRPr>
+          </a:p>
+          <a:p>
+            <a:r>
+              <a:rPr lang="en-US" altLang="zh-CN" b="1" dirty="0">
+                <a:sym typeface="Wingdings" panose="05000000000000000000" pitchFamily="2" charset="2"/>
+              </a:rPr>
+              <a:t>								 (3)</a:t>
+            </a:r>
+            <a:r>
+              <a:rPr lang="en-US" altLang="zh-CN" b="1" dirty="0"/>
+              <a:t>HEAD~2..HEAD</a:t>
+            </a:r>
+            <a:r>
+              <a:rPr lang="en-US" altLang="zh-CN" b="1" dirty="0">
+                <a:sym typeface="Wingdings" panose="05000000000000000000" pitchFamily="2" charset="2"/>
+              </a:rPr>
+              <a:t>     HEAD</a:t>
+            </a:r>
+            <a:r>
+              <a:rPr lang="zh-CN" altLang="en-US" b="1" dirty="0">
+                <a:sym typeface="Wingdings" panose="05000000000000000000" pitchFamily="2" charset="2"/>
+              </a:rPr>
+              <a:t>指向的</a:t>
+            </a:r>
+            <a:r>
+              <a:rPr lang="en-US" altLang="zh-CN" b="1" dirty="0">
+                <a:sym typeface="Wingdings" panose="05000000000000000000" pitchFamily="2" charset="2"/>
+              </a:rPr>
+              <a:t>commit             </a:t>
+            </a:r>
+          </a:p>
+          <a:p>
+            <a:r>
+              <a:rPr lang="en-US" altLang="zh-CN" b="1" dirty="0">
+                <a:sym typeface="Wingdings" panose="05000000000000000000" pitchFamily="2" charset="2"/>
+              </a:rPr>
+              <a:t>                                                                                                                                                                                  </a:t>
+            </a:r>
+            <a:r>
+              <a:rPr lang="zh-CN" altLang="en-US" b="1" dirty="0">
+                <a:sym typeface="Wingdings" panose="05000000000000000000" pitchFamily="2" charset="2"/>
+              </a:rPr>
+              <a:t>和他前一個指向的 </a:t>
+            </a:r>
+            <a:endParaRPr lang="en-US" altLang="zh-CN" b="1" dirty="0">
+              <a:sym typeface="Wingdings" panose="05000000000000000000" pitchFamily="2" charset="2"/>
+            </a:endParaRPr>
+          </a:p>
+          <a:p>
+            <a:r>
+              <a:rPr lang="en-US" altLang="zh-CN" b="1" dirty="0">
+                <a:sym typeface="Wingdings" panose="05000000000000000000" pitchFamily="2" charset="2"/>
+              </a:rPr>
+              <a:t>                                                                                                                                                                                  commit </a:t>
+            </a:r>
+            <a:endParaRPr lang="en-US" altLang="zh-CN" b="1" dirty="0"/>
+          </a:p>
+          <a:p>
+            <a:r>
+              <a:rPr lang="en-US" altLang="zh-CN" b="1" dirty="0"/>
+              <a:t>	 4. </a:t>
+            </a:r>
+            <a:r>
+              <a:rPr lang="zh-CN" altLang="en-US" b="1" dirty="0"/>
+              <a:t>查看歷史提交詳情</a:t>
+            </a:r>
+            <a:endParaRPr lang="en-US" altLang="zh-CN" b="1" dirty="0"/>
+          </a:p>
+          <a:p>
+            <a:r>
+              <a:rPr lang="en-US" altLang="zh-CN" b="1" dirty="0"/>
+              <a:t>		git log –n –p –stat           </a:t>
+            </a:r>
+            <a:r>
+              <a:rPr lang="en-US" altLang="zh-CN" b="1" dirty="0">
+                <a:sym typeface="Wingdings" panose="05000000000000000000" pitchFamily="2" charset="2"/>
+              </a:rPr>
+              <a:t>     -n</a:t>
+            </a:r>
+            <a:r>
+              <a:rPr lang="zh-CN" altLang="en-US" b="1" dirty="0">
+                <a:sym typeface="Wingdings" panose="05000000000000000000" pitchFamily="2" charset="2"/>
+              </a:rPr>
+              <a:t>輸出的行數， </a:t>
+            </a:r>
+            <a:r>
+              <a:rPr lang="en-US" altLang="zh-CN" b="1" dirty="0">
+                <a:sym typeface="Wingdings" panose="05000000000000000000" pitchFamily="2" charset="2"/>
+              </a:rPr>
+              <a:t>-p</a:t>
+            </a:r>
+            <a:r>
+              <a:rPr lang="zh-CN" altLang="en-US" b="1" dirty="0">
+                <a:sym typeface="Wingdings" panose="05000000000000000000" pitchFamily="2" charset="2"/>
+              </a:rPr>
+              <a:t>詳情包括代碼的修改</a:t>
+            </a:r>
+            <a:r>
+              <a:rPr lang="en-US" altLang="zh-CN" b="1" dirty="0">
+                <a:sym typeface="Wingdings" panose="05000000000000000000" pitchFamily="2" charset="2"/>
+              </a:rPr>
+              <a:t>, </a:t>
+            </a:r>
+            <a:r>
+              <a:rPr lang="zh-CN" altLang="en-US" b="1" dirty="0">
+                <a:sym typeface="Wingdings" panose="05000000000000000000" pitchFamily="2" charset="2"/>
+              </a:rPr>
               <a:t> </a:t>
             </a:r>
             <a:r>
-              <a:rPr lang="zh-CN" altLang="en-US" b="1" dirty="0" smtClean="0"/>
-              <a:t>文件名</a:t>
-            </a:r>
-            <a:endParaRPr lang="en-US" altLang="zh-CN" b="1" dirty="0" smtClean="0"/>
-          </a:p>
-          <a:p>
+              <a:rPr lang="en-US" altLang="zh-CN" b="1" dirty="0">
+                <a:sym typeface="Wingdings" panose="05000000000000000000" pitchFamily="2" charset="2"/>
+              </a:rPr>
+              <a:t>–stat</a:t>
+            </a:r>
+            <a:r>
+              <a:rPr lang="zh-CN" altLang="en-US" b="1" dirty="0">
+                <a:sym typeface="Wingdings" panose="05000000000000000000" pitchFamily="2" charset="2"/>
+              </a:rPr>
+              <a:t>文件的修改</a:t>
+            </a:r>
+            <a:endParaRPr lang="en-US" altLang="zh-CN" b="1" dirty="0">
+              <a:sym typeface="Wingdings" panose="05000000000000000000" pitchFamily="2" charset="2"/>
+            </a:endParaRPr>
+          </a:p>
+          <a:p>
+            <a:r>
+              <a:rPr lang="en-US" altLang="zh-CN" b="1" dirty="0">
+                <a:sym typeface="Wingdings" panose="05000000000000000000" pitchFamily="2" charset="2"/>
+              </a:rPr>
+              <a:t>		git show SHA1</a:t>
+            </a:r>
+          </a:p>
+          <a:p>
+            <a:r>
+              <a:rPr lang="en-US" altLang="zh-CN" b="1" dirty="0">
+                <a:sym typeface="Wingdings" panose="05000000000000000000" pitchFamily="2" charset="2"/>
+              </a:rPr>
+              <a:t>	</a:t>
+            </a:r>
+          </a:p>
+          <a:p>
+            <a:r>
+              <a:rPr lang="en-US" altLang="zh-CN" b="1" dirty="0">
+                <a:sym typeface="Wingdings" panose="05000000000000000000" pitchFamily="2" charset="2"/>
+              </a:rPr>
+              <a:t>	</a:t>
+            </a:r>
             <a:r>
               <a:rPr lang="en-US" altLang="zh-CN" b="1" dirty="0"/>
-              <a:t>	</a:t>
-            </a:r>
-            <a:r>
-              <a:rPr lang="en-US" altLang="zh-CN" b="1" dirty="0" smtClean="0"/>
-              <a:t>	</a:t>
-            </a:r>
-            <a:r>
-              <a:rPr lang="zh-CN" altLang="en-US" b="1" dirty="0" smtClean="0"/>
-              <a:t>可以看见代码修改的时间和人， </a:t>
-            </a:r>
-            <a:r>
-              <a:rPr lang="en-US" altLang="zh-CN" b="1" dirty="0" err="1" smtClean="0"/>
-              <a:t>m,n</a:t>
-            </a:r>
-            <a:r>
-              <a:rPr lang="zh-CN" altLang="en-US" b="1" smtClean="0"/>
-              <a:t>代表从第几行到第几行</a:t>
-            </a:r>
-            <a:endParaRPr lang="en-US" altLang="zh-CN" b="1" dirty="0"/>
+              <a:t>     </a:t>
+            </a:r>
           </a:p>
         </p:txBody>
       </p:sp>
@@ -4455,7 +4741,7 @@
         <p:spPr>
           <a:xfrm>
             <a:off x="365503" y="355600"/>
-            <a:ext cx="3043590" cy="400110"/>
+            <a:ext cx="2530629" cy="400110"/>
           </a:xfrm>
           <a:prstGeom prst="rect">
             <a:avLst/>
@@ -4474,7 +4760,7 @@
             </a:r>
             <a:r>
               <a:rPr lang="zh-CN" altLang="en-US" sz="2000" b="1" dirty="0"/>
-              <a:t>的命令操作分支</a:t>
+              <a:t>的相關命令</a:t>
             </a:r>
             <a:endParaRPr lang="zh-TW" altLang="en-US" sz="2000" b="1" dirty="0"/>
           </a:p>
@@ -4685,14 +4971,14 @@
           </a:p>
           <a:p>
             <a:r>
-              <a:rPr lang="en-US" altLang="zh-CN" b="1" dirty="0" smtClean="0"/>
+              <a:rPr lang="en-US" altLang="zh-CN" b="1" dirty="0"/>
               <a:t>7. </a:t>
             </a:r>
             <a:r>
-              <a:rPr lang="zh-CN" altLang="en-US" b="1" dirty="0" smtClean="0"/>
+              <a:rPr lang="zh-CN" altLang="en-US" b="1" dirty="0"/>
               <a:t>查看远程分支和所有分支信息</a:t>
             </a:r>
-            <a:endParaRPr lang="en-US" altLang="zh-CN" b="1" dirty="0" smtClean="0"/>
+            <a:endParaRPr lang="en-US" altLang="zh-CN" b="1" dirty="0"/>
           </a:p>
           <a:p>
             <a:r>
@@ -4700,11 +4986,11 @@
               <a:t>	</a:t>
             </a:r>
             <a:r>
-              <a:rPr lang="en-US" altLang="zh-CN" dirty="0" err="1" smtClean="0"/>
+              <a:rPr lang="en-US" altLang="zh-CN" dirty="0" err="1"/>
               <a:t>git</a:t>
             </a:r>
             <a:r>
-              <a:rPr lang="en-US" altLang="zh-CN" dirty="0" smtClean="0"/>
+              <a:rPr lang="en-US" altLang="zh-CN" dirty="0"/>
               <a:t> branch –r</a:t>
             </a:r>
           </a:p>
@@ -4714,16 +5000,12 @@
               <a:t>	</a:t>
             </a:r>
             <a:r>
-              <a:rPr lang="en-US" altLang="zh-CN" dirty="0" err="1" smtClean="0"/>
+              <a:rPr lang="en-US" altLang="zh-CN" dirty="0" err="1"/>
               <a:t>git</a:t>
             </a:r>
             <a:r>
-              <a:rPr lang="en-US" altLang="zh-CN" dirty="0" smtClean="0"/>
-              <a:t> branch –r -a</a:t>
-            </a:r>
-            <a:r>
               <a:rPr lang="en-US" altLang="zh-CN" dirty="0"/>
-              <a:t>	</a:t>
+              <a:t> branch –r -a	</a:t>
             </a:r>
           </a:p>
         </p:txBody>
@@ -4863,11 +5145,7 @@
           <a:p>
             <a:r>
               <a:rPr lang="en-US" altLang="zh-CN" dirty="0"/>
-              <a:t>8</a:t>
-            </a:r>
-            <a:r>
-              <a:rPr lang="en-US" altLang="zh-CN" dirty="0" smtClean="0"/>
-              <a:t>. </a:t>
+              <a:t>8. </a:t>
             </a:r>
             <a:r>
               <a:rPr lang="zh-CN" altLang="en-US" dirty="0"/>
@@ -4889,11 +5167,7 @@
             </a:r>
             <a:r>
               <a:rPr lang="en-US" altLang="zh-TW" dirty="0"/>
-              <a:t> </a:t>
-            </a:r>
-            <a:r>
-              <a:rPr lang="en-US" altLang="zh-TW" dirty="0" smtClean="0"/>
-              <a:t>show-branch</a:t>
+              <a:t> show-branch</a:t>
             </a:r>
           </a:p>
           <a:p>
@@ -4902,15 +5176,15 @@
               <a:t>	</a:t>
             </a:r>
             <a:r>
-              <a:rPr lang="en-US" altLang="zh-CN" dirty="0" err="1" smtClean="0"/>
+              <a:rPr lang="en-US" altLang="zh-CN" dirty="0" err="1"/>
               <a:t>git</a:t>
             </a:r>
             <a:r>
-              <a:rPr lang="en-US" altLang="zh-CN" dirty="0" smtClean="0"/>
+              <a:rPr lang="en-US" altLang="zh-CN" dirty="0"/>
               <a:t> show-branch –more=</a:t>
             </a:r>
             <a:r>
-              <a:rPr lang="zh-CN" altLang="en-US" dirty="0" smtClean="0"/>
+              <a:rPr lang="zh-CN" altLang="en-US" dirty="0"/>
               <a:t>数量</a:t>
             </a:r>
             <a:endParaRPr lang="en-US" altLang="zh-TW" dirty="0"/>

</xml_diff>

<commit_message>
add git commit content
</commit_message>
<xml_diff>
--- a/GitStudy/GitStudy.pptx
+++ b/GitStudy/GitStudy.pptx
@@ -9,9 +9,9 @@
     <p:sldId id="258" r:id="rId3"/>
     <p:sldId id="257" r:id="rId4"/>
     <p:sldId id="263" r:id="rId5"/>
-    <p:sldId id="266" r:id="rId6"/>
-    <p:sldId id="264" r:id="rId7"/>
-    <p:sldId id="265" r:id="rId8"/>
+    <p:sldId id="264" r:id="rId6"/>
+    <p:sldId id="265" r:id="rId7"/>
+    <p:sldId id="266" r:id="rId8"/>
     <p:sldId id="259" r:id="rId9"/>
     <p:sldId id="260" r:id="rId10"/>
     <p:sldId id="261" r:id="rId11"/>
@@ -269,7 +269,7 @@
           <a:p>
             <a:fld id="{B3DC4D43-2745-46E1-A871-6B61F7786A47}" type="datetimeFigureOut">
               <a:rPr lang="zh-TW" altLang="en-US" smtClean="0"/>
-              <a:t>2023/1/17</a:t>
+              <a:t>2023/1/19</a:t>
             </a:fld>
             <a:endParaRPr lang="zh-TW" altLang="en-US"/>
           </a:p>
@@ -467,7 +467,7 @@
           <a:p>
             <a:fld id="{B3DC4D43-2745-46E1-A871-6B61F7786A47}" type="datetimeFigureOut">
               <a:rPr lang="zh-TW" altLang="en-US" smtClean="0"/>
-              <a:t>2023/1/17</a:t>
+              <a:t>2023/1/19</a:t>
             </a:fld>
             <a:endParaRPr lang="zh-TW" altLang="en-US"/>
           </a:p>
@@ -675,7 +675,7 @@
           <a:p>
             <a:fld id="{B3DC4D43-2745-46E1-A871-6B61F7786A47}" type="datetimeFigureOut">
               <a:rPr lang="zh-TW" altLang="en-US" smtClean="0"/>
-              <a:t>2023/1/17</a:t>
+              <a:t>2023/1/19</a:t>
             </a:fld>
             <a:endParaRPr lang="zh-TW" altLang="en-US"/>
           </a:p>
@@ -873,7 +873,7 @@
           <a:p>
             <a:fld id="{B3DC4D43-2745-46E1-A871-6B61F7786A47}" type="datetimeFigureOut">
               <a:rPr lang="zh-TW" altLang="en-US" smtClean="0"/>
-              <a:t>2023/1/17</a:t>
+              <a:t>2023/1/19</a:t>
             </a:fld>
             <a:endParaRPr lang="zh-TW" altLang="en-US"/>
           </a:p>
@@ -1148,7 +1148,7 @@
           <a:p>
             <a:fld id="{B3DC4D43-2745-46E1-A871-6B61F7786A47}" type="datetimeFigureOut">
               <a:rPr lang="zh-TW" altLang="en-US" smtClean="0"/>
-              <a:t>2023/1/17</a:t>
+              <a:t>2023/1/19</a:t>
             </a:fld>
             <a:endParaRPr lang="zh-TW" altLang="en-US"/>
           </a:p>
@@ -1413,7 +1413,7 @@
           <a:p>
             <a:fld id="{B3DC4D43-2745-46E1-A871-6B61F7786A47}" type="datetimeFigureOut">
               <a:rPr lang="zh-TW" altLang="en-US" smtClean="0"/>
-              <a:t>2023/1/17</a:t>
+              <a:t>2023/1/19</a:t>
             </a:fld>
             <a:endParaRPr lang="zh-TW" altLang="en-US"/>
           </a:p>
@@ -1825,7 +1825,7 @@
           <a:p>
             <a:fld id="{B3DC4D43-2745-46E1-A871-6B61F7786A47}" type="datetimeFigureOut">
               <a:rPr lang="zh-TW" altLang="en-US" smtClean="0"/>
-              <a:t>2023/1/17</a:t>
+              <a:t>2023/1/19</a:t>
             </a:fld>
             <a:endParaRPr lang="zh-TW" altLang="en-US"/>
           </a:p>
@@ -1966,7 +1966,7 @@
           <a:p>
             <a:fld id="{B3DC4D43-2745-46E1-A871-6B61F7786A47}" type="datetimeFigureOut">
               <a:rPr lang="zh-TW" altLang="en-US" smtClean="0"/>
-              <a:t>2023/1/17</a:t>
+              <a:t>2023/1/19</a:t>
             </a:fld>
             <a:endParaRPr lang="zh-TW" altLang="en-US"/>
           </a:p>
@@ -2079,7 +2079,7 @@
           <a:p>
             <a:fld id="{B3DC4D43-2745-46E1-A871-6B61F7786A47}" type="datetimeFigureOut">
               <a:rPr lang="zh-TW" altLang="en-US" smtClean="0"/>
-              <a:t>2023/1/17</a:t>
+              <a:t>2023/1/19</a:t>
             </a:fld>
             <a:endParaRPr lang="zh-TW" altLang="en-US"/>
           </a:p>
@@ -2390,7 +2390,7 @@
           <a:p>
             <a:fld id="{B3DC4D43-2745-46E1-A871-6B61F7786A47}" type="datetimeFigureOut">
               <a:rPr lang="zh-TW" altLang="en-US" smtClean="0"/>
-              <a:t>2023/1/17</a:t>
+              <a:t>2023/1/19</a:t>
             </a:fld>
             <a:endParaRPr lang="zh-TW" altLang="en-US"/>
           </a:p>
@@ -2678,7 +2678,7 @@
           <a:p>
             <a:fld id="{B3DC4D43-2745-46E1-A871-6B61F7786A47}" type="datetimeFigureOut">
               <a:rPr lang="zh-TW" altLang="en-US" smtClean="0"/>
-              <a:t>2023/1/17</a:t>
+              <a:t>2023/1/19</a:t>
             </a:fld>
             <a:endParaRPr lang="zh-TW" altLang="en-US"/>
           </a:p>
@@ -2919,7 +2919,7 @@
           <a:p>
             <a:fld id="{B3DC4D43-2745-46E1-A871-6B61F7786A47}" type="datetimeFigureOut">
               <a:rPr lang="zh-TW" altLang="en-US" smtClean="0"/>
-              <a:t>2023/1/17</a:t>
+              <a:t>2023/1/19</a:t>
             </a:fld>
             <a:endParaRPr lang="zh-TW" altLang="en-US"/>
           </a:p>
@@ -3424,22 +3424,22 @@
           <a:lstStyle/>
           <a:p>
             <a:r>
-              <a:rPr lang="en-US" altLang="zh-TW" sz="2000" b="1" dirty="0"/>
+              <a:rPr lang="en-US" altLang="zh-TW" sz="2000" b="1" u="sng" dirty="0"/>
               <a:t>Git </a:t>
             </a:r>
             <a:r>
-              <a:rPr lang="zh-CN" altLang="en-US" sz="2000" b="1" dirty="0"/>
+              <a:rPr lang="zh-CN" altLang="en-US" sz="2000" b="1" u="sng" dirty="0"/>
               <a:t>修改一次文件到</a:t>
             </a:r>
             <a:r>
-              <a:rPr lang="en-US" altLang="zh-CN" sz="2000" b="1" dirty="0"/>
+              <a:rPr lang="en-US" altLang="zh-CN" sz="2000" b="1" u="sng" dirty="0"/>
               <a:t>commit</a:t>
             </a:r>
             <a:r>
-              <a:rPr lang="zh-CN" altLang="en-US" sz="2000" b="1" dirty="0"/>
+              <a:rPr lang="zh-CN" altLang="en-US" sz="2000" b="1" u="sng" dirty="0"/>
               <a:t>的圖示過程</a:t>
             </a:r>
-            <a:endParaRPr lang="zh-TW" altLang="en-US" sz="2000" b="1" dirty="0"/>
+            <a:endParaRPr lang="zh-TW" altLang="en-US" sz="2000" b="1" u="sng" dirty="0"/>
           </a:p>
         </p:txBody>
       </p:sp>
@@ -3624,22 +3624,22 @@
           <a:lstStyle/>
           <a:p>
             <a:r>
-              <a:rPr lang="en-US" altLang="zh-TW" sz="2000" b="1" dirty="0"/>
+              <a:rPr lang="en-US" altLang="zh-TW" sz="2000" b="1" u="sng" dirty="0"/>
               <a:t>Git </a:t>
             </a:r>
             <a:r>
-              <a:rPr lang="zh-CN" altLang="en-US" sz="2000" b="1" dirty="0"/>
+              <a:rPr lang="zh-CN" altLang="en-US" sz="2000" b="1" u="sng" dirty="0"/>
               <a:t>修改一次文件到</a:t>
             </a:r>
             <a:r>
-              <a:rPr lang="en-US" altLang="zh-CN" sz="2000" b="1" dirty="0"/>
+              <a:rPr lang="en-US" altLang="zh-CN" sz="2000" b="1" u="sng" dirty="0"/>
               <a:t>commit</a:t>
             </a:r>
             <a:r>
-              <a:rPr lang="zh-CN" altLang="en-US" sz="2000" b="1" dirty="0"/>
+              <a:rPr lang="zh-CN" altLang="en-US" sz="2000" b="1" u="sng" dirty="0"/>
               <a:t>的圖示過程</a:t>
             </a:r>
-            <a:endParaRPr lang="zh-TW" altLang="en-US" sz="2000" b="1" dirty="0"/>
+            <a:endParaRPr lang="zh-TW" altLang="en-US" sz="2000" b="1" u="sng" dirty="0"/>
           </a:p>
         </p:txBody>
       </p:sp>
@@ -3764,7 +3764,7 @@
         <p:spPr>
           <a:xfrm>
             <a:off x="487680" y="375920"/>
-            <a:ext cx="3671518" cy="646331"/>
+            <a:ext cx="11064240" cy="2862322"/>
           </a:xfrm>
           <a:prstGeom prst="rect">
             <a:avLst/>
@@ -3772,7 +3772,7 @@
           <a:noFill/>
         </p:spPr>
         <p:txBody>
-          <a:bodyPr wrap="none" rtlCol="0">
+          <a:bodyPr wrap="square" rtlCol="0">
             <a:spAutoFit/>
           </a:bodyPr>
           <a:lstStyle/>
@@ -3798,6 +3798,129 @@
             <a:r>
               <a:rPr lang="en-US" altLang="zh-CN" dirty="0"/>
               <a:t>Git  -- global information tracker</a:t>
+            </a:r>
+          </a:p>
+          <a:p>
+            <a:endParaRPr lang="en-US" altLang="zh-TW" dirty="0"/>
+          </a:p>
+          <a:p>
+            <a:pPr marL="342900" indent="-342900">
+              <a:buAutoNum type="arabicPeriod" startAt="2"/>
+            </a:pPr>
+            <a:r>
+              <a:rPr lang="en-US" altLang="zh-CN" dirty="0"/>
+              <a:t>Git</a:t>
+            </a:r>
+            <a:r>
+              <a:rPr lang="zh-CN" altLang="en-US" dirty="0"/>
+              <a:t>提交名和引用</a:t>
+            </a:r>
+            <a:endParaRPr lang="en-US" altLang="zh-CN" dirty="0"/>
+          </a:p>
+          <a:p>
+            <a:pPr lvl="1"/>
+            <a:r>
+              <a:rPr lang="zh-CN" altLang="en-US" dirty="0"/>
+              <a:t>絕對提交名</a:t>
+            </a:r>
+            <a:r>
+              <a:rPr lang="en-US" altLang="zh-CN" dirty="0"/>
+              <a:t>:   SHA1</a:t>
+            </a:r>
+          </a:p>
+          <a:p>
+            <a:pPr lvl="1"/>
+            <a:r>
+              <a:rPr lang="zh-CN" altLang="en-US" dirty="0"/>
+              <a:t>引用</a:t>
+            </a:r>
+            <a:r>
+              <a:rPr lang="en-US" altLang="zh-CN" dirty="0"/>
+              <a:t>:  SHA1</a:t>
+            </a:r>
+            <a:r>
+              <a:rPr lang="zh-CN" altLang="en-US" dirty="0"/>
+              <a:t>的散列值</a:t>
+            </a:r>
+            <a:endParaRPr lang="en-US" altLang="zh-CN" dirty="0"/>
+          </a:p>
+          <a:p>
+            <a:pPr lvl="1"/>
+            <a:r>
+              <a:rPr lang="zh-CN" altLang="en-US" dirty="0"/>
+              <a:t>符號引用</a:t>
+            </a:r>
+            <a:r>
+              <a:rPr lang="en-US" altLang="zh-CN" dirty="0"/>
+              <a:t>:   .git/refs/</a:t>
+            </a:r>
+            <a:r>
+              <a:rPr lang="zh-CN" altLang="en-US" dirty="0"/>
+              <a:t>下的文件</a:t>
+            </a:r>
+            <a:endParaRPr lang="en-US" altLang="zh-CN" dirty="0"/>
+          </a:p>
+          <a:p>
+            <a:pPr lvl="1"/>
+            <a:r>
+              <a:rPr lang="zh-CN" altLang="en-US" dirty="0"/>
+              <a:t>絕對提交名</a:t>
+            </a:r>
+            <a:r>
+              <a:rPr lang="en-US" altLang="zh-CN" dirty="0"/>
+              <a:t>:   master^1  master^2</a:t>
+            </a:r>
+            <a:r>
+              <a:rPr lang="zh-CN" altLang="en-US" dirty="0"/>
+              <a:t>代表第一個父提交</a:t>
+            </a:r>
+            <a:r>
+              <a:rPr lang="en-US" altLang="zh-CN" dirty="0"/>
+              <a:t>, </a:t>
+            </a:r>
+            <a:r>
+              <a:rPr lang="zh-CN" altLang="en-US" dirty="0"/>
+              <a:t>第二個父提交</a:t>
+            </a:r>
+            <a:r>
+              <a:rPr lang="en-US" altLang="zh-CN" dirty="0"/>
+              <a:t>, </a:t>
+            </a:r>
+            <a:r>
+              <a:rPr lang="zh-CN" altLang="en-US" dirty="0"/>
+              <a:t>主要用在分支合并之上</a:t>
+            </a:r>
+            <a:endParaRPr lang="en-US" altLang="zh-CN" dirty="0"/>
+          </a:p>
+          <a:p>
+            <a:pPr lvl="1"/>
+            <a:r>
+              <a:rPr lang="en-US" altLang="zh-TW" dirty="0"/>
+              <a:t>                          </a:t>
+            </a:r>
+            <a:r>
+              <a:rPr lang="en-US" altLang="zh-CN" dirty="0"/>
+              <a:t>master^   </a:t>
+            </a:r>
+            <a:r>
+              <a:rPr lang="zh-CN" altLang="en-US" dirty="0"/>
+              <a:t>代表父提交</a:t>
+            </a:r>
+            <a:endParaRPr lang="en-US" altLang="zh-CN" dirty="0"/>
+          </a:p>
+          <a:p>
+            <a:pPr lvl="1"/>
+            <a:r>
+              <a:rPr lang="en-US" altLang="zh-TW" dirty="0"/>
+              <a:t>		</a:t>
+            </a:r>
+            <a:r>
+              <a:rPr lang="en-US" altLang="zh-CN" dirty="0"/>
+              <a:t>master~1  </a:t>
+            </a:r>
+            <a:r>
+              <a:rPr lang="zh-CN" altLang="en-US" dirty="0"/>
+              <a:t>代表前一個提交</a:t>
             </a:r>
             <a:endParaRPr lang="zh-TW" altLang="en-US" dirty="0"/>
           </a:p>
@@ -4035,30 +4158,30 @@
           <a:lstStyle/>
           <a:p>
             <a:r>
-              <a:rPr lang="en-US" altLang="zh-CN" sz="2000" b="1" dirty="0"/>
+              <a:rPr lang="en-US" altLang="zh-CN" sz="2000" b="1" u="sng" dirty="0"/>
               <a:t>git config</a:t>
             </a:r>
             <a:r>
-              <a:rPr lang="zh-CN" altLang="en-US" sz="2000" b="1" dirty="0"/>
+              <a:rPr lang="zh-CN" altLang="en-US" sz="2000" b="1" u="sng" dirty="0"/>
               <a:t>的命令</a:t>
             </a:r>
             <a:r>
-              <a:rPr lang="en-US" altLang="zh-CN" sz="2000" b="1" dirty="0"/>
+              <a:rPr lang="en-US" altLang="zh-CN" sz="2000" b="1" u="sng" dirty="0"/>
               <a:t>-</a:t>
             </a:r>
             <a:r>
-              <a:rPr lang="zh-CN" altLang="en-US" sz="2000" b="1" dirty="0"/>
+              <a:rPr lang="zh-CN" altLang="en-US" sz="2000" b="1" u="sng" dirty="0"/>
               <a:t>配置</a:t>
             </a:r>
             <a:r>
-              <a:rPr lang="en-US" altLang="zh-CN" sz="2000" b="1" dirty="0"/>
+              <a:rPr lang="en-US" altLang="zh-CN" sz="2000" b="1" u="sng" dirty="0"/>
               <a:t>.git/config</a:t>
             </a:r>
             <a:r>
-              <a:rPr lang="zh-CN" altLang="en-US" sz="2000" b="1" dirty="0"/>
+              <a:rPr lang="zh-CN" altLang="en-US" sz="2000" b="1" u="sng" dirty="0"/>
               <a:t>文件</a:t>
             </a:r>
-            <a:endParaRPr lang="zh-TW" altLang="en-US" sz="2000" b="1" dirty="0"/>
+            <a:endParaRPr lang="zh-TW" altLang="en-US" sz="2000" b="1" u="sng" dirty="0"/>
           </a:p>
         </p:txBody>
       </p:sp>
@@ -4315,14 +4438,20 @@
       </p:grpSpPr>
       <p:sp>
         <p:nvSpPr>
-          <p:cNvPr id="4" name="文本框 3"/>
+          <p:cNvPr id="4" name="文字方塊 3">
+            <a:extLst>
+              <a:ext uri="{FF2B5EF4-FFF2-40B4-BE49-F238E27FC236}">
+                <a16:creationId xmlns:a16="http://schemas.microsoft.com/office/drawing/2014/main" id="{EE42E484-788D-46B8-84C5-818D073B92AE}"/>
+              </a:ext>
+            </a:extLst>
+          </p:cNvPr>
           <p:cNvSpPr txBox="1"/>
           <p:nvPr/>
         </p:nvSpPr>
         <p:spPr>
           <a:xfrm>
-            <a:off x="277552" y="225367"/>
-            <a:ext cx="11636895" cy="6463308"/>
+            <a:off x="335023" y="355600"/>
+            <a:ext cx="2530629" cy="400110"/>
           </a:xfrm>
           <a:prstGeom prst="rect">
             <a:avLst/>
@@ -4330,6 +4459,46 @@
           <a:noFill/>
         </p:spPr>
         <p:txBody>
+          <a:bodyPr wrap="none" rtlCol="0">
+            <a:spAutoFit/>
+          </a:bodyPr>
+          <a:lstStyle/>
+          <a:p>
+            <a:r>
+              <a:rPr lang="en-US" altLang="zh-CN" sz="2000" b="1" u="sng" dirty="0"/>
+              <a:t>git branch</a:t>
+            </a:r>
+            <a:r>
+              <a:rPr lang="zh-CN" altLang="en-US" sz="2000" b="1" u="sng" dirty="0"/>
+              <a:t>的相關命令</a:t>
+            </a:r>
+            <a:endParaRPr lang="zh-TW" altLang="en-US" sz="2000" b="1" u="sng" dirty="0"/>
+          </a:p>
+        </p:txBody>
+      </p:sp>
+      <p:sp>
+        <p:nvSpPr>
+          <p:cNvPr id="5" name="文字方塊 4">
+            <a:extLst>
+              <a:ext uri="{FF2B5EF4-FFF2-40B4-BE49-F238E27FC236}">
+                <a16:creationId xmlns:a16="http://schemas.microsoft.com/office/drawing/2014/main" id="{7335B79A-F03E-499E-A7C1-0FE623461237}"/>
+              </a:ext>
+            </a:extLst>
+          </p:cNvPr>
+          <p:cNvSpPr txBox="1"/>
+          <p:nvPr/>
+        </p:nvSpPr>
+        <p:spPr>
+          <a:xfrm>
+            <a:off x="1097280" y="755710"/>
+            <a:ext cx="10383519" cy="5909310"/>
+          </a:xfrm>
+          <a:prstGeom prst="rect">
+            <a:avLst/>
+          </a:prstGeom>
+          <a:noFill/>
+        </p:spPr>
+        <p:txBody>
           <a:bodyPr wrap="square" rtlCol="0">
             <a:spAutoFit/>
           </a:bodyPr>
@@ -4337,11 +4506,72 @@
           <a:p>
             <a:r>
               <a:rPr lang="en-US" altLang="zh-CN" b="1" dirty="0"/>
-              <a:t>git commit</a:t>
+              <a:t>1.</a:t>
             </a:r>
             <a:r>
               <a:rPr lang="zh-CN" altLang="en-US" b="1" dirty="0"/>
-              <a:t>的相關命令</a:t>
+              <a:t>創建分支</a:t>
+            </a:r>
+            <a:endParaRPr lang="en-US" altLang="zh-CN" b="1" dirty="0"/>
+          </a:p>
+          <a:p>
+            <a:r>
+              <a:rPr lang="en-US" altLang="zh-TW" dirty="0"/>
+              <a:t>	</a:t>
+            </a:r>
+            <a:r>
+              <a:rPr lang="en-US" altLang="zh-CN" dirty="0"/>
+              <a:t>git branch </a:t>
+            </a:r>
+            <a:r>
+              <a:rPr lang="zh-CN" altLang="en-US" dirty="0"/>
+              <a:t>分支名</a:t>
+            </a:r>
+            <a:endParaRPr lang="en-US" altLang="zh-CN" dirty="0"/>
+          </a:p>
+          <a:p>
+            <a:endParaRPr lang="en-US" altLang="zh-TW" b="1" dirty="0"/>
+          </a:p>
+          <a:p>
+            <a:r>
+              <a:rPr lang="zh-CN" altLang="en-US" b="1" dirty="0"/>
+              <a:t> </a:t>
+            </a:r>
+            <a:r>
+              <a:rPr lang="en-US" altLang="zh-CN" b="1" dirty="0"/>
+              <a:t>2.</a:t>
+            </a:r>
+            <a:r>
+              <a:rPr lang="zh-CN" altLang="en-US" b="1" dirty="0"/>
+              <a:t>查詢有哪些分支</a:t>
+            </a:r>
+            <a:endParaRPr lang="en-US" altLang="zh-CN" b="1" dirty="0"/>
+          </a:p>
+          <a:p>
+            <a:r>
+              <a:rPr lang="en-US" altLang="zh-TW" dirty="0"/>
+              <a:t>	</a:t>
+            </a:r>
+            <a:r>
+              <a:rPr lang="en-US" altLang="zh-CN" dirty="0"/>
+              <a:t>git branch</a:t>
+            </a:r>
+          </a:p>
+          <a:p>
+            <a:endParaRPr lang="en-US" altLang="zh-CN" dirty="0"/>
+          </a:p>
+          <a:p>
+            <a:r>
+              <a:rPr lang="en-US" altLang="zh-CN" dirty="0"/>
+              <a:t> </a:t>
+            </a:r>
+            <a:r>
+              <a:rPr lang="en-US" altLang="zh-CN" b="1" dirty="0"/>
+              <a:t>3.</a:t>
+            </a:r>
+            <a:r>
+              <a:rPr lang="zh-CN" altLang="en-US" b="1" dirty="0"/>
+              <a:t>查看分支有貢獻的提交</a:t>
             </a:r>
             <a:endParaRPr lang="en-US" altLang="zh-CN" b="1" dirty="0"/>
           </a:p>
@@ -4350,348 +4580,142 @@
               <a:rPr lang="en-US" altLang="zh-CN" b="1" dirty="0"/>
               <a:t>	</a:t>
             </a:r>
+            <a:r>
+              <a:rPr lang="en-US" altLang="zh-CN" dirty="0"/>
+              <a:t>git show-branch</a:t>
+            </a:r>
+          </a:p>
+          <a:p>
+            <a:endParaRPr lang="en-US" altLang="zh-CN" dirty="0"/>
           </a:p>
           <a:p>
             <a:r>
               <a:rPr lang="en-US" altLang="zh-CN" b="1" dirty="0"/>
-              <a:t>	1. </a:t>
+              <a:t>4.</a:t>
             </a:r>
             <a:r>
               <a:rPr lang="zh-CN" altLang="en-US" b="1" dirty="0"/>
-              <a:t>看见代码修改的时间和人</a:t>
+              <a:t>創建並切換到分支</a:t>
             </a:r>
             <a:endParaRPr lang="en-US" altLang="zh-CN" b="1" dirty="0"/>
           </a:p>
           <a:p>
             <a:r>
+              <a:rPr lang="en-US" altLang="zh-CN" dirty="0"/>
+              <a:t>	git checkout –b </a:t>
+            </a:r>
+            <a:r>
+              <a:rPr lang="zh-CN" altLang="en-US" dirty="0"/>
+              <a:t>分支名</a:t>
+            </a:r>
+            <a:endParaRPr lang="en-US" altLang="zh-CN" dirty="0"/>
+          </a:p>
+          <a:p>
+            <a:endParaRPr lang="en-US" altLang="zh-CN" dirty="0"/>
+          </a:p>
+          <a:p>
+            <a:r>
               <a:rPr lang="en-US" altLang="zh-CN" b="1" dirty="0"/>
-              <a:t>	         git blame –L </a:t>
-            </a:r>
-            <a:r>
-              <a:rPr lang="en-US" altLang="zh-CN" b="1" dirty="0" err="1"/>
-              <a:t>m,n</a:t>
-            </a:r>
+              <a:t>5. </a:t>
+            </a:r>
+            <a:r>
+              <a:rPr lang="zh-CN" altLang="en-US" b="1" dirty="0"/>
+              <a:t>切換分支</a:t>
+            </a:r>
+            <a:endParaRPr lang="en-US" altLang="zh-CN" b="1" dirty="0"/>
+          </a:p>
+          <a:p>
+            <a:r>
+              <a:rPr lang="en-US" altLang="zh-CN" dirty="0"/>
+              <a:t>	git checkout </a:t>
+            </a:r>
+            <a:r>
+              <a:rPr lang="zh-CN" altLang="en-US" dirty="0"/>
+              <a:t>分支名</a:t>
+            </a:r>
+            <a:r>
+              <a:rPr lang="en-US" altLang="zh-CN" dirty="0"/>
+              <a:t>, </a:t>
+            </a:r>
+            <a:r>
+              <a:rPr lang="zh-CN" altLang="en-US" dirty="0"/>
+              <a:t>如果内容不冲突會把修改也帶到切換分支</a:t>
+            </a:r>
+            <a:endParaRPr lang="en-US" altLang="zh-CN" dirty="0"/>
+          </a:p>
+          <a:p>
+            <a:endParaRPr lang="en-US" altLang="zh-CN" dirty="0"/>
+          </a:p>
+          <a:p>
             <a:r>
               <a:rPr lang="en-US" altLang="zh-CN" b="1" dirty="0"/>
-              <a:t> </a:t>
+              <a:t>6. </a:t>
             </a:r>
             <a:r>
               <a:rPr lang="zh-CN" altLang="en-US" b="1" dirty="0"/>
-              <a:t>文件名可以， </a:t>
-            </a:r>
-            <a:r>
-              <a:rPr lang="en-US" altLang="zh-CN" b="1" dirty="0" err="1"/>
-              <a:t>m,n</a:t>
+              <a:t>查看另外一個分支文件的内容</a:t>
+            </a:r>
+            <a:endParaRPr lang="en-US" altLang="zh-CN" b="1" dirty="0"/>
+          </a:p>
+          <a:p>
+            <a:r>
+              <a:rPr lang="en-US" altLang="zh-CN" dirty="0"/>
+              <a:t>	git show </a:t>
+            </a:r>
+            <a:r>
+              <a:rPr lang="zh-CN" altLang="en-US" dirty="0"/>
+              <a:t>分支名</a:t>
+            </a:r>
+            <a:r>
+              <a:rPr lang="en-US" altLang="zh-CN" dirty="0"/>
+              <a:t>:</a:t>
+            </a:r>
+            <a:r>
+              <a:rPr lang="zh-CN" altLang="en-US" dirty="0"/>
+              <a:t>文件名</a:t>
+            </a:r>
+            <a:endParaRPr lang="en-US" altLang="zh-CN" dirty="0"/>
+          </a:p>
+          <a:p>
+            <a:endParaRPr lang="en-US" altLang="zh-CN" dirty="0"/>
+          </a:p>
+          <a:p>
+            <a:r>
+              <a:rPr lang="en-US" altLang="zh-CN" b="1" dirty="0"/>
+              <a:t>7. </a:t>
             </a:r>
             <a:r>
               <a:rPr lang="zh-CN" altLang="en-US" b="1" dirty="0"/>
-              <a:t>代表从第几行到第几行</a:t>
+              <a:t>查看远程分支和所有分支信息</a:t>
             </a:r>
             <a:endParaRPr lang="en-US" altLang="zh-CN" b="1" dirty="0"/>
           </a:p>
           <a:p>
-            <a:endParaRPr lang="en-US" altLang="zh-CN" b="1" dirty="0"/>
-          </a:p>
-          <a:p>
-            <a:r>
-              <a:rPr lang="en-US" altLang="zh-CN" b="1" dirty="0"/>
-              <a:t>	2. </a:t>
-            </a:r>
-            <a:r>
-              <a:rPr lang="zh-CN" altLang="en-US" b="1" dirty="0"/>
-              <a:t>查找錯誤提交</a:t>
-            </a:r>
-            <a:endParaRPr lang="en-US" altLang="zh-CN" b="1" dirty="0"/>
-          </a:p>
-          <a:p>
-            <a:r>
-              <a:rPr lang="en-US" altLang="zh-CN" b="1" dirty="0"/>
-              <a:t>	         git bisect start </a:t>
-            </a:r>
-            <a:r>
-              <a:rPr lang="zh-CN" altLang="en-US" b="1" dirty="0"/>
-              <a:t>啓動二分法搜尋</a:t>
-            </a:r>
-            <a:endParaRPr lang="en-US" altLang="zh-CN" b="1" dirty="0"/>
-          </a:p>
-          <a:p>
-            <a:r>
-              <a:rPr lang="en-US" altLang="zh-CN" b="1" dirty="0"/>
-              <a:t>	         git bisect bad   </a:t>
-            </a:r>
-            <a:r>
-              <a:rPr lang="zh-CN" altLang="en-US" b="1" dirty="0"/>
-              <a:t>告訴</a:t>
-            </a:r>
-            <a:r>
-              <a:rPr lang="en-US" altLang="zh-CN" b="1" dirty="0"/>
+            <a:r>
+              <a:rPr lang="en-US" altLang="zh-CN" dirty="0"/>
+              <a:t>	</a:t>
+            </a:r>
+            <a:r>
+              <a:rPr lang="en-US" altLang="zh-CN" dirty="0" err="1"/>
               <a:t>git</a:t>
             </a:r>
             <a:r>
-              <a:rPr lang="zh-CN" altLang="en-US" b="1" dirty="0"/>
-              <a:t>目前</a:t>
-            </a:r>
-            <a:r>
-              <a:rPr lang="en-US" altLang="zh-CN" b="1" dirty="0"/>
-              <a:t>HEAD</a:t>
-            </a:r>
-            <a:r>
-              <a:rPr lang="zh-CN" altLang="en-US" b="1" dirty="0"/>
-              <a:t>指向的版本是壞的</a:t>
-            </a:r>
-            <a:endParaRPr lang="en-US" altLang="zh-CN" b="1" dirty="0"/>
-          </a:p>
-          <a:p>
-            <a:r>
-              <a:rPr lang="en-US" altLang="zh-CN" b="1" dirty="0"/>
-              <a:t>	         git bisect good sha1  </a:t>
-            </a:r>
-            <a:r>
-              <a:rPr lang="zh-CN" altLang="en-US" b="1" dirty="0"/>
-              <a:t>告訴</a:t>
-            </a:r>
-            <a:r>
-              <a:rPr lang="en-US" altLang="zh-CN" b="1" dirty="0"/>
+              <a:rPr lang="en-US" altLang="zh-CN" dirty="0"/>
+              <a:t> branch –r</a:t>
+            </a:r>
+          </a:p>
+          <a:p>
+            <a:r>
+              <a:rPr lang="en-US" altLang="zh-CN" dirty="0"/>
+              <a:t>	</a:t>
+            </a:r>
+            <a:r>
+              <a:rPr lang="en-US" altLang="zh-CN" dirty="0" err="1"/>
               <a:t>git</a:t>
             </a:r>
             <a:r>
-              <a:rPr lang="zh-CN" altLang="en-US" b="1" dirty="0"/>
-              <a:t>目前</a:t>
-            </a:r>
-            <a:r>
-              <a:rPr lang="en-US" altLang="zh-CN" b="1" dirty="0"/>
-              <a:t>HEAD</a:t>
-            </a:r>
-            <a:r>
-              <a:rPr lang="zh-CN" altLang="en-US" b="1" dirty="0"/>
-              <a:t>指向的版本是好的</a:t>
-            </a:r>
-            <a:endParaRPr lang="en-US" altLang="zh-CN" b="1" dirty="0"/>
-          </a:p>
-          <a:p>
-            <a:r>
-              <a:rPr lang="en-US" altLang="zh-CN" b="1" dirty="0"/>
-              <a:t>	         git bisect log   </a:t>
-            </a:r>
-            <a:r>
-              <a:rPr lang="zh-CN" altLang="en-US" b="1" dirty="0"/>
-              <a:t>查看二分法記錄你的回答</a:t>
-            </a:r>
-            <a:endParaRPr lang="en-US" altLang="zh-CN" b="1" dirty="0"/>
-          </a:p>
-          <a:p>
-            <a:r>
-              <a:rPr lang="en-US" altLang="zh-CN" b="1" dirty="0"/>
-              <a:t>	        git bisect reset  </a:t>
-            </a:r>
-            <a:r>
-              <a:rPr lang="zh-CN" altLang="en-US" b="1" dirty="0"/>
-              <a:t>回到原來的分支上面</a:t>
-            </a:r>
-            <a:endParaRPr lang="en-US" altLang="zh-CN" b="1" dirty="0"/>
-          </a:p>
-          <a:p>
-            <a:endParaRPr lang="en-US" altLang="zh-CN" b="1" dirty="0"/>
-          </a:p>
-          <a:p>
-            <a:r>
-              <a:rPr lang="en-US" altLang="zh-CN" b="1" dirty="0"/>
-              <a:t>	 3. </a:t>
-            </a:r>
-            <a:r>
-              <a:rPr lang="zh-CN" altLang="en-US" b="1" dirty="0"/>
-              <a:t>產看歷史提交</a:t>
-            </a:r>
-            <a:endParaRPr lang="en-US" altLang="zh-CN" b="1" dirty="0"/>
-          </a:p>
-          <a:p>
-            <a:r>
-              <a:rPr lang="en-US" altLang="zh-CN" b="1" dirty="0"/>
-              <a:t>		 git log --pretty=short --abbrev-commit HEAD~2..HEAD  </a:t>
-            </a:r>
-            <a:r>
-              <a:rPr lang="en-US" altLang="zh-CN" b="1" dirty="0">
-                <a:sym typeface="Wingdings" panose="05000000000000000000" pitchFamily="2" charset="2"/>
-              </a:rPr>
-              <a:t>  (1)</a:t>
-            </a:r>
-            <a:r>
-              <a:rPr lang="en-US" altLang="zh-CN" b="1" dirty="0"/>
-              <a:t>--pretty=short    </a:t>
-            </a:r>
-            <a:r>
-              <a:rPr lang="zh-CN" altLang="en-US" b="1" dirty="0"/>
-              <a:t>簡單的打印</a:t>
-            </a:r>
-            <a:endParaRPr lang="en-US" altLang="zh-CN" b="1" dirty="0"/>
-          </a:p>
-          <a:p>
-            <a:r>
-              <a:rPr lang="en-US" altLang="zh-CN" b="1" dirty="0">
-                <a:sym typeface="Wingdings" panose="05000000000000000000" pitchFamily="2" charset="2"/>
-              </a:rPr>
-              <a:t>								 (2)--abbrev-commit   SHA1</a:t>
-            </a:r>
-            <a:r>
-              <a:rPr lang="zh-CN" altLang="en-US" b="1" dirty="0">
-                <a:sym typeface="Wingdings" panose="05000000000000000000" pitchFamily="2" charset="2"/>
-              </a:rPr>
-              <a:t>的值進行縮寫</a:t>
-            </a:r>
-            <a:endParaRPr lang="en-US" altLang="zh-CN" b="1" dirty="0">
-              <a:sym typeface="Wingdings" panose="05000000000000000000" pitchFamily="2" charset="2"/>
-            </a:endParaRPr>
-          </a:p>
-          <a:p>
-            <a:r>
-              <a:rPr lang="en-US" altLang="zh-CN" b="1" dirty="0">
-                <a:sym typeface="Wingdings" panose="05000000000000000000" pitchFamily="2" charset="2"/>
-              </a:rPr>
-              <a:t>								 (3)</a:t>
-            </a:r>
-            <a:r>
-              <a:rPr lang="en-US" altLang="zh-CN" b="1" dirty="0"/>
-              <a:t>HEAD~2..HEAD</a:t>
-            </a:r>
-            <a:r>
-              <a:rPr lang="en-US" altLang="zh-CN" b="1" dirty="0">
-                <a:sym typeface="Wingdings" panose="05000000000000000000" pitchFamily="2" charset="2"/>
-              </a:rPr>
-              <a:t>     HEAD</a:t>
-            </a:r>
-            <a:r>
-              <a:rPr lang="zh-CN" altLang="en-US" b="1" dirty="0">
-                <a:sym typeface="Wingdings" panose="05000000000000000000" pitchFamily="2" charset="2"/>
-              </a:rPr>
-              <a:t>指向的</a:t>
-            </a:r>
-            <a:r>
-              <a:rPr lang="en-US" altLang="zh-CN" b="1" dirty="0">
-                <a:sym typeface="Wingdings" panose="05000000000000000000" pitchFamily="2" charset="2"/>
-              </a:rPr>
-              <a:t>commit             </a:t>
-            </a:r>
-          </a:p>
-          <a:p>
-            <a:r>
-              <a:rPr lang="en-US" altLang="zh-CN" b="1" dirty="0">
-                <a:sym typeface="Wingdings" panose="05000000000000000000" pitchFamily="2" charset="2"/>
-              </a:rPr>
-              <a:t>                                                                                                                                                                                  </a:t>
-            </a:r>
-            <a:r>
-              <a:rPr lang="zh-CN" altLang="en-US" b="1" dirty="0">
-                <a:sym typeface="Wingdings" panose="05000000000000000000" pitchFamily="2" charset="2"/>
-              </a:rPr>
-              <a:t>和他前一個指向的 </a:t>
-            </a:r>
-            <a:endParaRPr lang="en-US" altLang="zh-CN" b="1" dirty="0">
-              <a:sym typeface="Wingdings" panose="05000000000000000000" pitchFamily="2" charset="2"/>
-            </a:endParaRPr>
-          </a:p>
-          <a:p>
-            <a:r>
-              <a:rPr lang="en-US" altLang="zh-CN" b="1" dirty="0">
-                <a:sym typeface="Wingdings" panose="05000000000000000000" pitchFamily="2" charset="2"/>
-              </a:rPr>
-              <a:t>                                                                                                                                                                                  commit </a:t>
-            </a:r>
-            <a:endParaRPr lang="en-US" altLang="zh-CN" b="1" dirty="0"/>
-          </a:p>
-          <a:p>
-            <a:r>
-              <a:rPr lang="en-US" altLang="zh-CN" b="1" dirty="0"/>
-              <a:t>	 4. </a:t>
-            </a:r>
-            <a:r>
-              <a:rPr lang="zh-CN" altLang="en-US" b="1" dirty="0"/>
-              <a:t>查看歷史提交詳情</a:t>
-            </a:r>
-            <a:endParaRPr lang="en-US" altLang="zh-CN" b="1" dirty="0"/>
-          </a:p>
-          <a:p>
-            <a:r>
-              <a:rPr lang="en-US" altLang="zh-CN" b="1" dirty="0"/>
-              <a:t>		git log –n –p –stat           </a:t>
-            </a:r>
-            <a:r>
-              <a:rPr lang="en-US" altLang="zh-CN" b="1" dirty="0">
-                <a:sym typeface="Wingdings" panose="05000000000000000000" pitchFamily="2" charset="2"/>
-              </a:rPr>
-              <a:t>     -n</a:t>
-            </a:r>
-            <a:r>
-              <a:rPr lang="zh-CN" altLang="en-US" b="1" dirty="0">
-                <a:sym typeface="Wingdings" panose="05000000000000000000" pitchFamily="2" charset="2"/>
-              </a:rPr>
-              <a:t>輸出的行數， </a:t>
-            </a:r>
-            <a:r>
-              <a:rPr lang="en-US" altLang="zh-CN" b="1" dirty="0">
-                <a:sym typeface="Wingdings" panose="05000000000000000000" pitchFamily="2" charset="2"/>
-              </a:rPr>
-              <a:t>-p</a:t>
-            </a:r>
-            <a:r>
-              <a:rPr lang="zh-CN" altLang="en-US" b="1" dirty="0">
-                <a:sym typeface="Wingdings" panose="05000000000000000000" pitchFamily="2" charset="2"/>
-              </a:rPr>
-              <a:t>詳情包括代碼的修改</a:t>
-            </a:r>
-            <a:r>
-              <a:rPr lang="en-US" altLang="zh-CN" b="1" dirty="0">
-                <a:sym typeface="Wingdings" panose="05000000000000000000" pitchFamily="2" charset="2"/>
-              </a:rPr>
-              <a:t>, </a:t>
-            </a:r>
-            <a:r>
-              <a:rPr lang="zh-CN" altLang="en-US" b="1" dirty="0">
-                <a:sym typeface="Wingdings" panose="05000000000000000000" pitchFamily="2" charset="2"/>
-              </a:rPr>
-              <a:t> </a:t>
-            </a:r>
-            <a:r>
-              <a:rPr lang="en-US" altLang="zh-CN" b="1" dirty="0">
-                <a:sym typeface="Wingdings" panose="05000000000000000000" pitchFamily="2" charset="2"/>
-              </a:rPr>
-              <a:t>–stat</a:t>
-            </a:r>
-            <a:r>
-              <a:rPr lang="zh-CN" altLang="en-US" b="1" dirty="0">
-                <a:sym typeface="Wingdings" panose="05000000000000000000" pitchFamily="2" charset="2"/>
-              </a:rPr>
-              <a:t>文件的修改</a:t>
-            </a:r>
-            <a:endParaRPr lang="en-US" altLang="zh-CN" b="1" dirty="0">
-              <a:sym typeface="Wingdings" panose="05000000000000000000" pitchFamily="2" charset="2"/>
-            </a:endParaRPr>
-          </a:p>
-          <a:p>
-            <a:r>
-              <a:rPr lang="en-US" altLang="zh-CN" b="1" dirty="0">
-                <a:sym typeface="Wingdings" panose="05000000000000000000" pitchFamily="2" charset="2"/>
-              </a:rPr>
-              <a:t>		git show SHA1</a:t>
-            </a:r>
-          </a:p>
-          <a:p>
-            <a:r>
-              <a:rPr lang="en-US" altLang="zh-CN" b="1" dirty="0">
-                <a:sym typeface="Wingdings" panose="05000000000000000000" pitchFamily="2" charset="2"/>
-              </a:rPr>
-              <a:t>	</a:t>
-            </a:r>
-          </a:p>
-          <a:p>
-            <a:r>
-              <a:rPr lang="en-US" altLang="zh-CN" b="1" dirty="0">
-                <a:sym typeface="Wingdings" panose="05000000000000000000" pitchFamily="2" charset="2"/>
-              </a:rPr>
-              <a:t>	</a:t>
-            </a:r>
-            <a:r>
-              <a:rPr lang="en-US" altLang="zh-CN" b="1" dirty="0"/>
-              <a:t>     </a:t>
+              <a:rPr lang="en-US" altLang="zh-CN" dirty="0"/>
+              <a:t> branch –r -a	</a:t>
             </a:r>
           </a:p>
         </p:txBody>
@@ -4699,7 +4723,7 @@
     </p:spTree>
     <p:extLst>
       <p:ext uri="{BB962C8B-B14F-4D97-AF65-F5344CB8AC3E}">
-        <p14:creationId xmlns:p14="http://schemas.microsoft.com/office/powerpoint/2010/main" val="391565664"/>
+        <p14:creationId xmlns:p14="http://schemas.microsoft.com/office/powerpoint/2010/main" val="410421558"/>
       </p:ext>
     </p:extLst>
   </p:cSld>
@@ -4741,7 +4765,7 @@
         <p:spPr>
           <a:xfrm>
             <a:off x="365503" y="355600"/>
-            <a:ext cx="2530629" cy="400110"/>
+            <a:ext cx="3043590" cy="400110"/>
           </a:xfrm>
           <a:prstGeom prst="rect">
             <a:avLst/>
@@ -4755,14 +4779,14 @@
           <a:lstStyle/>
           <a:p>
             <a:r>
-              <a:rPr lang="en-US" altLang="zh-CN" sz="2000" b="1" dirty="0"/>
+              <a:rPr lang="en-US" altLang="zh-CN" sz="2000" b="1" u="sng" dirty="0"/>
               <a:t>git branch</a:t>
             </a:r>
             <a:r>
-              <a:rPr lang="zh-CN" altLang="en-US" sz="2000" b="1" dirty="0"/>
-              <a:t>的相關命令</a:t>
-            </a:r>
-            <a:endParaRPr lang="zh-TW" altLang="en-US" sz="2000" b="1" dirty="0"/>
+              <a:rPr lang="zh-CN" altLang="en-US" sz="2000" b="1" u="sng" dirty="0"/>
+              <a:t>的命令操作分支</a:t>
+            </a:r>
+            <a:endParaRPr lang="zh-TW" altLang="en-US" sz="2000" b="1" u="sng" dirty="0"/>
           </a:p>
         </p:txBody>
       </p:sp>
@@ -4781,7 +4805,7 @@
         <p:spPr>
           <a:xfrm>
             <a:off x="1097280" y="755710"/>
-            <a:ext cx="10383519" cy="5909310"/>
+            <a:ext cx="10383519" cy="369332"/>
           </a:xfrm>
           <a:prstGeom prst="rect">
             <a:avLst/>
@@ -4795,14 +4819,52 @@
           <a:lstStyle/>
           <a:p>
             <a:r>
-              <a:rPr lang="en-US" altLang="zh-CN" b="1" dirty="0"/>
-              <a:t>1.</a:t>
-            </a:r>
-            <a:r>
-              <a:rPr lang="zh-CN" altLang="en-US" b="1" dirty="0"/>
-              <a:t>創建分支</a:t>
-            </a:r>
-            <a:endParaRPr lang="en-US" altLang="zh-CN" b="1" dirty="0"/>
+              <a:rPr lang="en-US" altLang="zh-CN" dirty="0"/>
+              <a:t>	</a:t>
+            </a:r>
+          </a:p>
+        </p:txBody>
+      </p:sp>
+      <p:sp>
+        <p:nvSpPr>
+          <p:cNvPr id="2" name="文字方塊 1">
+            <a:extLst>
+              <a:ext uri="{FF2B5EF4-FFF2-40B4-BE49-F238E27FC236}">
+                <a16:creationId xmlns:a16="http://schemas.microsoft.com/office/drawing/2014/main" id="{705A9098-1D08-426B-9670-C472F103B3ED}"/>
+              </a:ext>
+            </a:extLst>
+          </p:cNvPr>
+          <p:cNvSpPr txBox="1"/>
+          <p:nvPr/>
+        </p:nvSpPr>
+        <p:spPr>
+          <a:xfrm>
+            <a:off x="995680" y="1125042"/>
+            <a:ext cx="5618480" cy="2308324"/>
+          </a:xfrm>
+          <a:prstGeom prst="rect">
+            <a:avLst/>
+          </a:prstGeom>
+          <a:noFill/>
+        </p:spPr>
+        <p:txBody>
+          <a:bodyPr wrap="square" rtlCol="0">
+            <a:spAutoFit/>
+          </a:bodyPr>
+          <a:lstStyle/>
+          <a:p>
+            <a:r>
+              <a:rPr lang="en-US" altLang="zh-CN" dirty="0"/>
+              <a:t>8. </a:t>
+            </a:r>
+            <a:r>
+              <a:rPr lang="zh-CN" altLang="en-US" dirty="0"/>
+              <a:t>展示</a:t>
+            </a:r>
+            <a:r>
+              <a:rPr lang="en-US" altLang="zh-CN" dirty="0"/>
+              <a:t>Branch</a:t>
+            </a:r>
           </a:p>
           <a:p>
             <a:r>
@@ -4810,32 +4872,13 @@
               <a:t>	</a:t>
             </a:r>
             <a:r>
-              <a:rPr lang="en-US" altLang="zh-CN" dirty="0"/>
-              <a:t>git branch </a:t>
-            </a:r>
-            <a:r>
-              <a:rPr lang="zh-CN" altLang="en-US" dirty="0"/>
-              <a:t>分支名</a:t>
-            </a:r>
-            <a:endParaRPr lang="en-US" altLang="zh-CN" dirty="0"/>
-          </a:p>
-          <a:p>
-            <a:endParaRPr lang="en-US" altLang="zh-TW" b="1" dirty="0"/>
-          </a:p>
-          <a:p>
-            <a:r>
-              <a:rPr lang="zh-CN" altLang="en-US" b="1" dirty="0"/>
-              <a:t> </a:t>
-            </a:r>
-            <a:r>
-              <a:rPr lang="en-US" altLang="zh-CN" b="1" dirty="0"/>
-              <a:t>2.</a:t>
-            </a:r>
-            <a:r>
-              <a:rPr lang="zh-CN" altLang="en-US" b="1" dirty="0"/>
-              <a:t>查詢有哪些分支</a:t>
-            </a:r>
-            <a:endParaRPr lang="en-US" altLang="zh-CN" b="1" dirty="0"/>
+              <a:rPr lang="en-US" altLang="zh-TW" dirty="0" err="1"/>
+              <a:t>git</a:t>
+            </a:r>
+            <a:r>
+              <a:rPr lang="en-US" altLang="zh-TW" dirty="0"/>
+              <a:t> show-branch</a:t>
+            </a:r>
           </a:p>
           <a:p>
             <a:r>
@@ -4843,177 +4886,213 @@
               <a:t>	</a:t>
             </a:r>
             <a:r>
-              <a:rPr lang="en-US" altLang="zh-CN" dirty="0"/>
-              <a:t>git branch</a:t>
-            </a:r>
-          </a:p>
-          <a:p>
-            <a:endParaRPr lang="en-US" altLang="zh-CN" dirty="0"/>
-          </a:p>
-          <a:p>
-            <a:r>
-              <a:rPr lang="en-US" altLang="zh-CN" dirty="0"/>
-              <a:t> </a:t>
-            </a:r>
-            <a:r>
-              <a:rPr lang="en-US" altLang="zh-CN" b="1" dirty="0"/>
-              <a:t>3.</a:t>
-            </a:r>
-            <a:r>
-              <a:rPr lang="zh-CN" altLang="en-US" b="1" dirty="0"/>
-              <a:t>查看分支有貢獻的提交</a:t>
-            </a:r>
-            <a:endParaRPr lang="en-US" altLang="zh-CN" b="1" dirty="0"/>
-          </a:p>
-          <a:p>
-            <a:r>
-              <a:rPr lang="en-US" altLang="zh-CN" b="1" dirty="0"/>
-              <a:t>	</a:t>
-            </a:r>
-            <a:r>
-              <a:rPr lang="en-US" altLang="zh-CN" dirty="0"/>
-              <a:t>git show-branch</a:t>
-            </a:r>
-          </a:p>
-          <a:p>
-            <a:endParaRPr lang="en-US" altLang="zh-CN" dirty="0"/>
-          </a:p>
-          <a:p>
-            <a:r>
-              <a:rPr lang="en-US" altLang="zh-CN" b="1" dirty="0"/>
-              <a:t>4.</a:t>
-            </a:r>
-            <a:r>
-              <a:rPr lang="zh-CN" altLang="en-US" b="1" dirty="0"/>
-              <a:t>創建並切換到分支</a:t>
-            </a:r>
-            <a:endParaRPr lang="en-US" altLang="zh-CN" b="1" dirty="0"/>
-          </a:p>
-          <a:p>
-            <a:r>
-              <a:rPr lang="en-US" altLang="zh-CN" dirty="0"/>
-              <a:t>	git checkout –b </a:t>
-            </a:r>
-            <a:r>
-              <a:rPr lang="zh-CN" altLang="en-US" dirty="0"/>
-              <a:t>分支名</a:t>
-            </a:r>
-            <a:endParaRPr lang="en-US" altLang="zh-CN" dirty="0"/>
-          </a:p>
-          <a:p>
-            <a:endParaRPr lang="en-US" altLang="zh-CN" dirty="0"/>
-          </a:p>
-          <a:p>
-            <a:r>
-              <a:rPr lang="en-US" altLang="zh-CN" b="1" dirty="0"/>
-              <a:t>5. </a:t>
-            </a:r>
-            <a:r>
-              <a:rPr lang="zh-CN" altLang="en-US" b="1" dirty="0"/>
-              <a:t>切換分支</a:t>
-            </a:r>
-            <a:endParaRPr lang="en-US" altLang="zh-CN" b="1" dirty="0"/>
-          </a:p>
-          <a:p>
-            <a:r>
-              <a:rPr lang="en-US" altLang="zh-CN" dirty="0"/>
-              <a:t>	git checkout </a:t>
-            </a:r>
-            <a:r>
-              <a:rPr lang="zh-CN" altLang="en-US" dirty="0"/>
-              <a:t>分支名</a:t>
-            </a:r>
-            <a:r>
-              <a:rPr lang="en-US" altLang="zh-CN" dirty="0"/>
-              <a:t>, </a:t>
-            </a:r>
-            <a:r>
-              <a:rPr lang="zh-CN" altLang="en-US" dirty="0"/>
-              <a:t>如果内容不冲突會把修改也帶到切換分支</a:t>
-            </a:r>
-            <a:endParaRPr lang="en-US" altLang="zh-CN" dirty="0"/>
-          </a:p>
-          <a:p>
-            <a:endParaRPr lang="en-US" altLang="zh-CN" dirty="0"/>
-          </a:p>
-          <a:p>
-            <a:r>
-              <a:rPr lang="en-US" altLang="zh-CN" b="1" dirty="0"/>
-              <a:t>6. </a:t>
-            </a:r>
-            <a:r>
-              <a:rPr lang="zh-CN" altLang="en-US" b="1" dirty="0"/>
-              <a:t>查看另外一個分支文件的内容</a:t>
-            </a:r>
-            <a:endParaRPr lang="en-US" altLang="zh-CN" b="1" dirty="0"/>
-          </a:p>
-          <a:p>
-            <a:r>
-              <a:rPr lang="en-US" altLang="zh-CN" dirty="0"/>
-              <a:t>	git show </a:t>
-            </a:r>
-            <a:r>
-              <a:rPr lang="zh-CN" altLang="en-US" dirty="0"/>
-              <a:t>分支名</a:t>
-            </a:r>
-            <a:r>
-              <a:rPr lang="en-US" altLang="zh-CN" dirty="0"/>
-              <a:t>:</a:t>
-            </a:r>
-            <a:r>
-              <a:rPr lang="zh-CN" altLang="en-US" dirty="0"/>
-              <a:t>文件名</a:t>
-            </a:r>
-            <a:endParaRPr lang="en-US" altLang="zh-CN" dirty="0"/>
-          </a:p>
-          <a:p>
-            <a:endParaRPr lang="en-US" altLang="zh-CN" dirty="0"/>
-          </a:p>
-          <a:p>
-            <a:r>
-              <a:rPr lang="en-US" altLang="zh-CN" b="1" dirty="0"/>
-              <a:t>7. </a:t>
-            </a:r>
-            <a:r>
-              <a:rPr lang="zh-CN" altLang="en-US" b="1" dirty="0"/>
-              <a:t>查看远程分支和所有分支信息</a:t>
-            </a:r>
-            <a:endParaRPr lang="en-US" altLang="zh-CN" b="1" dirty="0"/>
-          </a:p>
-          <a:p>
-            <a:r>
-              <a:rPr lang="en-US" altLang="zh-CN" dirty="0"/>
-              <a:t>	</a:t>
-            </a:r>
-            <a:r>
               <a:rPr lang="en-US" altLang="zh-CN" dirty="0" err="1"/>
               <a:t>git</a:t>
             </a:r>
             <a:r>
               <a:rPr lang="en-US" altLang="zh-CN" dirty="0"/>
-              <a:t> branch –r</a:t>
-            </a:r>
-          </a:p>
-          <a:p>
-            <a:r>
-              <a:rPr lang="en-US" altLang="zh-CN" dirty="0"/>
+              <a:t> show-branch –more=</a:t>
+            </a:r>
+            <a:r>
+              <a:rPr lang="zh-CN" altLang="en-US" dirty="0"/>
+              <a:t>数量</a:t>
+            </a:r>
+            <a:endParaRPr lang="en-US" altLang="zh-TW" dirty="0"/>
+          </a:p>
+          <a:p>
+            <a:r>
+              <a:rPr lang="en-US" altLang="zh-TW" dirty="0"/>
+              <a:t>	--</a:t>
+            </a:r>
+            <a:r>
+              <a:rPr lang="zh-CN" altLang="en-US" dirty="0"/>
+              <a:t>符號以上代表</a:t>
+            </a:r>
+            <a:r>
+              <a:rPr lang="en-US" altLang="zh-CN" dirty="0"/>
+              <a:t>branch</a:t>
+            </a:r>
+          </a:p>
+          <a:p>
+            <a:r>
+              <a:rPr lang="en-US" altLang="zh-TW" dirty="0"/>
               <a:t>	</a:t>
             </a:r>
             <a:r>
-              <a:rPr lang="en-US" altLang="zh-CN" dirty="0" err="1"/>
-              <a:t>git</a:t>
-            </a:r>
-            <a:r>
-              <a:rPr lang="en-US" altLang="zh-CN" dirty="0"/>
-              <a:t> branch –r -a	</a:t>
-            </a:r>
+              <a:rPr lang="en-US" altLang="zh-CN" dirty="0"/>
+              <a:t>--</a:t>
+            </a:r>
+            <a:r>
+              <a:rPr lang="zh-CN" altLang="en-US" dirty="0"/>
+              <a:t>符號以下代表提交的</a:t>
+            </a:r>
+            <a:r>
+              <a:rPr lang="en-US" altLang="zh-CN" dirty="0"/>
+              <a:t>log</a:t>
+            </a:r>
+            <a:r>
+              <a:rPr lang="zh-CN" altLang="en-US" dirty="0"/>
+              <a:t>信息</a:t>
+            </a:r>
+            <a:endParaRPr lang="en-US" altLang="zh-TW" dirty="0"/>
+          </a:p>
+          <a:p>
+            <a:r>
+              <a:rPr lang="en-US" altLang="zh-TW" dirty="0"/>
+              <a:t>	</a:t>
+            </a:r>
+            <a:r>
+              <a:rPr lang="en-US" altLang="zh-CN" dirty="0"/>
+              <a:t>+ </a:t>
+            </a:r>
+            <a:r>
+              <a:rPr lang="zh-CN" altLang="en-US" dirty="0"/>
+              <a:t>代表提交在哪一個分支當中</a:t>
+            </a:r>
+            <a:endParaRPr lang="en-US" altLang="zh-CN" dirty="0"/>
+          </a:p>
+          <a:p>
+            <a:r>
+              <a:rPr lang="en-US" altLang="zh-TW" dirty="0"/>
+              <a:t>                  </a:t>
+            </a:r>
+            <a:r>
+              <a:rPr lang="en-US" altLang="zh-CN" dirty="0"/>
+              <a:t>- </a:t>
+            </a:r>
+            <a:r>
+              <a:rPr lang="zh-CN" altLang="en-US" dirty="0"/>
+              <a:t>代表合并提交</a:t>
+            </a:r>
+            <a:endParaRPr lang="en-US" altLang="zh-CN" dirty="0"/>
+          </a:p>
+          <a:p>
+            <a:r>
+              <a:rPr lang="en-US" altLang="zh-TW" dirty="0"/>
+              <a:t>                 </a:t>
+            </a:r>
+            <a:r>
+              <a:rPr lang="zh-CN" altLang="en-US" dirty="0"/>
+              <a:t>* 代表存在于活動分支的提交</a:t>
+            </a:r>
+            <a:endParaRPr lang="zh-TW" altLang="en-US" dirty="0"/>
+          </a:p>
+        </p:txBody>
+      </p:sp>
+      <p:pic>
+        <p:nvPicPr>
+          <p:cNvPr id="8" name="圖片 7">
+            <a:extLst>
+              <a:ext uri="{FF2B5EF4-FFF2-40B4-BE49-F238E27FC236}">
+                <a16:creationId xmlns:a16="http://schemas.microsoft.com/office/drawing/2014/main" id="{E25375C7-CDC0-469F-B0A3-AB1EA038A7A6}"/>
+              </a:ext>
+            </a:extLst>
+          </p:cNvPr>
+          <p:cNvPicPr>
+            <a:picLocks noChangeAspect="1"/>
+          </p:cNvPicPr>
+          <p:nvPr/>
+        </p:nvPicPr>
+        <p:blipFill>
+          <a:blip r:embed="rId2">
+            <a:extLst>
+              <a:ext uri="{28A0092B-C50C-407E-A947-70E740481C1C}">
+                <a14:useLocalDpi xmlns:a14="http://schemas.microsoft.com/office/drawing/2010/main" val="0"/>
+              </a:ext>
+            </a:extLst>
+          </a:blip>
+          <a:stretch>
+            <a:fillRect/>
+          </a:stretch>
+        </p:blipFill>
+        <p:spPr>
+          <a:xfrm>
+            <a:off x="1469304" y="3433366"/>
+            <a:ext cx="5052117" cy="2247299"/>
+          </a:xfrm>
+          <a:prstGeom prst="rect">
+            <a:avLst/>
+          </a:prstGeom>
+        </p:spPr>
+      </p:pic>
+      <p:sp>
+        <p:nvSpPr>
+          <p:cNvPr id="9" name="文字方塊 8">
+            <a:extLst>
+              <a:ext uri="{FF2B5EF4-FFF2-40B4-BE49-F238E27FC236}">
+                <a16:creationId xmlns:a16="http://schemas.microsoft.com/office/drawing/2014/main" id="{5FAB5A54-BBE1-4721-A93D-ABA7C212CCBE}"/>
+              </a:ext>
+            </a:extLst>
+          </p:cNvPr>
+          <p:cNvSpPr txBox="1"/>
+          <p:nvPr/>
+        </p:nvSpPr>
+        <p:spPr>
+          <a:xfrm>
+            <a:off x="6868160" y="3433366"/>
+            <a:ext cx="4876800" cy="1200329"/>
+          </a:xfrm>
+          <a:prstGeom prst="rect">
+            <a:avLst/>
+          </a:prstGeom>
+          <a:noFill/>
+        </p:spPr>
+        <p:txBody>
+          <a:bodyPr wrap="square" rtlCol="0">
+            <a:spAutoFit/>
+          </a:bodyPr>
+          <a:lstStyle/>
+          <a:p>
+            <a:r>
+              <a:rPr lang="zh-CN" altLang="en-US" dirty="0"/>
+              <a:t>紅色對應紅色</a:t>
+            </a:r>
+            <a:r>
+              <a:rPr lang="en-US" altLang="zh-CN" dirty="0"/>
+              <a:t>, </a:t>
+            </a:r>
+            <a:r>
+              <a:rPr lang="zh-CN" altLang="en-US" dirty="0"/>
+              <a:t>綠色對應綠色</a:t>
+            </a:r>
+            <a:endParaRPr lang="en-US" altLang="zh-CN" dirty="0"/>
+          </a:p>
+          <a:p>
+            <a:endParaRPr lang="en-US" altLang="zh-TW" dirty="0"/>
+          </a:p>
+          <a:p>
+            <a:r>
+              <a:rPr lang="zh-CN" altLang="en-US" dirty="0"/>
+              <a:t>一般這條命令只有顯示到共同擁有的版本庫當中</a:t>
+            </a:r>
+            <a:r>
+              <a:rPr lang="en-US" altLang="zh-CN" dirty="0"/>
+              <a:t>, </a:t>
+            </a:r>
+            <a:r>
+              <a:rPr lang="zh-CN" altLang="en-US" dirty="0"/>
+              <a:t>如果顯示更多加上</a:t>
+            </a:r>
+            <a:r>
+              <a:rPr lang="en-US" altLang="zh-CN" dirty="0"/>
+              <a:t>”--more=</a:t>
+            </a:r>
+            <a:r>
+              <a:rPr lang="zh-CN" altLang="en-US" dirty="0"/>
+              <a:t>數量</a:t>
+            </a:r>
+            <a:r>
+              <a:rPr lang="en-US" altLang="zh-CN" dirty="0"/>
+              <a:t>“</a:t>
+            </a:r>
+            <a:endParaRPr lang="zh-TW" altLang="en-US" dirty="0"/>
           </a:p>
         </p:txBody>
       </p:sp>
     </p:spTree>
     <p:extLst>
       <p:ext uri="{BB962C8B-B14F-4D97-AF65-F5344CB8AC3E}">
-        <p14:creationId xmlns:p14="http://schemas.microsoft.com/office/powerpoint/2010/main" val="410421558"/>
+        <p14:creationId xmlns:p14="http://schemas.microsoft.com/office/powerpoint/2010/main" val="2151625063"/>
       </p:ext>
     </p:extLst>
   </p:cSld>
@@ -5042,20 +5121,14 @@
       </p:grpSpPr>
       <p:sp>
         <p:nvSpPr>
-          <p:cNvPr id="4" name="文字方塊 3">
-            <a:extLst>
-              <a:ext uri="{FF2B5EF4-FFF2-40B4-BE49-F238E27FC236}">
-                <a16:creationId xmlns:a16="http://schemas.microsoft.com/office/drawing/2014/main" id="{EE42E484-788D-46B8-84C5-818D073B92AE}"/>
-              </a:ext>
-            </a:extLst>
-          </p:cNvPr>
+          <p:cNvPr id="4" name="文本框 3"/>
           <p:cNvSpPr txBox="1"/>
           <p:nvPr/>
         </p:nvSpPr>
         <p:spPr>
           <a:xfrm>
-            <a:off x="365503" y="355600"/>
-            <a:ext cx="3043590" cy="400110"/>
+            <a:off x="277552" y="225367"/>
+            <a:ext cx="11636895" cy="6555641"/>
           </a:xfrm>
           <a:prstGeom prst="rect">
             <a:avLst/>
@@ -5063,326 +5136,376 @@
           <a:noFill/>
         </p:spPr>
         <p:txBody>
-          <a:bodyPr wrap="none" rtlCol="0">
-            <a:spAutoFit/>
-          </a:bodyPr>
-          <a:lstStyle/>
-          <a:p>
-            <a:r>
-              <a:rPr lang="en-US" altLang="zh-CN" sz="2000" b="1" dirty="0"/>
-              <a:t>git branch</a:t>
-            </a:r>
-            <a:r>
-              <a:rPr lang="zh-CN" altLang="en-US" sz="2000" b="1" dirty="0"/>
-              <a:t>的命令操作分支</a:t>
-            </a:r>
-            <a:endParaRPr lang="zh-TW" altLang="en-US" sz="2000" b="1" dirty="0"/>
-          </a:p>
-        </p:txBody>
-      </p:sp>
-      <p:sp>
-        <p:nvSpPr>
-          <p:cNvPr id="5" name="文字方塊 4">
-            <a:extLst>
-              <a:ext uri="{FF2B5EF4-FFF2-40B4-BE49-F238E27FC236}">
-                <a16:creationId xmlns:a16="http://schemas.microsoft.com/office/drawing/2014/main" id="{7335B79A-F03E-499E-A7C1-0FE623461237}"/>
-              </a:ext>
-            </a:extLst>
-          </p:cNvPr>
-          <p:cNvSpPr txBox="1"/>
-          <p:nvPr/>
-        </p:nvSpPr>
-        <p:spPr>
-          <a:xfrm>
-            <a:off x="1097280" y="755710"/>
-            <a:ext cx="10383519" cy="369332"/>
-          </a:xfrm>
-          <a:prstGeom prst="rect">
-            <a:avLst/>
-          </a:prstGeom>
-          <a:noFill/>
-        </p:spPr>
-        <p:txBody>
           <a:bodyPr wrap="square" rtlCol="0">
             <a:spAutoFit/>
           </a:bodyPr>
           <a:lstStyle/>
           <a:p>
             <a:r>
-              <a:rPr lang="en-US" altLang="zh-CN" dirty="0"/>
+              <a:rPr lang="en-US" altLang="zh-CN" sz="2400" b="1" u="sng" dirty="0"/>
+              <a:t>git commit</a:t>
+            </a:r>
+            <a:r>
+              <a:rPr lang="zh-CN" altLang="en-US" sz="2400" b="1" u="sng" dirty="0"/>
+              <a:t>的相關命令</a:t>
+            </a:r>
+            <a:endParaRPr lang="en-US" altLang="zh-CN" sz="2400" b="1" u="sng" dirty="0"/>
+          </a:p>
+          <a:p>
+            <a:r>
+              <a:rPr lang="en-US" altLang="zh-CN" b="1" dirty="0"/>
               <a:t>	</a:t>
             </a:r>
           </a:p>
-        </p:txBody>
-      </p:sp>
-      <p:sp>
-        <p:nvSpPr>
-          <p:cNvPr id="2" name="文字方塊 1">
-            <a:extLst>
-              <a:ext uri="{FF2B5EF4-FFF2-40B4-BE49-F238E27FC236}">
-                <a16:creationId xmlns:a16="http://schemas.microsoft.com/office/drawing/2014/main" id="{705A9098-1D08-426B-9670-C472F103B3ED}"/>
-              </a:ext>
-            </a:extLst>
-          </p:cNvPr>
-          <p:cNvSpPr txBox="1"/>
-          <p:nvPr/>
-        </p:nvSpPr>
-        <p:spPr>
-          <a:xfrm>
-            <a:off x="995680" y="1125042"/>
-            <a:ext cx="5618480" cy="2308324"/>
-          </a:xfrm>
-          <a:prstGeom prst="rect">
-            <a:avLst/>
-          </a:prstGeom>
-          <a:noFill/>
-        </p:spPr>
-        <p:txBody>
-          <a:bodyPr wrap="square" rtlCol="0">
-            <a:spAutoFit/>
-          </a:bodyPr>
-          <a:lstStyle/>
-          <a:p>
-            <a:r>
-              <a:rPr lang="en-US" altLang="zh-CN" dirty="0"/>
-              <a:t>8. </a:t>
-            </a:r>
-            <a:r>
-              <a:rPr lang="zh-CN" altLang="en-US" dirty="0"/>
-              <a:t>展示</a:t>
-            </a:r>
-            <a:r>
-              <a:rPr lang="en-US" altLang="zh-CN" dirty="0"/>
-              <a:t>Branch</a:t>
-            </a:r>
-          </a:p>
-          <a:p>
-            <a:r>
-              <a:rPr lang="en-US" altLang="zh-TW" dirty="0"/>
+          <a:p>
+            <a:r>
+              <a:rPr lang="en-US" altLang="zh-CN" b="1" dirty="0"/>
+              <a:t>	1. </a:t>
+            </a:r>
+            <a:r>
+              <a:rPr lang="zh-CN" altLang="en-US" b="1" dirty="0"/>
+              <a:t>看见代码修改的时间和人</a:t>
+            </a:r>
+            <a:endParaRPr lang="en-US" altLang="zh-CN" b="1" dirty="0"/>
+          </a:p>
+          <a:p>
+            <a:r>
+              <a:rPr lang="en-US" altLang="zh-CN" b="1" dirty="0"/>
+              <a:t>	         git blame –L </a:t>
+            </a:r>
+            <a:r>
+              <a:rPr lang="en-US" altLang="zh-CN" b="1" dirty="0" err="1"/>
+              <a:t>m,n</a:t>
+            </a:r>
+            <a:r>
+              <a:rPr lang="en-US" altLang="zh-CN" b="1" dirty="0"/>
+              <a:t> </a:t>
+            </a:r>
+            <a:r>
+              <a:rPr lang="zh-CN" altLang="en-US" b="1" dirty="0"/>
+              <a:t>文件名可以， </a:t>
+            </a:r>
+            <a:r>
+              <a:rPr lang="en-US" altLang="zh-CN" b="1" dirty="0" err="1"/>
+              <a:t>m,n</a:t>
+            </a:r>
+            <a:r>
+              <a:rPr lang="zh-CN" altLang="en-US" b="1" dirty="0"/>
+              <a:t>代表从第几行到第几行</a:t>
+            </a:r>
+            <a:endParaRPr lang="en-US" altLang="zh-CN" b="1" dirty="0"/>
+          </a:p>
+          <a:p>
+            <a:endParaRPr lang="en-US" altLang="zh-CN" b="1" dirty="0"/>
+          </a:p>
+          <a:p>
+            <a:r>
+              <a:rPr lang="en-US" altLang="zh-CN" b="1" dirty="0"/>
+              <a:t>	2. </a:t>
+            </a:r>
+            <a:r>
+              <a:rPr lang="zh-CN" altLang="en-US" b="1" dirty="0"/>
+              <a:t>查找錯誤提交</a:t>
+            </a:r>
+            <a:endParaRPr lang="en-US" altLang="zh-CN" b="1" dirty="0"/>
+          </a:p>
+          <a:p>
+            <a:r>
+              <a:rPr lang="en-US" altLang="zh-CN" b="1" dirty="0"/>
+              <a:t>	         git bisect start </a:t>
+            </a:r>
+            <a:r>
+              <a:rPr lang="zh-CN" altLang="en-US" b="1" dirty="0"/>
+              <a:t>啓動二分法搜尋</a:t>
+            </a:r>
+            <a:endParaRPr lang="en-US" altLang="zh-CN" b="1" dirty="0"/>
+          </a:p>
+          <a:p>
+            <a:r>
+              <a:rPr lang="en-US" altLang="zh-CN" b="1" dirty="0"/>
+              <a:t>	         git bisect bad   </a:t>
+            </a:r>
+            <a:r>
+              <a:rPr lang="zh-CN" altLang="en-US" b="1" dirty="0"/>
+              <a:t>告訴</a:t>
+            </a:r>
+            <a:r>
+              <a:rPr lang="en-US" altLang="zh-CN" b="1" dirty="0"/>
+              <a:t>git</a:t>
+            </a:r>
+            <a:r>
+              <a:rPr lang="zh-CN" altLang="en-US" b="1" dirty="0"/>
+              <a:t>目前</a:t>
+            </a:r>
+            <a:r>
+              <a:rPr lang="en-US" altLang="zh-CN" b="1" dirty="0"/>
+              <a:t>HEAD</a:t>
+            </a:r>
+            <a:r>
+              <a:rPr lang="zh-CN" altLang="en-US" b="1" dirty="0"/>
+              <a:t>指向的版本是壞的</a:t>
+            </a:r>
+            <a:endParaRPr lang="en-US" altLang="zh-CN" b="1" dirty="0"/>
+          </a:p>
+          <a:p>
+            <a:r>
+              <a:rPr lang="en-US" altLang="zh-CN" b="1" dirty="0"/>
+              <a:t>	         git bisect good sha1  </a:t>
+            </a:r>
+            <a:r>
+              <a:rPr lang="zh-CN" altLang="en-US" b="1" dirty="0"/>
+              <a:t>告訴</a:t>
+            </a:r>
+            <a:r>
+              <a:rPr lang="en-US" altLang="zh-CN" b="1" dirty="0"/>
+              <a:t>git</a:t>
+            </a:r>
+            <a:r>
+              <a:rPr lang="zh-CN" altLang="en-US" b="1" dirty="0"/>
+              <a:t>目前</a:t>
+            </a:r>
+            <a:r>
+              <a:rPr lang="en-US" altLang="zh-CN" b="1" dirty="0"/>
+              <a:t>HEAD</a:t>
+            </a:r>
+            <a:r>
+              <a:rPr lang="zh-CN" altLang="en-US" b="1" dirty="0"/>
+              <a:t>指向的版本是好的</a:t>
+            </a:r>
+            <a:endParaRPr lang="en-US" altLang="zh-CN" b="1" dirty="0"/>
+          </a:p>
+          <a:p>
+            <a:r>
+              <a:rPr lang="en-US" altLang="zh-CN" b="1" dirty="0"/>
+              <a:t>	         git bisect log   </a:t>
+            </a:r>
+            <a:r>
+              <a:rPr lang="zh-CN" altLang="en-US" b="1" dirty="0"/>
+              <a:t>查看二分法記錄你的回答</a:t>
+            </a:r>
+            <a:endParaRPr lang="en-US" altLang="zh-CN" b="1" dirty="0"/>
+          </a:p>
+          <a:p>
+            <a:r>
+              <a:rPr lang="en-US" altLang="zh-CN" b="1" dirty="0"/>
+              <a:t>	        git bisect reset  </a:t>
+            </a:r>
+            <a:r>
+              <a:rPr lang="zh-CN" altLang="en-US" b="1" dirty="0"/>
+              <a:t>回到原來的分支上面</a:t>
+            </a:r>
+            <a:endParaRPr lang="en-US" altLang="zh-CN" b="1" dirty="0"/>
+          </a:p>
+          <a:p>
+            <a:endParaRPr lang="en-US" altLang="zh-CN" b="1" dirty="0"/>
+          </a:p>
+          <a:p>
+            <a:r>
+              <a:rPr lang="en-US" altLang="zh-CN" b="1" dirty="0"/>
+              <a:t>	 3. </a:t>
+            </a:r>
+            <a:r>
+              <a:rPr lang="zh-CN" altLang="en-US" b="1" dirty="0"/>
+              <a:t>產看歷史提交</a:t>
+            </a:r>
+            <a:endParaRPr lang="en-US" altLang="zh-CN" b="1" dirty="0"/>
+          </a:p>
+          <a:p>
+            <a:r>
+              <a:rPr lang="en-US" altLang="zh-CN" b="1" dirty="0"/>
+              <a:t>		 git log --pretty=short --abbrev-commit HEAD~2..HEAD  </a:t>
+            </a:r>
+            <a:r>
+              <a:rPr lang="en-US" altLang="zh-CN" b="1" dirty="0">
+                <a:sym typeface="Wingdings" panose="05000000000000000000" pitchFamily="2" charset="2"/>
+              </a:rPr>
+              <a:t>  (1)</a:t>
+            </a:r>
+            <a:r>
+              <a:rPr lang="en-US" altLang="zh-CN" b="1" dirty="0"/>
+              <a:t>--pretty=short    </a:t>
+            </a:r>
+            <a:r>
+              <a:rPr lang="zh-CN" altLang="en-US" b="1" dirty="0"/>
+              <a:t>簡單的打印</a:t>
+            </a:r>
+            <a:endParaRPr lang="en-US" altLang="zh-CN" b="1" dirty="0"/>
+          </a:p>
+          <a:p>
+            <a:r>
+              <a:rPr lang="en-US" altLang="zh-CN" b="1" dirty="0">
+                <a:sym typeface="Wingdings" panose="05000000000000000000" pitchFamily="2" charset="2"/>
+              </a:rPr>
+              <a:t>								 (2)--abbrev-commit   SHA1</a:t>
+            </a:r>
+            <a:r>
+              <a:rPr lang="zh-CN" altLang="en-US" b="1" dirty="0">
+                <a:sym typeface="Wingdings" panose="05000000000000000000" pitchFamily="2" charset="2"/>
+              </a:rPr>
+              <a:t>的值進行縮寫</a:t>
+            </a:r>
+            <a:endParaRPr lang="en-US" altLang="zh-CN" b="1" dirty="0">
+              <a:sym typeface="Wingdings" panose="05000000000000000000" pitchFamily="2" charset="2"/>
+            </a:endParaRPr>
+          </a:p>
+          <a:p>
+            <a:r>
+              <a:rPr lang="en-US" altLang="zh-CN" b="1" dirty="0">
+                <a:sym typeface="Wingdings" panose="05000000000000000000" pitchFamily="2" charset="2"/>
+              </a:rPr>
+              <a:t>								 (3)</a:t>
+            </a:r>
+            <a:r>
+              <a:rPr lang="en-US" altLang="zh-CN" b="1" dirty="0"/>
+              <a:t>HEAD~2..HEAD</a:t>
+            </a:r>
+            <a:r>
+              <a:rPr lang="en-US" altLang="zh-CN" b="1" dirty="0">
+                <a:sym typeface="Wingdings" panose="05000000000000000000" pitchFamily="2" charset="2"/>
+              </a:rPr>
+              <a:t>     HEAD</a:t>
+            </a:r>
+            <a:r>
+              <a:rPr lang="zh-CN" altLang="en-US" b="1" dirty="0">
+                <a:sym typeface="Wingdings" panose="05000000000000000000" pitchFamily="2" charset="2"/>
+              </a:rPr>
+              <a:t>指向的</a:t>
+            </a:r>
+            <a:r>
+              <a:rPr lang="en-US" altLang="zh-CN" b="1" dirty="0">
+                <a:sym typeface="Wingdings" panose="05000000000000000000" pitchFamily="2" charset="2"/>
+              </a:rPr>
+              <a:t>commit             </a:t>
+            </a:r>
+          </a:p>
+          <a:p>
+            <a:r>
+              <a:rPr lang="en-US" altLang="zh-CN" b="1" dirty="0">
+                <a:sym typeface="Wingdings" panose="05000000000000000000" pitchFamily="2" charset="2"/>
+              </a:rPr>
+              <a:t>                                                                                                                                                                                  </a:t>
+            </a:r>
+            <a:r>
+              <a:rPr lang="zh-CN" altLang="en-US" b="1" dirty="0">
+                <a:sym typeface="Wingdings" panose="05000000000000000000" pitchFamily="2" charset="2"/>
+              </a:rPr>
+              <a:t>和他前一個指向的 </a:t>
+            </a:r>
+            <a:endParaRPr lang="en-US" altLang="zh-CN" b="1" dirty="0">
+              <a:sym typeface="Wingdings" panose="05000000000000000000" pitchFamily="2" charset="2"/>
+            </a:endParaRPr>
+          </a:p>
+          <a:p>
+            <a:r>
+              <a:rPr lang="en-US" altLang="zh-CN" b="1" dirty="0">
+                <a:sym typeface="Wingdings" panose="05000000000000000000" pitchFamily="2" charset="2"/>
+              </a:rPr>
+              <a:t>                                                                                                                                                                                  commit </a:t>
+            </a:r>
+            <a:endParaRPr lang="en-US" altLang="zh-CN" b="1" dirty="0"/>
+          </a:p>
+          <a:p>
+            <a:r>
+              <a:rPr lang="en-US" altLang="zh-CN" b="1" dirty="0"/>
+              <a:t>	 4. </a:t>
+            </a:r>
+            <a:r>
+              <a:rPr lang="zh-CN" altLang="en-US" b="1" dirty="0"/>
+              <a:t>查看歷史提交詳情</a:t>
+            </a:r>
+            <a:endParaRPr lang="en-US" altLang="zh-CN" b="1" dirty="0"/>
+          </a:p>
+          <a:p>
+            <a:r>
+              <a:rPr lang="en-US" altLang="zh-CN" b="1" dirty="0"/>
+              <a:t>		git log –n –p –stat           </a:t>
+            </a:r>
+            <a:r>
+              <a:rPr lang="en-US" altLang="zh-CN" b="1" dirty="0">
+                <a:sym typeface="Wingdings" panose="05000000000000000000" pitchFamily="2" charset="2"/>
+              </a:rPr>
+              <a:t>     -n</a:t>
+            </a:r>
+            <a:r>
+              <a:rPr lang="zh-CN" altLang="en-US" b="1" dirty="0">
+                <a:sym typeface="Wingdings" panose="05000000000000000000" pitchFamily="2" charset="2"/>
+              </a:rPr>
+              <a:t>輸出的行數， </a:t>
+            </a:r>
+            <a:r>
+              <a:rPr lang="en-US" altLang="zh-CN" b="1" dirty="0">
+                <a:sym typeface="Wingdings" panose="05000000000000000000" pitchFamily="2" charset="2"/>
+              </a:rPr>
+              <a:t>-p</a:t>
+            </a:r>
+            <a:r>
+              <a:rPr lang="zh-CN" altLang="en-US" b="1" dirty="0">
+                <a:sym typeface="Wingdings" panose="05000000000000000000" pitchFamily="2" charset="2"/>
+              </a:rPr>
+              <a:t>詳情包括代碼的修改</a:t>
+            </a:r>
+            <a:r>
+              <a:rPr lang="en-US" altLang="zh-CN" b="1" dirty="0">
+                <a:sym typeface="Wingdings" panose="05000000000000000000" pitchFamily="2" charset="2"/>
+              </a:rPr>
+              <a:t>, </a:t>
+            </a:r>
+            <a:r>
+              <a:rPr lang="zh-CN" altLang="en-US" b="1" dirty="0">
+                <a:sym typeface="Wingdings" panose="05000000000000000000" pitchFamily="2" charset="2"/>
+              </a:rPr>
+              <a:t> </a:t>
+            </a:r>
+            <a:r>
+              <a:rPr lang="en-US" altLang="zh-CN" b="1" dirty="0">
+                <a:sym typeface="Wingdings" panose="05000000000000000000" pitchFamily="2" charset="2"/>
+              </a:rPr>
+              <a:t>–stat</a:t>
+            </a:r>
+            <a:r>
+              <a:rPr lang="zh-CN" altLang="en-US" b="1" dirty="0">
+                <a:sym typeface="Wingdings" panose="05000000000000000000" pitchFamily="2" charset="2"/>
+              </a:rPr>
+              <a:t>文件的修改</a:t>
+            </a:r>
+            <a:endParaRPr lang="en-US" altLang="zh-CN" b="1" dirty="0">
+              <a:sym typeface="Wingdings" panose="05000000000000000000" pitchFamily="2" charset="2"/>
+            </a:endParaRPr>
+          </a:p>
+          <a:p>
+            <a:r>
+              <a:rPr lang="en-US" altLang="zh-CN" b="1" dirty="0">
+                <a:sym typeface="Wingdings" panose="05000000000000000000" pitchFamily="2" charset="2"/>
+              </a:rPr>
+              <a:t>		git show SHA1</a:t>
+            </a:r>
+          </a:p>
+          <a:p>
+            <a:r>
+              <a:rPr lang="en-US" altLang="zh-CN" b="1" dirty="0">
+                <a:sym typeface="Wingdings" panose="05000000000000000000" pitchFamily="2" charset="2"/>
+              </a:rPr>
               <a:t>	</a:t>
             </a:r>
-            <a:r>
-              <a:rPr lang="en-US" altLang="zh-TW" dirty="0" err="1"/>
-              <a:t>git</a:t>
-            </a:r>
-            <a:r>
-              <a:rPr lang="en-US" altLang="zh-TW" dirty="0"/>
-              <a:t> show-branch</a:t>
-            </a:r>
-          </a:p>
-          <a:p>
-            <a:r>
-              <a:rPr lang="en-US" altLang="zh-TW" dirty="0"/>
+          </a:p>
+          <a:p>
+            <a:r>
+              <a:rPr lang="en-US" altLang="zh-CN" b="1" dirty="0">
+                <a:sym typeface="Wingdings" panose="05000000000000000000" pitchFamily="2" charset="2"/>
+              </a:rPr>
               <a:t>	</a:t>
             </a:r>
             <a:r>
-              <a:rPr lang="en-US" altLang="zh-CN" dirty="0" err="1"/>
-              <a:t>git</a:t>
-            </a:r>
-            <a:r>
-              <a:rPr lang="en-US" altLang="zh-CN" dirty="0"/>
-              <a:t> show-branch –more=</a:t>
-            </a:r>
-            <a:r>
-              <a:rPr lang="zh-CN" altLang="en-US" dirty="0"/>
-              <a:t>数量</a:t>
-            </a:r>
-            <a:endParaRPr lang="en-US" altLang="zh-TW" dirty="0"/>
-          </a:p>
-          <a:p>
-            <a:r>
-              <a:rPr lang="en-US" altLang="zh-TW" dirty="0"/>
-              <a:t>	--</a:t>
-            </a:r>
-            <a:r>
-              <a:rPr lang="zh-CN" altLang="en-US" dirty="0"/>
-              <a:t>符號以上代表</a:t>
-            </a:r>
-            <a:r>
-              <a:rPr lang="en-US" altLang="zh-CN" dirty="0"/>
-              <a:t>branch</a:t>
-            </a:r>
-          </a:p>
-          <a:p>
-            <a:r>
-              <a:rPr lang="en-US" altLang="zh-TW" dirty="0"/>
-              <a:t>	</a:t>
-            </a:r>
-            <a:r>
-              <a:rPr lang="en-US" altLang="zh-CN" dirty="0"/>
-              <a:t>--</a:t>
-            </a:r>
-            <a:r>
-              <a:rPr lang="zh-CN" altLang="en-US" dirty="0"/>
-              <a:t>符號以下代表提交的</a:t>
-            </a:r>
-            <a:r>
-              <a:rPr lang="en-US" altLang="zh-CN" dirty="0"/>
-              <a:t>log</a:t>
-            </a:r>
-            <a:r>
-              <a:rPr lang="zh-CN" altLang="en-US" dirty="0"/>
-              <a:t>信息</a:t>
-            </a:r>
-            <a:endParaRPr lang="en-US" altLang="zh-TW" dirty="0"/>
-          </a:p>
-          <a:p>
-            <a:r>
-              <a:rPr lang="en-US" altLang="zh-TW" dirty="0"/>
-              <a:t>	</a:t>
-            </a:r>
-            <a:r>
-              <a:rPr lang="en-US" altLang="zh-CN" dirty="0"/>
-              <a:t>+ </a:t>
-            </a:r>
-            <a:r>
-              <a:rPr lang="zh-CN" altLang="en-US" dirty="0"/>
-              <a:t>代表提交在哪一個分支當中</a:t>
-            </a:r>
-            <a:endParaRPr lang="en-US" altLang="zh-CN" dirty="0"/>
-          </a:p>
-          <a:p>
-            <a:r>
-              <a:rPr lang="en-US" altLang="zh-TW" dirty="0"/>
-              <a:t>                  </a:t>
-            </a:r>
-            <a:r>
-              <a:rPr lang="en-US" altLang="zh-CN" dirty="0"/>
-              <a:t>- </a:t>
-            </a:r>
-            <a:r>
-              <a:rPr lang="zh-CN" altLang="en-US" dirty="0"/>
-              <a:t>代表合并提交</a:t>
-            </a:r>
-            <a:endParaRPr lang="en-US" altLang="zh-CN" dirty="0"/>
-          </a:p>
-          <a:p>
-            <a:r>
-              <a:rPr lang="en-US" altLang="zh-TW" dirty="0"/>
-              <a:t>                 </a:t>
-            </a:r>
-            <a:r>
-              <a:rPr lang="zh-CN" altLang="en-US" dirty="0"/>
-              <a:t>* 代表存在于活動分支的提交</a:t>
-            </a:r>
-            <a:endParaRPr lang="zh-TW" altLang="en-US" dirty="0"/>
-          </a:p>
-        </p:txBody>
-      </p:sp>
-      <p:pic>
-        <p:nvPicPr>
-          <p:cNvPr id="8" name="圖片 7">
-            <a:extLst>
-              <a:ext uri="{FF2B5EF4-FFF2-40B4-BE49-F238E27FC236}">
-                <a16:creationId xmlns:a16="http://schemas.microsoft.com/office/drawing/2014/main" id="{E25375C7-CDC0-469F-B0A3-AB1EA038A7A6}"/>
-              </a:ext>
-            </a:extLst>
-          </p:cNvPr>
-          <p:cNvPicPr>
-            <a:picLocks noChangeAspect="1"/>
-          </p:cNvPicPr>
-          <p:nvPr/>
-        </p:nvPicPr>
-        <p:blipFill>
-          <a:blip r:embed="rId2">
-            <a:extLst>
-              <a:ext uri="{28A0092B-C50C-407E-A947-70E740481C1C}">
-                <a14:useLocalDpi xmlns:a14="http://schemas.microsoft.com/office/drawing/2010/main" val="0"/>
-              </a:ext>
-            </a:extLst>
-          </a:blip>
-          <a:stretch>
-            <a:fillRect/>
-          </a:stretch>
-        </p:blipFill>
-        <p:spPr>
-          <a:xfrm>
-            <a:off x="1469304" y="3433366"/>
-            <a:ext cx="5052117" cy="2247299"/>
-          </a:xfrm>
-          <a:prstGeom prst="rect">
-            <a:avLst/>
-          </a:prstGeom>
-        </p:spPr>
-      </p:pic>
-      <p:sp>
-        <p:nvSpPr>
-          <p:cNvPr id="9" name="文字方塊 8">
-            <a:extLst>
-              <a:ext uri="{FF2B5EF4-FFF2-40B4-BE49-F238E27FC236}">
-                <a16:creationId xmlns:a16="http://schemas.microsoft.com/office/drawing/2014/main" id="{5FAB5A54-BBE1-4721-A93D-ABA7C212CCBE}"/>
-              </a:ext>
-            </a:extLst>
-          </p:cNvPr>
-          <p:cNvSpPr txBox="1"/>
-          <p:nvPr/>
-        </p:nvSpPr>
-        <p:spPr>
-          <a:xfrm>
-            <a:off x="6868160" y="3433366"/>
-            <a:ext cx="4876800" cy="1200329"/>
-          </a:xfrm>
-          <a:prstGeom prst="rect">
-            <a:avLst/>
-          </a:prstGeom>
-          <a:noFill/>
-        </p:spPr>
-        <p:txBody>
-          <a:bodyPr wrap="square" rtlCol="0">
-            <a:spAutoFit/>
-          </a:bodyPr>
-          <a:lstStyle/>
-          <a:p>
-            <a:r>
-              <a:rPr lang="zh-CN" altLang="en-US" dirty="0"/>
-              <a:t>紅色對應紅色</a:t>
-            </a:r>
-            <a:r>
-              <a:rPr lang="en-US" altLang="zh-CN" dirty="0"/>
-              <a:t>, </a:t>
-            </a:r>
-            <a:r>
-              <a:rPr lang="zh-CN" altLang="en-US" dirty="0"/>
-              <a:t>綠色對應綠色</a:t>
-            </a:r>
-            <a:endParaRPr lang="en-US" altLang="zh-CN" dirty="0"/>
-          </a:p>
-          <a:p>
-            <a:endParaRPr lang="en-US" altLang="zh-TW" dirty="0"/>
-          </a:p>
-          <a:p>
-            <a:r>
-              <a:rPr lang="zh-CN" altLang="en-US" dirty="0"/>
-              <a:t>一般這條命令只有顯示到共同擁有的版本庫當中</a:t>
-            </a:r>
-            <a:r>
-              <a:rPr lang="en-US" altLang="zh-CN" dirty="0"/>
-              <a:t>, </a:t>
-            </a:r>
-            <a:r>
-              <a:rPr lang="zh-CN" altLang="en-US" dirty="0"/>
-              <a:t>如果顯示更多加上</a:t>
-            </a:r>
-            <a:r>
-              <a:rPr lang="en-US" altLang="zh-CN" dirty="0"/>
-              <a:t>”--more=</a:t>
-            </a:r>
-            <a:r>
-              <a:rPr lang="zh-CN" altLang="en-US" dirty="0"/>
-              <a:t>數量</a:t>
-            </a:r>
-            <a:r>
-              <a:rPr lang="en-US" altLang="zh-CN" dirty="0"/>
-              <a:t>“</a:t>
-            </a:r>
-            <a:endParaRPr lang="zh-TW" altLang="en-US" dirty="0"/>
+              <a:rPr lang="en-US" altLang="zh-CN" b="1" dirty="0"/>
+              <a:t>     </a:t>
+            </a:r>
           </a:p>
         </p:txBody>
       </p:sp>
     </p:spTree>
     <p:extLst>
       <p:ext uri="{BB962C8B-B14F-4D97-AF65-F5344CB8AC3E}">
-        <p14:creationId xmlns:p14="http://schemas.microsoft.com/office/powerpoint/2010/main" val="2151625063"/>
+        <p14:creationId xmlns:p14="http://schemas.microsoft.com/office/powerpoint/2010/main" val="391565664"/>
       </p:ext>
     </p:extLst>
   </p:cSld>
@@ -5438,22 +5561,22 @@
           <a:lstStyle/>
           <a:p>
             <a:r>
-              <a:rPr lang="en-US" altLang="zh-TW" sz="2000" b="1" dirty="0"/>
+              <a:rPr lang="en-US" altLang="zh-TW" sz="2000" b="1" u="sng" dirty="0"/>
               <a:t>Git </a:t>
             </a:r>
             <a:r>
-              <a:rPr lang="zh-CN" altLang="en-US" sz="2000" b="1" dirty="0"/>
+              <a:rPr lang="zh-CN" altLang="en-US" sz="2000" b="1" u="sng" dirty="0"/>
               <a:t>修改一次文件到</a:t>
             </a:r>
             <a:r>
-              <a:rPr lang="en-US" altLang="zh-CN" sz="2000" b="1" dirty="0"/>
+              <a:rPr lang="en-US" altLang="zh-CN" sz="2000" b="1" u="sng" dirty="0"/>
               <a:t>commit</a:t>
             </a:r>
             <a:r>
-              <a:rPr lang="zh-CN" altLang="en-US" sz="2000" b="1" dirty="0"/>
+              <a:rPr lang="zh-CN" altLang="en-US" sz="2000" b="1" u="sng" dirty="0"/>
               <a:t>的圖示過程</a:t>
             </a:r>
-            <a:endParaRPr lang="zh-TW" altLang="en-US" sz="2000" b="1" dirty="0"/>
+            <a:endParaRPr lang="zh-TW" altLang="en-US" sz="2000" b="1" u="sng" dirty="0"/>
           </a:p>
         </p:txBody>
       </p:sp>
@@ -5642,22 +5765,22 @@
           <a:lstStyle/>
           <a:p>
             <a:r>
-              <a:rPr lang="en-US" altLang="zh-TW" sz="2000" b="1" dirty="0"/>
+              <a:rPr lang="en-US" altLang="zh-TW" sz="2000" b="1" u="sng" dirty="0"/>
               <a:t>Git </a:t>
             </a:r>
             <a:r>
-              <a:rPr lang="zh-CN" altLang="en-US" sz="2000" b="1" dirty="0"/>
+              <a:rPr lang="zh-CN" altLang="en-US" sz="2000" b="1" u="sng" dirty="0"/>
               <a:t>修改一次文件到</a:t>
             </a:r>
             <a:r>
-              <a:rPr lang="en-US" altLang="zh-CN" sz="2000" b="1" dirty="0"/>
+              <a:rPr lang="en-US" altLang="zh-CN" sz="2000" b="1" u="sng" dirty="0"/>
               <a:t>commit</a:t>
             </a:r>
             <a:r>
-              <a:rPr lang="zh-CN" altLang="en-US" sz="2000" b="1" dirty="0"/>
+              <a:rPr lang="zh-CN" altLang="en-US" sz="2000" b="1" u="sng" dirty="0"/>
               <a:t>的圖示過程</a:t>
             </a:r>
-            <a:endParaRPr lang="zh-TW" altLang="en-US" sz="2000" b="1" dirty="0"/>
+            <a:endParaRPr lang="zh-TW" altLang="en-US" sz="2000" b="1" u="sng" dirty="0"/>
           </a:p>
         </p:txBody>
       </p:sp>

</xml_diff>

<commit_message>
add git diff command study
</commit_message>
<xml_diff>
--- a/GitStudy/GitStudy.pptx
+++ b/GitStudy/GitStudy.pptx
@@ -4,6 +4,9 @@
   <p:sldMasterIdLst>
     <p:sldMasterId id="2147483648" r:id="rId1"/>
   </p:sldMasterIdLst>
+  <p:notesMasterIdLst>
+    <p:notesMasterId r:id="rId14"/>
+  </p:notesMasterIdLst>
   <p:sldIdLst>
     <p:sldId id="256" r:id="rId2"/>
     <p:sldId id="258" r:id="rId3"/>
@@ -16,6 +19,7 @@
     <p:sldId id="260" r:id="rId10"/>
     <p:sldId id="261" r:id="rId11"/>
     <p:sldId id="262" r:id="rId12"/>
+    <p:sldId id="267" r:id="rId13"/>
   </p:sldIdLst>
   <p:sldSz cx="12192000" cy="6858000"/>
   <p:notesSz cx="6858000" cy="9144000"/>
@@ -122,6 +126,355 @@
 </p:presentation>
 </file>
 
+<file path=ppt/notesMasters/notesMaster1.xml><?xml version="1.0" encoding="utf-8"?>
+<p:notesMaster xmlns:a="http://schemas.openxmlformats.org/drawingml/2006/main" xmlns:r="http://schemas.openxmlformats.org/officeDocument/2006/relationships" xmlns:p="http://schemas.openxmlformats.org/presentationml/2006/main">
+  <p:cSld>
+    <p:bg>
+      <p:bgRef idx="1001">
+        <a:schemeClr val="bg1"/>
+      </p:bgRef>
+    </p:bg>
+    <p:spTree>
+      <p:nvGrpSpPr>
+        <p:cNvPr id="1" name=""/>
+        <p:cNvGrpSpPr/>
+        <p:nvPr/>
+      </p:nvGrpSpPr>
+      <p:grpSpPr>
+        <a:xfrm>
+          <a:off x="0" y="0"/>
+          <a:ext cx="0" cy="0"/>
+          <a:chOff x="0" y="0"/>
+          <a:chExt cx="0" cy="0"/>
+        </a:xfrm>
+      </p:grpSpPr>
+      <p:sp>
+        <p:nvSpPr>
+          <p:cNvPr id="2" name="頁首版面配置區 1"/>
+          <p:cNvSpPr>
+            <a:spLocks noGrp="1"/>
+          </p:cNvSpPr>
+          <p:nvPr>
+            <p:ph type="hdr" sz="quarter"/>
+          </p:nvPr>
+        </p:nvSpPr>
+        <p:spPr>
+          <a:xfrm>
+            <a:off x="0" y="0"/>
+            <a:ext cx="2971800" cy="458788"/>
+          </a:xfrm>
+          <a:prstGeom prst="rect">
+            <a:avLst/>
+          </a:prstGeom>
+        </p:spPr>
+        <p:txBody>
+          <a:bodyPr vert="horz" lIns="91440" tIns="45720" rIns="91440" bIns="45720" rtlCol="0"/>
+          <a:lstStyle>
+            <a:lvl1pPr algn="l">
+              <a:defRPr sz="1200"/>
+            </a:lvl1pPr>
+          </a:lstStyle>
+          <a:p>
+            <a:endParaRPr lang="zh-TW" altLang="en-US"/>
+          </a:p>
+        </p:txBody>
+      </p:sp>
+      <p:sp>
+        <p:nvSpPr>
+          <p:cNvPr id="3" name="日期版面配置區 2"/>
+          <p:cNvSpPr>
+            <a:spLocks noGrp="1"/>
+          </p:cNvSpPr>
+          <p:nvPr>
+            <p:ph type="dt" idx="1"/>
+          </p:nvPr>
+        </p:nvSpPr>
+        <p:spPr>
+          <a:xfrm>
+            <a:off x="3884613" y="0"/>
+            <a:ext cx="2971800" cy="458788"/>
+          </a:xfrm>
+          <a:prstGeom prst="rect">
+            <a:avLst/>
+          </a:prstGeom>
+        </p:spPr>
+        <p:txBody>
+          <a:bodyPr vert="horz" lIns="91440" tIns="45720" rIns="91440" bIns="45720" rtlCol="0"/>
+          <a:lstStyle>
+            <a:lvl1pPr algn="r">
+              <a:defRPr sz="1200"/>
+            </a:lvl1pPr>
+          </a:lstStyle>
+          <a:p>
+            <a:fld id="{C0F69D9A-D151-4089-8C1D-9A87D3DC0987}" type="datetimeFigureOut">
+              <a:rPr lang="zh-TW" altLang="en-US" smtClean="0"/>
+              <a:t>2023/1/26</a:t>
+            </a:fld>
+            <a:endParaRPr lang="zh-TW" altLang="en-US"/>
+          </a:p>
+        </p:txBody>
+      </p:sp>
+      <p:sp>
+        <p:nvSpPr>
+          <p:cNvPr id="4" name="投影片影像版面配置區 3"/>
+          <p:cNvSpPr>
+            <a:spLocks noGrp="1" noRot="1" noChangeAspect="1"/>
+          </p:cNvSpPr>
+          <p:nvPr>
+            <p:ph type="sldImg" idx="2"/>
+          </p:nvPr>
+        </p:nvSpPr>
+        <p:spPr>
+          <a:xfrm>
+            <a:off x="685800" y="1143000"/>
+            <a:ext cx="5486400" cy="3086100"/>
+          </a:xfrm>
+          <a:prstGeom prst="rect">
+            <a:avLst/>
+          </a:prstGeom>
+          <a:noFill/>
+          <a:ln w="12700">
+            <a:solidFill>
+              <a:prstClr val="black"/>
+            </a:solidFill>
+          </a:ln>
+        </p:spPr>
+        <p:txBody>
+          <a:bodyPr vert="horz" lIns="91440" tIns="45720" rIns="91440" bIns="45720" rtlCol="0" anchor="ctr"/>
+          <a:lstStyle/>
+          <a:p>
+            <a:endParaRPr lang="zh-TW" altLang="en-US"/>
+          </a:p>
+        </p:txBody>
+      </p:sp>
+      <p:sp>
+        <p:nvSpPr>
+          <p:cNvPr id="5" name="備忘稿版面配置區 4"/>
+          <p:cNvSpPr>
+            <a:spLocks noGrp="1"/>
+          </p:cNvSpPr>
+          <p:nvPr>
+            <p:ph type="body" sz="quarter" idx="3"/>
+          </p:nvPr>
+        </p:nvSpPr>
+        <p:spPr>
+          <a:xfrm>
+            <a:off x="685800" y="4400550"/>
+            <a:ext cx="5486400" cy="3600450"/>
+          </a:xfrm>
+          <a:prstGeom prst="rect">
+            <a:avLst/>
+          </a:prstGeom>
+        </p:spPr>
+        <p:txBody>
+          <a:bodyPr vert="horz" lIns="91440" tIns="45720" rIns="91440" bIns="45720" rtlCol="0"/>
+          <a:lstStyle/>
+          <a:p>
+            <a:pPr lvl="0"/>
+            <a:r>
+              <a:rPr lang="zh-TW" altLang="en-US"/>
+              <a:t>編輯母片文字樣式</a:t>
+            </a:r>
+          </a:p>
+          <a:p>
+            <a:pPr lvl="1"/>
+            <a:r>
+              <a:rPr lang="zh-TW" altLang="en-US"/>
+              <a:t>第二層</a:t>
+            </a:r>
+          </a:p>
+          <a:p>
+            <a:pPr lvl="2"/>
+            <a:r>
+              <a:rPr lang="zh-TW" altLang="en-US"/>
+              <a:t>第三層</a:t>
+            </a:r>
+          </a:p>
+          <a:p>
+            <a:pPr lvl="3"/>
+            <a:r>
+              <a:rPr lang="zh-TW" altLang="en-US"/>
+              <a:t>第四層</a:t>
+            </a:r>
+          </a:p>
+          <a:p>
+            <a:pPr lvl="4"/>
+            <a:r>
+              <a:rPr lang="zh-TW" altLang="en-US"/>
+              <a:t>第五層</a:t>
+            </a:r>
+          </a:p>
+        </p:txBody>
+      </p:sp>
+      <p:sp>
+        <p:nvSpPr>
+          <p:cNvPr id="6" name="頁尾版面配置區 5"/>
+          <p:cNvSpPr>
+            <a:spLocks noGrp="1"/>
+          </p:cNvSpPr>
+          <p:nvPr>
+            <p:ph type="ftr" sz="quarter" idx="4"/>
+          </p:nvPr>
+        </p:nvSpPr>
+        <p:spPr>
+          <a:xfrm>
+            <a:off x="0" y="8685213"/>
+            <a:ext cx="2971800" cy="458787"/>
+          </a:xfrm>
+          <a:prstGeom prst="rect">
+            <a:avLst/>
+          </a:prstGeom>
+        </p:spPr>
+        <p:txBody>
+          <a:bodyPr vert="horz" lIns="91440" tIns="45720" rIns="91440" bIns="45720" rtlCol="0" anchor="b"/>
+          <a:lstStyle>
+            <a:lvl1pPr algn="l">
+              <a:defRPr sz="1200"/>
+            </a:lvl1pPr>
+          </a:lstStyle>
+          <a:p>
+            <a:endParaRPr lang="zh-TW" altLang="en-US"/>
+          </a:p>
+        </p:txBody>
+      </p:sp>
+      <p:sp>
+        <p:nvSpPr>
+          <p:cNvPr id="7" name="投影片編號版面配置區 6"/>
+          <p:cNvSpPr>
+            <a:spLocks noGrp="1"/>
+          </p:cNvSpPr>
+          <p:nvPr>
+            <p:ph type="sldNum" sz="quarter" idx="5"/>
+          </p:nvPr>
+        </p:nvSpPr>
+        <p:spPr>
+          <a:xfrm>
+            <a:off x="3884613" y="8685213"/>
+            <a:ext cx="2971800" cy="458787"/>
+          </a:xfrm>
+          <a:prstGeom prst="rect">
+            <a:avLst/>
+          </a:prstGeom>
+        </p:spPr>
+        <p:txBody>
+          <a:bodyPr vert="horz" lIns="91440" tIns="45720" rIns="91440" bIns="45720" rtlCol="0" anchor="b"/>
+          <a:lstStyle>
+            <a:lvl1pPr algn="r">
+              <a:defRPr sz="1200"/>
+            </a:lvl1pPr>
+          </a:lstStyle>
+          <a:p>
+            <a:fld id="{CD1B56E1-2037-4A4D-B6E0-C43426ED591A}" type="slidenum">
+              <a:rPr lang="zh-TW" altLang="en-US" smtClean="0"/>
+              <a:t>‹#›</a:t>
+            </a:fld>
+            <a:endParaRPr lang="zh-TW" altLang="en-US"/>
+          </a:p>
+        </p:txBody>
+      </p:sp>
+    </p:spTree>
+    <p:extLst>
+      <p:ext uri="{BB962C8B-B14F-4D97-AF65-F5344CB8AC3E}">
+        <p14:creationId xmlns:p14="http://schemas.microsoft.com/office/powerpoint/2010/main" val="4232876233"/>
+      </p:ext>
+    </p:extLst>
+  </p:cSld>
+  <p:clrMap bg1="lt1" tx1="dk1" bg2="lt2" tx2="dk2" accent1="accent1" accent2="accent2" accent3="accent3" accent4="accent4" accent5="accent5" accent6="accent6" hlink="hlink" folHlink="folHlink"/>
+  <p:notesStyle>
+    <a:lvl1pPr marL="0" algn="l" defTabSz="914400" rtl="0" eaLnBrk="1" latinLnBrk="0" hangingPunct="1">
+      <a:defRPr sz="1200" kern="1200">
+        <a:solidFill>
+          <a:schemeClr val="tx1"/>
+        </a:solidFill>
+        <a:latin typeface="+mn-lt"/>
+        <a:ea typeface="+mn-ea"/>
+        <a:cs typeface="+mn-cs"/>
+      </a:defRPr>
+    </a:lvl1pPr>
+    <a:lvl2pPr marL="457200" algn="l" defTabSz="914400" rtl="0" eaLnBrk="1" latinLnBrk="0" hangingPunct="1">
+      <a:defRPr sz="1200" kern="1200">
+        <a:solidFill>
+          <a:schemeClr val="tx1"/>
+        </a:solidFill>
+        <a:latin typeface="+mn-lt"/>
+        <a:ea typeface="+mn-ea"/>
+        <a:cs typeface="+mn-cs"/>
+      </a:defRPr>
+    </a:lvl2pPr>
+    <a:lvl3pPr marL="914400" algn="l" defTabSz="914400" rtl="0" eaLnBrk="1" latinLnBrk="0" hangingPunct="1">
+      <a:defRPr sz="1200" kern="1200">
+        <a:solidFill>
+          <a:schemeClr val="tx1"/>
+        </a:solidFill>
+        <a:latin typeface="+mn-lt"/>
+        <a:ea typeface="+mn-ea"/>
+        <a:cs typeface="+mn-cs"/>
+      </a:defRPr>
+    </a:lvl3pPr>
+    <a:lvl4pPr marL="1371600" algn="l" defTabSz="914400" rtl="0" eaLnBrk="1" latinLnBrk="0" hangingPunct="1">
+      <a:defRPr sz="1200" kern="1200">
+        <a:solidFill>
+          <a:schemeClr val="tx1"/>
+        </a:solidFill>
+        <a:latin typeface="+mn-lt"/>
+        <a:ea typeface="+mn-ea"/>
+        <a:cs typeface="+mn-cs"/>
+      </a:defRPr>
+    </a:lvl4pPr>
+    <a:lvl5pPr marL="1828800" algn="l" defTabSz="914400" rtl="0" eaLnBrk="1" latinLnBrk="0" hangingPunct="1">
+      <a:defRPr sz="1200" kern="1200">
+        <a:solidFill>
+          <a:schemeClr val="tx1"/>
+        </a:solidFill>
+        <a:latin typeface="+mn-lt"/>
+        <a:ea typeface="+mn-ea"/>
+        <a:cs typeface="+mn-cs"/>
+      </a:defRPr>
+    </a:lvl5pPr>
+    <a:lvl6pPr marL="2286000" algn="l" defTabSz="914400" rtl="0" eaLnBrk="1" latinLnBrk="0" hangingPunct="1">
+      <a:defRPr sz="1200" kern="1200">
+        <a:solidFill>
+          <a:schemeClr val="tx1"/>
+        </a:solidFill>
+        <a:latin typeface="+mn-lt"/>
+        <a:ea typeface="+mn-ea"/>
+        <a:cs typeface="+mn-cs"/>
+      </a:defRPr>
+    </a:lvl6pPr>
+    <a:lvl7pPr marL="2743200" algn="l" defTabSz="914400" rtl="0" eaLnBrk="1" latinLnBrk="0" hangingPunct="1">
+      <a:defRPr sz="1200" kern="1200">
+        <a:solidFill>
+          <a:schemeClr val="tx1"/>
+        </a:solidFill>
+        <a:latin typeface="+mn-lt"/>
+        <a:ea typeface="+mn-ea"/>
+        <a:cs typeface="+mn-cs"/>
+      </a:defRPr>
+    </a:lvl7pPr>
+    <a:lvl8pPr marL="3200400" algn="l" defTabSz="914400" rtl="0" eaLnBrk="1" latinLnBrk="0" hangingPunct="1">
+      <a:defRPr sz="1200" kern="1200">
+        <a:solidFill>
+          <a:schemeClr val="tx1"/>
+        </a:solidFill>
+        <a:latin typeface="+mn-lt"/>
+        <a:ea typeface="+mn-ea"/>
+        <a:cs typeface="+mn-cs"/>
+      </a:defRPr>
+    </a:lvl8pPr>
+    <a:lvl9pPr marL="3657600" algn="l" defTabSz="914400" rtl="0" eaLnBrk="1" latinLnBrk="0" hangingPunct="1">
+      <a:defRPr sz="1200" kern="1200">
+        <a:solidFill>
+          <a:schemeClr val="tx1"/>
+        </a:solidFill>
+        <a:latin typeface="+mn-lt"/>
+        <a:ea typeface="+mn-ea"/>
+        <a:cs typeface="+mn-cs"/>
+      </a:defRPr>
+    </a:lvl9pPr>
+  </p:notesStyle>
+</p:notesMaster>
+</file>
+
 <file path=ppt/slideLayouts/slideLayout1.xml><?xml version="1.0" encoding="utf-8"?>
 <p:sldLayout xmlns:a="http://schemas.openxmlformats.org/drawingml/2006/main" xmlns:r="http://schemas.openxmlformats.org/officeDocument/2006/relationships" xmlns:p="http://schemas.openxmlformats.org/presentationml/2006/main" type="title" preserve="1">
   <p:cSld name="標題投影片">
@@ -269,7 +622,7 @@
           <a:p>
             <a:fld id="{B3DC4D43-2745-46E1-A871-6B61F7786A47}" type="datetimeFigureOut">
               <a:rPr lang="zh-TW" altLang="en-US" smtClean="0"/>
-              <a:t>2023/1/19</a:t>
+              <a:t>2023/1/26</a:t>
             </a:fld>
             <a:endParaRPr lang="zh-TW" altLang="en-US"/>
           </a:p>
@@ -467,7 +820,7 @@
           <a:p>
             <a:fld id="{B3DC4D43-2745-46E1-A871-6B61F7786A47}" type="datetimeFigureOut">
               <a:rPr lang="zh-TW" altLang="en-US" smtClean="0"/>
-              <a:t>2023/1/19</a:t>
+              <a:t>2023/1/26</a:t>
             </a:fld>
             <a:endParaRPr lang="zh-TW" altLang="en-US"/>
           </a:p>
@@ -675,7 +1028,7 @@
           <a:p>
             <a:fld id="{B3DC4D43-2745-46E1-A871-6B61F7786A47}" type="datetimeFigureOut">
               <a:rPr lang="zh-TW" altLang="en-US" smtClean="0"/>
-              <a:t>2023/1/19</a:t>
+              <a:t>2023/1/26</a:t>
             </a:fld>
             <a:endParaRPr lang="zh-TW" altLang="en-US"/>
           </a:p>
@@ -873,7 +1226,7 @@
           <a:p>
             <a:fld id="{B3DC4D43-2745-46E1-A871-6B61F7786A47}" type="datetimeFigureOut">
               <a:rPr lang="zh-TW" altLang="en-US" smtClean="0"/>
-              <a:t>2023/1/19</a:t>
+              <a:t>2023/1/26</a:t>
             </a:fld>
             <a:endParaRPr lang="zh-TW" altLang="en-US"/>
           </a:p>
@@ -1148,7 +1501,7 @@
           <a:p>
             <a:fld id="{B3DC4D43-2745-46E1-A871-6B61F7786A47}" type="datetimeFigureOut">
               <a:rPr lang="zh-TW" altLang="en-US" smtClean="0"/>
-              <a:t>2023/1/19</a:t>
+              <a:t>2023/1/26</a:t>
             </a:fld>
             <a:endParaRPr lang="zh-TW" altLang="en-US"/>
           </a:p>
@@ -1413,7 +1766,7 @@
           <a:p>
             <a:fld id="{B3DC4D43-2745-46E1-A871-6B61F7786A47}" type="datetimeFigureOut">
               <a:rPr lang="zh-TW" altLang="en-US" smtClean="0"/>
-              <a:t>2023/1/19</a:t>
+              <a:t>2023/1/26</a:t>
             </a:fld>
             <a:endParaRPr lang="zh-TW" altLang="en-US"/>
           </a:p>
@@ -1825,7 +2178,7 @@
           <a:p>
             <a:fld id="{B3DC4D43-2745-46E1-A871-6B61F7786A47}" type="datetimeFigureOut">
               <a:rPr lang="zh-TW" altLang="en-US" smtClean="0"/>
-              <a:t>2023/1/19</a:t>
+              <a:t>2023/1/26</a:t>
             </a:fld>
             <a:endParaRPr lang="zh-TW" altLang="en-US"/>
           </a:p>
@@ -1966,7 +2319,7 @@
           <a:p>
             <a:fld id="{B3DC4D43-2745-46E1-A871-6B61F7786A47}" type="datetimeFigureOut">
               <a:rPr lang="zh-TW" altLang="en-US" smtClean="0"/>
-              <a:t>2023/1/19</a:t>
+              <a:t>2023/1/26</a:t>
             </a:fld>
             <a:endParaRPr lang="zh-TW" altLang="en-US"/>
           </a:p>
@@ -2079,7 +2432,7 @@
           <a:p>
             <a:fld id="{B3DC4D43-2745-46E1-A871-6B61F7786A47}" type="datetimeFigureOut">
               <a:rPr lang="zh-TW" altLang="en-US" smtClean="0"/>
-              <a:t>2023/1/19</a:t>
+              <a:t>2023/1/26</a:t>
             </a:fld>
             <a:endParaRPr lang="zh-TW" altLang="en-US"/>
           </a:p>
@@ -2390,7 +2743,7 @@
           <a:p>
             <a:fld id="{B3DC4D43-2745-46E1-A871-6B61F7786A47}" type="datetimeFigureOut">
               <a:rPr lang="zh-TW" altLang="en-US" smtClean="0"/>
-              <a:t>2023/1/19</a:t>
+              <a:t>2023/1/26</a:t>
             </a:fld>
             <a:endParaRPr lang="zh-TW" altLang="en-US"/>
           </a:p>
@@ -2678,7 +3031,7 @@
           <a:p>
             <a:fld id="{B3DC4D43-2745-46E1-A871-6B61F7786A47}" type="datetimeFigureOut">
               <a:rPr lang="zh-TW" altLang="en-US" smtClean="0"/>
-              <a:t>2023/1/19</a:t>
+              <a:t>2023/1/26</a:t>
             </a:fld>
             <a:endParaRPr lang="zh-TW" altLang="en-US"/>
           </a:p>
@@ -2919,7 +3272,7 @@
           <a:p>
             <a:fld id="{B3DC4D43-2745-46E1-A871-6B61F7786A47}" type="datetimeFigureOut">
               <a:rPr lang="zh-TW" altLang="en-US" smtClean="0"/>
-              <a:t>2023/1/19</a:t>
+              <a:t>2023/1/26</a:t>
             </a:fld>
             <a:endParaRPr lang="zh-TW" altLang="en-US"/>
           </a:p>
@@ -3732,6 +4085,215 @@
 </p:sld>
 </file>
 
+<file path=ppt/slides/slide12.xml><?xml version="1.0" encoding="utf-8"?>
+<p:sld xmlns:a="http://schemas.openxmlformats.org/drawingml/2006/main" xmlns:r="http://schemas.openxmlformats.org/officeDocument/2006/relationships" xmlns:p="http://schemas.openxmlformats.org/presentationml/2006/main">
+  <p:cSld>
+    <p:spTree>
+      <p:nvGrpSpPr>
+        <p:cNvPr id="1" name=""/>
+        <p:cNvGrpSpPr/>
+        <p:nvPr/>
+      </p:nvGrpSpPr>
+      <p:grpSpPr>
+        <a:xfrm>
+          <a:off x="0" y="0"/>
+          <a:ext cx="0" cy="0"/>
+          <a:chOff x="0" y="0"/>
+          <a:chExt cx="0" cy="0"/>
+        </a:xfrm>
+      </p:grpSpPr>
+      <p:sp>
+        <p:nvSpPr>
+          <p:cNvPr id="4" name="文字方塊 3">
+            <a:extLst>
+              <a:ext uri="{FF2B5EF4-FFF2-40B4-BE49-F238E27FC236}">
+                <a16:creationId xmlns:a16="http://schemas.microsoft.com/office/drawing/2014/main" id="{8958EB55-8532-485B-840C-B8BD4D5A5D94}"/>
+              </a:ext>
+            </a:extLst>
+          </p:cNvPr>
+          <p:cNvSpPr txBox="1"/>
+          <p:nvPr/>
+        </p:nvSpPr>
+        <p:spPr>
+          <a:xfrm>
+            <a:off x="335280" y="274320"/>
+            <a:ext cx="10972800" cy="4801314"/>
+          </a:xfrm>
+          <a:prstGeom prst="rect">
+            <a:avLst/>
+          </a:prstGeom>
+          <a:noFill/>
+        </p:spPr>
+        <p:txBody>
+          <a:bodyPr wrap="square" rtlCol="0">
+            <a:spAutoFit/>
+          </a:bodyPr>
+          <a:lstStyle/>
+          <a:p>
+            <a:r>
+              <a:rPr lang="en-US" altLang="zh-CN" b="1" u="sng" dirty="0"/>
+              <a:t>Git diff</a:t>
+            </a:r>
+            <a:r>
+              <a:rPr lang="zh-CN" altLang="en-US" b="1" u="sng" dirty="0"/>
+              <a:t>的相關操作</a:t>
+            </a:r>
+            <a:endParaRPr lang="en-US" altLang="zh-CN" b="1" u="sng" dirty="0"/>
+          </a:p>
+          <a:p>
+            <a:endParaRPr lang="en-US" altLang="zh-TW" dirty="0"/>
+          </a:p>
+          <a:p>
+            <a:r>
+              <a:rPr lang="en-US" altLang="zh-CN" dirty="0"/>
+              <a:t>1. </a:t>
+            </a:r>
+            <a:r>
+              <a:rPr lang="zh-CN" altLang="en-US" dirty="0"/>
+              <a:t>工作區和索引的比較</a:t>
+            </a:r>
+            <a:endParaRPr lang="en-US" altLang="zh-CN" dirty="0"/>
+          </a:p>
+          <a:p>
+            <a:pPr lvl="1"/>
+            <a:r>
+              <a:rPr lang="en-US" altLang="zh-TW" dirty="0"/>
+              <a:t>git diff</a:t>
+            </a:r>
+          </a:p>
+          <a:p>
+            <a:pPr lvl="1"/>
+            <a:endParaRPr lang="en-US" altLang="zh-TW" dirty="0"/>
+          </a:p>
+          <a:p>
+            <a:r>
+              <a:rPr lang="en-US" altLang="zh-TW" dirty="0"/>
+              <a:t>2. </a:t>
+            </a:r>
+            <a:r>
+              <a:rPr lang="zh-CN" altLang="en-US" dirty="0"/>
+              <a:t>工作區和本地版本庫比較</a:t>
+            </a:r>
+            <a:endParaRPr lang="en-US" altLang="zh-CN" dirty="0"/>
+          </a:p>
+          <a:p>
+            <a:r>
+              <a:rPr lang="en-US" altLang="zh-TW" dirty="0"/>
+              <a:t>         </a:t>
+            </a:r>
+            <a:r>
+              <a:rPr lang="en-US" altLang="zh-CN" dirty="0"/>
+              <a:t>git diff commit</a:t>
+            </a:r>
+            <a:r>
+              <a:rPr lang="zh-CN" altLang="en-US" dirty="0"/>
+              <a:t>號</a:t>
+            </a:r>
+            <a:endParaRPr lang="en-US" altLang="zh-CN" dirty="0"/>
+          </a:p>
+          <a:p>
+            <a:endParaRPr lang="en-US" altLang="zh-TW" dirty="0"/>
+          </a:p>
+          <a:p>
+            <a:r>
+              <a:rPr lang="en-US" altLang="zh-CN" dirty="0"/>
+              <a:t>3. </a:t>
+            </a:r>
+            <a:r>
+              <a:rPr lang="zh-CN" altLang="en-US" dirty="0"/>
+              <a:t>索引和本地版本庫比較</a:t>
+            </a:r>
+            <a:endParaRPr lang="en-US" altLang="zh-CN" dirty="0"/>
+          </a:p>
+          <a:p>
+            <a:r>
+              <a:rPr lang="en-US" altLang="zh-TW" dirty="0"/>
+              <a:t>         </a:t>
+            </a:r>
+            <a:r>
+              <a:rPr lang="en-US" altLang="zh-CN" dirty="0"/>
+              <a:t>git diff –cached</a:t>
+            </a:r>
+          </a:p>
+          <a:p>
+            <a:endParaRPr lang="en-US" altLang="zh-TW" dirty="0"/>
+          </a:p>
+          <a:p>
+            <a:r>
+              <a:rPr lang="en-US" altLang="zh-CN" dirty="0"/>
+              <a:t>4. </a:t>
+            </a:r>
+            <a:r>
+              <a:rPr lang="zh-CN" altLang="en-US" dirty="0"/>
+              <a:t>某個範圍内的比較</a:t>
+            </a:r>
+            <a:endParaRPr lang="en-US" altLang="zh-CN" dirty="0"/>
+          </a:p>
+          <a:p>
+            <a:r>
+              <a:rPr lang="en-US" altLang="zh-TW" dirty="0"/>
+              <a:t>        </a:t>
+            </a:r>
+            <a:r>
+              <a:rPr lang="en-US" altLang="zh-CN" dirty="0"/>
+              <a:t>git diff test</a:t>
+            </a:r>
+            <a:r>
+              <a:rPr lang="zh-CN" altLang="en-US" dirty="0"/>
+              <a:t>分支</a:t>
+            </a:r>
+            <a:r>
+              <a:rPr lang="en-US" altLang="zh-CN" dirty="0"/>
+              <a:t>..master</a:t>
+            </a:r>
+            <a:r>
+              <a:rPr lang="zh-CN" altLang="en-US" dirty="0"/>
+              <a:t>分之</a:t>
+            </a:r>
+            <a:endParaRPr lang="en-US" altLang="zh-CN" dirty="0"/>
+          </a:p>
+          <a:p>
+            <a:endParaRPr lang="en-US" altLang="zh-TW" dirty="0"/>
+          </a:p>
+          <a:p>
+            <a:r>
+              <a:rPr lang="en-US" altLang="zh-CN" dirty="0"/>
+              <a:t>5. </a:t>
+            </a:r>
+            <a:r>
+              <a:rPr lang="zh-CN" altLang="en-US" dirty="0"/>
+              <a:t>比較某個文件</a:t>
+            </a:r>
+            <a:endParaRPr lang="en-US" altLang="zh-CN" dirty="0"/>
+          </a:p>
+          <a:p>
+            <a:r>
+              <a:rPr lang="en-US" altLang="zh-TW" dirty="0"/>
+              <a:t>        </a:t>
+            </a:r>
+            <a:r>
+              <a:rPr lang="en-US" altLang="zh-CN" dirty="0"/>
+              <a:t>git diff master~5 master  a.txt</a:t>
+            </a:r>
+          </a:p>
+          <a:p>
+            <a:endParaRPr lang="en-US" altLang="zh-TW" dirty="0"/>
+          </a:p>
+        </p:txBody>
+      </p:sp>
+    </p:spTree>
+    <p:extLst>
+      <p:ext uri="{BB962C8B-B14F-4D97-AF65-F5344CB8AC3E}">
+        <p14:creationId xmlns:p14="http://schemas.microsoft.com/office/powerpoint/2010/main" val="2585208332"/>
+      </p:ext>
+    </p:extLst>
+  </p:cSld>
+  <p:clrMapOvr>
+    <a:masterClrMapping/>
+  </p:clrMapOvr>
+</p:sld>
+</file>
+
 <file path=ppt/slides/slide2.xml><?xml version="1.0" encoding="utf-8"?>
 <p:sld xmlns:a="http://schemas.openxmlformats.org/drawingml/2006/main" xmlns:r="http://schemas.openxmlformats.org/officeDocument/2006/relationships" xmlns:p="http://schemas.openxmlformats.org/presentationml/2006/main">
   <p:cSld>
@@ -3764,7 +4326,7 @@
         <p:spPr>
           <a:xfrm>
             <a:off x="487680" y="375920"/>
-            <a:ext cx="11064240" cy="2862322"/>
+            <a:ext cx="11064240" cy="3693319"/>
           </a:xfrm>
           <a:prstGeom prst="rect">
             <a:avLst/>
@@ -3922,7 +4484,41 @@
               <a:rPr lang="zh-CN" altLang="en-US" dirty="0"/>
               <a:t>代表前一個提交</a:t>
             </a:r>
-            <a:endParaRPr lang="zh-TW" altLang="en-US" dirty="0"/>
+            <a:endParaRPr lang="en-US" altLang="zh-CN" dirty="0"/>
+          </a:p>
+          <a:p>
+            <a:pPr lvl="1"/>
+            <a:endParaRPr lang="en-US" altLang="zh-CN" dirty="0"/>
+          </a:p>
+          <a:p>
+            <a:pPr marL="342900" indent="-342900">
+              <a:buAutoNum type="arabicPeriod" startAt="3"/>
+            </a:pPr>
+            <a:r>
+              <a:rPr lang="en-US" altLang="zh-CN" dirty="0"/>
+              <a:t>Git</a:t>
+            </a:r>
+            <a:r>
+              <a:rPr lang="zh-CN" altLang="en-US" dirty="0"/>
+              <a:t>分佈式版本控制系統全稱</a:t>
+            </a:r>
+            <a:endParaRPr lang="en-US" altLang="zh-CN" dirty="0"/>
+          </a:p>
+          <a:p>
+            <a:pPr lvl="1"/>
+            <a:r>
+              <a:rPr lang="en-US" altLang="zh-CN" dirty="0"/>
+              <a:t>Distributed Version Control System,</a:t>
+            </a:r>
+            <a:r>
+              <a:rPr lang="zh-CN" altLang="en-US" dirty="0"/>
+              <a:t> </a:t>
+            </a:r>
+            <a:r>
+              <a:rPr lang="en-US" altLang="zh-CN"/>
+              <a:t>DVCS</a:t>
+            </a:r>
+            <a:endParaRPr lang="en-US" altLang="zh-CN" dirty="0"/>
           </a:p>
         </p:txBody>
       </p:sp>
@@ -6208,4 +6804,299 @@
     </a:ext>
   </a:extLst>
 </a:theme>
+</file>
+
+<file path=ppt/theme/theme2.xml><?xml version="1.0" encoding="utf-8"?>
+<a:theme xmlns:a="http://schemas.openxmlformats.org/drawingml/2006/main" name="Office 佈景主題">
+  <a:themeElements>
+    <a:clrScheme name="Office">
+      <a:dk1>
+        <a:sysClr val="windowText" lastClr="000000"/>
+      </a:dk1>
+      <a:lt1>
+        <a:sysClr val="window" lastClr="FFFFFF"/>
+      </a:lt1>
+      <a:dk2>
+        <a:srgbClr val="44546A"/>
+      </a:dk2>
+      <a:lt2>
+        <a:srgbClr val="E7E6E6"/>
+      </a:lt2>
+      <a:accent1>
+        <a:srgbClr val="4472C4"/>
+      </a:accent1>
+      <a:accent2>
+        <a:srgbClr val="ED7D31"/>
+      </a:accent2>
+      <a:accent3>
+        <a:srgbClr val="A5A5A5"/>
+      </a:accent3>
+      <a:accent4>
+        <a:srgbClr val="FFC000"/>
+      </a:accent4>
+      <a:accent5>
+        <a:srgbClr val="5B9BD5"/>
+      </a:accent5>
+      <a:accent6>
+        <a:srgbClr val="70AD47"/>
+      </a:accent6>
+      <a:hlink>
+        <a:srgbClr val="0563C1"/>
+      </a:hlink>
+      <a:folHlink>
+        <a:srgbClr val="954F72"/>
+      </a:folHlink>
+    </a:clrScheme>
+    <a:fontScheme name="Office">
+      <a:majorFont>
+        <a:latin typeface="Calibri Light" panose="020F0302020204030204"/>
+        <a:ea typeface=""/>
+        <a:cs typeface=""/>
+        <a:font script="Jpan" typeface="游ゴシック Light"/>
+        <a:font script="Hang" typeface="맑은 고딕"/>
+        <a:font script="Hans" typeface="等线 Light"/>
+        <a:font script="Hant" typeface="新細明體"/>
+        <a:font script="Arab" typeface="Times New Roman"/>
+        <a:font script="Hebr" typeface="Times New Roman"/>
+        <a:font script="Thai" typeface="Angsana New"/>
+        <a:font script="Ethi" typeface="Nyala"/>
+        <a:font script="Beng" typeface="Vrinda"/>
+        <a:font script="Gujr" typeface="Shruti"/>
+        <a:font script="Khmr" typeface="MoolBoran"/>
+        <a:font script="Knda" typeface="Tunga"/>
+        <a:font script="Guru" typeface="Raavi"/>
+        <a:font script="Cans" typeface="Euphemia"/>
+        <a:font script="Cher" typeface="Plantagenet Cherokee"/>
+        <a:font script="Yiii" typeface="Microsoft Yi Baiti"/>
+        <a:font script="Tibt" typeface="Microsoft Himalaya"/>
+        <a:font script="Thaa" typeface="MV Boli"/>
+        <a:font script="Deva" typeface="Mangal"/>
+        <a:font script="Telu" typeface="Gautami"/>
+        <a:font script="Taml" typeface="Latha"/>
+        <a:font script="Syrc" typeface="Estrangelo Edessa"/>
+        <a:font script="Orya" typeface="Kalinga"/>
+        <a:font script="Mlym" typeface="Kartika"/>
+        <a:font script="Laoo" typeface="DokChampa"/>
+        <a:font script="Sinh" typeface="Iskoola Pota"/>
+        <a:font script="Mong" typeface="Mongolian Baiti"/>
+        <a:font script="Viet" typeface="Times New Roman"/>
+        <a:font script="Uigh" typeface="Microsoft Uighur"/>
+        <a:font script="Geor" typeface="Sylfaen"/>
+        <a:font script="Armn" typeface="Arial"/>
+        <a:font script="Bugi" typeface="Leelawadee UI"/>
+        <a:font script="Bopo" typeface="Microsoft JhengHei"/>
+        <a:font script="Java" typeface="Javanese Text"/>
+        <a:font script="Lisu" typeface="Segoe UI"/>
+        <a:font script="Mymr" typeface="Myanmar Text"/>
+        <a:font script="Nkoo" typeface="Ebrima"/>
+        <a:font script="Olck" typeface="Nirmala UI"/>
+        <a:font script="Osma" typeface="Ebrima"/>
+        <a:font script="Phag" typeface="Phagspa"/>
+        <a:font script="Syrn" typeface="Estrangelo Edessa"/>
+        <a:font script="Syrj" typeface="Estrangelo Edessa"/>
+        <a:font script="Syre" typeface="Estrangelo Edessa"/>
+        <a:font script="Sora" typeface="Nirmala UI"/>
+        <a:font script="Tale" typeface="Microsoft Tai Le"/>
+        <a:font script="Talu" typeface="Microsoft New Tai Lue"/>
+        <a:font script="Tfng" typeface="Ebrima"/>
+      </a:majorFont>
+      <a:minorFont>
+        <a:latin typeface="Calibri" panose="020F0502020204030204"/>
+        <a:ea typeface=""/>
+        <a:cs typeface=""/>
+        <a:font script="Jpan" typeface="游ゴシック"/>
+        <a:font script="Hang" typeface="맑은 고딕"/>
+        <a:font script="Hans" typeface="等线"/>
+        <a:font script="Hant" typeface="新細明體"/>
+        <a:font script="Arab" typeface="Arial"/>
+        <a:font script="Hebr" typeface="Arial"/>
+        <a:font script="Thai" typeface="Cordia New"/>
+        <a:font script="Ethi" typeface="Nyala"/>
+        <a:font script="Beng" typeface="Vrinda"/>
+        <a:font script="Gujr" typeface="Shruti"/>
+        <a:font script="Khmr" typeface="DaunPenh"/>
+        <a:font script="Knda" typeface="Tunga"/>
+        <a:font script="Guru" typeface="Raavi"/>
+        <a:font script="Cans" typeface="Euphemia"/>
+        <a:font script="Cher" typeface="Plantagenet Cherokee"/>
+        <a:font script="Yiii" typeface="Microsoft Yi Baiti"/>
+        <a:font script="Tibt" typeface="Microsoft Himalaya"/>
+        <a:font script="Thaa" typeface="MV Boli"/>
+        <a:font script="Deva" typeface="Mangal"/>
+        <a:font script="Telu" typeface="Gautami"/>
+        <a:font script="Taml" typeface="Latha"/>
+        <a:font script="Syrc" typeface="Estrangelo Edessa"/>
+        <a:font script="Orya" typeface="Kalinga"/>
+        <a:font script="Mlym" typeface="Kartika"/>
+        <a:font script="Laoo" typeface="DokChampa"/>
+        <a:font script="Sinh" typeface="Iskoola Pota"/>
+        <a:font script="Mong" typeface="Mongolian Baiti"/>
+        <a:font script="Viet" typeface="Arial"/>
+        <a:font script="Uigh" typeface="Microsoft Uighur"/>
+        <a:font script="Geor" typeface="Sylfaen"/>
+        <a:font script="Armn" typeface="Arial"/>
+        <a:font script="Bugi" typeface="Leelawadee UI"/>
+        <a:font script="Bopo" typeface="Microsoft JhengHei"/>
+        <a:font script="Java" typeface="Javanese Text"/>
+        <a:font script="Lisu" typeface="Segoe UI"/>
+        <a:font script="Mymr" typeface="Myanmar Text"/>
+        <a:font script="Nkoo" typeface="Ebrima"/>
+        <a:font script="Olck" typeface="Nirmala UI"/>
+        <a:font script="Osma" typeface="Ebrima"/>
+        <a:font script="Phag" typeface="Phagspa"/>
+        <a:font script="Syrn" typeface="Estrangelo Edessa"/>
+        <a:font script="Syrj" typeface="Estrangelo Edessa"/>
+        <a:font script="Syre" typeface="Estrangelo Edessa"/>
+        <a:font script="Sora" typeface="Nirmala UI"/>
+        <a:font script="Tale" typeface="Microsoft Tai Le"/>
+        <a:font script="Talu" typeface="Microsoft New Tai Lue"/>
+        <a:font script="Tfng" typeface="Ebrima"/>
+      </a:minorFont>
+    </a:fontScheme>
+    <a:fmtScheme name="Office">
+      <a:fillStyleLst>
+        <a:solidFill>
+          <a:schemeClr val="phClr"/>
+        </a:solidFill>
+        <a:gradFill rotWithShape="1">
+          <a:gsLst>
+            <a:gs pos="0">
+              <a:schemeClr val="phClr">
+                <a:lumMod val="110000"/>
+                <a:satMod val="105000"/>
+                <a:tint val="67000"/>
+              </a:schemeClr>
+            </a:gs>
+            <a:gs pos="50000">
+              <a:schemeClr val="phClr">
+                <a:lumMod val="105000"/>
+                <a:satMod val="103000"/>
+                <a:tint val="73000"/>
+              </a:schemeClr>
+            </a:gs>
+            <a:gs pos="100000">
+              <a:schemeClr val="phClr">
+                <a:lumMod val="105000"/>
+                <a:satMod val="109000"/>
+                <a:tint val="81000"/>
+              </a:schemeClr>
+            </a:gs>
+          </a:gsLst>
+          <a:lin ang="5400000" scaled="0"/>
+        </a:gradFill>
+        <a:gradFill rotWithShape="1">
+          <a:gsLst>
+            <a:gs pos="0">
+              <a:schemeClr val="phClr">
+                <a:satMod val="103000"/>
+                <a:lumMod val="102000"/>
+                <a:tint val="94000"/>
+              </a:schemeClr>
+            </a:gs>
+            <a:gs pos="50000">
+              <a:schemeClr val="phClr">
+                <a:satMod val="110000"/>
+                <a:lumMod val="100000"/>
+                <a:shade val="100000"/>
+              </a:schemeClr>
+            </a:gs>
+            <a:gs pos="100000">
+              <a:schemeClr val="phClr">
+                <a:lumMod val="99000"/>
+                <a:satMod val="120000"/>
+                <a:shade val="78000"/>
+              </a:schemeClr>
+            </a:gs>
+          </a:gsLst>
+          <a:lin ang="5400000" scaled="0"/>
+        </a:gradFill>
+      </a:fillStyleLst>
+      <a:lnStyleLst>
+        <a:ln w="6350" cap="flat" cmpd="sng" algn="ctr">
+          <a:solidFill>
+            <a:schemeClr val="phClr"/>
+          </a:solidFill>
+          <a:prstDash val="solid"/>
+          <a:miter lim="800000"/>
+        </a:ln>
+        <a:ln w="12700" cap="flat" cmpd="sng" algn="ctr">
+          <a:solidFill>
+            <a:schemeClr val="phClr"/>
+          </a:solidFill>
+          <a:prstDash val="solid"/>
+          <a:miter lim="800000"/>
+        </a:ln>
+        <a:ln w="19050" cap="flat" cmpd="sng" algn="ctr">
+          <a:solidFill>
+            <a:schemeClr val="phClr"/>
+          </a:solidFill>
+          <a:prstDash val="solid"/>
+          <a:miter lim="800000"/>
+        </a:ln>
+      </a:lnStyleLst>
+      <a:effectStyleLst>
+        <a:effectStyle>
+          <a:effectLst/>
+        </a:effectStyle>
+        <a:effectStyle>
+          <a:effectLst/>
+        </a:effectStyle>
+        <a:effectStyle>
+          <a:effectLst>
+            <a:outerShdw blurRad="57150" dist="19050" dir="5400000" algn="ctr" rotWithShape="0">
+              <a:srgbClr val="000000">
+                <a:alpha val="63000"/>
+              </a:srgbClr>
+            </a:outerShdw>
+          </a:effectLst>
+        </a:effectStyle>
+      </a:effectStyleLst>
+      <a:bgFillStyleLst>
+        <a:solidFill>
+          <a:schemeClr val="phClr"/>
+        </a:solidFill>
+        <a:solidFill>
+          <a:schemeClr val="phClr">
+            <a:tint val="95000"/>
+            <a:satMod val="170000"/>
+          </a:schemeClr>
+        </a:solidFill>
+        <a:gradFill rotWithShape="1">
+          <a:gsLst>
+            <a:gs pos="0">
+              <a:schemeClr val="phClr">
+                <a:tint val="93000"/>
+                <a:satMod val="150000"/>
+                <a:shade val="98000"/>
+                <a:lumMod val="102000"/>
+              </a:schemeClr>
+            </a:gs>
+            <a:gs pos="50000">
+              <a:schemeClr val="phClr">
+                <a:tint val="98000"/>
+                <a:satMod val="130000"/>
+                <a:shade val="90000"/>
+                <a:lumMod val="103000"/>
+              </a:schemeClr>
+            </a:gs>
+            <a:gs pos="100000">
+              <a:schemeClr val="phClr">
+                <a:shade val="63000"/>
+                <a:satMod val="120000"/>
+              </a:schemeClr>
+            </a:gs>
+          </a:gsLst>
+          <a:lin ang="5400000" scaled="0"/>
+        </a:gradFill>
+      </a:bgFillStyleLst>
+    </a:fmtScheme>
+  </a:themeElements>
+  <a:objectDefaults/>
+  <a:extraClrSchemeLst/>
+  <a:extLst>
+    <a:ext uri="{05A4C25C-085E-4340-85A3-A5531E510DB2}">
+      <thm15:themeFamily xmlns:thm15="http://schemas.microsoft.com/office/thememl/2012/main" name="Office Theme" id="{62F939B6-93AF-4DB8-9C6B-D6C7DFDC589F}" vid="{4A3C46E8-61CC-4603-A589-7422A47A8E4A}"/>
+    </a:ext>
+  </a:extLst>
+</a:theme>
 </file>
</xml_diff>

<commit_message>
Add modify commit command in pptx
</commit_message>
<xml_diff>
--- a/GitStudy/GitStudy.pptx
+++ b/GitStudy/GitStudy.pptx
@@ -5,7 +5,7 @@
     <p:sldMasterId id="2147483648" r:id="rId1"/>
   </p:sldMasterIdLst>
   <p:notesMasterIdLst>
-    <p:notesMasterId r:id="rId14"/>
+    <p:notesMasterId r:id="rId16"/>
   </p:notesMasterIdLst>
   <p:sldIdLst>
     <p:sldId id="256" r:id="rId2"/>
@@ -14,12 +14,14 @@
     <p:sldId id="263" r:id="rId5"/>
     <p:sldId id="264" r:id="rId6"/>
     <p:sldId id="265" r:id="rId7"/>
-    <p:sldId id="266" r:id="rId8"/>
-    <p:sldId id="259" r:id="rId9"/>
-    <p:sldId id="260" r:id="rId10"/>
-    <p:sldId id="261" r:id="rId11"/>
-    <p:sldId id="262" r:id="rId12"/>
-    <p:sldId id="267" r:id="rId13"/>
+    <p:sldId id="268" r:id="rId8"/>
+    <p:sldId id="266" r:id="rId9"/>
+    <p:sldId id="259" r:id="rId10"/>
+    <p:sldId id="260" r:id="rId11"/>
+    <p:sldId id="261" r:id="rId12"/>
+    <p:sldId id="262" r:id="rId13"/>
+    <p:sldId id="267" r:id="rId14"/>
+    <p:sldId id="269" r:id="rId15"/>
   </p:sldIdLst>
   <p:sldSz cx="12192000" cy="6858000"/>
   <p:notesSz cx="6858000" cy="9144000"/>
@@ -208,7 +210,7 @@
           <a:p>
             <a:fld id="{C0F69D9A-D151-4089-8C1D-9A87D3DC0987}" type="datetimeFigureOut">
               <a:rPr lang="zh-TW" altLang="en-US" smtClean="0"/>
-              <a:t>2023/1/26</a:t>
+              <a:t>2023/1/29</a:t>
             </a:fld>
             <a:endParaRPr lang="zh-TW" altLang="en-US"/>
           </a:p>
@@ -622,7 +624,7 @@
           <a:p>
             <a:fld id="{B3DC4D43-2745-46E1-A871-6B61F7786A47}" type="datetimeFigureOut">
               <a:rPr lang="zh-TW" altLang="en-US" smtClean="0"/>
-              <a:t>2023/1/26</a:t>
+              <a:t>2023/1/29</a:t>
             </a:fld>
             <a:endParaRPr lang="zh-TW" altLang="en-US"/>
           </a:p>
@@ -820,7 +822,7 @@
           <a:p>
             <a:fld id="{B3DC4D43-2745-46E1-A871-6B61F7786A47}" type="datetimeFigureOut">
               <a:rPr lang="zh-TW" altLang="en-US" smtClean="0"/>
-              <a:t>2023/1/26</a:t>
+              <a:t>2023/1/29</a:t>
             </a:fld>
             <a:endParaRPr lang="zh-TW" altLang="en-US"/>
           </a:p>
@@ -1028,7 +1030,7 @@
           <a:p>
             <a:fld id="{B3DC4D43-2745-46E1-A871-6B61F7786A47}" type="datetimeFigureOut">
               <a:rPr lang="zh-TW" altLang="en-US" smtClean="0"/>
-              <a:t>2023/1/26</a:t>
+              <a:t>2023/1/29</a:t>
             </a:fld>
             <a:endParaRPr lang="zh-TW" altLang="en-US"/>
           </a:p>
@@ -1226,7 +1228,7 @@
           <a:p>
             <a:fld id="{B3DC4D43-2745-46E1-A871-6B61F7786A47}" type="datetimeFigureOut">
               <a:rPr lang="zh-TW" altLang="en-US" smtClean="0"/>
-              <a:t>2023/1/26</a:t>
+              <a:t>2023/1/29</a:t>
             </a:fld>
             <a:endParaRPr lang="zh-TW" altLang="en-US"/>
           </a:p>
@@ -1501,7 +1503,7 @@
           <a:p>
             <a:fld id="{B3DC4D43-2745-46E1-A871-6B61F7786A47}" type="datetimeFigureOut">
               <a:rPr lang="zh-TW" altLang="en-US" smtClean="0"/>
-              <a:t>2023/1/26</a:t>
+              <a:t>2023/1/29</a:t>
             </a:fld>
             <a:endParaRPr lang="zh-TW" altLang="en-US"/>
           </a:p>
@@ -1766,7 +1768,7 @@
           <a:p>
             <a:fld id="{B3DC4D43-2745-46E1-A871-6B61F7786A47}" type="datetimeFigureOut">
               <a:rPr lang="zh-TW" altLang="en-US" smtClean="0"/>
-              <a:t>2023/1/26</a:t>
+              <a:t>2023/1/29</a:t>
             </a:fld>
             <a:endParaRPr lang="zh-TW" altLang="en-US"/>
           </a:p>
@@ -2178,7 +2180,7 @@
           <a:p>
             <a:fld id="{B3DC4D43-2745-46E1-A871-6B61F7786A47}" type="datetimeFigureOut">
               <a:rPr lang="zh-TW" altLang="en-US" smtClean="0"/>
-              <a:t>2023/1/26</a:t>
+              <a:t>2023/1/29</a:t>
             </a:fld>
             <a:endParaRPr lang="zh-TW" altLang="en-US"/>
           </a:p>
@@ -2319,7 +2321,7 @@
           <a:p>
             <a:fld id="{B3DC4D43-2745-46E1-A871-6B61F7786A47}" type="datetimeFigureOut">
               <a:rPr lang="zh-TW" altLang="en-US" smtClean="0"/>
-              <a:t>2023/1/26</a:t>
+              <a:t>2023/1/29</a:t>
             </a:fld>
             <a:endParaRPr lang="zh-TW" altLang="en-US"/>
           </a:p>
@@ -2432,7 +2434,7 @@
           <a:p>
             <a:fld id="{B3DC4D43-2745-46E1-A871-6B61F7786A47}" type="datetimeFigureOut">
               <a:rPr lang="zh-TW" altLang="en-US" smtClean="0"/>
-              <a:t>2023/1/26</a:t>
+              <a:t>2023/1/29</a:t>
             </a:fld>
             <a:endParaRPr lang="zh-TW" altLang="en-US"/>
           </a:p>
@@ -2743,7 +2745,7 @@
           <a:p>
             <a:fld id="{B3DC4D43-2745-46E1-A871-6B61F7786A47}" type="datetimeFigureOut">
               <a:rPr lang="zh-TW" altLang="en-US" smtClean="0"/>
-              <a:t>2023/1/26</a:t>
+              <a:t>2023/1/29</a:t>
             </a:fld>
             <a:endParaRPr lang="zh-TW" altLang="en-US"/>
           </a:p>
@@ -3031,7 +3033,7 @@
           <a:p>
             <a:fld id="{B3DC4D43-2745-46E1-A871-6B61F7786A47}" type="datetimeFigureOut">
               <a:rPr lang="zh-TW" altLang="en-US" smtClean="0"/>
-              <a:t>2023/1/26</a:t>
+              <a:t>2023/1/29</a:t>
             </a:fld>
             <a:endParaRPr lang="zh-TW" altLang="en-US"/>
           </a:p>
@@ -3272,7 +3274,7 @@
           <a:p>
             <a:fld id="{B3DC4D43-2745-46E1-A871-6B61F7786A47}" type="datetimeFigureOut">
               <a:rPr lang="zh-TW" altLang="en-US" smtClean="0"/>
-              <a:t>2023/1/26</a:t>
+              <a:t>2023/1/29</a:t>
             </a:fld>
             <a:endParaRPr lang="zh-TW" altLang="en-US"/>
           </a:p>
@@ -3810,6 +3812,202 @@
         </p:nvSpPr>
         <p:spPr>
           <a:xfrm flipH="1">
+            <a:off x="5003392" y="1105804"/>
+            <a:ext cx="3230882" cy="369332"/>
+          </a:xfrm>
+          <a:prstGeom prst="rect">
+            <a:avLst/>
+          </a:prstGeom>
+          <a:noFill/>
+        </p:spPr>
+        <p:txBody>
+          <a:bodyPr wrap="square" rtlCol="0">
+            <a:spAutoFit/>
+          </a:bodyPr>
+          <a:lstStyle/>
+          <a:p>
+            <a:r>
+              <a:rPr lang="zh-CN" altLang="en-US" dirty="0"/>
+              <a:t>修改某個文件内容</a:t>
+            </a:r>
+            <a:endParaRPr lang="zh-TW" altLang="en-US" dirty="0"/>
+          </a:p>
+        </p:txBody>
+      </p:sp>
+      <p:sp>
+        <p:nvSpPr>
+          <p:cNvPr id="9" name="箭號: 向下 8">
+            <a:extLst>
+              <a:ext uri="{FF2B5EF4-FFF2-40B4-BE49-F238E27FC236}">
+                <a16:creationId xmlns:a16="http://schemas.microsoft.com/office/drawing/2014/main" id="{2FCCB5B6-35FA-41D1-9A57-23ACAE0006F5}"/>
+              </a:ext>
+            </a:extLst>
+          </p:cNvPr>
+          <p:cNvSpPr/>
+          <p:nvPr/>
+        </p:nvSpPr>
+        <p:spPr>
+          <a:xfrm>
+            <a:off x="5455920" y="5382864"/>
+            <a:ext cx="934720" cy="790545"/>
+          </a:xfrm>
+          <a:prstGeom prst="downArrow">
+            <a:avLst/>
+          </a:prstGeom>
+        </p:spPr>
+        <p:style>
+          <a:lnRef idx="2">
+            <a:schemeClr val="accent1">
+              <a:shade val="50000"/>
+            </a:schemeClr>
+          </a:lnRef>
+          <a:fillRef idx="1">
+            <a:schemeClr val="accent1"/>
+          </a:fillRef>
+          <a:effectRef idx="0">
+            <a:schemeClr val="accent1"/>
+          </a:effectRef>
+          <a:fontRef idx="minor">
+            <a:schemeClr val="lt1"/>
+          </a:fontRef>
+        </p:style>
+        <p:txBody>
+          <a:bodyPr rtlCol="0" anchor="ctr"/>
+          <a:lstStyle/>
+          <a:p>
+            <a:pPr algn="ctr"/>
+            <a:endParaRPr lang="zh-TW" altLang="en-US"/>
+          </a:p>
+        </p:txBody>
+      </p:sp>
+      <p:pic>
+        <p:nvPicPr>
+          <p:cNvPr id="3" name="圖片 2">
+            <a:extLst>
+              <a:ext uri="{FF2B5EF4-FFF2-40B4-BE49-F238E27FC236}">
+                <a16:creationId xmlns:a16="http://schemas.microsoft.com/office/drawing/2014/main" id="{77378AED-F75E-4D86-B271-D01414623425}"/>
+              </a:ext>
+            </a:extLst>
+          </p:cNvPr>
+          <p:cNvPicPr>
+            <a:picLocks noChangeAspect="1"/>
+          </p:cNvPicPr>
+          <p:nvPr/>
+        </p:nvPicPr>
+        <p:blipFill>
+          <a:blip r:embed="rId2">
+            <a:extLst>
+              <a:ext uri="{28A0092B-C50C-407E-A947-70E740481C1C}">
+                <a14:useLocalDpi xmlns:a14="http://schemas.microsoft.com/office/drawing/2010/main" val="0"/>
+              </a:ext>
+            </a:extLst>
+          </a:blip>
+          <a:stretch>
+            <a:fillRect/>
+          </a:stretch>
+        </p:blipFill>
+        <p:spPr>
+          <a:xfrm>
+            <a:off x="3774440" y="1573389"/>
+            <a:ext cx="4643120" cy="3711222"/>
+          </a:xfrm>
+          <a:prstGeom prst="rect">
+            <a:avLst/>
+          </a:prstGeom>
+        </p:spPr>
+      </p:pic>
+    </p:spTree>
+    <p:extLst>
+      <p:ext uri="{BB962C8B-B14F-4D97-AF65-F5344CB8AC3E}">
+        <p14:creationId xmlns:p14="http://schemas.microsoft.com/office/powerpoint/2010/main" val="4280783543"/>
+      </p:ext>
+    </p:extLst>
+  </p:cSld>
+  <p:clrMapOvr>
+    <a:masterClrMapping/>
+  </p:clrMapOvr>
+</p:sld>
+</file>
+
+<file path=ppt/slides/slide11.xml><?xml version="1.0" encoding="utf-8"?>
+<p:sld xmlns:a="http://schemas.openxmlformats.org/drawingml/2006/main" xmlns:r="http://schemas.openxmlformats.org/officeDocument/2006/relationships" xmlns:p="http://schemas.openxmlformats.org/presentationml/2006/main">
+  <p:cSld>
+    <p:spTree>
+      <p:nvGrpSpPr>
+        <p:cNvPr id="1" name=""/>
+        <p:cNvGrpSpPr/>
+        <p:nvPr/>
+      </p:nvGrpSpPr>
+      <p:grpSpPr>
+        <a:xfrm>
+          <a:off x="0" y="0"/>
+          <a:ext cx="0" cy="0"/>
+          <a:chOff x="0" y="0"/>
+          <a:chExt cx="0" cy="0"/>
+        </a:xfrm>
+      </p:grpSpPr>
+      <p:sp>
+        <p:nvSpPr>
+          <p:cNvPr id="5" name="文字方塊 4">
+            <a:extLst>
+              <a:ext uri="{FF2B5EF4-FFF2-40B4-BE49-F238E27FC236}">
+                <a16:creationId xmlns:a16="http://schemas.microsoft.com/office/drawing/2014/main" id="{0B1F6121-1C23-4A07-A66F-19BD3BFDA4C3}"/>
+              </a:ext>
+            </a:extLst>
+          </p:cNvPr>
+          <p:cNvSpPr txBox="1"/>
+          <p:nvPr/>
+        </p:nvSpPr>
+        <p:spPr>
+          <a:xfrm>
+            <a:off x="304800" y="284480"/>
+            <a:ext cx="4425699" cy="400110"/>
+          </a:xfrm>
+          <a:prstGeom prst="rect">
+            <a:avLst/>
+          </a:prstGeom>
+          <a:noFill/>
+        </p:spPr>
+        <p:txBody>
+          <a:bodyPr wrap="none" rtlCol="0">
+            <a:spAutoFit/>
+          </a:bodyPr>
+          <a:lstStyle/>
+          <a:p>
+            <a:r>
+              <a:rPr lang="en-US" altLang="zh-TW" sz="2000" b="1" u="sng" dirty="0"/>
+              <a:t>Git </a:t>
+            </a:r>
+            <a:r>
+              <a:rPr lang="zh-CN" altLang="en-US" sz="2000" b="1" u="sng" dirty="0"/>
+              <a:t>修改一次文件到</a:t>
+            </a:r>
+            <a:r>
+              <a:rPr lang="en-US" altLang="zh-CN" sz="2000" b="1" u="sng" dirty="0"/>
+              <a:t>commit</a:t>
+            </a:r>
+            <a:r>
+              <a:rPr lang="zh-CN" altLang="en-US" sz="2000" b="1" u="sng" dirty="0"/>
+              <a:t>的圖示過程</a:t>
+            </a:r>
+            <a:endParaRPr lang="zh-TW" altLang="en-US" sz="2000" b="1" u="sng" dirty="0"/>
+          </a:p>
+        </p:txBody>
+      </p:sp>
+      <p:sp>
+        <p:nvSpPr>
+          <p:cNvPr id="8" name="文字方塊 7">
+            <a:extLst>
+              <a:ext uri="{FF2B5EF4-FFF2-40B4-BE49-F238E27FC236}">
+                <a16:creationId xmlns:a16="http://schemas.microsoft.com/office/drawing/2014/main" id="{49C93D34-C734-4A03-AE9A-C29244EFEBC3}"/>
+              </a:ext>
+            </a:extLst>
+          </p:cNvPr>
+          <p:cNvSpPr txBox="1"/>
+          <p:nvPr/>
+        </p:nvSpPr>
+        <p:spPr>
+          <a:xfrm flipH="1">
             <a:off x="4740659" y="1105803"/>
             <a:ext cx="3230882" cy="369332"/>
           </a:xfrm>
@@ -3931,7 +4129,7 @@
 </p:sld>
 </file>
 
-<file path=ppt/slides/slide11.xml><?xml version="1.0" encoding="utf-8"?>
+<file path=ppt/slides/slide12.xml><?xml version="1.0" encoding="utf-8"?>
 <p:sld xmlns:a="http://schemas.openxmlformats.org/drawingml/2006/main" xmlns:r="http://schemas.openxmlformats.org/officeDocument/2006/relationships" xmlns:p="http://schemas.openxmlformats.org/presentationml/2006/main">
   <p:cSld>
     <p:spTree>
@@ -4085,7 +4283,7 @@
 </p:sld>
 </file>
 
-<file path=ppt/slides/slide12.xml><?xml version="1.0" encoding="utf-8"?>
+<file path=ppt/slides/slide13.xml><?xml version="1.0" encoding="utf-8"?>
 <p:sld xmlns:a="http://schemas.openxmlformats.org/drawingml/2006/main" xmlns:r="http://schemas.openxmlformats.org/officeDocument/2006/relationships" xmlns:p="http://schemas.openxmlformats.org/presentationml/2006/main">
   <p:cSld>
     <p:spTree>
@@ -4285,6 +4483,270 @@
     <p:extLst>
       <p:ext uri="{BB962C8B-B14F-4D97-AF65-F5344CB8AC3E}">
         <p14:creationId xmlns:p14="http://schemas.microsoft.com/office/powerpoint/2010/main" val="2585208332"/>
+      </p:ext>
+    </p:extLst>
+  </p:cSld>
+  <p:clrMapOvr>
+    <a:masterClrMapping/>
+  </p:clrMapOvr>
+</p:sld>
+</file>
+
+<file path=ppt/slides/slide14.xml><?xml version="1.0" encoding="utf-8"?>
+<p:sld xmlns:a="http://schemas.openxmlformats.org/drawingml/2006/main" xmlns:r="http://schemas.openxmlformats.org/officeDocument/2006/relationships" xmlns:p="http://schemas.openxmlformats.org/presentationml/2006/main">
+  <p:cSld>
+    <p:spTree>
+      <p:nvGrpSpPr>
+        <p:cNvPr id="1" name=""/>
+        <p:cNvGrpSpPr/>
+        <p:nvPr/>
+      </p:nvGrpSpPr>
+      <p:grpSpPr>
+        <a:xfrm>
+          <a:off x="0" y="0"/>
+          <a:ext cx="0" cy="0"/>
+          <a:chOff x="0" y="0"/>
+          <a:chExt cx="0" cy="0"/>
+        </a:xfrm>
+      </p:grpSpPr>
+      <p:sp>
+        <p:nvSpPr>
+          <p:cNvPr id="4" name="文本框 3"/>
+          <p:cNvSpPr txBox="1"/>
+          <p:nvPr/>
+        </p:nvSpPr>
+        <p:spPr>
+          <a:xfrm>
+            <a:off x="346364" y="277090"/>
+            <a:ext cx="11399467" cy="2308324"/>
+          </a:xfrm>
+          <a:prstGeom prst="rect">
+            <a:avLst/>
+          </a:prstGeom>
+          <a:noFill/>
+        </p:spPr>
+        <p:txBody>
+          <a:bodyPr wrap="none" rtlCol="0">
+            <a:spAutoFit/>
+          </a:bodyPr>
+          <a:lstStyle/>
+          <a:p>
+            <a:r>
+              <a:rPr lang="zh-CN" altLang="en-US" b="1" u="sng" dirty="0" smtClean="0"/>
+              <a:t>更改提交的相关命令</a:t>
+            </a:r>
+            <a:endParaRPr lang="en-US" altLang="zh-CN" b="1" u="sng" dirty="0" smtClean="0"/>
+          </a:p>
+          <a:p>
+            <a:endParaRPr lang="en-US" altLang="zh-CN" b="1" u="sng" dirty="0"/>
+          </a:p>
+          <a:p>
+            <a:r>
+              <a:rPr lang="en-US" altLang="zh-CN" b="1" dirty="0"/>
+              <a:t>	</a:t>
+            </a:r>
+            <a:r>
+              <a:rPr lang="en-US" altLang="zh-CN" b="1" dirty="0" smtClean="0"/>
+              <a:t>1.  </a:t>
+            </a:r>
+            <a:r>
+              <a:rPr lang="en-US" altLang="zh-CN" b="1" dirty="0" err="1" smtClean="0"/>
+              <a:t>git</a:t>
+            </a:r>
+            <a:r>
+              <a:rPr lang="en-US" altLang="zh-CN" b="1" dirty="0" smtClean="0"/>
+              <a:t> reset mixed</a:t>
+            </a:r>
+            <a:r>
+              <a:rPr lang="zh-CN" altLang="en-US" b="1" dirty="0" smtClean="0"/>
+              <a:t>， </a:t>
+            </a:r>
+            <a:r>
+              <a:rPr lang="en-US" altLang="zh-CN" b="1" dirty="0" smtClean="0"/>
+              <a:t>hard</a:t>
+            </a:r>
+            <a:r>
+              <a:rPr lang="zh-CN" altLang="en-US" b="1" dirty="0" smtClean="0"/>
+              <a:t>， </a:t>
+            </a:r>
+            <a:r>
+              <a:rPr lang="en-US" altLang="zh-CN" b="1" dirty="0" smtClean="0"/>
+              <a:t>soft</a:t>
+            </a:r>
+          </a:p>
+          <a:p>
+            <a:r>
+              <a:rPr lang="en-US" altLang="zh-CN" b="1" dirty="0"/>
+              <a:t>	 </a:t>
+            </a:r>
+            <a:r>
+              <a:rPr lang="en-US" altLang="zh-CN" b="1" dirty="0" smtClean="0"/>
+              <a:t>     </a:t>
+            </a:r>
+            <a:r>
+              <a:rPr lang="en-US" altLang="zh-CN" b="1" dirty="0" err="1" smtClean="0"/>
+              <a:t>git</a:t>
+            </a:r>
+            <a:r>
+              <a:rPr lang="en-US" altLang="zh-CN" b="1" dirty="0" smtClean="0"/>
+              <a:t> reset --mixed HEAD </a:t>
+            </a:r>
+            <a:r>
+              <a:rPr lang="zh-CN" altLang="en-US" b="1" dirty="0" smtClean="0"/>
+              <a:t>本地版本库</a:t>
+            </a:r>
+            <a:r>
+              <a:rPr lang="en-US" altLang="zh-CN" b="1" dirty="0" smtClean="0"/>
+              <a:t>HEAD</a:t>
+            </a:r>
+            <a:r>
+              <a:rPr lang="zh-CN" altLang="en-US" b="1" dirty="0" smtClean="0"/>
+              <a:t>前内容退回工作区</a:t>
+            </a:r>
+            <a:r>
+              <a:rPr lang="en-US" altLang="zh-CN" b="1" dirty="0" smtClean="0"/>
+              <a:t>, </a:t>
+            </a:r>
+            <a:r>
+              <a:rPr lang="zh-CN" altLang="en-US" b="1" dirty="0" smtClean="0"/>
+              <a:t>索引退回工作区</a:t>
+            </a:r>
+            <a:r>
+              <a:rPr lang="en-US" altLang="zh-CN" b="1" dirty="0" smtClean="0"/>
+              <a:t>, </a:t>
+            </a:r>
+            <a:r>
+              <a:rPr lang="zh-CN" altLang="en-US" b="1" dirty="0" smtClean="0"/>
+              <a:t>工作区内容不变</a:t>
+            </a:r>
+            <a:endParaRPr lang="en-US" altLang="zh-CN" b="1" dirty="0" smtClean="0"/>
+          </a:p>
+          <a:p>
+            <a:r>
+              <a:rPr lang="en-US" altLang="zh-CN" b="1" dirty="0" smtClean="0"/>
+              <a:t>	      </a:t>
+            </a:r>
+            <a:r>
+              <a:rPr lang="en-US" altLang="zh-CN" b="1" dirty="0" err="1" smtClean="0"/>
+              <a:t>git</a:t>
+            </a:r>
+            <a:r>
+              <a:rPr lang="en-US" altLang="zh-CN" b="1" dirty="0" smtClean="0"/>
+              <a:t> reset --hard HEAD   </a:t>
+            </a:r>
+            <a:r>
+              <a:rPr lang="zh-CN" altLang="en-US" b="1" dirty="0" smtClean="0"/>
+              <a:t>将本地版本库，索引，工作区恢复到与</a:t>
+            </a:r>
+            <a:r>
+              <a:rPr lang="en-US" altLang="zh-CN" b="1" dirty="0" smtClean="0"/>
+              <a:t>HEAD</a:t>
+            </a:r>
+            <a:r>
+              <a:rPr lang="zh-CN" altLang="en-US" b="1" dirty="0" smtClean="0"/>
+              <a:t>一样</a:t>
+            </a:r>
+            <a:r>
+              <a:rPr lang="en-US" altLang="zh-CN" b="1" dirty="0" smtClean="0"/>
+              <a:t>. </a:t>
+            </a:r>
+            <a:r>
+              <a:rPr lang="zh-CN" altLang="en-US" b="1" dirty="0" smtClean="0"/>
+              <a:t>索引和工作区内容全部消失</a:t>
+            </a:r>
+            <a:endParaRPr lang="en-US" altLang="zh-CN" b="1" dirty="0" smtClean="0"/>
+          </a:p>
+          <a:p>
+            <a:r>
+              <a:rPr lang="en-US" altLang="zh-CN" b="1" dirty="0"/>
+              <a:t>	</a:t>
+            </a:r>
+            <a:r>
+              <a:rPr lang="en-US" altLang="zh-CN" b="1" dirty="0" smtClean="0"/>
+              <a:t>      </a:t>
+            </a:r>
+            <a:r>
+              <a:rPr lang="en-US" altLang="zh-CN" b="1" dirty="0" err="1"/>
+              <a:t>git</a:t>
+            </a:r>
+            <a:r>
+              <a:rPr lang="en-US" altLang="zh-CN" b="1" dirty="0"/>
+              <a:t> reset </a:t>
+            </a:r>
+            <a:r>
+              <a:rPr lang="en-US" altLang="zh-CN" b="1" dirty="0" smtClean="0"/>
+              <a:t>--</a:t>
+            </a:r>
+            <a:r>
+              <a:rPr lang="en-US" altLang="zh-CN" b="1" dirty="0"/>
+              <a:t>soft</a:t>
+            </a:r>
+            <a:r>
+              <a:rPr lang="en-US" altLang="zh-CN" b="1" dirty="0" smtClean="0"/>
+              <a:t> HEAD   </a:t>
+            </a:r>
+            <a:r>
+              <a:rPr lang="zh-CN" altLang="en-US" b="1" dirty="0" smtClean="0"/>
+              <a:t>本地</a:t>
+            </a:r>
+            <a:r>
+              <a:rPr lang="zh-CN" altLang="en-US" b="1" dirty="0"/>
+              <a:t>版本库，索引，</a:t>
+            </a:r>
+            <a:r>
+              <a:rPr lang="zh-CN" altLang="en-US" b="1" dirty="0" smtClean="0"/>
+              <a:t>工作区都不变</a:t>
+            </a:r>
+            <a:r>
+              <a:rPr lang="en-US" altLang="zh-CN" b="1" dirty="0" smtClean="0"/>
+              <a:t>,  </a:t>
+            </a:r>
+            <a:r>
+              <a:rPr lang="zh-CN" altLang="en-US" b="1" dirty="0"/>
+              <a:t> </a:t>
+            </a:r>
+            <a:r>
+              <a:rPr lang="zh-CN" altLang="en-US" b="1" dirty="0" smtClean="0"/>
+              <a:t>本地版本库</a:t>
+            </a:r>
+            <a:r>
+              <a:rPr lang="en-US" altLang="zh-CN" b="1" dirty="0" smtClean="0"/>
+              <a:t>HEAD</a:t>
+            </a:r>
+            <a:r>
+              <a:rPr lang="zh-CN" altLang="en-US" b="1" dirty="0" smtClean="0"/>
+              <a:t>之后内容退回</a:t>
+            </a:r>
+            <a:r>
+              <a:rPr lang="zh-CN" altLang="en-US" b="1" dirty="0" smtClean="0"/>
+              <a:t>索引</a:t>
+            </a:r>
+            <a:endParaRPr lang="en-US" altLang="zh-CN" b="1" dirty="0" smtClean="0"/>
+          </a:p>
+          <a:p>
+            <a:endParaRPr lang="en-US" altLang="zh-CN" b="1" dirty="0"/>
+          </a:p>
+          <a:p>
+            <a:r>
+              <a:rPr lang="en-US" altLang="zh-CN" b="1" dirty="0" smtClean="0"/>
+              <a:t>	2.   </a:t>
+            </a:r>
+            <a:r>
+              <a:rPr lang="en-US" altLang="zh-CN" b="1" dirty="0" err="1" smtClean="0"/>
+              <a:t>git</a:t>
+            </a:r>
+            <a:r>
+              <a:rPr lang="en-US" altLang="zh-CN" b="1" dirty="0" smtClean="0"/>
+              <a:t> </a:t>
+            </a:r>
+            <a:endParaRPr lang="en-US" altLang="zh-CN" b="1" dirty="0"/>
+          </a:p>
+        </p:txBody>
+      </p:sp>
+    </p:spTree>
+    <p:extLst>
+      <p:ext uri="{BB962C8B-B14F-4D97-AF65-F5344CB8AC3E}">
+        <p14:creationId xmlns:p14="http://schemas.microsoft.com/office/powerpoint/2010/main" val="1192480786"/>
       </p:ext>
     </p:extLst>
   </p:cSld>
@@ -5723,8 +6185,8 @@
         </p:nvSpPr>
         <p:spPr>
           <a:xfrm>
-            <a:off x="277552" y="225367"/>
-            <a:ext cx="11636895" cy="6555641"/>
+            <a:off x="332509" y="318655"/>
+            <a:ext cx="4698530" cy="1200329"/>
           </a:xfrm>
           <a:prstGeom prst="rect">
             <a:avLst/>
@@ -5732,376 +6194,64 @@
           <a:noFill/>
         </p:spPr>
         <p:txBody>
-          <a:bodyPr wrap="square" rtlCol="0">
+          <a:bodyPr wrap="none" rtlCol="0">
             <a:spAutoFit/>
           </a:bodyPr>
           <a:lstStyle/>
           <a:p>
             <a:r>
-              <a:rPr lang="en-US" altLang="zh-CN" sz="2400" b="1" u="sng" dirty="0"/>
-              <a:t>git commit</a:t>
-            </a:r>
-            <a:r>
-              <a:rPr lang="zh-CN" altLang="en-US" sz="2400" b="1" u="sng" dirty="0"/>
-              <a:t>的相關命令</a:t>
-            </a:r>
-            <a:endParaRPr lang="en-US" altLang="zh-CN" sz="2400" b="1" u="sng" dirty="0"/>
+              <a:rPr lang="en-US" altLang="zh-CN" b="1" u="sng" dirty="0" err="1" smtClean="0"/>
+              <a:t>git</a:t>
+            </a:r>
+            <a:r>
+              <a:rPr lang="zh-CN" altLang="en-US" b="1" u="sng" dirty="0" smtClean="0"/>
+              <a:t>合并分支</a:t>
+            </a:r>
+            <a:endParaRPr lang="en-US" altLang="zh-CN" b="1" u="sng" dirty="0" smtClean="0"/>
+          </a:p>
+          <a:p>
+            <a:endParaRPr lang="en-US" altLang="zh-CN" b="1" u="sng" dirty="0"/>
           </a:p>
           <a:p>
             <a:r>
               <a:rPr lang="en-US" altLang="zh-CN" b="1" dirty="0"/>
               <a:t>	</a:t>
             </a:r>
-          </a:p>
-          <a:p>
-            <a:r>
-              <a:rPr lang="en-US" altLang="zh-CN" b="1" dirty="0"/>
-              <a:t>	1. </a:t>
-            </a:r>
-            <a:r>
-              <a:rPr lang="zh-CN" altLang="en-US" b="1" dirty="0"/>
-              <a:t>看见代码修改的时间和人</a:t>
-            </a:r>
-            <a:endParaRPr lang="en-US" altLang="zh-CN" b="1" dirty="0"/>
-          </a:p>
-          <a:p>
-            <a:r>
-              <a:rPr lang="en-US" altLang="zh-CN" b="1" dirty="0"/>
-              <a:t>	         git blame –L </a:t>
-            </a:r>
-            <a:r>
-              <a:rPr lang="en-US" altLang="zh-CN" b="1" dirty="0" err="1"/>
-              <a:t>m,n</a:t>
-            </a:r>
-            <a:r>
-              <a:rPr lang="en-US" altLang="zh-CN" b="1" dirty="0"/>
-              <a:t> </a:t>
-            </a:r>
-            <a:r>
-              <a:rPr lang="zh-CN" altLang="en-US" b="1" dirty="0"/>
-              <a:t>文件名可以， </a:t>
-            </a:r>
-            <a:r>
-              <a:rPr lang="en-US" altLang="zh-CN" b="1" dirty="0" err="1"/>
-              <a:t>m,n</a:t>
-            </a:r>
-            <a:r>
-              <a:rPr lang="zh-CN" altLang="en-US" b="1" dirty="0"/>
-              <a:t>代表从第几行到第几行</a:t>
-            </a:r>
-            <a:endParaRPr lang="en-US" altLang="zh-CN" b="1" dirty="0"/>
-          </a:p>
-          <a:p>
-            <a:endParaRPr lang="en-US" altLang="zh-CN" b="1" dirty="0"/>
-          </a:p>
-          <a:p>
-            <a:r>
-              <a:rPr lang="en-US" altLang="zh-CN" b="1" dirty="0"/>
-              <a:t>	2. </a:t>
-            </a:r>
-            <a:r>
-              <a:rPr lang="zh-CN" altLang="en-US" b="1" dirty="0"/>
-              <a:t>查找錯誤提交</a:t>
-            </a:r>
-            <a:endParaRPr lang="en-US" altLang="zh-CN" b="1" dirty="0"/>
-          </a:p>
-          <a:p>
-            <a:r>
-              <a:rPr lang="en-US" altLang="zh-CN" b="1" dirty="0"/>
-              <a:t>	         git bisect start </a:t>
-            </a:r>
-            <a:r>
-              <a:rPr lang="zh-CN" altLang="en-US" b="1" dirty="0"/>
-              <a:t>啓動二分法搜尋</a:t>
-            </a:r>
-            <a:endParaRPr lang="en-US" altLang="zh-CN" b="1" dirty="0"/>
-          </a:p>
-          <a:p>
-            <a:r>
-              <a:rPr lang="en-US" altLang="zh-CN" b="1" dirty="0"/>
-              <a:t>	         git bisect bad   </a:t>
-            </a:r>
-            <a:r>
-              <a:rPr lang="zh-CN" altLang="en-US" b="1" dirty="0"/>
-              <a:t>告訴</a:t>
-            </a:r>
-            <a:r>
-              <a:rPr lang="en-US" altLang="zh-CN" b="1" dirty="0"/>
+            <a:r>
+              <a:rPr lang="en-US" altLang="zh-CN" dirty="0" smtClean="0"/>
+              <a:t>1. </a:t>
+            </a:r>
+            <a:r>
+              <a:rPr lang="zh-CN" altLang="en-US" dirty="0" smtClean="0"/>
+              <a:t>放弃分支合并</a:t>
+            </a:r>
+            <a:endParaRPr lang="en-US" altLang="zh-CN" dirty="0" smtClean="0"/>
+          </a:p>
+          <a:p>
+            <a:r>
+              <a:rPr lang="en-US" altLang="zh-CN" dirty="0"/>
+              <a:t>	</a:t>
+            </a:r>
+            <a:r>
+              <a:rPr lang="en-US" altLang="zh-CN" dirty="0" smtClean="0"/>
+              <a:t>	</a:t>
+            </a:r>
+            <a:r>
+              <a:rPr lang="en-US" altLang="zh-CN" dirty="0" err="1" smtClean="0"/>
               <a:t>git</a:t>
             </a:r>
             <a:r>
-              <a:rPr lang="zh-CN" altLang="en-US" b="1" dirty="0"/>
-              <a:t>目前</a:t>
-            </a:r>
-            <a:r>
-              <a:rPr lang="en-US" altLang="zh-CN" b="1" dirty="0"/>
-              <a:t>HEAD</a:t>
-            </a:r>
-            <a:r>
-              <a:rPr lang="zh-CN" altLang="en-US" b="1" dirty="0"/>
-              <a:t>指向的版本是壞的</a:t>
-            </a:r>
-            <a:endParaRPr lang="en-US" altLang="zh-CN" b="1" dirty="0"/>
-          </a:p>
-          <a:p>
-            <a:r>
-              <a:rPr lang="en-US" altLang="zh-CN" b="1" dirty="0"/>
-              <a:t>	         git bisect good sha1  </a:t>
-            </a:r>
-            <a:r>
-              <a:rPr lang="zh-CN" altLang="en-US" b="1" dirty="0"/>
-              <a:t>告訴</a:t>
-            </a:r>
-            <a:r>
-              <a:rPr lang="en-US" altLang="zh-CN" b="1" dirty="0"/>
-              <a:t>git</a:t>
-            </a:r>
-            <a:r>
-              <a:rPr lang="zh-CN" altLang="en-US" b="1" dirty="0"/>
-              <a:t>目前</a:t>
-            </a:r>
-            <a:r>
-              <a:rPr lang="en-US" altLang="zh-CN" b="1" dirty="0"/>
-              <a:t>HEAD</a:t>
-            </a:r>
-            <a:r>
-              <a:rPr lang="zh-CN" altLang="en-US" b="1" dirty="0"/>
-              <a:t>指向的版本是好的</a:t>
-            </a:r>
-            <a:endParaRPr lang="en-US" altLang="zh-CN" b="1" dirty="0"/>
-          </a:p>
-          <a:p>
-            <a:r>
-              <a:rPr lang="en-US" altLang="zh-CN" b="1" dirty="0"/>
-              <a:t>	         git bisect log   </a:t>
-            </a:r>
-            <a:r>
-              <a:rPr lang="zh-CN" altLang="en-US" b="1" dirty="0"/>
-              <a:t>查看二分法記錄你的回答</a:t>
-            </a:r>
-            <a:endParaRPr lang="en-US" altLang="zh-CN" b="1" dirty="0"/>
-          </a:p>
-          <a:p>
-            <a:r>
-              <a:rPr lang="en-US" altLang="zh-CN" b="1" dirty="0"/>
-              <a:t>	        git bisect reset  </a:t>
-            </a:r>
-            <a:r>
-              <a:rPr lang="zh-CN" altLang="en-US" b="1" dirty="0"/>
-              <a:t>回到原來的分支上面</a:t>
-            </a:r>
-            <a:endParaRPr lang="en-US" altLang="zh-CN" b="1" dirty="0"/>
-          </a:p>
-          <a:p>
-            <a:endParaRPr lang="en-US" altLang="zh-CN" b="1" dirty="0"/>
-          </a:p>
-          <a:p>
-            <a:r>
-              <a:rPr lang="en-US" altLang="zh-CN" b="1" dirty="0"/>
-              <a:t>	 3. </a:t>
-            </a:r>
-            <a:r>
-              <a:rPr lang="zh-CN" altLang="en-US" b="1" dirty="0"/>
-              <a:t>產看歷史提交</a:t>
-            </a:r>
-            <a:endParaRPr lang="en-US" altLang="zh-CN" b="1" dirty="0"/>
-          </a:p>
-          <a:p>
-            <a:r>
-              <a:rPr lang="en-US" altLang="zh-CN" b="1" dirty="0"/>
-              <a:t>		 git log --pretty=short --abbrev-commit HEAD~2..HEAD  </a:t>
-            </a:r>
-            <a:r>
-              <a:rPr lang="en-US" altLang="zh-CN" b="1" dirty="0">
-                <a:sym typeface="Wingdings" panose="05000000000000000000" pitchFamily="2" charset="2"/>
-              </a:rPr>
-              <a:t>  (1)</a:t>
-            </a:r>
-            <a:r>
-              <a:rPr lang="en-US" altLang="zh-CN" b="1" dirty="0"/>
-              <a:t>--pretty=short    </a:t>
-            </a:r>
-            <a:r>
-              <a:rPr lang="zh-CN" altLang="en-US" b="1" dirty="0"/>
-              <a:t>簡單的打印</a:t>
-            </a:r>
-            <a:endParaRPr lang="en-US" altLang="zh-CN" b="1" dirty="0"/>
-          </a:p>
-          <a:p>
-            <a:r>
-              <a:rPr lang="en-US" altLang="zh-CN" b="1" dirty="0">
-                <a:sym typeface="Wingdings" panose="05000000000000000000" pitchFamily="2" charset="2"/>
-              </a:rPr>
-              <a:t>								 (2)--abbrev-commit   SHA1</a:t>
-            </a:r>
-            <a:r>
-              <a:rPr lang="zh-CN" altLang="en-US" b="1" dirty="0">
-                <a:sym typeface="Wingdings" panose="05000000000000000000" pitchFamily="2" charset="2"/>
-              </a:rPr>
-              <a:t>的值進行縮寫</a:t>
-            </a:r>
-            <a:endParaRPr lang="en-US" altLang="zh-CN" b="1" dirty="0">
-              <a:sym typeface="Wingdings" panose="05000000000000000000" pitchFamily="2" charset="2"/>
-            </a:endParaRPr>
-          </a:p>
-          <a:p>
-            <a:r>
-              <a:rPr lang="en-US" altLang="zh-CN" b="1" dirty="0">
-                <a:sym typeface="Wingdings" panose="05000000000000000000" pitchFamily="2" charset="2"/>
-              </a:rPr>
-              <a:t>								 (3)</a:t>
-            </a:r>
-            <a:r>
-              <a:rPr lang="en-US" altLang="zh-CN" b="1" dirty="0"/>
-              <a:t>HEAD~2..HEAD</a:t>
-            </a:r>
-            <a:r>
-              <a:rPr lang="en-US" altLang="zh-CN" b="1" dirty="0">
-                <a:sym typeface="Wingdings" panose="05000000000000000000" pitchFamily="2" charset="2"/>
-              </a:rPr>
-              <a:t>     HEAD</a:t>
-            </a:r>
-            <a:r>
-              <a:rPr lang="zh-CN" altLang="en-US" b="1" dirty="0">
-                <a:sym typeface="Wingdings" panose="05000000000000000000" pitchFamily="2" charset="2"/>
-              </a:rPr>
-              <a:t>指向的</a:t>
-            </a:r>
-            <a:r>
-              <a:rPr lang="en-US" altLang="zh-CN" b="1" dirty="0">
-                <a:sym typeface="Wingdings" panose="05000000000000000000" pitchFamily="2" charset="2"/>
-              </a:rPr>
-              <a:t>commit             </a:t>
-            </a:r>
-          </a:p>
-          <a:p>
-            <a:r>
-              <a:rPr lang="en-US" altLang="zh-CN" b="1" dirty="0">
-                <a:sym typeface="Wingdings" panose="05000000000000000000" pitchFamily="2" charset="2"/>
-              </a:rPr>
-              <a:t>                                                                                                                                                                                  </a:t>
-            </a:r>
-            <a:r>
-              <a:rPr lang="zh-CN" altLang="en-US" b="1" dirty="0">
-                <a:sym typeface="Wingdings" panose="05000000000000000000" pitchFamily="2" charset="2"/>
-              </a:rPr>
-              <a:t>和他前一個指向的 </a:t>
-            </a:r>
-            <a:endParaRPr lang="en-US" altLang="zh-CN" b="1" dirty="0">
-              <a:sym typeface="Wingdings" panose="05000000000000000000" pitchFamily="2" charset="2"/>
-            </a:endParaRPr>
-          </a:p>
-          <a:p>
-            <a:r>
-              <a:rPr lang="en-US" altLang="zh-CN" b="1" dirty="0">
-                <a:sym typeface="Wingdings" panose="05000000000000000000" pitchFamily="2" charset="2"/>
-              </a:rPr>
-              <a:t>                                                                                                                                                                                  commit </a:t>
-            </a:r>
-            <a:endParaRPr lang="en-US" altLang="zh-CN" b="1" dirty="0"/>
-          </a:p>
-          <a:p>
-            <a:r>
-              <a:rPr lang="en-US" altLang="zh-CN" b="1" dirty="0"/>
-              <a:t>	 4. </a:t>
-            </a:r>
-            <a:r>
-              <a:rPr lang="zh-CN" altLang="en-US" b="1" dirty="0"/>
-              <a:t>查看歷史提交詳情</a:t>
-            </a:r>
-            <a:endParaRPr lang="en-US" altLang="zh-CN" b="1" dirty="0"/>
-          </a:p>
-          <a:p>
-            <a:r>
-              <a:rPr lang="en-US" altLang="zh-CN" b="1" dirty="0"/>
-              <a:t>		git log –n –p –stat           </a:t>
-            </a:r>
-            <a:r>
-              <a:rPr lang="en-US" altLang="zh-CN" b="1" dirty="0">
-                <a:sym typeface="Wingdings" panose="05000000000000000000" pitchFamily="2" charset="2"/>
-              </a:rPr>
-              <a:t>     -n</a:t>
-            </a:r>
-            <a:r>
-              <a:rPr lang="zh-CN" altLang="en-US" b="1" dirty="0">
-                <a:sym typeface="Wingdings" panose="05000000000000000000" pitchFamily="2" charset="2"/>
-              </a:rPr>
-              <a:t>輸出的行數， </a:t>
-            </a:r>
-            <a:r>
-              <a:rPr lang="en-US" altLang="zh-CN" b="1" dirty="0">
-                <a:sym typeface="Wingdings" panose="05000000000000000000" pitchFamily="2" charset="2"/>
-              </a:rPr>
-              <a:t>-p</a:t>
-            </a:r>
-            <a:r>
-              <a:rPr lang="zh-CN" altLang="en-US" b="1" dirty="0">
-                <a:sym typeface="Wingdings" panose="05000000000000000000" pitchFamily="2" charset="2"/>
-              </a:rPr>
-              <a:t>詳情包括代碼的修改</a:t>
-            </a:r>
-            <a:r>
-              <a:rPr lang="en-US" altLang="zh-CN" b="1" dirty="0">
-                <a:sym typeface="Wingdings" panose="05000000000000000000" pitchFamily="2" charset="2"/>
-              </a:rPr>
-              <a:t>, </a:t>
-            </a:r>
-            <a:r>
-              <a:rPr lang="zh-CN" altLang="en-US" b="1" dirty="0">
-                <a:sym typeface="Wingdings" panose="05000000000000000000" pitchFamily="2" charset="2"/>
-              </a:rPr>
-              <a:t> </a:t>
-            </a:r>
-            <a:r>
-              <a:rPr lang="en-US" altLang="zh-CN" b="1" dirty="0">
-                <a:sym typeface="Wingdings" panose="05000000000000000000" pitchFamily="2" charset="2"/>
-              </a:rPr>
-              <a:t>–stat</a:t>
-            </a:r>
-            <a:r>
-              <a:rPr lang="zh-CN" altLang="en-US" b="1" dirty="0">
-                <a:sym typeface="Wingdings" panose="05000000000000000000" pitchFamily="2" charset="2"/>
-              </a:rPr>
-              <a:t>文件的修改</a:t>
-            </a:r>
-            <a:endParaRPr lang="en-US" altLang="zh-CN" b="1" dirty="0">
-              <a:sym typeface="Wingdings" panose="05000000000000000000" pitchFamily="2" charset="2"/>
-            </a:endParaRPr>
-          </a:p>
-          <a:p>
-            <a:r>
-              <a:rPr lang="en-US" altLang="zh-CN" b="1" dirty="0">
-                <a:sym typeface="Wingdings" panose="05000000000000000000" pitchFamily="2" charset="2"/>
-              </a:rPr>
-              <a:t>		git show SHA1</a:t>
-            </a:r>
-          </a:p>
-          <a:p>
-            <a:r>
-              <a:rPr lang="en-US" altLang="zh-CN" b="1" dirty="0">
-                <a:sym typeface="Wingdings" panose="05000000000000000000" pitchFamily="2" charset="2"/>
-              </a:rPr>
-              <a:t>	</a:t>
-            </a:r>
-          </a:p>
-          <a:p>
-            <a:r>
-              <a:rPr lang="en-US" altLang="zh-CN" b="1" dirty="0">
-                <a:sym typeface="Wingdings" panose="05000000000000000000" pitchFamily="2" charset="2"/>
-              </a:rPr>
-              <a:t>	</a:t>
-            </a:r>
-            <a:r>
-              <a:rPr lang="en-US" altLang="zh-CN" b="1" dirty="0"/>
-              <a:t>     </a:t>
-            </a:r>
+              <a:rPr lang="en-US" altLang="zh-CN" dirty="0" smtClean="0"/>
+              <a:t> reset --hard ORIG_HEAD </a:t>
+            </a:r>
+            <a:endParaRPr lang="zh-CN" altLang="en-US" dirty="0"/>
           </a:p>
         </p:txBody>
       </p:sp>
     </p:spTree>
     <p:extLst>
       <p:ext uri="{BB962C8B-B14F-4D97-AF65-F5344CB8AC3E}">
-        <p14:creationId xmlns:p14="http://schemas.microsoft.com/office/powerpoint/2010/main" val="391565664"/>
+        <p14:creationId xmlns:p14="http://schemas.microsoft.com/office/powerpoint/2010/main" val="289339779"/>
       </p:ext>
     </p:extLst>
   </p:cSld>
@@ -6130,20 +6280,14 @@
       </p:grpSpPr>
       <p:sp>
         <p:nvSpPr>
-          <p:cNvPr id="5" name="文字方塊 4">
-            <a:extLst>
-              <a:ext uri="{FF2B5EF4-FFF2-40B4-BE49-F238E27FC236}">
-                <a16:creationId xmlns:a16="http://schemas.microsoft.com/office/drawing/2014/main" id="{0B1F6121-1C23-4A07-A66F-19BD3BFDA4C3}"/>
-              </a:ext>
-            </a:extLst>
-          </p:cNvPr>
+          <p:cNvPr id="4" name="文本框 3"/>
           <p:cNvSpPr txBox="1"/>
           <p:nvPr/>
         </p:nvSpPr>
         <p:spPr>
           <a:xfrm>
-            <a:off x="304800" y="284480"/>
-            <a:ext cx="4425699" cy="400110"/>
+            <a:off x="277552" y="225367"/>
+            <a:ext cx="11636895" cy="6555641"/>
           </a:xfrm>
           <a:prstGeom prst="rect">
             <a:avLst/>
@@ -6151,161 +6295,376 @@
           <a:noFill/>
         </p:spPr>
         <p:txBody>
-          <a:bodyPr wrap="none" rtlCol="0">
-            <a:spAutoFit/>
-          </a:bodyPr>
-          <a:lstStyle/>
-          <a:p>
-            <a:r>
-              <a:rPr lang="en-US" altLang="zh-TW" sz="2000" b="1" u="sng" dirty="0"/>
-              <a:t>Git </a:t>
-            </a:r>
-            <a:r>
-              <a:rPr lang="zh-CN" altLang="en-US" sz="2000" b="1" u="sng" dirty="0"/>
-              <a:t>修改一次文件到</a:t>
-            </a:r>
-            <a:r>
-              <a:rPr lang="en-US" altLang="zh-CN" sz="2000" b="1" u="sng" dirty="0"/>
-              <a:t>commit</a:t>
-            </a:r>
-            <a:r>
-              <a:rPr lang="zh-CN" altLang="en-US" sz="2000" b="1" u="sng" dirty="0"/>
-              <a:t>的圖示過程</a:t>
-            </a:r>
-            <a:endParaRPr lang="zh-TW" altLang="en-US" sz="2000" b="1" u="sng" dirty="0"/>
-          </a:p>
-        </p:txBody>
-      </p:sp>
-      <p:pic>
-        <p:nvPicPr>
-          <p:cNvPr id="7" name="圖片 6">
-            <a:extLst>
-              <a:ext uri="{FF2B5EF4-FFF2-40B4-BE49-F238E27FC236}">
-                <a16:creationId xmlns:a16="http://schemas.microsoft.com/office/drawing/2014/main" id="{21F441B3-C6D6-46FD-B8E7-6B83AE9E5AC7}"/>
-              </a:ext>
-            </a:extLst>
-          </p:cNvPr>
-          <p:cNvPicPr>
-            <a:picLocks noChangeAspect="1"/>
-          </p:cNvPicPr>
-          <p:nvPr/>
-        </p:nvPicPr>
-        <p:blipFill>
-          <a:blip r:embed="rId2">
-            <a:extLst>
-              <a:ext uri="{28A0092B-C50C-407E-A947-70E740481C1C}">
-                <a14:useLocalDpi xmlns:a14="http://schemas.microsoft.com/office/drawing/2010/main" val="0"/>
-              </a:ext>
-            </a:extLst>
-          </a:blip>
-          <a:stretch>
-            <a:fillRect/>
-          </a:stretch>
-        </p:blipFill>
-        <p:spPr>
-          <a:xfrm>
-            <a:off x="3746819" y="1475135"/>
-            <a:ext cx="4910908" cy="3907730"/>
-          </a:xfrm>
-          <a:prstGeom prst="rect">
-            <a:avLst/>
-          </a:prstGeom>
-        </p:spPr>
-      </p:pic>
-      <p:sp>
-        <p:nvSpPr>
-          <p:cNvPr id="8" name="文字方塊 7">
-            <a:extLst>
-              <a:ext uri="{FF2B5EF4-FFF2-40B4-BE49-F238E27FC236}">
-                <a16:creationId xmlns:a16="http://schemas.microsoft.com/office/drawing/2014/main" id="{49C93D34-C734-4A03-AE9A-C29244EFEBC3}"/>
-              </a:ext>
-            </a:extLst>
-          </p:cNvPr>
-          <p:cNvSpPr txBox="1"/>
-          <p:nvPr/>
-        </p:nvSpPr>
-        <p:spPr>
-          <a:xfrm flipH="1">
-            <a:off x="5094832" y="1105803"/>
-            <a:ext cx="3230882" cy="369332"/>
-          </a:xfrm>
-          <a:prstGeom prst="rect">
-            <a:avLst/>
-          </a:prstGeom>
-          <a:noFill/>
-        </p:spPr>
-        <p:txBody>
           <a:bodyPr wrap="square" rtlCol="0">
             <a:spAutoFit/>
           </a:bodyPr>
           <a:lstStyle/>
           <a:p>
             <a:r>
-              <a:rPr lang="zh-CN" altLang="en-US" dirty="0"/>
-              <a:t>一次</a:t>
-            </a:r>
-            <a:r>
-              <a:rPr lang="en-US" altLang="zh-CN" dirty="0"/>
-              <a:t>commit</a:t>
-            </a:r>
-            <a:r>
-              <a:rPr lang="zh-CN" altLang="en-US" dirty="0"/>
-              <a:t>后</a:t>
-            </a:r>
-            <a:endParaRPr lang="zh-TW" altLang="en-US" dirty="0"/>
-          </a:p>
-        </p:txBody>
-      </p:sp>
-      <p:sp>
-        <p:nvSpPr>
-          <p:cNvPr id="9" name="箭號: 向下 8">
-            <a:extLst>
-              <a:ext uri="{FF2B5EF4-FFF2-40B4-BE49-F238E27FC236}">
-                <a16:creationId xmlns:a16="http://schemas.microsoft.com/office/drawing/2014/main" id="{2FCCB5B6-35FA-41D1-9A57-23ACAE0006F5}"/>
-              </a:ext>
-            </a:extLst>
-          </p:cNvPr>
-          <p:cNvSpPr/>
-          <p:nvPr/>
-        </p:nvSpPr>
-        <p:spPr>
-          <a:xfrm>
-            <a:off x="5455920" y="5382864"/>
-            <a:ext cx="934720" cy="790545"/>
-          </a:xfrm>
-          <a:prstGeom prst="downArrow">
-            <a:avLst/>
-          </a:prstGeom>
-        </p:spPr>
-        <p:style>
-          <a:lnRef idx="2">
-            <a:schemeClr val="accent1">
-              <a:shade val="50000"/>
-            </a:schemeClr>
-          </a:lnRef>
-          <a:fillRef idx="1">
-            <a:schemeClr val="accent1"/>
-          </a:fillRef>
-          <a:effectRef idx="0">
-            <a:schemeClr val="accent1"/>
-          </a:effectRef>
-          <a:fontRef idx="minor">
-            <a:schemeClr val="lt1"/>
-          </a:fontRef>
-        </p:style>
-        <p:txBody>
-          <a:bodyPr rtlCol="0" anchor="ctr"/>
-          <a:lstStyle/>
-          <a:p>
-            <a:pPr algn="ctr"/>
-            <a:endParaRPr lang="zh-TW" altLang="en-US"/>
+              <a:rPr lang="en-US" altLang="zh-CN" sz="2400" b="1" u="sng" dirty="0"/>
+              <a:t>git commit</a:t>
+            </a:r>
+            <a:r>
+              <a:rPr lang="zh-CN" altLang="en-US" sz="2400" b="1" u="sng" dirty="0"/>
+              <a:t>的相關命令</a:t>
+            </a:r>
+            <a:endParaRPr lang="en-US" altLang="zh-CN" sz="2400" b="1" u="sng" dirty="0"/>
+          </a:p>
+          <a:p>
+            <a:r>
+              <a:rPr lang="en-US" altLang="zh-CN" b="1" dirty="0"/>
+              <a:t>	</a:t>
+            </a:r>
+          </a:p>
+          <a:p>
+            <a:r>
+              <a:rPr lang="en-US" altLang="zh-CN" b="1" dirty="0"/>
+              <a:t>	1. </a:t>
+            </a:r>
+            <a:r>
+              <a:rPr lang="zh-CN" altLang="en-US" b="1" dirty="0"/>
+              <a:t>看见代码修改的时间和人</a:t>
+            </a:r>
+            <a:endParaRPr lang="en-US" altLang="zh-CN" b="1" dirty="0"/>
+          </a:p>
+          <a:p>
+            <a:r>
+              <a:rPr lang="en-US" altLang="zh-CN" b="1" dirty="0"/>
+              <a:t>	         git blame –L </a:t>
+            </a:r>
+            <a:r>
+              <a:rPr lang="en-US" altLang="zh-CN" b="1" dirty="0" err="1"/>
+              <a:t>m,n</a:t>
+            </a:r>
+            <a:r>
+              <a:rPr lang="en-US" altLang="zh-CN" b="1" dirty="0"/>
+              <a:t> </a:t>
+            </a:r>
+            <a:r>
+              <a:rPr lang="zh-CN" altLang="en-US" b="1" dirty="0"/>
+              <a:t>文件名可以， </a:t>
+            </a:r>
+            <a:r>
+              <a:rPr lang="en-US" altLang="zh-CN" b="1" dirty="0" err="1"/>
+              <a:t>m,n</a:t>
+            </a:r>
+            <a:r>
+              <a:rPr lang="zh-CN" altLang="en-US" b="1" dirty="0"/>
+              <a:t>代表从第几行到第几行</a:t>
+            </a:r>
+            <a:endParaRPr lang="en-US" altLang="zh-CN" b="1" dirty="0"/>
+          </a:p>
+          <a:p>
+            <a:endParaRPr lang="en-US" altLang="zh-CN" b="1" dirty="0"/>
+          </a:p>
+          <a:p>
+            <a:r>
+              <a:rPr lang="en-US" altLang="zh-CN" b="1" dirty="0"/>
+              <a:t>	2. </a:t>
+            </a:r>
+            <a:r>
+              <a:rPr lang="zh-CN" altLang="en-US" b="1" dirty="0"/>
+              <a:t>查找錯誤提交</a:t>
+            </a:r>
+            <a:endParaRPr lang="en-US" altLang="zh-CN" b="1" dirty="0"/>
+          </a:p>
+          <a:p>
+            <a:r>
+              <a:rPr lang="en-US" altLang="zh-CN" b="1" dirty="0"/>
+              <a:t>	         git bisect start </a:t>
+            </a:r>
+            <a:r>
+              <a:rPr lang="zh-CN" altLang="en-US" b="1" dirty="0"/>
+              <a:t>啓動二分法搜尋</a:t>
+            </a:r>
+            <a:endParaRPr lang="en-US" altLang="zh-CN" b="1" dirty="0"/>
+          </a:p>
+          <a:p>
+            <a:r>
+              <a:rPr lang="en-US" altLang="zh-CN" b="1" dirty="0"/>
+              <a:t>	         git bisect bad   </a:t>
+            </a:r>
+            <a:r>
+              <a:rPr lang="zh-CN" altLang="en-US" b="1" dirty="0"/>
+              <a:t>告訴</a:t>
+            </a:r>
+            <a:r>
+              <a:rPr lang="en-US" altLang="zh-CN" b="1" dirty="0"/>
+              <a:t>git</a:t>
+            </a:r>
+            <a:r>
+              <a:rPr lang="zh-CN" altLang="en-US" b="1" dirty="0"/>
+              <a:t>目前</a:t>
+            </a:r>
+            <a:r>
+              <a:rPr lang="en-US" altLang="zh-CN" b="1" dirty="0"/>
+              <a:t>HEAD</a:t>
+            </a:r>
+            <a:r>
+              <a:rPr lang="zh-CN" altLang="en-US" b="1" dirty="0"/>
+              <a:t>指向的版本是壞的</a:t>
+            </a:r>
+            <a:endParaRPr lang="en-US" altLang="zh-CN" b="1" dirty="0"/>
+          </a:p>
+          <a:p>
+            <a:r>
+              <a:rPr lang="en-US" altLang="zh-CN" b="1" dirty="0"/>
+              <a:t>	         git bisect good sha1  </a:t>
+            </a:r>
+            <a:r>
+              <a:rPr lang="zh-CN" altLang="en-US" b="1" dirty="0"/>
+              <a:t>告訴</a:t>
+            </a:r>
+            <a:r>
+              <a:rPr lang="en-US" altLang="zh-CN" b="1" dirty="0"/>
+              <a:t>git</a:t>
+            </a:r>
+            <a:r>
+              <a:rPr lang="zh-CN" altLang="en-US" b="1" dirty="0"/>
+              <a:t>目前</a:t>
+            </a:r>
+            <a:r>
+              <a:rPr lang="en-US" altLang="zh-CN" b="1" dirty="0"/>
+              <a:t>HEAD</a:t>
+            </a:r>
+            <a:r>
+              <a:rPr lang="zh-CN" altLang="en-US" b="1" dirty="0"/>
+              <a:t>指向的版本是好的</a:t>
+            </a:r>
+            <a:endParaRPr lang="en-US" altLang="zh-CN" b="1" dirty="0"/>
+          </a:p>
+          <a:p>
+            <a:r>
+              <a:rPr lang="en-US" altLang="zh-CN" b="1" dirty="0"/>
+              <a:t>	         git bisect log   </a:t>
+            </a:r>
+            <a:r>
+              <a:rPr lang="zh-CN" altLang="en-US" b="1" dirty="0"/>
+              <a:t>查看二分法記錄你的回答</a:t>
+            </a:r>
+            <a:endParaRPr lang="en-US" altLang="zh-CN" b="1" dirty="0"/>
+          </a:p>
+          <a:p>
+            <a:r>
+              <a:rPr lang="en-US" altLang="zh-CN" b="1" dirty="0"/>
+              <a:t>	        git bisect reset  </a:t>
+            </a:r>
+            <a:r>
+              <a:rPr lang="zh-CN" altLang="en-US" b="1" dirty="0"/>
+              <a:t>回到原來的分支上面</a:t>
+            </a:r>
+            <a:endParaRPr lang="en-US" altLang="zh-CN" b="1" dirty="0"/>
+          </a:p>
+          <a:p>
+            <a:endParaRPr lang="en-US" altLang="zh-CN" b="1" dirty="0"/>
+          </a:p>
+          <a:p>
+            <a:r>
+              <a:rPr lang="en-US" altLang="zh-CN" b="1" dirty="0"/>
+              <a:t>	 3. </a:t>
+            </a:r>
+            <a:r>
+              <a:rPr lang="zh-CN" altLang="en-US" b="1" dirty="0"/>
+              <a:t>產看歷史提交</a:t>
+            </a:r>
+            <a:endParaRPr lang="en-US" altLang="zh-CN" b="1" dirty="0"/>
+          </a:p>
+          <a:p>
+            <a:r>
+              <a:rPr lang="en-US" altLang="zh-CN" b="1" dirty="0"/>
+              <a:t>		 git log --pretty=short --abbrev-commit HEAD~2..HEAD  </a:t>
+            </a:r>
+            <a:r>
+              <a:rPr lang="en-US" altLang="zh-CN" b="1" dirty="0">
+                <a:sym typeface="Wingdings" panose="05000000000000000000" pitchFamily="2" charset="2"/>
+              </a:rPr>
+              <a:t>  (1)</a:t>
+            </a:r>
+            <a:r>
+              <a:rPr lang="en-US" altLang="zh-CN" b="1" dirty="0"/>
+              <a:t>--pretty=short    </a:t>
+            </a:r>
+            <a:r>
+              <a:rPr lang="zh-CN" altLang="en-US" b="1" dirty="0"/>
+              <a:t>簡單的打印</a:t>
+            </a:r>
+            <a:endParaRPr lang="en-US" altLang="zh-CN" b="1" dirty="0"/>
+          </a:p>
+          <a:p>
+            <a:r>
+              <a:rPr lang="en-US" altLang="zh-CN" b="1" dirty="0">
+                <a:sym typeface="Wingdings" panose="05000000000000000000" pitchFamily="2" charset="2"/>
+              </a:rPr>
+              <a:t>								 (2)--abbrev-commit   SHA1</a:t>
+            </a:r>
+            <a:r>
+              <a:rPr lang="zh-CN" altLang="en-US" b="1" dirty="0">
+                <a:sym typeface="Wingdings" panose="05000000000000000000" pitchFamily="2" charset="2"/>
+              </a:rPr>
+              <a:t>的值進行縮寫</a:t>
+            </a:r>
+            <a:endParaRPr lang="en-US" altLang="zh-CN" b="1" dirty="0">
+              <a:sym typeface="Wingdings" panose="05000000000000000000" pitchFamily="2" charset="2"/>
+            </a:endParaRPr>
+          </a:p>
+          <a:p>
+            <a:r>
+              <a:rPr lang="en-US" altLang="zh-CN" b="1" dirty="0">
+                <a:sym typeface="Wingdings" panose="05000000000000000000" pitchFamily="2" charset="2"/>
+              </a:rPr>
+              <a:t>								 (3)</a:t>
+            </a:r>
+            <a:r>
+              <a:rPr lang="en-US" altLang="zh-CN" b="1" dirty="0"/>
+              <a:t>HEAD~2..HEAD</a:t>
+            </a:r>
+            <a:r>
+              <a:rPr lang="en-US" altLang="zh-CN" b="1" dirty="0">
+                <a:sym typeface="Wingdings" panose="05000000000000000000" pitchFamily="2" charset="2"/>
+              </a:rPr>
+              <a:t>     HEAD</a:t>
+            </a:r>
+            <a:r>
+              <a:rPr lang="zh-CN" altLang="en-US" b="1" dirty="0">
+                <a:sym typeface="Wingdings" panose="05000000000000000000" pitchFamily="2" charset="2"/>
+              </a:rPr>
+              <a:t>指向的</a:t>
+            </a:r>
+            <a:r>
+              <a:rPr lang="en-US" altLang="zh-CN" b="1" dirty="0">
+                <a:sym typeface="Wingdings" panose="05000000000000000000" pitchFamily="2" charset="2"/>
+              </a:rPr>
+              <a:t>commit             </a:t>
+            </a:r>
+          </a:p>
+          <a:p>
+            <a:r>
+              <a:rPr lang="en-US" altLang="zh-CN" b="1" dirty="0">
+                <a:sym typeface="Wingdings" panose="05000000000000000000" pitchFamily="2" charset="2"/>
+              </a:rPr>
+              <a:t>                                                                                                                                                                                  </a:t>
+            </a:r>
+            <a:r>
+              <a:rPr lang="zh-CN" altLang="en-US" b="1" dirty="0">
+                <a:sym typeface="Wingdings" panose="05000000000000000000" pitchFamily="2" charset="2"/>
+              </a:rPr>
+              <a:t>和他前一個指向的 </a:t>
+            </a:r>
+            <a:endParaRPr lang="en-US" altLang="zh-CN" b="1" dirty="0">
+              <a:sym typeface="Wingdings" panose="05000000000000000000" pitchFamily="2" charset="2"/>
+            </a:endParaRPr>
+          </a:p>
+          <a:p>
+            <a:r>
+              <a:rPr lang="en-US" altLang="zh-CN" b="1" dirty="0">
+                <a:sym typeface="Wingdings" panose="05000000000000000000" pitchFamily="2" charset="2"/>
+              </a:rPr>
+              <a:t>                                                                                                                                                                                  commit </a:t>
+            </a:r>
+            <a:endParaRPr lang="en-US" altLang="zh-CN" b="1" dirty="0"/>
+          </a:p>
+          <a:p>
+            <a:r>
+              <a:rPr lang="en-US" altLang="zh-CN" b="1" dirty="0"/>
+              <a:t>	 4. </a:t>
+            </a:r>
+            <a:r>
+              <a:rPr lang="zh-CN" altLang="en-US" b="1" dirty="0"/>
+              <a:t>查看歷史提交詳情</a:t>
+            </a:r>
+            <a:endParaRPr lang="en-US" altLang="zh-CN" b="1" dirty="0"/>
+          </a:p>
+          <a:p>
+            <a:r>
+              <a:rPr lang="en-US" altLang="zh-CN" b="1" dirty="0"/>
+              <a:t>		git log –n –p –stat           </a:t>
+            </a:r>
+            <a:r>
+              <a:rPr lang="en-US" altLang="zh-CN" b="1" dirty="0">
+                <a:sym typeface="Wingdings" panose="05000000000000000000" pitchFamily="2" charset="2"/>
+              </a:rPr>
+              <a:t>     -n</a:t>
+            </a:r>
+            <a:r>
+              <a:rPr lang="zh-CN" altLang="en-US" b="1" dirty="0">
+                <a:sym typeface="Wingdings" panose="05000000000000000000" pitchFamily="2" charset="2"/>
+              </a:rPr>
+              <a:t>輸出的行數， </a:t>
+            </a:r>
+            <a:r>
+              <a:rPr lang="en-US" altLang="zh-CN" b="1" dirty="0">
+                <a:sym typeface="Wingdings" panose="05000000000000000000" pitchFamily="2" charset="2"/>
+              </a:rPr>
+              <a:t>-p</a:t>
+            </a:r>
+            <a:r>
+              <a:rPr lang="zh-CN" altLang="en-US" b="1" dirty="0">
+                <a:sym typeface="Wingdings" panose="05000000000000000000" pitchFamily="2" charset="2"/>
+              </a:rPr>
+              <a:t>詳情包括代碼的修改</a:t>
+            </a:r>
+            <a:r>
+              <a:rPr lang="en-US" altLang="zh-CN" b="1" dirty="0">
+                <a:sym typeface="Wingdings" panose="05000000000000000000" pitchFamily="2" charset="2"/>
+              </a:rPr>
+              <a:t>, </a:t>
+            </a:r>
+            <a:r>
+              <a:rPr lang="zh-CN" altLang="en-US" b="1" dirty="0">
+                <a:sym typeface="Wingdings" panose="05000000000000000000" pitchFamily="2" charset="2"/>
+              </a:rPr>
+              <a:t> </a:t>
+            </a:r>
+            <a:r>
+              <a:rPr lang="en-US" altLang="zh-CN" b="1" dirty="0">
+                <a:sym typeface="Wingdings" panose="05000000000000000000" pitchFamily="2" charset="2"/>
+              </a:rPr>
+              <a:t>–stat</a:t>
+            </a:r>
+            <a:r>
+              <a:rPr lang="zh-CN" altLang="en-US" b="1" dirty="0">
+                <a:sym typeface="Wingdings" panose="05000000000000000000" pitchFamily="2" charset="2"/>
+              </a:rPr>
+              <a:t>文件的修改</a:t>
+            </a:r>
+            <a:endParaRPr lang="en-US" altLang="zh-CN" b="1" dirty="0">
+              <a:sym typeface="Wingdings" panose="05000000000000000000" pitchFamily="2" charset="2"/>
+            </a:endParaRPr>
+          </a:p>
+          <a:p>
+            <a:r>
+              <a:rPr lang="en-US" altLang="zh-CN" b="1" dirty="0">
+                <a:sym typeface="Wingdings" panose="05000000000000000000" pitchFamily="2" charset="2"/>
+              </a:rPr>
+              <a:t>		git show SHA1</a:t>
+            </a:r>
+          </a:p>
+          <a:p>
+            <a:r>
+              <a:rPr lang="en-US" altLang="zh-CN" b="1" dirty="0">
+                <a:sym typeface="Wingdings" panose="05000000000000000000" pitchFamily="2" charset="2"/>
+              </a:rPr>
+              <a:t>	</a:t>
+            </a:r>
+          </a:p>
+          <a:p>
+            <a:r>
+              <a:rPr lang="en-US" altLang="zh-CN" b="1" dirty="0">
+                <a:sym typeface="Wingdings" panose="05000000000000000000" pitchFamily="2" charset="2"/>
+              </a:rPr>
+              <a:t>	</a:t>
+            </a:r>
+            <a:r>
+              <a:rPr lang="en-US" altLang="zh-CN" b="1" dirty="0"/>
+              <a:t>     </a:t>
+            </a:r>
           </a:p>
         </p:txBody>
       </p:sp>
     </p:spTree>
     <p:extLst>
       <p:ext uri="{BB962C8B-B14F-4D97-AF65-F5344CB8AC3E}">
-        <p14:creationId xmlns:p14="http://schemas.microsoft.com/office/powerpoint/2010/main" val="3901155342"/>
+        <p14:creationId xmlns:p14="http://schemas.microsoft.com/office/powerpoint/2010/main" val="391565664"/>
       </p:ext>
     </p:extLst>
   </p:cSld>
@@ -6380,6 +6739,42 @@
           </a:p>
         </p:txBody>
       </p:sp>
+      <p:pic>
+        <p:nvPicPr>
+          <p:cNvPr id="7" name="圖片 6">
+            <a:extLst>
+              <a:ext uri="{FF2B5EF4-FFF2-40B4-BE49-F238E27FC236}">
+                <a16:creationId xmlns:a16="http://schemas.microsoft.com/office/drawing/2014/main" id="{21F441B3-C6D6-46FD-B8E7-6B83AE9E5AC7}"/>
+              </a:ext>
+            </a:extLst>
+          </p:cNvPr>
+          <p:cNvPicPr>
+            <a:picLocks noChangeAspect="1"/>
+          </p:cNvPicPr>
+          <p:nvPr/>
+        </p:nvPicPr>
+        <p:blipFill>
+          <a:blip r:embed="rId2">
+            <a:extLst>
+              <a:ext uri="{28A0092B-C50C-407E-A947-70E740481C1C}">
+                <a14:useLocalDpi xmlns:a14="http://schemas.microsoft.com/office/drawing/2010/main" val="0"/>
+              </a:ext>
+            </a:extLst>
+          </a:blip>
+          <a:stretch>
+            <a:fillRect/>
+          </a:stretch>
+        </p:blipFill>
+        <p:spPr>
+          <a:xfrm>
+            <a:off x="3746819" y="1475135"/>
+            <a:ext cx="4910908" cy="3907730"/>
+          </a:xfrm>
+          <a:prstGeom prst="rect">
+            <a:avLst/>
+          </a:prstGeom>
+        </p:spPr>
+      </p:pic>
       <p:sp>
         <p:nvSpPr>
           <p:cNvPr id="8" name="文字方塊 7">
@@ -6394,7 +6789,7 @@
         </p:nvSpPr>
         <p:spPr>
           <a:xfrm flipH="1">
-            <a:off x="5003392" y="1105804"/>
+            <a:off x="5094832" y="1105803"/>
             <a:ext cx="3230882" cy="369332"/>
           </a:xfrm>
           <a:prstGeom prst="rect">
@@ -6410,7 +6805,15 @@
           <a:p>
             <a:r>
               <a:rPr lang="zh-CN" altLang="en-US" dirty="0"/>
-              <a:t>修改某個文件内容</a:t>
+              <a:t>一次</a:t>
+            </a:r>
+            <a:r>
+              <a:rPr lang="en-US" altLang="zh-CN" dirty="0"/>
+              <a:t>commit</a:t>
+            </a:r>
+            <a:r>
+              <a:rPr lang="zh-CN" altLang="en-US" dirty="0"/>
+              <a:t>后</a:t>
             </a:r>
             <a:endParaRPr lang="zh-TW" altLang="en-US" dirty="0"/>
           </a:p>
@@ -6462,46 +6865,10 @@
           </a:p>
         </p:txBody>
       </p:sp>
-      <p:pic>
-        <p:nvPicPr>
-          <p:cNvPr id="3" name="圖片 2">
-            <a:extLst>
-              <a:ext uri="{FF2B5EF4-FFF2-40B4-BE49-F238E27FC236}">
-                <a16:creationId xmlns:a16="http://schemas.microsoft.com/office/drawing/2014/main" id="{77378AED-F75E-4D86-B271-D01414623425}"/>
-              </a:ext>
-            </a:extLst>
-          </p:cNvPr>
-          <p:cNvPicPr>
-            <a:picLocks noChangeAspect="1"/>
-          </p:cNvPicPr>
-          <p:nvPr/>
-        </p:nvPicPr>
-        <p:blipFill>
-          <a:blip r:embed="rId2">
-            <a:extLst>
-              <a:ext uri="{28A0092B-C50C-407E-A947-70E740481C1C}">
-                <a14:useLocalDpi xmlns:a14="http://schemas.microsoft.com/office/drawing/2010/main" val="0"/>
-              </a:ext>
-            </a:extLst>
-          </a:blip>
-          <a:stretch>
-            <a:fillRect/>
-          </a:stretch>
-        </p:blipFill>
-        <p:spPr>
-          <a:xfrm>
-            <a:off x="3774440" y="1573389"/>
-            <a:ext cx="4643120" cy="3711222"/>
-          </a:xfrm>
-          <a:prstGeom prst="rect">
-            <a:avLst/>
-          </a:prstGeom>
-        </p:spPr>
-      </p:pic>
     </p:spTree>
     <p:extLst>
       <p:ext uri="{BB962C8B-B14F-4D97-AF65-F5344CB8AC3E}">
-        <p14:creationId xmlns:p14="http://schemas.microsoft.com/office/powerpoint/2010/main" val="4280783543"/>
+        <p14:creationId xmlns:p14="http://schemas.microsoft.com/office/powerpoint/2010/main" val="3901155342"/>
       </p:ext>
     </p:extLst>
   </p:cSld>

</xml_diff>

<commit_message>
Add git rebase command in ppt
</commit_message>
<xml_diff>
--- a/GitStudy/GitStudy.pptx
+++ b/GitStudy/GitStudy.pptx
@@ -210,7 +210,7 @@
           <a:p>
             <a:fld id="{C0F69D9A-D151-4089-8C1D-9A87D3DC0987}" type="datetimeFigureOut">
               <a:rPr lang="zh-TW" altLang="en-US" smtClean="0"/>
-              <a:t>2023/1/29</a:t>
+              <a:t>2023/1/30</a:t>
             </a:fld>
             <a:endParaRPr lang="zh-TW" altLang="en-US"/>
           </a:p>
@@ -624,7 +624,7 @@
           <a:p>
             <a:fld id="{B3DC4D43-2745-46E1-A871-6B61F7786A47}" type="datetimeFigureOut">
               <a:rPr lang="zh-TW" altLang="en-US" smtClean="0"/>
-              <a:t>2023/1/29</a:t>
+              <a:t>2023/1/30</a:t>
             </a:fld>
             <a:endParaRPr lang="zh-TW" altLang="en-US"/>
           </a:p>
@@ -822,7 +822,7 @@
           <a:p>
             <a:fld id="{B3DC4D43-2745-46E1-A871-6B61F7786A47}" type="datetimeFigureOut">
               <a:rPr lang="zh-TW" altLang="en-US" smtClean="0"/>
-              <a:t>2023/1/29</a:t>
+              <a:t>2023/1/30</a:t>
             </a:fld>
             <a:endParaRPr lang="zh-TW" altLang="en-US"/>
           </a:p>
@@ -1030,7 +1030,7 @@
           <a:p>
             <a:fld id="{B3DC4D43-2745-46E1-A871-6B61F7786A47}" type="datetimeFigureOut">
               <a:rPr lang="zh-TW" altLang="en-US" smtClean="0"/>
-              <a:t>2023/1/29</a:t>
+              <a:t>2023/1/30</a:t>
             </a:fld>
             <a:endParaRPr lang="zh-TW" altLang="en-US"/>
           </a:p>
@@ -1228,7 +1228,7 @@
           <a:p>
             <a:fld id="{B3DC4D43-2745-46E1-A871-6B61F7786A47}" type="datetimeFigureOut">
               <a:rPr lang="zh-TW" altLang="en-US" smtClean="0"/>
-              <a:t>2023/1/29</a:t>
+              <a:t>2023/1/30</a:t>
             </a:fld>
             <a:endParaRPr lang="zh-TW" altLang="en-US"/>
           </a:p>
@@ -1503,7 +1503,7 @@
           <a:p>
             <a:fld id="{B3DC4D43-2745-46E1-A871-6B61F7786A47}" type="datetimeFigureOut">
               <a:rPr lang="zh-TW" altLang="en-US" smtClean="0"/>
-              <a:t>2023/1/29</a:t>
+              <a:t>2023/1/30</a:t>
             </a:fld>
             <a:endParaRPr lang="zh-TW" altLang="en-US"/>
           </a:p>
@@ -1768,7 +1768,7 @@
           <a:p>
             <a:fld id="{B3DC4D43-2745-46E1-A871-6B61F7786A47}" type="datetimeFigureOut">
               <a:rPr lang="zh-TW" altLang="en-US" smtClean="0"/>
-              <a:t>2023/1/29</a:t>
+              <a:t>2023/1/30</a:t>
             </a:fld>
             <a:endParaRPr lang="zh-TW" altLang="en-US"/>
           </a:p>
@@ -2180,7 +2180,7 @@
           <a:p>
             <a:fld id="{B3DC4D43-2745-46E1-A871-6B61F7786A47}" type="datetimeFigureOut">
               <a:rPr lang="zh-TW" altLang="en-US" smtClean="0"/>
-              <a:t>2023/1/29</a:t>
+              <a:t>2023/1/30</a:t>
             </a:fld>
             <a:endParaRPr lang="zh-TW" altLang="en-US"/>
           </a:p>
@@ -2321,7 +2321,7 @@
           <a:p>
             <a:fld id="{B3DC4D43-2745-46E1-A871-6B61F7786A47}" type="datetimeFigureOut">
               <a:rPr lang="zh-TW" altLang="en-US" smtClean="0"/>
-              <a:t>2023/1/29</a:t>
+              <a:t>2023/1/30</a:t>
             </a:fld>
             <a:endParaRPr lang="zh-TW" altLang="en-US"/>
           </a:p>
@@ -2434,7 +2434,7 @@
           <a:p>
             <a:fld id="{B3DC4D43-2745-46E1-A871-6B61F7786A47}" type="datetimeFigureOut">
               <a:rPr lang="zh-TW" altLang="en-US" smtClean="0"/>
-              <a:t>2023/1/29</a:t>
+              <a:t>2023/1/30</a:t>
             </a:fld>
             <a:endParaRPr lang="zh-TW" altLang="en-US"/>
           </a:p>
@@ -2745,7 +2745,7 @@
           <a:p>
             <a:fld id="{B3DC4D43-2745-46E1-A871-6B61F7786A47}" type="datetimeFigureOut">
               <a:rPr lang="zh-TW" altLang="en-US" smtClean="0"/>
-              <a:t>2023/1/29</a:t>
+              <a:t>2023/1/30</a:t>
             </a:fld>
             <a:endParaRPr lang="zh-TW" altLang="en-US"/>
           </a:p>
@@ -3033,7 +3033,7 @@
           <a:p>
             <a:fld id="{B3DC4D43-2745-46E1-A871-6B61F7786A47}" type="datetimeFigureOut">
               <a:rPr lang="zh-TW" altLang="en-US" smtClean="0"/>
-              <a:t>2023/1/29</a:t>
+              <a:t>2023/1/30</a:t>
             </a:fld>
             <a:endParaRPr lang="zh-TW" altLang="en-US"/>
           </a:p>
@@ -3274,7 +3274,7 @@
           <a:p>
             <a:fld id="{B3DC4D43-2745-46E1-A871-6B61F7786A47}" type="datetimeFigureOut">
               <a:rPr lang="zh-TW" altLang="en-US" smtClean="0"/>
-              <a:t>2023/1/29</a:t>
+              <a:t>2023/1/30</a:t>
             </a:fld>
             <a:endParaRPr lang="zh-TW" altLang="en-US"/>
           </a:p>
@@ -4518,7 +4518,7 @@
         <p:spPr>
           <a:xfrm>
             <a:off x="346364" y="277090"/>
-            <a:ext cx="11399467" cy="2308324"/>
+            <a:ext cx="11399467" cy="5078313"/>
           </a:xfrm>
           <a:prstGeom prst="rect">
             <a:avLst/>
@@ -4532,214 +4532,286 @@
           <a:lstStyle/>
           <a:p>
             <a:r>
-              <a:rPr lang="zh-CN" altLang="en-US" b="1" u="sng" dirty="0" smtClean="0"/>
+              <a:rPr lang="zh-CN" altLang="en-US" b="1" u="sng" dirty="0"/>
               <a:t>更改提交的相关命令</a:t>
             </a:r>
-            <a:endParaRPr lang="en-US" altLang="zh-CN" b="1" u="sng" dirty="0" smtClean="0"/>
-          </a:p>
-          <a:p>
             <a:endParaRPr lang="en-US" altLang="zh-CN" b="1" u="sng" dirty="0"/>
+          </a:p>
+          <a:p>
+            <a:endParaRPr lang="en-US" altLang="zh-CN" b="1" u="sng" dirty="0"/>
+          </a:p>
+          <a:p>
+            <a:r>
+              <a:rPr lang="en-US" altLang="zh-CN" b="1" dirty="0"/>
+              <a:t>	1.  </a:t>
+            </a:r>
+            <a:r>
+              <a:rPr lang="en-US" altLang="zh-CN" b="1" dirty="0" err="1"/>
+              <a:t>git</a:t>
+            </a:r>
+            <a:r>
+              <a:rPr lang="en-US" altLang="zh-CN" b="1" dirty="0"/>
+              <a:t> reset mixed</a:t>
+            </a:r>
+            <a:r>
+              <a:rPr lang="zh-CN" altLang="en-US" b="1" dirty="0"/>
+              <a:t>， </a:t>
+            </a:r>
+            <a:r>
+              <a:rPr lang="en-US" altLang="zh-CN" b="1" dirty="0"/>
+              <a:t>hard</a:t>
+            </a:r>
+            <a:r>
+              <a:rPr lang="zh-CN" altLang="en-US" b="1" dirty="0"/>
+              <a:t>， </a:t>
+            </a:r>
+            <a:r>
+              <a:rPr lang="en-US" altLang="zh-CN" b="1" dirty="0"/>
+              <a:t>soft</a:t>
+            </a:r>
+          </a:p>
+          <a:p>
+            <a:r>
+              <a:rPr lang="en-US" altLang="zh-CN" b="1" dirty="0"/>
+              <a:t>	      </a:t>
+            </a:r>
+            <a:r>
+              <a:rPr lang="en-US" altLang="zh-CN" b="1" dirty="0" err="1"/>
+              <a:t>git</a:t>
+            </a:r>
+            <a:r>
+              <a:rPr lang="en-US" altLang="zh-CN" b="1" dirty="0"/>
+              <a:t> reset --mixed HEAD </a:t>
+            </a:r>
+            <a:r>
+              <a:rPr lang="zh-CN" altLang="en-US" b="1" dirty="0"/>
+              <a:t>本地版本库</a:t>
+            </a:r>
+            <a:r>
+              <a:rPr lang="en-US" altLang="zh-CN" b="1" dirty="0"/>
+              <a:t>HEAD</a:t>
+            </a:r>
+            <a:r>
+              <a:rPr lang="zh-CN" altLang="en-US" b="1" dirty="0"/>
+              <a:t>前内容退回工作区</a:t>
+            </a:r>
+            <a:r>
+              <a:rPr lang="en-US" altLang="zh-CN" b="1" dirty="0"/>
+              <a:t>, </a:t>
+            </a:r>
+            <a:r>
+              <a:rPr lang="zh-CN" altLang="en-US" b="1" dirty="0"/>
+              <a:t>索引退回工作区</a:t>
+            </a:r>
+            <a:r>
+              <a:rPr lang="en-US" altLang="zh-CN" b="1" dirty="0"/>
+              <a:t>, </a:t>
+            </a:r>
+            <a:r>
+              <a:rPr lang="zh-CN" altLang="en-US" b="1" dirty="0"/>
+              <a:t>工作区内容不变</a:t>
+            </a:r>
+            <a:endParaRPr lang="en-US" altLang="zh-CN" b="1" dirty="0"/>
+          </a:p>
+          <a:p>
+            <a:r>
+              <a:rPr lang="en-US" altLang="zh-CN" b="1" dirty="0"/>
+              <a:t>	      </a:t>
+            </a:r>
+            <a:r>
+              <a:rPr lang="en-US" altLang="zh-CN" b="1" dirty="0" err="1"/>
+              <a:t>git</a:t>
+            </a:r>
+            <a:r>
+              <a:rPr lang="en-US" altLang="zh-CN" b="1" dirty="0"/>
+              <a:t> reset --hard HEAD   </a:t>
+            </a:r>
+            <a:r>
+              <a:rPr lang="zh-CN" altLang="en-US" b="1" dirty="0"/>
+              <a:t>将本地版本库，索引，工作区恢复到与</a:t>
+            </a:r>
+            <a:r>
+              <a:rPr lang="en-US" altLang="zh-CN" b="1" dirty="0"/>
+              <a:t>HEAD</a:t>
+            </a:r>
+            <a:r>
+              <a:rPr lang="zh-CN" altLang="en-US" b="1" dirty="0"/>
+              <a:t>一样</a:t>
+            </a:r>
+            <a:r>
+              <a:rPr lang="en-US" altLang="zh-CN" b="1" dirty="0"/>
+              <a:t>. </a:t>
+            </a:r>
+            <a:r>
+              <a:rPr lang="zh-CN" altLang="en-US" b="1" dirty="0"/>
+              <a:t>索引和工作区内容全部消失</a:t>
+            </a:r>
+            <a:endParaRPr lang="en-US" altLang="zh-CN" b="1" dirty="0"/>
+          </a:p>
+          <a:p>
+            <a:r>
+              <a:rPr lang="en-US" altLang="zh-CN" b="1" dirty="0"/>
+              <a:t>	      </a:t>
+            </a:r>
+            <a:r>
+              <a:rPr lang="en-US" altLang="zh-CN" b="1" dirty="0" err="1"/>
+              <a:t>git</a:t>
+            </a:r>
+            <a:r>
+              <a:rPr lang="en-US" altLang="zh-CN" b="1" dirty="0"/>
+              <a:t> reset --soft HEAD   </a:t>
+            </a:r>
+            <a:r>
+              <a:rPr lang="zh-CN" altLang="en-US" b="1" dirty="0"/>
+              <a:t>本地版本库，索引，工作区都不变</a:t>
+            </a:r>
+            <a:r>
+              <a:rPr lang="en-US" altLang="zh-CN" b="1" dirty="0"/>
+              <a:t>,  </a:t>
+            </a:r>
+            <a:r>
+              <a:rPr lang="zh-CN" altLang="en-US" b="1" dirty="0"/>
+              <a:t> 本地版本库</a:t>
+            </a:r>
+            <a:r>
+              <a:rPr lang="en-US" altLang="zh-CN" b="1" dirty="0"/>
+              <a:t>HEAD</a:t>
+            </a:r>
+            <a:r>
+              <a:rPr lang="zh-CN" altLang="en-US" b="1" dirty="0"/>
+              <a:t>之后内容退回索引</a:t>
+            </a:r>
+            <a:endParaRPr lang="en-US" altLang="zh-CN" b="1" dirty="0"/>
+          </a:p>
+          <a:p>
+            <a:endParaRPr lang="en-US" altLang="zh-CN" b="1" dirty="0"/>
+          </a:p>
+          <a:p>
+            <a:r>
+              <a:rPr lang="en-US" altLang="zh-CN" b="1" dirty="0"/>
+              <a:t>	2.   git cherry-pick SHAID  </a:t>
+            </a:r>
+            <a:r>
+              <a:rPr lang="zh-CN" altLang="en-US" b="1" dirty="0"/>
+              <a:t>把某次</a:t>
+            </a:r>
+            <a:r>
+              <a:rPr lang="en-US" altLang="zh-CN" b="1" dirty="0"/>
+              <a:t>commit</a:t>
+            </a:r>
+            <a:r>
+              <a:rPr lang="zh-CN" altLang="en-US" b="1" dirty="0"/>
+              <a:t>放到指定的</a:t>
+            </a:r>
+            <a:r>
+              <a:rPr lang="en-US" altLang="zh-CN" b="1" dirty="0"/>
+              <a:t>branch</a:t>
+            </a:r>
+          </a:p>
+          <a:p>
+            <a:endParaRPr lang="en-US" altLang="zh-CN" b="1" dirty="0"/>
+          </a:p>
+          <a:p>
+            <a:r>
+              <a:rPr lang="en-US" altLang="zh-CN" b="1" dirty="0"/>
+              <a:t>	3.   git revert SHAID   </a:t>
+            </a:r>
+            <a:r>
+              <a:rPr lang="zh-CN" altLang="en-US" b="1" dirty="0"/>
+              <a:t>撤銷</a:t>
+            </a:r>
+            <a:r>
+              <a:rPr lang="en-US" altLang="zh-CN" b="1" dirty="0"/>
+              <a:t>branch</a:t>
+            </a:r>
+            <a:r>
+              <a:rPr lang="zh-CN" altLang="en-US" b="1" dirty="0"/>
+              <a:t>上的某次提交</a:t>
+            </a:r>
+            <a:endParaRPr lang="en-US" altLang="zh-CN" b="1" dirty="0"/>
+          </a:p>
+          <a:p>
+            <a:endParaRPr lang="en-US" altLang="zh-CN" b="1" dirty="0"/>
+          </a:p>
+          <a:p>
+            <a:r>
+              <a:rPr lang="en-US" altLang="zh-CN" b="1" dirty="0"/>
+              <a:t>	4.   git checkout </a:t>
+            </a:r>
+            <a:r>
+              <a:rPr lang="zh-CN" altLang="en-US" b="1" dirty="0"/>
+              <a:t>文件     從對象庫提取内容放到工作區</a:t>
+            </a:r>
+            <a:endParaRPr lang="en-US" altLang="zh-CN" b="1" dirty="0"/>
+          </a:p>
+          <a:p>
+            <a:endParaRPr lang="en-US" altLang="zh-CN" b="1" dirty="0"/>
+          </a:p>
+          <a:p>
+            <a:r>
+              <a:rPr lang="en-US" altLang="zh-CN" b="1" dirty="0"/>
+              <a:t>	5.   git commit --amend   </a:t>
+            </a:r>
+            <a:r>
+              <a:rPr lang="zh-CN" altLang="en-US" b="1" dirty="0"/>
+              <a:t>修改最近一次提交信息</a:t>
+            </a:r>
+            <a:endParaRPr lang="en-US" altLang="zh-CN" b="1" dirty="0"/>
+          </a:p>
+          <a:p>
+            <a:endParaRPr lang="en-US" altLang="zh-CN" b="1" dirty="0"/>
+          </a:p>
+          <a:p>
+            <a:r>
+              <a:rPr lang="en-US" altLang="zh-CN" b="1" dirty="0"/>
+              <a:t>	6.   git rebase </a:t>
+            </a:r>
+            <a:r>
+              <a:rPr lang="zh-CN" altLang="en-US" b="1" dirty="0"/>
+              <a:t>分支</a:t>
+            </a:r>
+            <a:r>
+              <a:rPr lang="en-US" altLang="zh-CN" b="1" dirty="0"/>
+              <a:t>1 </a:t>
+            </a:r>
+            <a:r>
+              <a:rPr lang="zh-CN" altLang="en-US" b="1" dirty="0"/>
+              <a:t>分支</a:t>
+            </a:r>
+            <a:r>
+              <a:rPr lang="en-US" altLang="zh-CN" b="1" dirty="0"/>
+              <a:t>2   </a:t>
+            </a:r>
+            <a:r>
+              <a:rPr lang="zh-CN" altLang="en-US" b="1" dirty="0"/>
+              <a:t>把分支</a:t>
+            </a:r>
+            <a:r>
+              <a:rPr lang="en-US" altLang="zh-CN" b="1" dirty="0"/>
+              <a:t>1</a:t>
+            </a:r>
+            <a:r>
+              <a:rPr lang="zh-CN" altLang="en-US" b="1" dirty="0"/>
+              <a:t>的提交變基到分支</a:t>
+            </a:r>
+            <a:r>
+              <a:rPr lang="en-US" altLang="zh-CN" b="1" dirty="0"/>
+              <a:t>2</a:t>
+            </a:r>
+            <a:r>
+              <a:rPr lang="zh-CN" altLang="en-US" b="1" dirty="0"/>
+              <a:t>上面</a:t>
+            </a:r>
+            <a:endParaRPr lang="en-US" altLang="zh-CN" b="1" dirty="0"/>
+          </a:p>
+          <a:p>
+            <a:endParaRPr lang="en-US" altLang="zh-CN" b="1" dirty="0"/>
           </a:p>
           <a:p>
             <a:r>
               <a:rPr lang="en-US" altLang="zh-CN" b="1" dirty="0"/>
               <a:t>	</a:t>
             </a:r>
-            <a:r>
-              <a:rPr lang="en-US" altLang="zh-CN" b="1" dirty="0" smtClean="0"/>
-              <a:t>1.  </a:t>
-            </a:r>
-            <a:r>
-              <a:rPr lang="en-US" altLang="zh-CN" b="1" dirty="0" err="1" smtClean="0"/>
-              <a:t>git</a:t>
-            </a:r>
-            <a:r>
-              <a:rPr lang="en-US" altLang="zh-CN" b="1" dirty="0" smtClean="0"/>
-              <a:t> reset mixed</a:t>
-            </a:r>
-            <a:r>
-              <a:rPr lang="zh-CN" altLang="en-US" b="1" dirty="0" smtClean="0"/>
-              <a:t>， </a:t>
-            </a:r>
-            <a:r>
-              <a:rPr lang="en-US" altLang="zh-CN" b="1" dirty="0" smtClean="0"/>
-              <a:t>hard</a:t>
-            </a:r>
-            <a:r>
-              <a:rPr lang="zh-CN" altLang="en-US" b="1" dirty="0" smtClean="0"/>
-              <a:t>， </a:t>
-            </a:r>
-            <a:r>
-              <a:rPr lang="en-US" altLang="zh-CN" b="1" dirty="0" smtClean="0"/>
-              <a:t>soft</a:t>
-            </a:r>
-          </a:p>
-          <a:p>
-            <a:r>
-              <a:rPr lang="en-US" altLang="zh-CN" b="1" dirty="0"/>
-              <a:t>	 </a:t>
-            </a:r>
-            <a:r>
-              <a:rPr lang="en-US" altLang="zh-CN" b="1" dirty="0" smtClean="0"/>
-              <a:t>     </a:t>
-            </a:r>
-            <a:r>
-              <a:rPr lang="en-US" altLang="zh-CN" b="1" dirty="0" err="1" smtClean="0"/>
-              <a:t>git</a:t>
-            </a:r>
-            <a:r>
-              <a:rPr lang="en-US" altLang="zh-CN" b="1" dirty="0" smtClean="0"/>
-              <a:t> reset --mixed HEAD </a:t>
-            </a:r>
-            <a:r>
-              <a:rPr lang="zh-CN" altLang="en-US" b="1" dirty="0" smtClean="0"/>
-              <a:t>本地版本库</a:t>
-            </a:r>
-            <a:r>
-              <a:rPr lang="en-US" altLang="zh-CN" b="1" dirty="0" smtClean="0"/>
-              <a:t>HEAD</a:t>
-            </a:r>
-            <a:r>
-              <a:rPr lang="zh-CN" altLang="en-US" b="1" dirty="0" smtClean="0"/>
-              <a:t>前内容退回工作区</a:t>
-            </a:r>
-            <a:r>
-              <a:rPr lang="en-US" altLang="zh-CN" b="1" dirty="0" smtClean="0"/>
-              <a:t>, </a:t>
-            </a:r>
-            <a:r>
-              <a:rPr lang="zh-CN" altLang="en-US" b="1" dirty="0" smtClean="0"/>
-              <a:t>索引退回工作区</a:t>
-            </a:r>
-            <a:r>
-              <a:rPr lang="en-US" altLang="zh-CN" b="1" dirty="0" smtClean="0"/>
-              <a:t>, </a:t>
-            </a:r>
-            <a:r>
-              <a:rPr lang="zh-CN" altLang="en-US" b="1" dirty="0" smtClean="0"/>
-              <a:t>工作区内容不变</a:t>
-            </a:r>
-            <a:endParaRPr lang="en-US" altLang="zh-CN" b="1" dirty="0" smtClean="0"/>
-          </a:p>
-          <a:p>
-            <a:r>
-              <a:rPr lang="en-US" altLang="zh-CN" b="1" dirty="0" smtClean="0"/>
-              <a:t>	      </a:t>
-            </a:r>
-            <a:r>
-              <a:rPr lang="en-US" altLang="zh-CN" b="1" dirty="0" err="1" smtClean="0"/>
-              <a:t>git</a:t>
-            </a:r>
-            <a:r>
-              <a:rPr lang="en-US" altLang="zh-CN" b="1" dirty="0" smtClean="0"/>
-              <a:t> reset --hard HEAD   </a:t>
-            </a:r>
-            <a:r>
-              <a:rPr lang="zh-CN" altLang="en-US" b="1" dirty="0" smtClean="0"/>
-              <a:t>将本地版本库，索引，工作区恢复到与</a:t>
-            </a:r>
-            <a:r>
-              <a:rPr lang="en-US" altLang="zh-CN" b="1" dirty="0" smtClean="0"/>
-              <a:t>HEAD</a:t>
-            </a:r>
-            <a:r>
-              <a:rPr lang="zh-CN" altLang="en-US" b="1" dirty="0" smtClean="0"/>
-              <a:t>一样</a:t>
-            </a:r>
-            <a:r>
-              <a:rPr lang="en-US" altLang="zh-CN" b="1" dirty="0" smtClean="0"/>
-              <a:t>. </a:t>
-            </a:r>
-            <a:r>
-              <a:rPr lang="zh-CN" altLang="en-US" b="1" dirty="0" smtClean="0"/>
-              <a:t>索引和工作区内容全部消失</a:t>
-            </a:r>
-            <a:endParaRPr lang="en-US" altLang="zh-CN" b="1" dirty="0" smtClean="0"/>
-          </a:p>
-          <a:p>
-            <a:r>
-              <a:rPr lang="en-US" altLang="zh-CN" b="1" dirty="0"/>
-              <a:t>	</a:t>
-            </a:r>
-            <a:r>
-              <a:rPr lang="en-US" altLang="zh-CN" b="1" dirty="0" smtClean="0"/>
-              <a:t>      </a:t>
-            </a:r>
-            <a:r>
-              <a:rPr lang="en-US" altLang="zh-CN" b="1" dirty="0" err="1"/>
-              <a:t>git</a:t>
-            </a:r>
-            <a:r>
-              <a:rPr lang="en-US" altLang="zh-CN" b="1" dirty="0"/>
-              <a:t> reset </a:t>
-            </a:r>
-            <a:r>
-              <a:rPr lang="en-US" altLang="zh-CN" b="1" dirty="0" smtClean="0"/>
-              <a:t>--</a:t>
-            </a:r>
-            <a:r>
-              <a:rPr lang="en-US" altLang="zh-CN" b="1" dirty="0"/>
-              <a:t>soft</a:t>
-            </a:r>
-            <a:r>
-              <a:rPr lang="en-US" altLang="zh-CN" b="1" dirty="0" smtClean="0"/>
-              <a:t> HEAD   </a:t>
-            </a:r>
-            <a:r>
-              <a:rPr lang="zh-CN" altLang="en-US" b="1" dirty="0" smtClean="0"/>
-              <a:t>本地</a:t>
-            </a:r>
-            <a:r>
-              <a:rPr lang="zh-CN" altLang="en-US" b="1" dirty="0"/>
-              <a:t>版本库，索引，</a:t>
-            </a:r>
-            <a:r>
-              <a:rPr lang="zh-CN" altLang="en-US" b="1" dirty="0" smtClean="0"/>
-              <a:t>工作区都不变</a:t>
-            </a:r>
-            <a:r>
-              <a:rPr lang="en-US" altLang="zh-CN" b="1" dirty="0" smtClean="0"/>
-              <a:t>,  </a:t>
-            </a:r>
-            <a:r>
-              <a:rPr lang="zh-CN" altLang="en-US" b="1" dirty="0"/>
-              <a:t> </a:t>
-            </a:r>
-            <a:r>
-              <a:rPr lang="zh-CN" altLang="en-US" b="1" dirty="0" smtClean="0"/>
-              <a:t>本地版本库</a:t>
-            </a:r>
-            <a:r>
-              <a:rPr lang="en-US" altLang="zh-CN" b="1" dirty="0" smtClean="0"/>
-              <a:t>HEAD</a:t>
-            </a:r>
-            <a:r>
-              <a:rPr lang="zh-CN" altLang="en-US" b="1" dirty="0" smtClean="0"/>
-              <a:t>之后内容退回</a:t>
-            </a:r>
-            <a:r>
-              <a:rPr lang="zh-CN" altLang="en-US" b="1" dirty="0" smtClean="0"/>
-              <a:t>索引</a:t>
-            </a:r>
-            <a:endParaRPr lang="en-US" altLang="zh-CN" b="1" dirty="0" smtClean="0"/>
-          </a:p>
-          <a:p>
-            <a:endParaRPr lang="en-US" altLang="zh-CN" b="1" dirty="0"/>
-          </a:p>
-          <a:p>
-            <a:r>
-              <a:rPr lang="en-US" altLang="zh-CN" b="1" dirty="0" smtClean="0"/>
-              <a:t>	2.   </a:t>
-            </a:r>
-            <a:r>
-              <a:rPr lang="en-US" altLang="zh-CN" b="1" dirty="0" err="1" smtClean="0"/>
-              <a:t>git</a:t>
-            </a:r>
-            <a:r>
-              <a:rPr lang="en-US" altLang="zh-CN" b="1" dirty="0" smtClean="0"/>
-              <a:t> </a:t>
-            </a:r>
-            <a:endParaRPr lang="en-US" altLang="zh-CN" b="1" dirty="0"/>
           </a:p>
         </p:txBody>
       </p:sp>
@@ -6200,14 +6272,14 @@
           <a:lstStyle/>
           <a:p>
             <a:r>
-              <a:rPr lang="en-US" altLang="zh-CN" b="1" u="sng" dirty="0" err="1" smtClean="0"/>
+              <a:rPr lang="en-US" altLang="zh-CN" b="1" u="sng" dirty="0" err="1"/>
               <a:t>git</a:t>
             </a:r>
             <a:r>
-              <a:rPr lang="zh-CN" altLang="en-US" b="1" u="sng" dirty="0" smtClean="0"/>
+              <a:rPr lang="zh-CN" altLang="en-US" b="1" u="sng" dirty="0"/>
               <a:t>合并分支</a:t>
             </a:r>
-            <a:endParaRPr lang="en-US" altLang="zh-CN" b="1" u="sng" dirty="0" smtClean="0"/>
+            <a:endParaRPr lang="en-US" altLang="zh-CN" b="1" u="sng" dirty="0"/>
           </a:p>
           <a:p>
             <a:endParaRPr lang="en-US" altLang="zh-CN" b="1" u="sng" dirty="0"/>
@@ -6218,30 +6290,26 @@
               <a:t>	</a:t>
             </a:r>
             <a:r>
-              <a:rPr lang="en-US" altLang="zh-CN" dirty="0" smtClean="0"/>
+              <a:rPr lang="en-US" altLang="zh-CN" dirty="0"/>
               <a:t>1. </a:t>
             </a:r>
             <a:r>
-              <a:rPr lang="zh-CN" altLang="en-US" dirty="0" smtClean="0"/>
+              <a:rPr lang="zh-CN" altLang="en-US" dirty="0"/>
               <a:t>放弃分支合并</a:t>
             </a:r>
-            <a:endParaRPr lang="en-US" altLang="zh-CN" dirty="0" smtClean="0"/>
-          </a:p>
-          <a:p>
-            <a:r>
-              <a:rPr lang="en-US" altLang="zh-CN" dirty="0"/>
-              <a:t>	</a:t>
-            </a:r>
-            <a:r>
-              <a:rPr lang="en-US" altLang="zh-CN" dirty="0" smtClean="0"/>
-              <a:t>	</a:t>
-            </a:r>
-            <a:r>
-              <a:rPr lang="en-US" altLang="zh-CN" dirty="0" err="1" smtClean="0"/>
+            <a:endParaRPr lang="en-US" altLang="zh-CN" dirty="0"/>
+          </a:p>
+          <a:p>
+            <a:r>
+              <a:rPr lang="en-US" altLang="zh-CN" dirty="0"/>
+              <a:t>		</a:t>
+            </a:r>
+            <a:r>
+              <a:rPr lang="en-US" altLang="zh-CN" dirty="0" err="1"/>
               <a:t>git</a:t>
             </a:r>
             <a:r>
-              <a:rPr lang="en-US" altLang="zh-CN" dirty="0" smtClean="0"/>
+              <a:rPr lang="en-US" altLang="zh-CN" dirty="0"/>
               <a:t> reset --hard ORIG_HEAD </a:t>
             </a:r>
             <a:endParaRPr lang="zh-CN" altLang="en-US" dirty="0"/>

</xml_diff>

<commit_message>
Add the git rebase command
</commit_message>
<xml_diff>
--- a/GitStudy/GitStudy.pptx
+++ b/GitStudy/GitStudy.pptx
@@ -210,7 +210,7 @@
           <a:p>
             <a:fld id="{C0F69D9A-D151-4089-8C1D-9A87D3DC0987}" type="datetimeFigureOut">
               <a:rPr lang="zh-TW" altLang="en-US" smtClean="0"/>
-              <a:t>2023/1/30</a:t>
+              <a:t>2023/1/31</a:t>
             </a:fld>
             <a:endParaRPr lang="zh-TW" altLang="en-US"/>
           </a:p>
@@ -624,7 +624,7 @@
           <a:p>
             <a:fld id="{B3DC4D43-2745-46E1-A871-6B61F7786A47}" type="datetimeFigureOut">
               <a:rPr lang="zh-TW" altLang="en-US" smtClean="0"/>
-              <a:t>2023/1/30</a:t>
+              <a:t>2023/1/31</a:t>
             </a:fld>
             <a:endParaRPr lang="zh-TW" altLang="en-US"/>
           </a:p>
@@ -822,7 +822,7 @@
           <a:p>
             <a:fld id="{B3DC4D43-2745-46E1-A871-6B61F7786A47}" type="datetimeFigureOut">
               <a:rPr lang="zh-TW" altLang="en-US" smtClean="0"/>
-              <a:t>2023/1/30</a:t>
+              <a:t>2023/1/31</a:t>
             </a:fld>
             <a:endParaRPr lang="zh-TW" altLang="en-US"/>
           </a:p>
@@ -1030,7 +1030,7 @@
           <a:p>
             <a:fld id="{B3DC4D43-2745-46E1-A871-6B61F7786A47}" type="datetimeFigureOut">
               <a:rPr lang="zh-TW" altLang="en-US" smtClean="0"/>
-              <a:t>2023/1/30</a:t>
+              <a:t>2023/1/31</a:t>
             </a:fld>
             <a:endParaRPr lang="zh-TW" altLang="en-US"/>
           </a:p>
@@ -1228,7 +1228,7 @@
           <a:p>
             <a:fld id="{B3DC4D43-2745-46E1-A871-6B61F7786A47}" type="datetimeFigureOut">
               <a:rPr lang="zh-TW" altLang="en-US" smtClean="0"/>
-              <a:t>2023/1/30</a:t>
+              <a:t>2023/1/31</a:t>
             </a:fld>
             <a:endParaRPr lang="zh-TW" altLang="en-US"/>
           </a:p>
@@ -1503,7 +1503,7 @@
           <a:p>
             <a:fld id="{B3DC4D43-2745-46E1-A871-6B61F7786A47}" type="datetimeFigureOut">
               <a:rPr lang="zh-TW" altLang="en-US" smtClean="0"/>
-              <a:t>2023/1/30</a:t>
+              <a:t>2023/1/31</a:t>
             </a:fld>
             <a:endParaRPr lang="zh-TW" altLang="en-US"/>
           </a:p>
@@ -1768,7 +1768,7 @@
           <a:p>
             <a:fld id="{B3DC4D43-2745-46E1-A871-6B61F7786A47}" type="datetimeFigureOut">
               <a:rPr lang="zh-TW" altLang="en-US" smtClean="0"/>
-              <a:t>2023/1/30</a:t>
+              <a:t>2023/1/31</a:t>
             </a:fld>
             <a:endParaRPr lang="zh-TW" altLang="en-US"/>
           </a:p>
@@ -2180,7 +2180,7 @@
           <a:p>
             <a:fld id="{B3DC4D43-2745-46E1-A871-6B61F7786A47}" type="datetimeFigureOut">
               <a:rPr lang="zh-TW" altLang="en-US" smtClean="0"/>
-              <a:t>2023/1/30</a:t>
+              <a:t>2023/1/31</a:t>
             </a:fld>
             <a:endParaRPr lang="zh-TW" altLang="en-US"/>
           </a:p>
@@ -2321,7 +2321,7 @@
           <a:p>
             <a:fld id="{B3DC4D43-2745-46E1-A871-6B61F7786A47}" type="datetimeFigureOut">
               <a:rPr lang="zh-TW" altLang="en-US" smtClean="0"/>
-              <a:t>2023/1/30</a:t>
+              <a:t>2023/1/31</a:t>
             </a:fld>
             <a:endParaRPr lang="zh-TW" altLang="en-US"/>
           </a:p>
@@ -2434,7 +2434,7 @@
           <a:p>
             <a:fld id="{B3DC4D43-2745-46E1-A871-6B61F7786A47}" type="datetimeFigureOut">
               <a:rPr lang="zh-TW" altLang="en-US" smtClean="0"/>
-              <a:t>2023/1/30</a:t>
+              <a:t>2023/1/31</a:t>
             </a:fld>
             <a:endParaRPr lang="zh-TW" altLang="en-US"/>
           </a:p>
@@ -2745,7 +2745,7 @@
           <a:p>
             <a:fld id="{B3DC4D43-2745-46E1-A871-6B61F7786A47}" type="datetimeFigureOut">
               <a:rPr lang="zh-TW" altLang="en-US" smtClean="0"/>
-              <a:t>2023/1/30</a:t>
+              <a:t>2023/1/31</a:t>
             </a:fld>
             <a:endParaRPr lang="zh-TW" altLang="en-US"/>
           </a:p>
@@ -3033,7 +3033,7 @@
           <a:p>
             <a:fld id="{B3DC4D43-2745-46E1-A871-6B61F7786A47}" type="datetimeFigureOut">
               <a:rPr lang="zh-TW" altLang="en-US" smtClean="0"/>
-              <a:t>2023/1/30</a:t>
+              <a:t>2023/1/31</a:t>
             </a:fld>
             <a:endParaRPr lang="zh-TW" altLang="en-US"/>
           </a:p>
@@ -3274,7 +3274,7 @@
           <a:p>
             <a:fld id="{B3DC4D43-2745-46E1-A871-6B61F7786A47}" type="datetimeFigureOut">
               <a:rPr lang="zh-TW" altLang="en-US" smtClean="0"/>
-              <a:t>2023/1/30</a:t>
+              <a:t>2023/1/31</a:t>
             </a:fld>
             <a:endParaRPr lang="zh-TW" altLang="en-US"/>
           </a:p>
@@ -4518,7 +4518,7 @@
         <p:spPr>
           <a:xfrm>
             <a:off x="346364" y="277090"/>
-            <a:ext cx="11399467" cy="5078313"/>
+            <a:ext cx="11399467" cy="7017306"/>
           </a:xfrm>
           <a:prstGeom prst="rect">
             <a:avLst/>
@@ -4689,7 +4689,7 @@
           <a:p>
             <a:r>
               <a:rPr lang="en-US" altLang="zh-CN" b="1" dirty="0"/>
-              <a:t>	2.   git cherry-pick SHAID  </a:t>
+              <a:t>	2.   git cherry-pick SHAID                  </a:t>
             </a:r>
             <a:r>
               <a:rPr lang="zh-CN" altLang="en-US" b="1" dirty="0"/>
@@ -4714,7 +4714,7 @@
           <a:p>
             <a:r>
               <a:rPr lang="en-US" altLang="zh-CN" b="1" dirty="0"/>
-              <a:t>	3.   git revert SHAID   </a:t>
+              <a:t>	3.   git revert SHAID                           </a:t>
             </a:r>
             <a:r>
               <a:rPr lang="zh-CN" altLang="en-US" b="1" dirty="0"/>
@@ -4740,7 +4740,7 @@
             </a:r>
             <a:r>
               <a:rPr lang="zh-CN" altLang="en-US" b="1" dirty="0"/>
-              <a:t>文件     從對象庫提取内容放到工作區</a:t>
+              <a:t>文件                        從對象庫提取内容放到工作區</a:t>
             </a:r>
             <a:endParaRPr lang="en-US" altLang="zh-CN" b="1" dirty="0"/>
           </a:p>
@@ -4750,7 +4750,7 @@
           <a:p>
             <a:r>
               <a:rPr lang="en-US" altLang="zh-CN" b="1" dirty="0"/>
-              <a:t>	5.   git commit --amend   </a:t>
+              <a:t>	5.   git commit --amend                    </a:t>
             </a:r>
             <a:r>
               <a:rPr lang="zh-CN" altLang="en-US" b="1" dirty="0"/>
@@ -4780,7 +4780,7 @@
             </a:r>
             <a:r>
               <a:rPr lang="en-US" altLang="zh-CN" b="1" dirty="0"/>
-              <a:t>2   </a:t>
+              <a:t>2              </a:t>
             </a:r>
             <a:r>
               <a:rPr lang="zh-CN" altLang="en-US" b="1" dirty="0"/>
@@ -4803,6 +4803,94 @@
               <a:t>上面</a:t>
             </a:r>
             <a:endParaRPr lang="en-US" altLang="zh-CN" b="1" dirty="0"/>
+          </a:p>
+          <a:p>
+            <a:r>
+              <a:rPr lang="en-US" altLang="zh-CN" b="1" dirty="0"/>
+              <a:t>	      git rebase --continue                   </a:t>
+            </a:r>
+            <a:r>
+              <a:rPr lang="zh-CN" altLang="en-US" b="1" dirty="0"/>
+              <a:t>繼續變基操作</a:t>
+            </a:r>
+            <a:endParaRPr lang="en-US" altLang="zh-CN" b="1" dirty="0"/>
+          </a:p>
+          <a:p>
+            <a:r>
+              <a:rPr lang="en-US" altLang="zh-CN" b="1" dirty="0"/>
+              <a:t>	      git rebase –abort                         </a:t>
+            </a:r>
+            <a:r>
+              <a:rPr lang="zh-CN" altLang="en-US" b="1" dirty="0"/>
+              <a:t>終止變基操作</a:t>
+            </a:r>
+            <a:endParaRPr lang="en-US" altLang="zh-CN" b="1" dirty="0"/>
+          </a:p>
+          <a:p>
+            <a:endParaRPr lang="en-US" altLang="zh-CN" b="1" dirty="0"/>
+          </a:p>
+          <a:p>
+            <a:r>
+              <a:rPr lang="en-US" altLang="zh-CN" b="1" dirty="0"/>
+              <a:t>	7.</a:t>
+            </a:r>
+            <a:r>
+              <a:rPr lang="zh-CN" altLang="en-US" b="1" dirty="0"/>
+              <a:t> </a:t>
+            </a:r>
+            <a:r>
+              <a:rPr lang="en-US" altLang="zh-CN" b="1" dirty="0"/>
+              <a:t>  git rebase --onto </a:t>
+            </a:r>
+            <a:r>
+              <a:rPr lang="zh-CN" altLang="en-US" b="1" dirty="0"/>
+              <a:t>分支名 起始提交 最後提交     </a:t>
+            </a:r>
+            <a:r>
+              <a:rPr lang="en-US" altLang="zh-CN" b="1" dirty="0"/>
+              <a:t>       </a:t>
+            </a:r>
+            <a:r>
+              <a:rPr lang="zh-CN" altLang="en-US" b="1" dirty="0"/>
+              <a:t>把多筆提交變基到分支名的上面</a:t>
+            </a:r>
+            <a:endParaRPr lang="en-US" altLang="zh-CN" b="1" dirty="0"/>
+          </a:p>
+          <a:p>
+            <a:endParaRPr lang="en-US" altLang="zh-CN" b="1" dirty="0"/>
+          </a:p>
+          <a:p>
+            <a:r>
+              <a:rPr lang="en-US" altLang="zh-CN" b="1" dirty="0"/>
+              <a:t>	8.   git rebase --I  SHAID             </a:t>
+            </a:r>
+            <a:r>
+              <a:rPr lang="zh-CN" altLang="en-US" b="1" dirty="0"/>
+              <a:t>合并</a:t>
+            </a:r>
+            <a:r>
+              <a:rPr lang="en-US" altLang="zh-CN" b="1" dirty="0"/>
+              <a:t>commit</a:t>
+            </a:r>
+            <a:r>
+              <a:rPr lang="zh-CN" altLang="en-US" b="1" dirty="0"/>
+              <a:t>獲取</a:t>
+            </a:r>
+            <a:r>
+              <a:rPr lang="en-US" altLang="zh-CN" b="1"/>
+              <a:t>, </a:t>
+            </a:r>
+            <a:r>
+              <a:rPr lang="zh-CN" altLang="en-US" b="1"/>
+              <a:t>修改</a:t>
+            </a:r>
+            <a:endParaRPr lang="en-US" altLang="zh-CN" b="1" dirty="0"/>
+          </a:p>
+          <a:p>
+            <a:r>
+              <a:rPr lang="en-US" altLang="zh-CN" b="1" dirty="0"/>
+              <a:t>	</a:t>
+            </a:r>
           </a:p>
           <a:p>
             <a:endParaRPr lang="en-US" altLang="zh-CN" b="1" dirty="0"/>

</xml_diff>

<commit_message>
Add git stash and git log in pptx
</commit_message>
<xml_diff>
--- a/GitStudy/GitStudy.pptx
+++ b/GitStudy/GitStudy.pptx
@@ -5,7 +5,7 @@
     <p:sldMasterId id="2147483648" r:id="rId1"/>
   </p:sldMasterIdLst>
   <p:notesMasterIdLst>
-    <p:notesMasterId r:id="rId16"/>
+    <p:notesMasterId r:id="rId18"/>
   </p:notesMasterIdLst>
   <p:sldIdLst>
     <p:sldId id="256" r:id="rId2"/>
@@ -22,6 +22,8 @@
     <p:sldId id="262" r:id="rId13"/>
     <p:sldId id="267" r:id="rId14"/>
     <p:sldId id="269" r:id="rId15"/>
+    <p:sldId id="270" r:id="rId16"/>
+    <p:sldId id="271" r:id="rId17"/>
   </p:sldIdLst>
   <p:sldSz cx="12192000" cy="6858000"/>
   <p:notesSz cx="6858000" cy="9144000"/>
@@ -210,7 +212,7 @@
           <a:p>
             <a:fld id="{C0F69D9A-D151-4089-8C1D-9A87D3DC0987}" type="datetimeFigureOut">
               <a:rPr lang="zh-TW" altLang="en-US" smtClean="0"/>
-              <a:t>2023/1/31</a:t>
+              <a:t>2023/2/2</a:t>
             </a:fld>
             <a:endParaRPr lang="zh-TW" altLang="en-US"/>
           </a:p>
@@ -624,7 +626,7 @@
           <a:p>
             <a:fld id="{B3DC4D43-2745-46E1-A871-6B61F7786A47}" type="datetimeFigureOut">
               <a:rPr lang="zh-TW" altLang="en-US" smtClean="0"/>
-              <a:t>2023/1/31</a:t>
+              <a:t>2023/2/2</a:t>
             </a:fld>
             <a:endParaRPr lang="zh-TW" altLang="en-US"/>
           </a:p>
@@ -822,7 +824,7 @@
           <a:p>
             <a:fld id="{B3DC4D43-2745-46E1-A871-6B61F7786A47}" type="datetimeFigureOut">
               <a:rPr lang="zh-TW" altLang="en-US" smtClean="0"/>
-              <a:t>2023/1/31</a:t>
+              <a:t>2023/2/2</a:t>
             </a:fld>
             <a:endParaRPr lang="zh-TW" altLang="en-US"/>
           </a:p>
@@ -1030,7 +1032,7 @@
           <a:p>
             <a:fld id="{B3DC4D43-2745-46E1-A871-6B61F7786A47}" type="datetimeFigureOut">
               <a:rPr lang="zh-TW" altLang="en-US" smtClean="0"/>
-              <a:t>2023/1/31</a:t>
+              <a:t>2023/2/2</a:t>
             </a:fld>
             <a:endParaRPr lang="zh-TW" altLang="en-US"/>
           </a:p>
@@ -1228,7 +1230,7 @@
           <a:p>
             <a:fld id="{B3DC4D43-2745-46E1-A871-6B61F7786A47}" type="datetimeFigureOut">
               <a:rPr lang="zh-TW" altLang="en-US" smtClean="0"/>
-              <a:t>2023/1/31</a:t>
+              <a:t>2023/2/2</a:t>
             </a:fld>
             <a:endParaRPr lang="zh-TW" altLang="en-US"/>
           </a:p>
@@ -1503,7 +1505,7 @@
           <a:p>
             <a:fld id="{B3DC4D43-2745-46E1-A871-6B61F7786A47}" type="datetimeFigureOut">
               <a:rPr lang="zh-TW" altLang="en-US" smtClean="0"/>
-              <a:t>2023/1/31</a:t>
+              <a:t>2023/2/2</a:t>
             </a:fld>
             <a:endParaRPr lang="zh-TW" altLang="en-US"/>
           </a:p>
@@ -1768,7 +1770,7 @@
           <a:p>
             <a:fld id="{B3DC4D43-2745-46E1-A871-6B61F7786A47}" type="datetimeFigureOut">
               <a:rPr lang="zh-TW" altLang="en-US" smtClean="0"/>
-              <a:t>2023/1/31</a:t>
+              <a:t>2023/2/2</a:t>
             </a:fld>
             <a:endParaRPr lang="zh-TW" altLang="en-US"/>
           </a:p>
@@ -2180,7 +2182,7 @@
           <a:p>
             <a:fld id="{B3DC4D43-2745-46E1-A871-6B61F7786A47}" type="datetimeFigureOut">
               <a:rPr lang="zh-TW" altLang="en-US" smtClean="0"/>
-              <a:t>2023/1/31</a:t>
+              <a:t>2023/2/2</a:t>
             </a:fld>
             <a:endParaRPr lang="zh-TW" altLang="en-US"/>
           </a:p>
@@ -2321,7 +2323,7 @@
           <a:p>
             <a:fld id="{B3DC4D43-2745-46E1-A871-6B61F7786A47}" type="datetimeFigureOut">
               <a:rPr lang="zh-TW" altLang="en-US" smtClean="0"/>
-              <a:t>2023/1/31</a:t>
+              <a:t>2023/2/2</a:t>
             </a:fld>
             <a:endParaRPr lang="zh-TW" altLang="en-US"/>
           </a:p>
@@ -2434,7 +2436,7 @@
           <a:p>
             <a:fld id="{B3DC4D43-2745-46E1-A871-6B61F7786A47}" type="datetimeFigureOut">
               <a:rPr lang="zh-TW" altLang="en-US" smtClean="0"/>
-              <a:t>2023/1/31</a:t>
+              <a:t>2023/2/2</a:t>
             </a:fld>
             <a:endParaRPr lang="zh-TW" altLang="en-US"/>
           </a:p>
@@ -2745,7 +2747,7 @@
           <a:p>
             <a:fld id="{B3DC4D43-2745-46E1-A871-6B61F7786A47}" type="datetimeFigureOut">
               <a:rPr lang="zh-TW" altLang="en-US" smtClean="0"/>
-              <a:t>2023/1/31</a:t>
+              <a:t>2023/2/2</a:t>
             </a:fld>
             <a:endParaRPr lang="zh-TW" altLang="en-US"/>
           </a:p>
@@ -3033,7 +3035,7 @@
           <a:p>
             <a:fld id="{B3DC4D43-2745-46E1-A871-6B61F7786A47}" type="datetimeFigureOut">
               <a:rPr lang="zh-TW" altLang="en-US" smtClean="0"/>
-              <a:t>2023/1/31</a:t>
+              <a:t>2023/2/2</a:t>
             </a:fld>
             <a:endParaRPr lang="zh-TW" altLang="en-US"/>
           </a:p>
@@ -3274,7 +3276,7 @@
           <a:p>
             <a:fld id="{B3DC4D43-2745-46E1-A871-6B61F7786A47}" type="datetimeFigureOut">
               <a:rPr lang="zh-TW" altLang="en-US" smtClean="0"/>
-              <a:t>2023/1/31</a:t>
+              <a:t>2023/2/2</a:t>
             </a:fld>
             <a:endParaRPr lang="zh-TW" altLang="en-US"/>
           </a:p>
@@ -4907,6 +4909,379 @@
     <p:extLst>
       <p:ext uri="{BB962C8B-B14F-4D97-AF65-F5344CB8AC3E}">
         <p14:creationId xmlns:p14="http://schemas.microsoft.com/office/powerpoint/2010/main" val="1192480786"/>
+      </p:ext>
+    </p:extLst>
+  </p:cSld>
+  <p:clrMapOvr>
+    <a:masterClrMapping/>
+  </p:clrMapOvr>
+</p:sld>
+</file>
+
+<file path=ppt/slides/slide15.xml><?xml version="1.0" encoding="utf-8"?>
+<p:sld xmlns:a="http://schemas.openxmlformats.org/drawingml/2006/main" xmlns:r="http://schemas.openxmlformats.org/officeDocument/2006/relationships" xmlns:p="http://schemas.openxmlformats.org/presentationml/2006/main">
+  <p:cSld>
+    <p:spTree>
+      <p:nvGrpSpPr>
+        <p:cNvPr id="1" name=""/>
+        <p:cNvGrpSpPr/>
+        <p:nvPr/>
+      </p:nvGrpSpPr>
+      <p:grpSpPr>
+        <a:xfrm>
+          <a:off x="0" y="0"/>
+          <a:ext cx="0" cy="0"/>
+          <a:chOff x="0" y="0"/>
+          <a:chExt cx="0" cy="0"/>
+        </a:xfrm>
+      </p:grpSpPr>
+      <p:sp>
+        <p:nvSpPr>
+          <p:cNvPr id="4" name="文字方塊 3">
+            <a:extLst>
+              <a:ext uri="{FF2B5EF4-FFF2-40B4-BE49-F238E27FC236}">
+                <a16:creationId xmlns:a16="http://schemas.microsoft.com/office/drawing/2014/main" id="{EC5647E3-24FF-4A86-BF24-284CB38C9F61}"/>
+              </a:ext>
+            </a:extLst>
+          </p:cNvPr>
+          <p:cNvSpPr txBox="1"/>
+          <p:nvPr/>
+        </p:nvSpPr>
+        <p:spPr>
+          <a:xfrm>
+            <a:off x="203200" y="162560"/>
+            <a:ext cx="2377574" cy="461665"/>
+          </a:xfrm>
+          <a:prstGeom prst="rect">
+            <a:avLst/>
+          </a:prstGeom>
+          <a:noFill/>
+        </p:spPr>
+        <p:txBody>
+          <a:bodyPr wrap="none" rtlCol="0">
+            <a:spAutoFit/>
+          </a:bodyPr>
+          <a:lstStyle/>
+          <a:p>
+            <a:r>
+              <a:rPr lang="en-US" altLang="zh-TW" sz="2400" b="1" u="sng" dirty="0"/>
+              <a:t>git pop </a:t>
+            </a:r>
+            <a:r>
+              <a:rPr lang="zh-CN" altLang="en-US" sz="2400" b="1" u="sng" dirty="0"/>
+              <a:t>儲藏修改</a:t>
+            </a:r>
+            <a:endParaRPr lang="zh-TW" altLang="en-US" sz="2400" b="1" u="sng" dirty="0"/>
+          </a:p>
+        </p:txBody>
+      </p:sp>
+      <p:sp>
+        <p:nvSpPr>
+          <p:cNvPr id="5" name="文字方塊 4">
+            <a:extLst>
+              <a:ext uri="{FF2B5EF4-FFF2-40B4-BE49-F238E27FC236}">
+                <a16:creationId xmlns:a16="http://schemas.microsoft.com/office/drawing/2014/main" id="{F9CE0819-0846-481D-A5D3-131A9F6F0B7D}"/>
+              </a:ext>
+            </a:extLst>
+          </p:cNvPr>
+          <p:cNvSpPr txBox="1"/>
+          <p:nvPr/>
+        </p:nvSpPr>
+        <p:spPr>
+          <a:xfrm>
+            <a:off x="843280" y="904240"/>
+            <a:ext cx="10048240" cy="1477328"/>
+          </a:xfrm>
+          <a:prstGeom prst="rect">
+            <a:avLst/>
+          </a:prstGeom>
+          <a:noFill/>
+        </p:spPr>
+        <p:txBody>
+          <a:bodyPr wrap="square" rtlCol="0">
+            <a:spAutoFit/>
+          </a:bodyPr>
+          <a:lstStyle/>
+          <a:p>
+            <a:pPr marL="342900" indent="-342900">
+              <a:buAutoNum type="arabicPeriod"/>
+            </a:pPr>
+            <a:r>
+              <a:rPr lang="en-US" altLang="zh-CN" dirty="0"/>
+              <a:t>git stash save “commit</a:t>
+            </a:r>
+            <a:r>
+              <a:rPr lang="zh-CN" altLang="en-US" dirty="0"/>
+              <a:t>信息</a:t>
+            </a:r>
+            <a:r>
+              <a:rPr lang="en-US" altLang="zh-CN" dirty="0"/>
+              <a:t>”</a:t>
+            </a:r>
+            <a:r>
+              <a:rPr lang="zh-CN" altLang="en-US" dirty="0"/>
+              <a:t>       </a:t>
+            </a:r>
+            <a:r>
+              <a:rPr lang="en-US" altLang="zh-CN" dirty="0"/>
+              <a:t>---  </a:t>
+            </a:r>
+            <a:r>
+              <a:rPr lang="zh-CN" altLang="en-US" dirty="0"/>
+              <a:t>存儲工作區和索引的内容</a:t>
+            </a:r>
+            <a:endParaRPr lang="en-US" altLang="zh-CN" dirty="0"/>
+          </a:p>
+          <a:p>
+            <a:pPr marL="342900" indent="-342900">
+              <a:buAutoNum type="arabicPeriod"/>
+            </a:pPr>
+            <a:r>
+              <a:rPr lang="en-US" altLang="zh-CN" dirty="0"/>
+              <a:t>git stash pop     ---   </a:t>
+            </a:r>
+            <a:r>
+              <a:rPr lang="zh-CN" altLang="en-US" dirty="0"/>
+              <a:t>取出存儲内容放到工作區</a:t>
+            </a:r>
+            <a:r>
+              <a:rPr lang="en-US" altLang="zh-CN" dirty="0"/>
+              <a:t>, </a:t>
+            </a:r>
+            <a:r>
+              <a:rPr lang="zh-CN" altLang="en-US" dirty="0"/>
+              <a:t>成功后刪除</a:t>
+            </a:r>
+            <a:r>
+              <a:rPr lang="en-US" altLang="zh-CN" dirty="0"/>
+              <a:t>stash, </a:t>
+            </a:r>
+            <a:r>
+              <a:rPr lang="zh-CN" altLang="en-US" dirty="0"/>
+              <a:t>有衝突不刪除</a:t>
+            </a:r>
+            <a:r>
+              <a:rPr lang="en-US" altLang="zh-CN" dirty="0"/>
+              <a:t>stash</a:t>
+            </a:r>
+          </a:p>
+          <a:p>
+            <a:pPr marL="342900" indent="-342900">
+              <a:buAutoNum type="arabicPeriod"/>
+            </a:pPr>
+            <a:r>
+              <a:rPr lang="en-US" altLang="zh-CN" dirty="0"/>
+              <a:t>git stash drop  stash</a:t>
+            </a:r>
+            <a:r>
+              <a:rPr lang="zh-CN" altLang="en-US" dirty="0"/>
+              <a:t>信息    </a:t>
+            </a:r>
+            <a:r>
+              <a:rPr lang="en-US" altLang="zh-CN" dirty="0"/>
+              <a:t>--- </a:t>
+            </a:r>
+            <a:r>
+              <a:rPr lang="zh-CN" altLang="en-US" dirty="0"/>
+              <a:t>如果沒有</a:t>
+            </a:r>
+            <a:r>
+              <a:rPr lang="en-US" altLang="zh-CN" dirty="0"/>
+              <a:t>stash</a:t>
+            </a:r>
+            <a:r>
+              <a:rPr lang="zh-CN" altLang="en-US" dirty="0"/>
+              <a:t>信息默認刪除最近一個</a:t>
+            </a:r>
+            <a:endParaRPr lang="en-US" altLang="zh-CN" dirty="0"/>
+          </a:p>
+          <a:p>
+            <a:pPr marL="342900" indent="-342900">
+              <a:buAutoNum type="arabicPeriod"/>
+            </a:pPr>
+            <a:r>
+              <a:rPr lang="en-US" altLang="zh-CN" dirty="0"/>
+              <a:t>git stash apply stash</a:t>
+            </a:r>
+            <a:r>
+              <a:rPr lang="zh-CN" altLang="en-US" dirty="0"/>
+              <a:t>信息  </a:t>
+            </a:r>
+            <a:r>
+              <a:rPr lang="en-US" altLang="zh-CN" dirty="0"/>
+              <a:t>---</a:t>
+            </a:r>
+            <a:r>
+              <a:rPr lang="zh-CN" altLang="en-US" dirty="0"/>
+              <a:t>取出存儲内容放到工作區，不刪除</a:t>
+            </a:r>
+            <a:r>
+              <a:rPr lang="en-US" altLang="zh-CN" dirty="0"/>
+              <a:t>stash</a:t>
+            </a:r>
+          </a:p>
+          <a:p>
+            <a:pPr marL="342900" indent="-342900">
+              <a:buAutoNum type="arabicPeriod"/>
+            </a:pPr>
+            <a:r>
+              <a:rPr lang="en-US" altLang="zh-TW" dirty="0"/>
+              <a:t>git stash show </a:t>
+            </a:r>
+            <a:r>
+              <a:rPr lang="en-US" altLang="zh-CN" dirty="0"/>
+              <a:t>–p</a:t>
+            </a:r>
+            <a:r>
+              <a:rPr lang="zh-CN" altLang="en-US" dirty="0"/>
+              <a:t> </a:t>
+            </a:r>
+            <a:r>
+              <a:rPr lang="en-US" altLang="zh-TW" dirty="0"/>
+              <a:t>stash</a:t>
+            </a:r>
+            <a:r>
+              <a:rPr lang="zh-CN" altLang="en-US" dirty="0"/>
+              <a:t>信息  </a:t>
+            </a:r>
+            <a:r>
+              <a:rPr lang="en-US" altLang="zh-CN" dirty="0"/>
+              <a:t>---  </a:t>
+            </a:r>
+            <a:r>
+              <a:rPr lang="zh-CN" altLang="en-US" dirty="0"/>
+              <a:t>顯示文件變更的記錄的詳細信息</a:t>
+            </a:r>
+            <a:endParaRPr lang="zh-TW" altLang="en-US" dirty="0"/>
+          </a:p>
+        </p:txBody>
+      </p:sp>
+    </p:spTree>
+    <p:extLst>
+      <p:ext uri="{BB962C8B-B14F-4D97-AF65-F5344CB8AC3E}">
+        <p14:creationId xmlns:p14="http://schemas.microsoft.com/office/powerpoint/2010/main" val="996690383"/>
+      </p:ext>
+    </p:extLst>
+  </p:cSld>
+  <p:clrMapOvr>
+    <a:masterClrMapping/>
+  </p:clrMapOvr>
+</p:sld>
+</file>
+
+<file path=ppt/slides/slide16.xml><?xml version="1.0" encoding="utf-8"?>
+<p:sld xmlns:a="http://schemas.openxmlformats.org/drawingml/2006/main" xmlns:r="http://schemas.openxmlformats.org/officeDocument/2006/relationships" xmlns:p="http://schemas.openxmlformats.org/presentationml/2006/main">
+  <p:cSld>
+    <p:spTree>
+      <p:nvGrpSpPr>
+        <p:cNvPr id="1" name=""/>
+        <p:cNvGrpSpPr/>
+        <p:nvPr/>
+      </p:nvGrpSpPr>
+      <p:grpSpPr>
+        <a:xfrm>
+          <a:off x="0" y="0"/>
+          <a:ext cx="0" cy="0"/>
+          <a:chOff x="0" y="0"/>
+          <a:chExt cx="0" cy="0"/>
+        </a:xfrm>
+      </p:grpSpPr>
+      <p:sp>
+        <p:nvSpPr>
+          <p:cNvPr id="4" name="文字方塊 3">
+            <a:extLst>
+              <a:ext uri="{FF2B5EF4-FFF2-40B4-BE49-F238E27FC236}">
+                <a16:creationId xmlns:a16="http://schemas.microsoft.com/office/drawing/2014/main" id="{A5DB0455-196F-4FAE-B01E-8441D8909D47}"/>
+              </a:ext>
+            </a:extLst>
+          </p:cNvPr>
+          <p:cNvSpPr txBox="1"/>
+          <p:nvPr/>
+        </p:nvSpPr>
+        <p:spPr>
+          <a:xfrm>
+            <a:off x="284480" y="264160"/>
+            <a:ext cx="11023600" cy="1200329"/>
+          </a:xfrm>
+          <a:prstGeom prst="rect">
+            <a:avLst/>
+          </a:prstGeom>
+          <a:noFill/>
+        </p:spPr>
+        <p:txBody>
+          <a:bodyPr wrap="square" rtlCol="0">
+            <a:spAutoFit/>
+          </a:bodyPr>
+          <a:lstStyle/>
+          <a:p>
+            <a:r>
+              <a:rPr lang="en-US" altLang="zh-CN" b="1" u="sng" dirty="0"/>
+              <a:t>git log</a:t>
+            </a:r>
+            <a:r>
+              <a:rPr lang="zh-CN" altLang="en-US" b="1" u="sng" dirty="0"/>
+              <a:t>的使用</a:t>
+            </a:r>
+            <a:endParaRPr lang="en-US" altLang="zh-CN" b="1" u="sng" dirty="0"/>
+          </a:p>
+          <a:p>
+            <a:endParaRPr lang="en-US" altLang="zh-TW" b="1" u="sng" dirty="0"/>
+          </a:p>
+          <a:p>
+            <a:r>
+              <a:rPr lang="en-US" altLang="zh-TW" b="1" dirty="0"/>
+              <a:t>	</a:t>
+            </a:r>
+            <a:r>
+              <a:rPr lang="en-US" altLang="zh-CN" b="1" dirty="0"/>
+              <a:t>1.   git log HEAD@{</a:t>
+            </a:r>
+            <a:r>
+              <a:rPr lang="zh-CN" altLang="en-US" b="1" dirty="0"/>
+              <a:t>時間標語</a:t>
+            </a:r>
+            <a:r>
+              <a:rPr lang="en-US" altLang="zh-CN" b="1" dirty="0"/>
+              <a:t>}</a:t>
+            </a:r>
+          </a:p>
+          <a:p>
+            <a:r>
+              <a:rPr lang="en-US" altLang="zh-TW" b="1" dirty="0"/>
+              <a:t>		</a:t>
+            </a:r>
+            <a:r>
+              <a:rPr lang="en-US" altLang="zh-CN" b="1" dirty="0" err="1"/>
+              <a:t>e.g</a:t>
+            </a:r>
+            <a:r>
+              <a:rPr lang="en-US" altLang="zh-CN" b="1" dirty="0"/>
+              <a:t>    git log HEAD@{yesterday</a:t>
+            </a:r>
+            <a:r>
+              <a:rPr lang="en-US" altLang="zh-CN" b="1"/>
+              <a:t>}     </a:t>
+            </a:r>
+            <a:r>
+              <a:rPr lang="zh-CN" altLang="en-US" b="1"/>
+              <a:t>昨天之前的</a:t>
+            </a:r>
+            <a:r>
+              <a:rPr lang="en-US" altLang="zh-CN" b="1" dirty="0"/>
+              <a:t>commit</a:t>
+            </a:r>
+            <a:r>
+              <a:rPr lang="zh-CN" altLang="en-US" b="1" dirty="0"/>
+              <a:t>信息</a:t>
+            </a:r>
+            <a:endParaRPr lang="zh-TW" altLang="en-US" b="1" dirty="0"/>
+          </a:p>
+        </p:txBody>
+      </p:sp>
+    </p:spTree>
+    <p:extLst>
+      <p:ext uri="{BB962C8B-B14F-4D97-AF65-F5344CB8AC3E}">
+        <p14:creationId xmlns:p14="http://schemas.microsoft.com/office/powerpoint/2010/main" val="1091212863"/>
       </p:ext>
     </p:extLst>
   </p:cSld>

</xml_diff>

<commit_message>
Add the git stash command into pptx
</commit_message>
<xml_diff>
--- a/GitStudy/GitStudy.pptx
+++ b/GitStudy/GitStudy.pptx
@@ -4990,7 +4990,7 @@
         <p:spPr>
           <a:xfrm>
             <a:off x="843280" y="904240"/>
-            <a:ext cx="10048240" cy="1477328"/>
+            <a:ext cx="10048240" cy="2031325"/>
           </a:xfrm>
           <a:prstGeom prst="rect">
             <a:avLst/>
@@ -5150,7 +5150,79 @@
             </a:r>
             <a:r>
               <a:rPr lang="zh-CN" altLang="en-US" dirty="0"/>
-              <a:t>顯示文件變更的記錄的詳細信息</a:t>
+              <a:t>顯示文件變更的記錄的詳細</a:t>
+            </a:r>
+            <a:r>
+              <a:rPr lang="zh-CN" altLang="en-US" dirty="0" smtClean="0"/>
+              <a:t>信息</a:t>
+            </a:r>
+            <a:endParaRPr lang="en-US" altLang="zh-CN" dirty="0" smtClean="0"/>
+          </a:p>
+          <a:p>
+            <a:pPr marL="342900" indent="-342900">
+              <a:buAutoNum type="arabicPeriod"/>
+            </a:pPr>
+            <a:r>
+              <a:rPr lang="en-US" altLang="zh-CN" dirty="0" err="1"/>
+              <a:t>git</a:t>
+            </a:r>
+            <a:r>
+              <a:rPr lang="en-US" altLang="zh-CN" dirty="0"/>
+              <a:t> stash save </a:t>
+            </a:r>
+            <a:r>
+              <a:rPr lang="en-US" altLang="zh-CN" dirty="0" smtClean="0"/>
+              <a:t>stash</a:t>
+            </a:r>
+            <a:r>
+              <a:rPr lang="zh-CN" altLang="en-US" dirty="0" smtClean="0"/>
+              <a:t>信息</a:t>
+            </a:r>
+            <a:r>
+              <a:rPr lang="en-US" altLang="zh-CN" dirty="0" smtClean="0"/>
+              <a:t> </a:t>
+            </a:r>
+            <a:r>
+              <a:rPr lang="en-US" altLang="zh-CN" dirty="0"/>
+              <a:t>--</a:t>
+            </a:r>
+            <a:r>
+              <a:rPr lang="en-US" altLang="zh-CN" dirty="0" smtClean="0"/>
+              <a:t>include-untrack --- </a:t>
+            </a:r>
+            <a:r>
+              <a:rPr lang="zh-CN" altLang="en-US" dirty="0" smtClean="0"/>
+              <a:t>将未被追踪的文件也存储起来</a:t>
+            </a:r>
+            <a:endParaRPr lang="en-US" altLang="zh-CN" dirty="0" smtClean="0"/>
+          </a:p>
+          <a:p>
+            <a:pPr marL="342900" indent="-342900">
+              <a:buAutoNum type="arabicPeriod"/>
+            </a:pPr>
+            <a:r>
+              <a:rPr lang="en-US" altLang="zh-CN" dirty="0" err="1"/>
+              <a:t>git</a:t>
+            </a:r>
+            <a:r>
+              <a:rPr lang="en-US" altLang="zh-CN" dirty="0"/>
+              <a:t> stash branch </a:t>
+            </a:r>
+            <a:r>
+              <a:rPr lang="zh-CN" altLang="en-US" dirty="0"/>
+              <a:t>分支名</a:t>
+            </a:r>
+            <a:r>
+              <a:rPr lang="en-US" altLang="zh-CN" dirty="0" smtClean="0"/>
+              <a:t>     ---  </a:t>
+            </a:r>
+            <a:r>
+              <a:rPr lang="zh-CN" altLang="en-US" dirty="0" smtClean="0"/>
+              <a:t>将存储的工作区运用到新的</a:t>
+            </a:r>
+            <a:r>
+              <a:rPr lang="en-US" altLang="zh-CN" dirty="0" smtClean="0"/>
+              <a:t>branch</a:t>
             </a:r>
             <a:endParaRPr lang="zh-TW" altLang="en-US" dirty="0"/>
           </a:p>

</xml_diff>

<commit_message>
Add the remote branch into pptx
</commit_message>
<xml_diff>
--- a/GitStudy/GitStudy.pptx
+++ b/GitStudy/GitStudy.pptx
@@ -5,7 +5,7 @@
     <p:sldMasterId id="2147483648" r:id="rId1"/>
   </p:sldMasterIdLst>
   <p:notesMasterIdLst>
-    <p:notesMasterId r:id="rId18"/>
+    <p:notesMasterId r:id="rId19"/>
   </p:notesMasterIdLst>
   <p:sldIdLst>
     <p:sldId id="256" r:id="rId2"/>
@@ -24,6 +24,7 @@
     <p:sldId id="269" r:id="rId15"/>
     <p:sldId id="270" r:id="rId16"/>
     <p:sldId id="271" r:id="rId17"/>
+    <p:sldId id="272" r:id="rId18"/>
   </p:sldIdLst>
   <p:sldSz cx="12192000" cy="6858000"/>
   <p:notesSz cx="6858000" cy="9144000"/>
@@ -212,7 +213,7 @@
           <a:p>
             <a:fld id="{C0F69D9A-D151-4089-8C1D-9A87D3DC0987}" type="datetimeFigureOut">
               <a:rPr lang="zh-TW" altLang="en-US" smtClean="0"/>
-              <a:t>2023/2/2</a:t>
+              <a:t>2023/2/3</a:t>
             </a:fld>
             <a:endParaRPr lang="zh-TW" altLang="en-US"/>
           </a:p>
@@ -626,7 +627,7 @@
           <a:p>
             <a:fld id="{B3DC4D43-2745-46E1-A871-6B61F7786A47}" type="datetimeFigureOut">
               <a:rPr lang="zh-TW" altLang="en-US" smtClean="0"/>
-              <a:t>2023/2/2</a:t>
+              <a:t>2023/2/3</a:t>
             </a:fld>
             <a:endParaRPr lang="zh-TW" altLang="en-US"/>
           </a:p>
@@ -824,7 +825,7 @@
           <a:p>
             <a:fld id="{B3DC4D43-2745-46E1-A871-6B61F7786A47}" type="datetimeFigureOut">
               <a:rPr lang="zh-TW" altLang="en-US" smtClean="0"/>
-              <a:t>2023/2/2</a:t>
+              <a:t>2023/2/3</a:t>
             </a:fld>
             <a:endParaRPr lang="zh-TW" altLang="en-US"/>
           </a:p>
@@ -1032,7 +1033,7 @@
           <a:p>
             <a:fld id="{B3DC4D43-2745-46E1-A871-6B61F7786A47}" type="datetimeFigureOut">
               <a:rPr lang="zh-TW" altLang="en-US" smtClean="0"/>
-              <a:t>2023/2/2</a:t>
+              <a:t>2023/2/3</a:t>
             </a:fld>
             <a:endParaRPr lang="zh-TW" altLang="en-US"/>
           </a:p>
@@ -1230,7 +1231,7 @@
           <a:p>
             <a:fld id="{B3DC4D43-2745-46E1-A871-6B61F7786A47}" type="datetimeFigureOut">
               <a:rPr lang="zh-TW" altLang="en-US" smtClean="0"/>
-              <a:t>2023/2/2</a:t>
+              <a:t>2023/2/3</a:t>
             </a:fld>
             <a:endParaRPr lang="zh-TW" altLang="en-US"/>
           </a:p>
@@ -1505,7 +1506,7 @@
           <a:p>
             <a:fld id="{B3DC4D43-2745-46E1-A871-6B61F7786A47}" type="datetimeFigureOut">
               <a:rPr lang="zh-TW" altLang="en-US" smtClean="0"/>
-              <a:t>2023/2/2</a:t>
+              <a:t>2023/2/3</a:t>
             </a:fld>
             <a:endParaRPr lang="zh-TW" altLang="en-US"/>
           </a:p>
@@ -1770,7 +1771,7 @@
           <a:p>
             <a:fld id="{B3DC4D43-2745-46E1-A871-6B61F7786A47}" type="datetimeFigureOut">
               <a:rPr lang="zh-TW" altLang="en-US" smtClean="0"/>
-              <a:t>2023/2/2</a:t>
+              <a:t>2023/2/3</a:t>
             </a:fld>
             <a:endParaRPr lang="zh-TW" altLang="en-US"/>
           </a:p>
@@ -2182,7 +2183,7 @@
           <a:p>
             <a:fld id="{B3DC4D43-2745-46E1-A871-6B61F7786A47}" type="datetimeFigureOut">
               <a:rPr lang="zh-TW" altLang="en-US" smtClean="0"/>
-              <a:t>2023/2/2</a:t>
+              <a:t>2023/2/3</a:t>
             </a:fld>
             <a:endParaRPr lang="zh-TW" altLang="en-US"/>
           </a:p>
@@ -2323,7 +2324,7 @@
           <a:p>
             <a:fld id="{B3DC4D43-2745-46E1-A871-6B61F7786A47}" type="datetimeFigureOut">
               <a:rPr lang="zh-TW" altLang="en-US" smtClean="0"/>
-              <a:t>2023/2/2</a:t>
+              <a:t>2023/2/3</a:t>
             </a:fld>
             <a:endParaRPr lang="zh-TW" altLang="en-US"/>
           </a:p>
@@ -2436,7 +2437,7 @@
           <a:p>
             <a:fld id="{B3DC4D43-2745-46E1-A871-6B61F7786A47}" type="datetimeFigureOut">
               <a:rPr lang="zh-TW" altLang="en-US" smtClean="0"/>
-              <a:t>2023/2/2</a:t>
+              <a:t>2023/2/3</a:t>
             </a:fld>
             <a:endParaRPr lang="zh-TW" altLang="en-US"/>
           </a:p>
@@ -2747,7 +2748,7 @@
           <a:p>
             <a:fld id="{B3DC4D43-2745-46E1-A871-6B61F7786A47}" type="datetimeFigureOut">
               <a:rPr lang="zh-TW" altLang="en-US" smtClean="0"/>
-              <a:t>2023/2/2</a:t>
+              <a:t>2023/2/3</a:t>
             </a:fld>
             <a:endParaRPr lang="zh-TW" altLang="en-US"/>
           </a:p>
@@ -3035,7 +3036,7 @@
           <a:p>
             <a:fld id="{B3DC4D43-2745-46E1-A871-6B61F7786A47}" type="datetimeFigureOut">
               <a:rPr lang="zh-TW" altLang="en-US" smtClean="0"/>
-              <a:t>2023/2/2</a:t>
+              <a:t>2023/2/3</a:t>
             </a:fld>
             <a:endParaRPr lang="zh-TW" altLang="en-US"/>
           </a:p>
@@ -3276,7 +3277,7 @@
           <a:p>
             <a:fld id="{B3DC4D43-2745-46E1-A871-6B61F7786A47}" type="datetimeFigureOut">
               <a:rPr lang="zh-TW" altLang="en-US" smtClean="0"/>
-              <a:t>2023/2/2</a:t>
+              <a:t>2023/2/3</a:t>
             </a:fld>
             <a:endParaRPr lang="zh-TW" altLang="en-US"/>
           </a:p>
@@ -5150,13 +5151,9 @@
             </a:r>
             <a:r>
               <a:rPr lang="zh-CN" altLang="en-US" dirty="0"/>
-              <a:t>顯示文件變更的記錄的詳細</a:t>
-            </a:r>
-            <a:r>
-              <a:rPr lang="zh-CN" altLang="en-US" dirty="0" smtClean="0"/>
-              <a:t>信息</a:t>
-            </a:r>
-            <a:endParaRPr lang="en-US" altLang="zh-CN" dirty="0" smtClean="0"/>
+              <a:t>顯示文件變更的記錄的詳細信息</a:t>
+            </a:r>
+            <a:endParaRPr lang="en-US" altLang="zh-CN" dirty="0"/>
           </a:p>
           <a:p>
             <a:pPr marL="342900" indent="-342900">
@@ -5168,33 +5165,21 @@
             </a:r>
             <a:r>
               <a:rPr lang="en-US" altLang="zh-CN" dirty="0"/>
-              <a:t> stash save </a:t>
-            </a:r>
-            <a:r>
-              <a:rPr lang="en-US" altLang="zh-CN" dirty="0" smtClean="0"/>
-              <a:t>stash</a:t>
-            </a:r>
-            <a:r>
-              <a:rPr lang="zh-CN" altLang="en-US" dirty="0" smtClean="0"/>
+              <a:t> stash save stash</a:t>
+            </a:r>
+            <a:r>
+              <a:rPr lang="zh-CN" altLang="en-US" dirty="0"/>
               <a:t>信息</a:t>
             </a:r>
             <a:r>
-              <a:rPr lang="en-US" altLang="zh-CN" dirty="0" smtClean="0"/>
-              <a:t> </a:t>
-            </a:r>
-            <a:r>
-              <a:rPr lang="en-US" altLang="zh-CN" dirty="0"/>
-              <a:t>--</a:t>
-            </a:r>
-            <a:r>
-              <a:rPr lang="en-US" altLang="zh-CN" dirty="0" smtClean="0"/>
-              <a:t>include-untrack --- </a:t>
-            </a:r>
-            <a:r>
-              <a:rPr lang="zh-CN" altLang="en-US" dirty="0" smtClean="0"/>
+              <a:rPr lang="en-US" altLang="zh-CN" dirty="0"/>
+              <a:t> --include-untrack --- </a:t>
+            </a:r>
+            <a:r>
+              <a:rPr lang="zh-CN" altLang="en-US" dirty="0"/>
               <a:t>将未被追踪的文件也存储起来</a:t>
             </a:r>
-            <a:endParaRPr lang="en-US" altLang="zh-CN" dirty="0" smtClean="0"/>
+            <a:endParaRPr lang="en-US" altLang="zh-CN" dirty="0"/>
           </a:p>
           <a:p>
             <a:pPr marL="342900" indent="-342900">
@@ -5213,15 +5198,15 @@
               <a:t>分支名</a:t>
             </a:r>
             <a:r>
-              <a:rPr lang="en-US" altLang="zh-CN" dirty="0" smtClean="0"/>
+              <a:rPr lang="en-US" altLang="zh-CN" dirty="0"/>
               <a:t>     ---  </a:t>
             </a:r>
             <a:r>
-              <a:rPr lang="zh-CN" altLang="en-US" dirty="0" smtClean="0"/>
+              <a:rPr lang="zh-CN" altLang="en-US" dirty="0"/>
               <a:t>将存储的工作区运用到新的</a:t>
             </a:r>
             <a:r>
-              <a:rPr lang="en-US" altLang="zh-CN" dirty="0" smtClean="0"/>
+              <a:rPr lang="en-US" altLang="zh-CN" dirty="0"/>
               <a:t>branch</a:t>
             </a:r>
             <a:endParaRPr lang="zh-TW" altLang="en-US" dirty="0"/>
@@ -5354,6 +5339,360 @@
     <p:extLst>
       <p:ext uri="{BB962C8B-B14F-4D97-AF65-F5344CB8AC3E}">
         <p14:creationId xmlns:p14="http://schemas.microsoft.com/office/powerpoint/2010/main" val="1091212863"/>
+      </p:ext>
+    </p:extLst>
+  </p:cSld>
+  <p:clrMapOvr>
+    <a:masterClrMapping/>
+  </p:clrMapOvr>
+</p:sld>
+</file>
+
+<file path=ppt/slides/slide17.xml><?xml version="1.0" encoding="utf-8"?>
+<p:sld xmlns:a="http://schemas.openxmlformats.org/drawingml/2006/main" xmlns:r="http://schemas.openxmlformats.org/officeDocument/2006/relationships" xmlns:p="http://schemas.openxmlformats.org/presentationml/2006/main">
+  <p:cSld>
+    <p:spTree>
+      <p:nvGrpSpPr>
+        <p:cNvPr id="1" name=""/>
+        <p:cNvGrpSpPr/>
+        <p:nvPr/>
+      </p:nvGrpSpPr>
+      <p:grpSpPr>
+        <a:xfrm>
+          <a:off x="0" y="0"/>
+          <a:ext cx="0" cy="0"/>
+          <a:chOff x="0" y="0"/>
+          <a:chExt cx="0" cy="0"/>
+        </a:xfrm>
+      </p:grpSpPr>
+      <p:sp>
+        <p:nvSpPr>
+          <p:cNvPr id="4" name="文字方塊 3">
+            <a:extLst>
+              <a:ext uri="{FF2B5EF4-FFF2-40B4-BE49-F238E27FC236}">
+                <a16:creationId xmlns:a16="http://schemas.microsoft.com/office/drawing/2014/main" id="{A2D95AE1-409A-44C3-B90F-8326E1441332}"/>
+              </a:ext>
+            </a:extLst>
+          </p:cNvPr>
+          <p:cNvSpPr txBox="1"/>
+          <p:nvPr/>
+        </p:nvSpPr>
+        <p:spPr>
+          <a:xfrm>
+            <a:off x="335280" y="325120"/>
+            <a:ext cx="11480800" cy="6247864"/>
+          </a:xfrm>
+          <a:prstGeom prst="rect">
+            <a:avLst/>
+          </a:prstGeom>
+          <a:noFill/>
+        </p:spPr>
+        <p:txBody>
+          <a:bodyPr wrap="square" rtlCol="0">
+            <a:spAutoFit/>
+          </a:bodyPr>
+          <a:lstStyle/>
+          <a:p>
+            <a:r>
+              <a:rPr lang="zh-CN" altLang="en-US" sz="2400" b="1" u="sng" dirty="0"/>
+              <a:t>遠程分支的使用</a:t>
+            </a:r>
+            <a:endParaRPr lang="en-US" altLang="zh-CN" sz="2400" b="1" u="sng" dirty="0"/>
+          </a:p>
+          <a:p>
+            <a:r>
+              <a:rPr lang="en-US" altLang="zh-TW" sz="2000" dirty="0"/>
+              <a:t>	</a:t>
+            </a:r>
+          </a:p>
+          <a:p>
+            <a:r>
+              <a:rPr lang="en-US" altLang="zh-TW" sz="2000" dirty="0"/>
+              <a:t>	</a:t>
+            </a:r>
+            <a:r>
+              <a:rPr lang="en-US" altLang="zh-CN" sz="2000" dirty="0"/>
+              <a:t>1</a:t>
+            </a:r>
+            <a:r>
+              <a:rPr lang="en-US" altLang="zh-CN" dirty="0"/>
+              <a:t>.   </a:t>
+            </a:r>
+            <a:r>
+              <a:rPr lang="zh-CN" altLang="en-US" dirty="0"/>
+              <a:t>查看引用</a:t>
+            </a:r>
+            <a:endParaRPr lang="en-US" altLang="zh-CN" dirty="0"/>
+          </a:p>
+          <a:p>
+            <a:r>
+              <a:rPr lang="en-US" altLang="zh-CN" dirty="0"/>
+              <a:t>		git show-ref   ---  </a:t>
+            </a:r>
+            <a:r>
+              <a:rPr lang="zh-CN" altLang="en-US" dirty="0"/>
+              <a:t>顯示當前版本庫的引用</a:t>
+            </a:r>
+            <a:endParaRPr lang="en-US" altLang="zh-CN" dirty="0"/>
+          </a:p>
+          <a:p>
+            <a:r>
+              <a:rPr lang="en-US" altLang="zh-CN" dirty="0"/>
+              <a:t>		git ls-remote ---  </a:t>
+            </a:r>
+            <a:r>
+              <a:rPr lang="zh-CN" altLang="en-US" dirty="0"/>
+              <a:t>顯示遠程版本庫的引用</a:t>
+            </a:r>
+            <a:endParaRPr lang="en-US" altLang="zh-CN" dirty="0"/>
+          </a:p>
+          <a:p>
+            <a:endParaRPr lang="en-US" altLang="zh-CN" sz="2000" dirty="0"/>
+          </a:p>
+          <a:p>
+            <a:r>
+              <a:rPr lang="en-US" altLang="zh-CN" sz="2000" dirty="0"/>
+              <a:t>	2. </a:t>
+            </a:r>
+            <a:r>
+              <a:rPr lang="zh-CN" altLang="en-US" sz="2000" dirty="0"/>
+              <a:t>以一個本地版本作爲裸倉庫</a:t>
+            </a:r>
+            <a:r>
+              <a:rPr lang="en-US" altLang="zh-CN" sz="2000" dirty="0"/>
+              <a:t>(</a:t>
+            </a:r>
+            <a:r>
+              <a:rPr lang="zh-CN" altLang="en-US" sz="2000" dirty="0"/>
+              <a:t>遠程版本庫</a:t>
+            </a:r>
+            <a:r>
+              <a:rPr lang="en-US" altLang="zh-CN" sz="2000" dirty="0"/>
+              <a:t>)</a:t>
+            </a:r>
+            <a:r>
+              <a:rPr lang="zh-CN" altLang="en-US" sz="2000" dirty="0"/>
+              <a:t>步驟</a:t>
+            </a:r>
+            <a:endParaRPr lang="en-US" altLang="zh-CN" sz="2000" dirty="0"/>
+          </a:p>
+          <a:p>
+            <a:r>
+              <a:rPr lang="en-US" altLang="zh-CN" sz="2000" dirty="0"/>
+              <a:t>		(1)git clone --bare </a:t>
+            </a:r>
+            <a:r>
+              <a:rPr lang="zh-CN" altLang="en-US" sz="2000" dirty="0"/>
+              <a:t>本地版本庫的路徑   </a:t>
+            </a:r>
+            <a:r>
+              <a:rPr lang="en-US" altLang="zh-CN" sz="2000" dirty="0"/>
+              <a:t>---  </a:t>
+            </a:r>
+            <a:r>
+              <a:rPr lang="zh-CN" altLang="en-US" sz="2000" dirty="0"/>
+              <a:t>創建裸倉庫生成本地版本庫名字加</a:t>
+            </a:r>
+            <a:r>
+              <a:rPr lang="en-US" altLang="zh-CN" sz="2000" dirty="0"/>
+              <a:t>.git</a:t>
+            </a:r>
+          </a:p>
+          <a:p>
+            <a:r>
+              <a:rPr lang="en-US" altLang="zh-CN" sz="2000" dirty="0"/>
+              <a:t>                                (2)git</a:t>
+            </a:r>
+            <a:r>
+              <a:rPr lang="zh-CN" altLang="en-US" sz="2000" dirty="0"/>
+              <a:t> </a:t>
+            </a:r>
+            <a:r>
+              <a:rPr lang="en-US" altLang="zh-CN" sz="2000" dirty="0"/>
+              <a:t>remote</a:t>
+            </a:r>
+            <a:r>
+              <a:rPr lang="zh-CN" altLang="en-US" sz="2000" dirty="0"/>
+              <a:t> </a:t>
+            </a:r>
+            <a:r>
+              <a:rPr lang="en-US" altLang="zh-CN" sz="2000" dirty="0"/>
+              <a:t>add+</a:t>
+            </a:r>
+            <a:r>
+              <a:rPr lang="zh-CN" altLang="en-US" sz="2000" dirty="0"/>
+              <a:t>遠程分支名字</a:t>
+            </a:r>
+            <a:r>
+              <a:rPr lang="en-US" altLang="zh-CN" sz="2000" dirty="0"/>
+              <a:t>+ </a:t>
+            </a:r>
+            <a:r>
+              <a:rPr lang="zh-CN" altLang="en-US" sz="2000" dirty="0"/>
+              <a:t>裸倉庫下</a:t>
+            </a:r>
+            <a:r>
+              <a:rPr lang="en-US" altLang="zh-CN" sz="2000" dirty="0"/>
+              <a:t>.git</a:t>
+            </a:r>
+            <a:r>
+              <a:rPr lang="zh-CN" altLang="en-US" sz="2000" dirty="0"/>
+              <a:t>結尾文件夾的路徑</a:t>
+            </a:r>
+            <a:endParaRPr lang="en-US" altLang="zh-CN" sz="2000" dirty="0"/>
+          </a:p>
+          <a:p>
+            <a:r>
+              <a:rPr lang="en-US" altLang="zh-CN" sz="2000" dirty="0"/>
+              <a:t>		(3)git remote update </a:t>
+            </a:r>
+            <a:r>
+              <a:rPr lang="zh-CN" altLang="en-US" sz="2000" dirty="0"/>
+              <a:t>遠程分支名字</a:t>
+            </a:r>
+            <a:endParaRPr lang="en-US" altLang="zh-CN" sz="2000" dirty="0"/>
+          </a:p>
+          <a:p>
+            <a:endParaRPr lang="en-US" altLang="zh-CN" sz="2000" dirty="0"/>
+          </a:p>
+          <a:p>
+            <a:r>
+              <a:rPr lang="en-US" altLang="zh-CN" sz="2000" dirty="0"/>
+              <a:t>	3. </a:t>
+            </a:r>
+            <a:r>
+              <a:rPr lang="zh-CN" altLang="en-US" sz="2000" dirty="0"/>
+              <a:t>刪除本地的遠程分支</a:t>
+            </a:r>
+            <a:endParaRPr lang="en-US" altLang="zh-CN" sz="2000" dirty="0"/>
+          </a:p>
+          <a:p>
+            <a:r>
+              <a:rPr lang="en-US" altLang="zh-CN" sz="2000" dirty="0"/>
+              <a:t>		git remote remove </a:t>
+            </a:r>
+            <a:r>
+              <a:rPr lang="zh-CN" altLang="en-US" sz="2000" dirty="0"/>
+              <a:t>遠程分支</a:t>
+            </a:r>
+            <a:endParaRPr lang="en-US" altLang="zh-CN" sz="2000" dirty="0"/>
+          </a:p>
+          <a:p>
+            <a:endParaRPr lang="en-US" altLang="zh-CN" sz="2000" dirty="0"/>
+          </a:p>
+          <a:p>
+            <a:r>
+              <a:rPr lang="en-US" altLang="zh-CN" sz="2000" dirty="0"/>
+              <a:t>	4. </a:t>
+            </a:r>
+            <a:r>
+              <a:rPr lang="zh-CN" altLang="en-US" sz="2000" dirty="0"/>
+              <a:t>將本地修改提交到遠程分支</a:t>
+            </a:r>
+            <a:r>
+              <a:rPr lang="en-US" altLang="zh-CN" sz="2000" dirty="0"/>
+              <a:t>,  </a:t>
+            </a:r>
+            <a:r>
+              <a:rPr lang="zh-CN" altLang="en-US" sz="2000" dirty="0"/>
+              <a:t>本地分支和遠程分支一樣以下指令等同</a:t>
+            </a:r>
+            <a:endParaRPr lang="en-US" altLang="zh-CN" sz="2000" dirty="0"/>
+          </a:p>
+          <a:p>
+            <a:r>
+              <a:rPr lang="en-US" altLang="zh-CN" sz="2000" dirty="0"/>
+              <a:t>		git push &lt;</a:t>
+            </a:r>
+            <a:r>
+              <a:rPr lang="zh-TW" altLang="en-US" sz="2000" dirty="0"/>
+              <a:t>远程主机名</a:t>
+            </a:r>
+            <a:r>
+              <a:rPr lang="en-US" altLang="zh-TW" sz="2000" dirty="0"/>
+              <a:t>&gt; &lt;</a:t>
+            </a:r>
+            <a:r>
+              <a:rPr lang="zh-TW" altLang="en-US" sz="2000" dirty="0"/>
+              <a:t>本地分支名</a:t>
+            </a:r>
+            <a:r>
+              <a:rPr lang="en-US" altLang="zh-TW" sz="2000" dirty="0"/>
+              <a:t>&gt;:&lt;</a:t>
+            </a:r>
+            <a:r>
+              <a:rPr lang="zh-TW" altLang="en-US" sz="2000" dirty="0"/>
+              <a:t>远程分支名</a:t>
+            </a:r>
+            <a:r>
+              <a:rPr lang="en-US" altLang="zh-TW" sz="2000" dirty="0"/>
+              <a:t>&gt;</a:t>
+            </a:r>
+          </a:p>
+          <a:p>
+            <a:r>
+              <a:rPr lang="en-US" altLang="zh-CN" sz="2000" dirty="0"/>
+              <a:t>		git push &lt;</a:t>
+            </a:r>
+            <a:r>
+              <a:rPr lang="zh-TW" altLang="en-US" sz="2000" dirty="0"/>
+              <a:t>远程主机名</a:t>
+            </a:r>
+            <a:r>
+              <a:rPr lang="en-US" altLang="zh-TW" sz="2000" dirty="0"/>
+              <a:t>&gt; &lt;</a:t>
+            </a:r>
+            <a:r>
+              <a:rPr lang="zh-TW" altLang="en-US" sz="2000" dirty="0"/>
+              <a:t>本地分支名</a:t>
+            </a:r>
+            <a:r>
+              <a:rPr lang="en-US" altLang="zh-TW" sz="2000" dirty="0"/>
+              <a:t>&gt;</a:t>
+            </a:r>
+            <a:endParaRPr lang="en-US" altLang="zh-CN" sz="2000" dirty="0"/>
+          </a:p>
+          <a:p>
+            <a:r>
+              <a:rPr lang="en-US" altLang="zh-CN" sz="2000" dirty="0"/>
+              <a:t> </a:t>
+            </a:r>
+          </a:p>
+          <a:p>
+            <a:r>
+              <a:rPr lang="en-US" altLang="zh-TW" sz="2000" dirty="0"/>
+              <a:t>	</a:t>
+            </a:r>
+            <a:r>
+              <a:rPr lang="en-US" altLang="zh-CN" sz="2000" dirty="0"/>
+              <a:t>5.  </a:t>
+            </a:r>
+            <a:r>
+              <a:rPr lang="zh-CN" altLang="en-US" sz="2000" dirty="0"/>
+              <a:t>刪除遠程分支</a:t>
+            </a:r>
+            <a:endParaRPr lang="en-US" altLang="zh-CN" sz="2000" dirty="0"/>
+          </a:p>
+          <a:p>
+            <a:r>
+              <a:rPr lang="en-US" altLang="zh-TW" sz="2000" dirty="0"/>
+              <a:t>		 git push origin --delete </a:t>
+            </a:r>
+            <a:r>
+              <a:rPr lang="zh-CN" altLang="en-US" sz="2000" dirty="0"/>
+              <a:t>分支名</a:t>
+            </a:r>
+            <a:r>
+              <a:rPr lang="en-US" altLang="zh-TW" sz="2000" dirty="0"/>
+              <a:t>	</a:t>
+            </a:r>
+          </a:p>
+        </p:txBody>
+      </p:sp>
+    </p:spTree>
+    <p:extLst>
+      <p:ext uri="{BB962C8B-B14F-4D97-AF65-F5344CB8AC3E}">
+        <p14:creationId xmlns:p14="http://schemas.microsoft.com/office/powerpoint/2010/main" val="1314544165"/>
       </p:ext>
     </p:extLst>
   </p:cSld>

</xml_diff>

<commit_message>
Add the git remote command into pptx
</commit_message>
<xml_diff>
--- a/GitStudy/GitStudy.pptx
+++ b/GitStudy/GitStudy.pptx
@@ -5,7 +5,7 @@
     <p:sldMasterId id="2147483648" r:id="rId1"/>
   </p:sldMasterIdLst>
   <p:notesMasterIdLst>
-    <p:notesMasterId r:id="rId19"/>
+    <p:notesMasterId r:id="rId21"/>
   </p:notesMasterIdLst>
   <p:sldIdLst>
     <p:sldId id="256" r:id="rId2"/>
@@ -25,6 +25,8 @@
     <p:sldId id="270" r:id="rId16"/>
     <p:sldId id="271" r:id="rId17"/>
     <p:sldId id="272" r:id="rId18"/>
+    <p:sldId id="273" r:id="rId19"/>
+    <p:sldId id="274" r:id="rId20"/>
   </p:sldIdLst>
   <p:sldSz cx="12192000" cy="6858000"/>
   <p:notesSz cx="6858000" cy="9144000"/>
@@ -213,7 +215,7 @@
           <a:p>
             <a:fld id="{C0F69D9A-D151-4089-8C1D-9A87D3DC0987}" type="datetimeFigureOut">
               <a:rPr lang="zh-TW" altLang="en-US" smtClean="0"/>
-              <a:t>2023/2/3</a:t>
+              <a:t>2023/2/4</a:t>
             </a:fld>
             <a:endParaRPr lang="zh-TW" altLang="en-US"/>
           </a:p>
@@ -627,7 +629,7 @@
           <a:p>
             <a:fld id="{B3DC4D43-2745-46E1-A871-6B61F7786A47}" type="datetimeFigureOut">
               <a:rPr lang="zh-TW" altLang="en-US" smtClean="0"/>
-              <a:t>2023/2/3</a:t>
+              <a:t>2023/2/4</a:t>
             </a:fld>
             <a:endParaRPr lang="zh-TW" altLang="en-US"/>
           </a:p>
@@ -825,7 +827,7 @@
           <a:p>
             <a:fld id="{B3DC4D43-2745-46E1-A871-6B61F7786A47}" type="datetimeFigureOut">
               <a:rPr lang="zh-TW" altLang="en-US" smtClean="0"/>
-              <a:t>2023/2/3</a:t>
+              <a:t>2023/2/4</a:t>
             </a:fld>
             <a:endParaRPr lang="zh-TW" altLang="en-US"/>
           </a:p>
@@ -1033,7 +1035,7 @@
           <a:p>
             <a:fld id="{B3DC4D43-2745-46E1-A871-6B61F7786A47}" type="datetimeFigureOut">
               <a:rPr lang="zh-TW" altLang="en-US" smtClean="0"/>
-              <a:t>2023/2/3</a:t>
+              <a:t>2023/2/4</a:t>
             </a:fld>
             <a:endParaRPr lang="zh-TW" altLang="en-US"/>
           </a:p>
@@ -1231,7 +1233,7 @@
           <a:p>
             <a:fld id="{B3DC4D43-2745-46E1-A871-6B61F7786A47}" type="datetimeFigureOut">
               <a:rPr lang="zh-TW" altLang="en-US" smtClean="0"/>
-              <a:t>2023/2/3</a:t>
+              <a:t>2023/2/4</a:t>
             </a:fld>
             <a:endParaRPr lang="zh-TW" altLang="en-US"/>
           </a:p>
@@ -1506,7 +1508,7 @@
           <a:p>
             <a:fld id="{B3DC4D43-2745-46E1-A871-6B61F7786A47}" type="datetimeFigureOut">
               <a:rPr lang="zh-TW" altLang="en-US" smtClean="0"/>
-              <a:t>2023/2/3</a:t>
+              <a:t>2023/2/4</a:t>
             </a:fld>
             <a:endParaRPr lang="zh-TW" altLang="en-US"/>
           </a:p>
@@ -1771,7 +1773,7 @@
           <a:p>
             <a:fld id="{B3DC4D43-2745-46E1-A871-6B61F7786A47}" type="datetimeFigureOut">
               <a:rPr lang="zh-TW" altLang="en-US" smtClean="0"/>
-              <a:t>2023/2/3</a:t>
+              <a:t>2023/2/4</a:t>
             </a:fld>
             <a:endParaRPr lang="zh-TW" altLang="en-US"/>
           </a:p>
@@ -2183,7 +2185,7 @@
           <a:p>
             <a:fld id="{B3DC4D43-2745-46E1-A871-6B61F7786A47}" type="datetimeFigureOut">
               <a:rPr lang="zh-TW" altLang="en-US" smtClean="0"/>
-              <a:t>2023/2/3</a:t>
+              <a:t>2023/2/4</a:t>
             </a:fld>
             <a:endParaRPr lang="zh-TW" altLang="en-US"/>
           </a:p>
@@ -2324,7 +2326,7 @@
           <a:p>
             <a:fld id="{B3DC4D43-2745-46E1-A871-6B61F7786A47}" type="datetimeFigureOut">
               <a:rPr lang="zh-TW" altLang="en-US" smtClean="0"/>
-              <a:t>2023/2/3</a:t>
+              <a:t>2023/2/4</a:t>
             </a:fld>
             <a:endParaRPr lang="zh-TW" altLang="en-US"/>
           </a:p>
@@ -2437,7 +2439,7 @@
           <a:p>
             <a:fld id="{B3DC4D43-2745-46E1-A871-6B61F7786A47}" type="datetimeFigureOut">
               <a:rPr lang="zh-TW" altLang="en-US" smtClean="0"/>
-              <a:t>2023/2/3</a:t>
+              <a:t>2023/2/4</a:t>
             </a:fld>
             <a:endParaRPr lang="zh-TW" altLang="en-US"/>
           </a:p>
@@ -2748,7 +2750,7 @@
           <a:p>
             <a:fld id="{B3DC4D43-2745-46E1-A871-6B61F7786A47}" type="datetimeFigureOut">
               <a:rPr lang="zh-TW" altLang="en-US" smtClean="0"/>
-              <a:t>2023/2/3</a:t>
+              <a:t>2023/2/4</a:t>
             </a:fld>
             <a:endParaRPr lang="zh-TW" altLang="en-US"/>
           </a:p>
@@ -3036,7 +3038,7 @@
           <a:p>
             <a:fld id="{B3DC4D43-2745-46E1-A871-6B61F7786A47}" type="datetimeFigureOut">
               <a:rPr lang="zh-TW" altLang="en-US" smtClean="0"/>
-              <a:t>2023/2/3</a:t>
+              <a:t>2023/2/4</a:t>
             </a:fld>
             <a:endParaRPr lang="zh-TW" altLang="en-US"/>
           </a:p>
@@ -3277,7 +3279,7 @@
           <a:p>
             <a:fld id="{B3DC4D43-2745-46E1-A871-6B61F7786A47}" type="datetimeFigureOut">
               <a:rPr lang="zh-TW" altLang="en-US" smtClean="0"/>
-              <a:t>2023/2/3</a:t>
+              <a:t>2023/2/4</a:t>
             </a:fld>
             <a:endParaRPr lang="zh-TW" altLang="en-US"/>
           </a:p>
@@ -5693,6 +5695,560 @@
     <p:extLst>
       <p:ext uri="{BB962C8B-B14F-4D97-AF65-F5344CB8AC3E}">
         <p14:creationId xmlns:p14="http://schemas.microsoft.com/office/powerpoint/2010/main" val="1314544165"/>
+      </p:ext>
+    </p:extLst>
+  </p:cSld>
+  <p:clrMapOvr>
+    <a:masterClrMapping/>
+  </p:clrMapOvr>
+</p:sld>
+</file>
+
+<file path=ppt/slides/slide18.xml><?xml version="1.0" encoding="utf-8"?>
+<p:sld xmlns:a="http://schemas.openxmlformats.org/drawingml/2006/main" xmlns:r="http://schemas.openxmlformats.org/officeDocument/2006/relationships" xmlns:p="http://schemas.openxmlformats.org/presentationml/2006/main">
+  <p:cSld>
+    <p:spTree>
+      <p:nvGrpSpPr>
+        <p:cNvPr id="1" name=""/>
+        <p:cNvGrpSpPr/>
+        <p:nvPr/>
+      </p:nvGrpSpPr>
+      <p:grpSpPr>
+        <a:xfrm>
+          <a:off x="0" y="0"/>
+          <a:ext cx="0" cy="0"/>
+          <a:chOff x="0" y="0"/>
+          <a:chExt cx="0" cy="0"/>
+        </a:xfrm>
+      </p:grpSpPr>
+      <p:sp>
+        <p:nvSpPr>
+          <p:cNvPr id="4" name="文字方塊 3">
+            <a:extLst>
+              <a:ext uri="{FF2B5EF4-FFF2-40B4-BE49-F238E27FC236}">
+                <a16:creationId xmlns:a16="http://schemas.microsoft.com/office/drawing/2014/main" id="{A2D95AE1-409A-44C3-B90F-8326E1441332}"/>
+              </a:ext>
+            </a:extLst>
+          </p:cNvPr>
+          <p:cNvSpPr txBox="1"/>
+          <p:nvPr/>
+        </p:nvSpPr>
+        <p:spPr>
+          <a:xfrm>
+            <a:off x="335280" y="325120"/>
+            <a:ext cx="11480800" cy="6617196"/>
+          </a:xfrm>
+          <a:prstGeom prst="rect">
+            <a:avLst/>
+          </a:prstGeom>
+          <a:noFill/>
+        </p:spPr>
+        <p:txBody>
+          <a:bodyPr wrap="square" rtlCol="0">
+            <a:spAutoFit/>
+          </a:bodyPr>
+          <a:lstStyle/>
+          <a:p>
+            <a:r>
+              <a:rPr lang="zh-CN" altLang="en-US" sz="2400" b="1" u="sng" dirty="0"/>
+              <a:t>遠程分支的使用</a:t>
+            </a:r>
+            <a:endParaRPr lang="en-US" altLang="zh-CN" sz="2400" b="1" u="sng" dirty="0"/>
+          </a:p>
+          <a:p>
+            <a:r>
+              <a:rPr lang="en-US" altLang="zh-TW" sz="2000" dirty="0"/>
+              <a:t>	</a:t>
+            </a:r>
+          </a:p>
+          <a:p>
+            <a:r>
+              <a:rPr lang="en-US" altLang="zh-TW" sz="2000" dirty="0"/>
+              <a:t>	</a:t>
+            </a:r>
+            <a:r>
+              <a:rPr lang="en-US" altLang="zh-CN" dirty="0"/>
+              <a:t>6.  </a:t>
+            </a:r>
+            <a:r>
+              <a:rPr lang="zh-CN" altLang="en-US" dirty="0"/>
+              <a:t>查看遠程分支的信息</a:t>
+            </a:r>
+            <a:endParaRPr lang="en-US" altLang="zh-CN" dirty="0"/>
+          </a:p>
+          <a:p>
+            <a:r>
+              <a:rPr lang="en-US" altLang="zh-TW" dirty="0"/>
+              <a:t>		</a:t>
+            </a:r>
+            <a:r>
+              <a:rPr lang="en-US" altLang="zh-CN" dirty="0"/>
+              <a:t>git remote show origin</a:t>
+            </a:r>
+          </a:p>
+          <a:p>
+            <a:endParaRPr lang="en-US" altLang="zh-TW" dirty="0"/>
+          </a:p>
+          <a:p>
+            <a:r>
+              <a:rPr lang="en-US" altLang="zh-TW" dirty="0"/>
+              <a:t>	7.  </a:t>
+            </a:r>
+            <a:r>
+              <a:rPr lang="zh-CN" altLang="en-US" dirty="0"/>
+              <a:t>刪除本地遠程分支</a:t>
+            </a:r>
+            <a:endParaRPr lang="en-US" altLang="zh-CN" dirty="0"/>
+          </a:p>
+          <a:p>
+            <a:r>
+              <a:rPr lang="en-US" altLang="zh-TW" dirty="0"/>
+              <a:t>		</a:t>
+            </a:r>
+            <a:r>
+              <a:rPr lang="en-US" altLang="zh-CN" dirty="0"/>
+              <a:t>git remote --d --r </a:t>
+            </a:r>
+            <a:r>
+              <a:rPr lang="zh-CN" altLang="en-US" dirty="0"/>
+              <a:t>遠程分支名字</a:t>
+            </a:r>
+            <a:endParaRPr lang="en-US" altLang="zh-CN" dirty="0"/>
+          </a:p>
+          <a:p>
+            <a:r>
+              <a:rPr lang="en-US" altLang="zh-TW" dirty="0"/>
+              <a:t>	</a:t>
+            </a:r>
+          </a:p>
+          <a:p>
+            <a:r>
+              <a:rPr lang="en-US" altLang="zh-TW" dirty="0"/>
+              <a:t>	</a:t>
+            </a:r>
+            <a:r>
+              <a:rPr lang="en-US" altLang="zh-CN" dirty="0"/>
+              <a:t>8. </a:t>
+            </a:r>
+            <a:r>
+              <a:rPr lang="zh-CN" altLang="en-US" dirty="0"/>
+              <a:t>遠程版本庫刪除了分支同步到本地</a:t>
+            </a:r>
+            <a:endParaRPr lang="en-US" altLang="zh-CN" dirty="0"/>
+          </a:p>
+          <a:p>
+            <a:r>
+              <a:rPr lang="en-US" altLang="zh-TW" dirty="0"/>
+              <a:t>		git remote update –prune</a:t>
+            </a:r>
+          </a:p>
+          <a:p>
+            <a:endParaRPr lang="en-US" altLang="zh-TW" dirty="0"/>
+          </a:p>
+          <a:p>
+            <a:r>
+              <a:rPr lang="en-US" altLang="zh-TW" dirty="0"/>
+              <a:t>	</a:t>
+            </a:r>
+            <a:r>
+              <a:rPr lang="en-US" altLang="zh-CN" dirty="0"/>
+              <a:t>9. </a:t>
+            </a:r>
+            <a:r>
+              <a:rPr lang="zh-CN" altLang="en-US" dirty="0"/>
+              <a:t>重新命名遠程版本庫</a:t>
+            </a:r>
+            <a:endParaRPr lang="en-US" altLang="zh-CN" dirty="0"/>
+          </a:p>
+          <a:p>
+            <a:r>
+              <a:rPr lang="en-US" altLang="zh-TW" dirty="0"/>
+              <a:t>		</a:t>
+            </a:r>
+            <a:r>
+              <a:rPr lang="en-US" altLang="zh-CN" dirty="0"/>
+              <a:t>git remote rename </a:t>
+            </a:r>
+            <a:r>
+              <a:rPr lang="zh-CN" altLang="en-US" dirty="0"/>
+              <a:t>舊名字 新名字</a:t>
+            </a:r>
+            <a:endParaRPr lang="en-US" altLang="zh-CN" dirty="0"/>
+          </a:p>
+          <a:p>
+            <a:endParaRPr lang="en-US" altLang="zh-TW" dirty="0"/>
+          </a:p>
+          <a:p>
+            <a:r>
+              <a:rPr lang="en-US" altLang="zh-TW" dirty="0"/>
+              <a:t>	</a:t>
+            </a:r>
+            <a:r>
+              <a:rPr lang="en-US" altLang="zh-CN" dirty="0"/>
+              <a:t>10. clone</a:t>
+            </a:r>
+            <a:r>
+              <a:rPr lang="zh-CN" altLang="en-US" dirty="0"/>
+              <a:t>單個分支的代碼</a:t>
+            </a:r>
+            <a:endParaRPr lang="en-US" altLang="zh-CN" dirty="0"/>
+          </a:p>
+          <a:p>
+            <a:r>
+              <a:rPr lang="en-US" altLang="zh-TW" dirty="0"/>
+              <a:t>		git clone </a:t>
+            </a:r>
+            <a:r>
+              <a:rPr lang="en-US" altLang="zh-TW" dirty="0" err="1"/>
+              <a:t>git@github.com:luchaojun</a:t>
+            </a:r>
+            <a:r>
+              <a:rPr lang="en-US" altLang="zh-TW" dirty="0"/>
+              <a:t>/</a:t>
+            </a:r>
+            <a:r>
+              <a:rPr lang="en-US" altLang="zh-TW" dirty="0" err="1"/>
+              <a:t>Test.git</a:t>
+            </a:r>
+            <a:r>
+              <a:rPr lang="en-US" altLang="zh-TW" dirty="0"/>
+              <a:t> -b ref/test1 --single-branch</a:t>
+            </a:r>
+          </a:p>
+          <a:p>
+            <a:endParaRPr lang="en-US" altLang="zh-TW" dirty="0"/>
+          </a:p>
+          <a:p>
+            <a:r>
+              <a:rPr lang="en-US" altLang="zh-TW" dirty="0"/>
+              <a:t>	</a:t>
+            </a:r>
+            <a:r>
+              <a:rPr lang="en-US" altLang="zh-CN" dirty="0"/>
+              <a:t>11. clone</a:t>
+            </a:r>
+            <a:r>
+              <a:rPr lang="zh-CN" altLang="en-US" dirty="0"/>
+              <a:t>后本地分支和遠程分支相對應</a:t>
+            </a:r>
+            <a:r>
+              <a:rPr lang="en-US" altLang="zh-CN" dirty="0"/>
+              <a:t>, </a:t>
+            </a:r>
+            <a:r>
+              <a:rPr lang="zh-CN" altLang="en-US" dirty="0"/>
+              <a:t>切換到本地分支命名以自定義或遠程分支命名</a:t>
+            </a:r>
+            <a:endParaRPr lang="en-US" altLang="zh-CN" dirty="0"/>
+          </a:p>
+          <a:p>
+            <a:r>
+              <a:rPr lang="en-US" altLang="zh-CN" dirty="0"/>
+              <a:t>		git checkout –b </a:t>
+            </a:r>
+            <a:r>
+              <a:rPr lang="zh-CN" altLang="en-US" dirty="0"/>
+              <a:t>自定義分支 </a:t>
+            </a:r>
+            <a:r>
+              <a:rPr lang="en-US" altLang="zh-CN" dirty="0"/>
+              <a:t>--track </a:t>
+            </a:r>
+            <a:r>
+              <a:rPr lang="zh-CN" altLang="en-US" dirty="0"/>
+              <a:t>遠程分支名字</a:t>
+            </a:r>
+            <a:endParaRPr lang="en-US" altLang="zh-CN" dirty="0"/>
+          </a:p>
+          <a:p>
+            <a:r>
+              <a:rPr lang="en-US" altLang="zh-TW" dirty="0"/>
+              <a:t>		</a:t>
+            </a:r>
+            <a:r>
+              <a:rPr lang="en-US" altLang="zh-CN" dirty="0"/>
+              <a:t>git checkout --track </a:t>
+            </a:r>
+            <a:r>
+              <a:rPr lang="zh-CN" altLang="en-US" dirty="0"/>
+              <a:t>遠程分支名 </a:t>
+            </a:r>
+            <a:endParaRPr lang="en-US" altLang="zh-CN" dirty="0"/>
+          </a:p>
+          <a:p>
+            <a:endParaRPr lang="en-US" altLang="zh-CN" dirty="0"/>
+          </a:p>
+          <a:p>
+            <a:r>
+              <a:rPr lang="en-US" altLang="zh-CN" dirty="0"/>
+              <a:t>	12. clone</a:t>
+            </a:r>
+            <a:r>
+              <a:rPr lang="zh-CN" altLang="en-US" dirty="0"/>
+              <a:t>后本地分支和遠程分支相對應</a:t>
+            </a:r>
+            <a:r>
+              <a:rPr lang="en-US" altLang="zh-CN" dirty="0"/>
+              <a:t>,  </a:t>
+            </a:r>
+            <a:r>
+              <a:rPr lang="zh-CN" altLang="en-US" dirty="0"/>
+              <a:t>本地分支名字變爲自定義名字</a:t>
+            </a:r>
+            <a:endParaRPr lang="en-US" altLang="zh-CN" dirty="0"/>
+          </a:p>
+          <a:p>
+            <a:r>
+              <a:rPr lang="en-US" altLang="zh-CN" dirty="0"/>
+              <a:t>		git branch --track </a:t>
+            </a:r>
+            <a:r>
+              <a:rPr lang="zh-CN" altLang="en-US" dirty="0"/>
+              <a:t>自定義分支名字 遠程分支的名字</a:t>
+            </a:r>
+            <a:r>
+              <a:rPr lang="en-US" altLang="zh-CN" dirty="0"/>
+              <a:t>  </a:t>
+            </a:r>
+            <a:endParaRPr lang="en-US" altLang="zh-TW" dirty="0"/>
+          </a:p>
+        </p:txBody>
+      </p:sp>
+    </p:spTree>
+    <p:extLst>
+      <p:ext uri="{BB962C8B-B14F-4D97-AF65-F5344CB8AC3E}">
+        <p14:creationId xmlns:p14="http://schemas.microsoft.com/office/powerpoint/2010/main" val="1977993870"/>
+      </p:ext>
+    </p:extLst>
+  </p:cSld>
+  <p:clrMapOvr>
+    <a:masterClrMapping/>
+  </p:clrMapOvr>
+</p:sld>
+</file>
+
+<file path=ppt/slides/slide19.xml><?xml version="1.0" encoding="utf-8"?>
+<p:sld xmlns:a="http://schemas.openxmlformats.org/drawingml/2006/main" xmlns:r="http://schemas.openxmlformats.org/officeDocument/2006/relationships" xmlns:p="http://schemas.openxmlformats.org/presentationml/2006/main">
+  <p:cSld>
+    <p:spTree>
+      <p:nvGrpSpPr>
+        <p:cNvPr id="1" name=""/>
+        <p:cNvGrpSpPr/>
+        <p:nvPr/>
+      </p:nvGrpSpPr>
+      <p:grpSpPr>
+        <a:xfrm>
+          <a:off x="0" y="0"/>
+          <a:ext cx="0" cy="0"/>
+          <a:chOff x="0" y="0"/>
+          <a:chExt cx="0" cy="0"/>
+        </a:xfrm>
+      </p:grpSpPr>
+      <p:sp>
+        <p:nvSpPr>
+          <p:cNvPr id="4" name="文字方塊 3">
+            <a:extLst>
+              <a:ext uri="{FF2B5EF4-FFF2-40B4-BE49-F238E27FC236}">
+                <a16:creationId xmlns:a16="http://schemas.microsoft.com/office/drawing/2014/main" id="{A2D95AE1-409A-44C3-B90F-8326E1441332}"/>
+              </a:ext>
+            </a:extLst>
+          </p:cNvPr>
+          <p:cNvSpPr txBox="1"/>
+          <p:nvPr/>
+        </p:nvSpPr>
+        <p:spPr>
+          <a:xfrm>
+            <a:off x="355600" y="325120"/>
+            <a:ext cx="11480800" cy="5170646"/>
+          </a:xfrm>
+          <a:prstGeom prst="rect">
+            <a:avLst/>
+          </a:prstGeom>
+          <a:noFill/>
+        </p:spPr>
+        <p:txBody>
+          <a:bodyPr wrap="square" rtlCol="0">
+            <a:spAutoFit/>
+          </a:bodyPr>
+          <a:lstStyle/>
+          <a:p>
+            <a:r>
+              <a:rPr lang="zh-CN" altLang="en-US" sz="2400" b="1" u="sng" dirty="0"/>
+              <a:t>遠程分支的使用</a:t>
+            </a:r>
+            <a:endParaRPr lang="en-US" altLang="zh-CN" sz="2400" b="1" u="sng" dirty="0"/>
+          </a:p>
+          <a:p>
+            <a:r>
+              <a:rPr lang="en-US" altLang="zh-CN" sz="2400" dirty="0"/>
+              <a:t>	</a:t>
+            </a:r>
+            <a:r>
+              <a:rPr lang="en-US" altLang="zh-CN" dirty="0"/>
+              <a:t>13. </a:t>
+            </a:r>
+            <a:r>
+              <a:rPr lang="zh-CN" altLang="en-US" dirty="0"/>
+              <a:t>用已經存在的分支與遠程分支綁定</a:t>
+            </a:r>
+            <a:endParaRPr lang="en-US" altLang="zh-CN" dirty="0"/>
+          </a:p>
+          <a:p>
+            <a:r>
+              <a:rPr lang="en-US" altLang="zh-CN" dirty="0"/>
+              <a:t>		git branch –u </a:t>
+            </a:r>
+            <a:r>
+              <a:rPr lang="zh-CN" altLang="en-US" dirty="0"/>
+              <a:t>已經存在的本地分支</a:t>
+            </a:r>
+            <a:r>
+              <a:rPr lang="en-US" altLang="zh-CN" dirty="0"/>
+              <a:t> </a:t>
+            </a:r>
+            <a:r>
+              <a:rPr lang="zh-CN" altLang="en-US" dirty="0"/>
+              <a:t>遠程分支</a:t>
+            </a:r>
+            <a:endParaRPr lang="en-US" altLang="zh-CN" dirty="0"/>
+          </a:p>
+          <a:p>
+            <a:endParaRPr lang="en-US" altLang="zh-CN" dirty="0"/>
+          </a:p>
+          <a:p>
+            <a:r>
+              <a:rPr lang="en-US" altLang="zh-CN" dirty="0"/>
+              <a:t>	14. </a:t>
+            </a:r>
+            <a:r>
+              <a:rPr lang="zh-CN" altLang="en-US" dirty="0"/>
+              <a:t>抓取遠程分支的狀態然後查看</a:t>
+            </a:r>
+            <a:endParaRPr lang="en-US" altLang="zh-CN" dirty="0"/>
+          </a:p>
+          <a:p>
+            <a:r>
+              <a:rPr lang="en-US" altLang="zh-CN" dirty="0"/>
+              <a:t>		git fetch</a:t>
+            </a:r>
+          </a:p>
+          <a:p>
+            <a:r>
+              <a:rPr lang="en-US" altLang="zh-CN" dirty="0"/>
+              <a:t>		git status</a:t>
+            </a:r>
+          </a:p>
+          <a:p>
+            <a:endParaRPr lang="en-US" altLang="zh-CN" dirty="0"/>
+          </a:p>
+          <a:p>
+            <a:r>
+              <a:rPr lang="en-US" altLang="zh-CN" dirty="0"/>
+              <a:t>	15. </a:t>
+            </a:r>
+            <a:r>
+              <a:rPr lang="zh-CN" altLang="en-US" dirty="0"/>
+              <a:t>刪除遠程分支的方法</a:t>
+            </a:r>
+            <a:endParaRPr lang="en-US" altLang="zh-CN" dirty="0"/>
+          </a:p>
+          <a:p>
+            <a:r>
+              <a:rPr lang="en-US" altLang="zh-CN" dirty="0"/>
+              <a:t>		(1)git push origin :</a:t>
+            </a:r>
+            <a:r>
+              <a:rPr lang="zh-CN" altLang="en-US" dirty="0"/>
+              <a:t>遠程分支名</a:t>
+            </a:r>
+            <a:endParaRPr lang="en-US" altLang="zh-CN" dirty="0"/>
+          </a:p>
+          <a:p>
+            <a:r>
+              <a:rPr lang="en-US" altLang="zh-CN" dirty="0"/>
+              <a:t>		(2)git push origin --delete </a:t>
+            </a:r>
+            <a:r>
+              <a:rPr lang="zh-CN" altLang="en-US" dirty="0"/>
+              <a:t>遠程分支名</a:t>
+            </a:r>
+            <a:endParaRPr lang="en-US" altLang="zh-CN" dirty="0"/>
+          </a:p>
+          <a:p>
+            <a:endParaRPr lang="en-US" altLang="zh-TW" sz="2000" dirty="0"/>
+          </a:p>
+          <a:p>
+            <a:r>
+              <a:rPr lang="en-US" altLang="zh-TW" sz="2000" dirty="0"/>
+              <a:t>	</a:t>
+            </a:r>
+            <a:r>
+              <a:rPr lang="en-US" altLang="zh-CN" sz="2000" dirty="0"/>
+              <a:t>16. </a:t>
+            </a:r>
+            <a:r>
+              <a:rPr lang="zh-CN" altLang="en-US" sz="2000" dirty="0"/>
+              <a:t>給遠程分支重新命名</a:t>
+            </a:r>
+            <a:endParaRPr lang="en-US" altLang="zh-CN" sz="2000" dirty="0"/>
+          </a:p>
+          <a:p>
+            <a:r>
+              <a:rPr lang="en-US" altLang="zh-TW" sz="2000" dirty="0"/>
+              <a:t>		(1)</a:t>
+            </a:r>
+            <a:r>
+              <a:rPr lang="en-US" altLang="zh-CN" sz="2000" dirty="0"/>
+              <a:t>git branch </a:t>
+            </a:r>
+            <a:r>
+              <a:rPr lang="zh-CN" altLang="en-US" sz="2000" dirty="0"/>
+              <a:t>新分支名字</a:t>
+            </a:r>
+            <a:endParaRPr lang="en-US" altLang="zh-CN" sz="2000" dirty="0"/>
+          </a:p>
+          <a:p>
+            <a:r>
+              <a:rPr lang="en-US" altLang="zh-TW" sz="2000" dirty="0"/>
+              <a:t>		(2)</a:t>
+            </a:r>
+            <a:r>
+              <a:rPr lang="en-US" altLang="zh-CN" sz="2000" dirty="0"/>
+              <a:t>git push origin </a:t>
+            </a:r>
+            <a:r>
+              <a:rPr lang="zh-CN" altLang="en-US" sz="2000" dirty="0"/>
+              <a:t>新分支名字</a:t>
+            </a:r>
+            <a:r>
+              <a:rPr lang="en-US" altLang="zh-TW" sz="2000" dirty="0"/>
+              <a:t>	</a:t>
+            </a:r>
+          </a:p>
+          <a:p>
+            <a:r>
+              <a:rPr lang="en-US" altLang="zh-TW" sz="2000" dirty="0"/>
+              <a:t>		(3)git push origin :</a:t>
+            </a:r>
+            <a:r>
+              <a:rPr lang="zh-CN" altLang="en-US" sz="2000"/>
+              <a:t>舊的分支名字</a:t>
+            </a:r>
+            <a:endParaRPr lang="en-US" altLang="zh-TW" sz="2000" dirty="0"/>
+          </a:p>
+          <a:p>
+            <a:r>
+              <a:rPr lang="en-US" altLang="zh-TW" sz="2000" dirty="0"/>
+              <a:t>	</a:t>
+            </a:r>
+            <a:endParaRPr lang="en-US" altLang="zh-TW" dirty="0"/>
+          </a:p>
+        </p:txBody>
+      </p:sp>
+    </p:spTree>
+    <p:extLst>
+      <p:ext uri="{BB962C8B-B14F-4D97-AF65-F5344CB8AC3E}">
+        <p14:creationId xmlns:p14="http://schemas.microsoft.com/office/powerpoint/2010/main" val="2308405603"/>
       </p:ext>
     </p:extLst>
   </p:cSld>

</xml_diff>

<commit_message>
Add the git format-patch into pptx
</commit_message>
<xml_diff>
--- a/GitStudy/GitStudy.pptx
+++ b/GitStudy/GitStudy.pptx
@@ -5,7 +5,7 @@
     <p:sldMasterId id="2147483648" r:id="rId1"/>
   </p:sldMasterIdLst>
   <p:notesMasterIdLst>
-    <p:notesMasterId r:id="rId21"/>
+    <p:notesMasterId r:id="rId22"/>
   </p:notesMasterIdLst>
   <p:sldIdLst>
     <p:sldId id="256" r:id="rId2"/>
@@ -27,6 +27,7 @@
     <p:sldId id="272" r:id="rId18"/>
     <p:sldId id="273" r:id="rId19"/>
     <p:sldId id="274" r:id="rId20"/>
+    <p:sldId id="275" r:id="rId21"/>
   </p:sldIdLst>
   <p:sldSz cx="12192000" cy="6858000"/>
   <p:notesSz cx="6858000" cy="9144000"/>
@@ -215,7 +216,7 @@
           <a:p>
             <a:fld id="{C0F69D9A-D151-4089-8C1D-9A87D3DC0987}" type="datetimeFigureOut">
               <a:rPr lang="zh-TW" altLang="en-US" smtClean="0"/>
-              <a:t>2023/2/4</a:t>
+              <a:t>2023/2/14</a:t>
             </a:fld>
             <a:endParaRPr lang="zh-TW" altLang="en-US"/>
           </a:p>
@@ -629,7 +630,7 @@
           <a:p>
             <a:fld id="{B3DC4D43-2745-46E1-A871-6B61F7786A47}" type="datetimeFigureOut">
               <a:rPr lang="zh-TW" altLang="en-US" smtClean="0"/>
-              <a:t>2023/2/4</a:t>
+              <a:t>2023/2/14</a:t>
             </a:fld>
             <a:endParaRPr lang="zh-TW" altLang="en-US"/>
           </a:p>
@@ -827,7 +828,7 @@
           <a:p>
             <a:fld id="{B3DC4D43-2745-46E1-A871-6B61F7786A47}" type="datetimeFigureOut">
               <a:rPr lang="zh-TW" altLang="en-US" smtClean="0"/>
-              <a:t>2023/2/4</a:t>
+              <a:t>2023/2/14</a:t>
             </a:fld>
             <a:endParaRPr lang="zh-TW" altLang="en-US"/>
           </a:p>
@@ -1035,7 +1036,7 @@
           <a:p>
             <a:fld id="{B3DC4D43-2745-46E1-A871-6B61F7786A47}" type="datetimeFigureOut">
               <a:rPr lang="zh-TW" altLang="en-US" smtClean="0"/>
-              <a:t>2023/2/4</a:t>
+              <a:t>2023/2/14</a:t>
             </a:fld>
             <a:endParaRPr lang="zh-TW" altLang="en-US"/>
           </a:p>
@@ -1233,7 +1234,7 @@
           <a:p>
             <a:fld id="{B3DC4D43-2745-46E1-A871-6B61F7786A47}" type="datetimeFigureOut">
               <a:rPr lang="zh-TW" altLang="en-US" smtClean="0"/>
-              <a:t>2023/2/4</a:t>
+              <a:t>2023/2/14</a:t>
             </a:fld>
             <a:endParaRPr lang="zh-TW" altLang="en-US"/>
           </a:p>
@@ -1508,7 +1509,7 @@
           <a:p>
             <a:fld id="{B3DC4D43-2745-46E1-A871-6B61F7786A47}" type="datetimeFigureOut">
               <a:rPr lang="zh-TW" altLang="en-US" smtClean="0"/>
-              <a:t>2023/2/4</a:t>
+              <a:t>2023/2/14</a:t>
             </a:fld>
             <a:endParaRPr lang="zh-TW" altLang="en-US"/>
           </a:p>
@@ -1773,7 +1774,7 @@
           <a:p>
             <a:fld id="{B3DC4D43-2745-46E1-A871-6B61F7786A47}" type="datetimeFigureOut">
               <a:rPr lang="zh-TW" altLang="en-US" smtClean="0"/>
-              <a:t>2023/2/4</a:t>
+              <a:t>2023/2/14</a:t>
             </a:fld>
             <a:endParaRPr lang="zh-TW" altLang="en-US"/>
           </a:p>
@@ -2185,7 +2186,7 @@
           <a:p>
             <a:fld id="{B3DC4D43-2745-46E1-A871-6B61F7786A47}" type="datetimeFigureOut">
               <a:rPr lang="zh-TW" altLang="en-US" smtClean="0"/>
-              <a:t>2023/2/4</a:t>
+              <a:t>2023/2/14</a:t>
             </a:fld>
             <a:endParaRPr lang="zh-TW" altLang="en-US"/>
           </a:p>
@@ -2326,7 +2327,7 @@
           <a:p>
             <a:fld id="{B3DC4D43-2745-46E1-A871-6B61F7786A47}" type="datetimeFigureOut">
               <a:rPr lang="zh-TW" altLang="en-US" smtClean="0"/>
-              <a:t>2023/2/4</a:t>
+              <a:t>2023/2/14</a:t>
             </a:fld>
             <a:endParaRPr lang="zh-TW" altLang="en-US"/>
           </a:p>
@@ -2439,7 +2440,7 @@
           <a:p>
             <a:fld id="{B3DC4D43-2745-46E1-A871-6B61F7786A47}" type="datetimeFigureOut">
               <a:rPr lang="zh-TW" altLang="en-US" smtClean="0"/>
-              <a:t>2023/2/4</a:t>
+              <a:t>2023/2/14</a:t>
             </a:fld>
             <a:endParaRPr lang="zh-TW" altLang="en-US"/>
           </a:p>
@@ -2750,7 +2751,7 @@
           <a:p>
             <a:fld id="{B3DC4D43-2745-46E1-A871-6B61F7786A47}" type="datetimeFigureOut">
               <a:rPr lang="zh-TW" altLang="en-US" smtClean="0"/>
-              <a:t>2023/2/4</a:t>
+              <a:t>2023/2/14</a:t>
             </a:fld>
             <a:endParaRPr lang="zh-TW" altLang="en-US"/>
           </a:p>
@@ -3038,7 +3039,7 @@
           <a:p>
             <a:fld id="{B3DC4D43-2745-46E1-A871-6B61F7786A47}" type="datetimeFigureOut">
               <a:rPr lang="zh-TW" altLang="en-US" smtClean="0"/>
-              <a:t>2023/2/4</a:t>
+              <a:t>2023/2/14</a:t>
             </a:fld>
             <a:endParaRPr lang="zh-TW" altLang="en-US"/>
           </a:p>
@@ -3279,7 +3280,7 @@
           <a:p>
             <a:fld id="{B3DC4D43-2745-46E1-A871-6B61F7786A47}" type="datetimeFigureOut">
               <a:rPr lang="zh-TW" altLang="en-US" smtClean="0"/>
-              <a:t>2023/2/4</a:t>
+              <a:t>2023/2/14</a:t>
             </a:fld>
             <a:endParaRPr lang="zh-TW" altLang="en-US"/>
           </a:p>
@@ -6490,6 +6491,189 @@
     <p:extLst>
       <p:ext uri="{BB962C8B-B14F-4D97-AF65-F5344CB8AC3E}">
         <p14:creationId xmlns:p14="http://schemas.microsoft.com/office/powerpoint/2010/main" val="1981488840"/>
+      </p:ext>
+    </p:extLst>
+  </p:cSld>
+  <p:clrMapOvr>
+    <a:masterClrMapping/>
+  </p:clrMapOvr>
+</p:sld>
+</file>
+
+<file path=ppt/slides/slide20.xml><?xml version="1.0" encoding="utf-8"?>
+<p:sld xmlns:a="http://schemas.openxmlformats.org/drawingml/2006/main" xmlns:r="http://schemas.openxmlformats.org/officeDocument/2006/relationships" xmlns:p="http://schemas.openxmlformats.org/presentationml/2006/main">
+  <p:cSld>
+    <p:spTree>
+      <p:nvGrpSpPr>
+        <p:cNvPr id="1" name=""/>
+        <p:cNvGrpSpPr/>
+        <p:nvPr/>
+      </p:nvGrpSpPr>
+      <p:grpSpPr>
+        <a:xfrm>
+          <a:off x="0" y="0"/>
+          <a:ext cx="0" cy="0"/>
+          <a:chOff x="0" y="0"/>
+          <a:chExt cx="0" cy="0"/>
+        </a:xfrm>
+      </p:grpSpPr>
+      <p:sp>
+        <p:nvSpPr>
+          <p:cNvPr id="5" name="文字方塊 4">
+            <a:extLst>
+              <a:ext uri="{FF2B5EF4-FFF2-40B4-BE49-F238E27FC236}">
+                <a16:creationId xmlns:a16="http://schemas.microsoft.com/office/drawing/2014/main" id="{6669FEF5-2795-41B4-9C67-6A3AFE909A96}"/>
+              </a:ext>
+            </a:extLst>
+          </p:cNvPr>
+          <p:cNvSpPr txBox="1"/>
+          <p:nvPr/>
+        </p:nvSpPr>
+        <p:spPr>
+          <a:xfrm>
+            <a:off x="132080" y="335280"/>
+            <a:ext cx="8398133" cy="1938992"/>
+          </a:xfrm>
+          <a:prstGeom prst="rect">
+            <a:avLst/>
+          </a:prstGeom>
+          <a:noFill/>
+        </p:spPr>
+        <p:txBody>
+          <a:bodyPr wrap="none" rtlCol="0">
+            <a:spAutoFit/>
+          </a:bodyPr>
+          <a:lstStyle/>
+          <a:p>
+            <a:r>
+              <a:rPr lang="zh-CN" altLang="en-US" sz="2000" b="1" u="sng" dirty="0"/>
+              <a:t>生成和運用</a:t>
+            </a:r>
+            <a:r>
+              <a:rPr lang="en-US" altLang="zh-CN" sz="2000" b="1" u="sng" dirty="0"/>
+              <a:t>patch</a:t>
+            </a:r>
+          </a:p>
+          <a:p>
+            <a:endParaRPr lang="en-US" altLang="zh-TW" sz="2000" b="1" u="sng" dirty="0"/>
+          </a:p>
+          <a:p>
+            <a:r>
+              <a:rPr lang="en-US" altLang="zh-TW" sz="2000" b="1" dirty="0"/>
+              <a:t>	</a:t>
+            </a:r>
+            <a:r>
+              <a:rPr lang="en-US" altLang="zh-CN" sz="2000" b="1" dirty="0"/>
+              <a:t>1.   git format-patch  master~3</a:t>
+            </a:r>
+            <a:r>
+              <a:rPr lang="zh-CN" altLang="en-US" sz="2000" b="1" dirty="0"/>
+              <a:t>   </a:t>
+            </a:r>
+            <a:r>
+              <a:rPr lang="en-US" altLang="zh-CN" sz="2000" b="1" dirty="0"/>
+              <a:t>---</a:t>
+            </a:r>
+            <a:r>
+              <a:rPr lang="zh-CN" altLang="en-US" sz="2000" b="1" dirty="0"/>
+              <a:t>   生成</a:t>
+            </a:r>
+            <a:r>
+              <a:rPr lang="en-US" altLang="zh-CN" sz="2000" b="1" dirty="0"/>
+              <a:t>patch</a:t>
+            </a:r>
+          </a:p>
+          <a:p>
+            <a:r>
+              <a:rPr lang="en-US" altLang="zh-TW" sz="2000" b="1" dirty="0"/>
+              <a:t>	</a:t>
+            </a:r>
+            <a:r>
+              <a:rPr lang="en-US" altLang="zh-CN" sz="2000" b="1" dirty="0"/>
+              <a:t>2.   git apply patch</a:t>
+            </a:r>
+            <a:r>
+              <a:rPr lang="zh-CN" altLang="en-US" sz="2000" b="1" dirty="0"/>
+              <a:t>檔案   </a:t>
+            </a:r>
+            <a:r>
+              <a:rPr lang="en-US" altLang="zh-CN" sz="2000" b="1" dirty="0"/>
+              <a:t>--- </a:t>
+            </a:r>
+            <a:r>
+              <a:rPr lang="zh-CN" altLang="en-US" sz="2000" b="1" dirty="0"/>
+              <a:t>運用</a:t>
+            </a:r>
+            <a:r>
+              <a:rPr lang="en-US" altLang="zh-CN" sz="2000" b="1" dirty="0"/>
+              <a:t>patch, </a:t>
+            </a:r>
+            <a:r>
+              <a:rPr lang="zh-CN" altLang="en-US" sz="2000" b="1" dirty="0"/>
+              <a:t>不產生</a:t>
+            </a:r>
+            <a:r>
+              <a:rPr lang="en-US" altLang="zh-CN" sz="2000" b="1" dirty="0"/>
+              <a:t>log</a:t>
+            </a:r>
+            <a:r>
+              <a:rPr lang="zh-CN" altLang="en-US" sz="2000" b="1" dirty="0"/>
+              <a:t>，修改進入工作區</a:t>
+            </a:r>
+            <a:endParaRPr lang="en-US" altLang="zh-CN" sz="2000" b="1" dirty="0"/>
+          </a:p>
+          <a:p>
+            <a:r>
+              <a:rPr lang="en-US" altLang="zh-TW" sz="2000" b="1" dirty="0"/>
+              <a:t>	</a:t>
+            </a:r>
+            <a:r>
+              <a:rPr lang="en-US" altLang="zh-CN" sz="2000" b="1" dirty="0"/>
+              <a:t>3.   git am  patch</a:t>
+            </a:r>
+            <a:r>
+              <a:rPr lang="zh-CN" altLang="en-US" sz="2000" b="1" dirty="0"/>
+              <a:t>檔案    </a:t>
+            </a:r>
+            <a:r>
+              <a:rPr lang="en-US" altLang="zh-CN" sz="2000" b="1" dirty="0"/>
+              <a:t>--- </a:t>
+            </a:r>
+            <a:r>
+              <a:rPr lang="zh-CN" altLang="en-US" sz="2000" b="1" dirty="0"/>
+              <a:t>運用</a:t>
+            </a:r>
+            <a:r>
+              <a:rPr lang="en-US" altLang="zh-CN" sz="2000" b="1" dirty="0"/>
+              <a:t>patch</a:t>
+            </a:r>
+            <a:r>
+              <a:rPr lang="zh-CN" altLang="en-US" sz="2000" b="1" dirty="0"/>
+              <a:t>產生</a:t>
+            </a:r>
+            <a:r>
+              <a:rPr lang="en-US" altLang="zh-CN" sz="2000" b="1" dirty="0"/>
+              <a:t>log, </a:t>
+            </a:r>
+            <a:r>
+              <a:rPr lang="zh-CN" altLang="en-US" sz="2000" b="1" dirty="0"/>
+              <a:t>修改進入版本庫</a:t>
+            </a:r>
+            <a:endParaRPr lang="en-US" altLang="zh-CN" sz="2000" b="1" dirty="0"/>
+          </a:p>
+          <a:p>
+            <a:r>
+              <a:rPr lang="en-US" altLang="zh-TW" sz="2000" b="1" dirty="0"/>
+              <a:t>	</a:t>
+            </a:r>
+            <a:endParaRPr lang="zh-TW" altLang="en-US" sz="2000" b="1" dirty="0"/>
+          </a:p>
+        </p:txBody>
+      </p:sp>
+    </p:spTree>
+    <p:extLst>
+      <p:ext uri="{BB962C8B-B14F-4D97-AF65-F5344CB8AC3E}">
+        <p14:creationId xmlns:p14="http://schemas.microsoft.com/office/powerpoint/2010/main" val="2512809475"/>
       </p:ext>
     </p:extLst>
   </p:cSld>

</xml_diff>